<commit_message>
Updated XML and IO presentations
- static methods of File class
- minor text changes in XML presentation
</commit_message>
<xml_diff>
--- a/Presentation/lesson-04-io.pptx
+++ b/Presentation/lesson-04-io.pptx
@@ -22,14 +22,17 @@
     <p:sldId id="263" r:id="rId16"/>
     <p:sldId id="275" r:id="rId17"/>
     <p:sldId id="264" r:id="rId18"/>
-    <p:sldId id="265" r:id="rId19"/>
-    <p:sldId id="266" r:id="rId20"/>
-    <p:sldId id="267" r:id="rId21"/>
-    <p:sldId id="268" r:id="rId22"/>
-    <p:sldId id="278" r:id="rId23"/>
-    <p:sldId id="279" r:id="rId24"/>
-    <p:sldId id="280" r:id="rId25"/>
-    <p:sldId id="271" r:id="rId26"/>
+    <p:sldId id="288" r:id="rId19"/>
+    <p:sldId id="289" r:id="rId20"/>
+    <p:sldId id="265" r:id="rId21"/>
+    <p:sldId id="266" r:id="rId22"/>
+    <p:sldId id="267" r:id="rId23"/>
+    <p:sldId id="268" r:id="rId24"/>
+    <p:sldId id="287" r:id="rId25"/>
+    <p:sldId id="278" r:id="rId26"/>
+    <p:sldId id="279" r:id="rId27"/>
+    <p:sldId id="280" r:id="rId28"/>
+    <p:sldId id="271" r:id="rId29"/>
   </p:sldIdLst>
   <p:sldSz cx="9144000" cy="6858000" type="screen4x3"/>
   <p:notesSz cx="6858000" cy="9144000"/>
@@ -312,7 +315,7 @@
           <a:p>
             <a:fld id="{FAECF776-F836-4CCD-9497-99E5597B8B5D}" type="datetimeFigureOut">
               <a:rPr lang="en-US" smtClean="0"/>
-              <a:t>10/26/2013</a:t>
+              <a:t>10/28/2013</a:t>
             </a:fld>
             <a:endParaRPr lang="en-US"/>
           </a:p>
@@ -482,7 +485,7 @@
           <a:p>
             <a:fld id="{FAECF776-F836-4CCD-9497-99E5597B8B5D}" type="datetimeFigureOut">
               <a:rPr lang="en-US" smtClean="0"/>
-              <a:t>10/26/2013</a:t>
+              <a:t>10/28/2013</a:t>
             </a:fld>
             <a:endParaRPr lang="en-US"/>
           </a:p>
@@ -662,7 +665,7 @@
           <a:p>
             <a:fld id="{FAECF776-F836-4CCD-9497-99E5597B8B5D}" type="datetimeFigureOut">
               <a:rPr lang="en-US" smtClean="0"/>
-              <a:t>10/26/2013</a:t>
+              <a:t>10/28/2013</a:t>
             </a:fld>
             <a:endParaRPr lang="en-US"/>
           </a:p>
@@ -911,7 +914,7 @@
                 </a:solidFill>
               </a:rPr>
               <a:pPr/>
-              <a:t>10/26/2013</a:t>
+              <a:t>10/28/2013</a:t>
             </a:fld>
             <a:endParaRPr lang="en-US">
               <a:solidFill>
@@ -1113,7 +1116,7 @@
                 </a:solidFill>
               </a:rPr>
               <a:pPr/>
-              <a:t>10/26/2013</a:t>
+              <a:t>10/28/2013</a:t>
             </a:fld>
             <a:endParaRPr lang="en-US">
               <a:solidFill>
@@ -1391,7 +1394,7 @@
                 </a:solidFill>
               </a:rPr>
               <a:pPr/>
-              <a:t>10/26/2013</a:t>
+              <a:t>10/28/2013</a:t>
             </a:fld>
             <a:endParaRPr lang="en-US">
               <a:solidFill>
@@ -1711,7 +1714,7 @@
                 </a:solidFill>
               </a:rPr>
               <a:pPr/>
-              <a:t>10/26/2013</a:t>
+              <a:t>10/28/2013</a:t>
             </a:fld>
             <a:endParaRPr lang="en-US">
               <a:solidFill>
@@ -2165,7 +2168,7 @@
                 </a:solidFill>
               </a:rPr>
               <a:pPr/>
-              <a:t>10/26/2013</a:t>
+              <a:t>10/28/2013</a:t>
             </a:fld>
             <a:endParaRPr lang="en-US">
               <a:solidFill>
@@ -2315,7 +2318,7 @@
                 </a:solidFill>
               </a:rPr>
               <a:pPr/>
-              <a:t>10/26/2013</a:t>
+              <a:t>10/28/2013</a:t>
             </a:fld>
             <a:endParaRPr lang="en-US">
               <a:solidFill>
@@ -2442,7 +2445,7 @@
                 </a:solidFill>
               </a:rPr>
               <a:pPr/>
-              <a:t>10/26/2013</a:t>
+              <a:t>10/28/2013</a:t>
             </a:fld>
             <a:endParaRPr lang="en-US">
               <a:solidFill>
@@ -2751,7 +2754,7 @@
                 </a:solidFill>
               </a:rPr>
               <a:pPr/>
-              <a:t>10/26/2013</a:t>
+              <a:t>10/28/2013</a:t>
             </a:fld>
             <a:endParaRPr lang="en-US">
               <a:solidFill>
@@ -2946,7 +2949,7 @@
           <a:p>
             <a:fld id="{FAECF776-F836-4CCD-9497-99E5597B8B5D}" type="datetimeFigureOut">
               <a:rPr lang="en-US" smtClean="0"/>
-              <a:t>10/26/2013</a:t>
+              <a:t>10/28/2013</a:t>
             </a:fld>
             <a:endParaRPr lang="en-US"/>
           </a:p>
@@ -3206,7 +3209,7 @@
                 </a:solidFill>
               </a:rPr>
               <a:pPr/>
-              <a:t>10/26/2013</a:t>
+              <a:t>10/28/2013</a:t>
             </a:fld>
             <a:endParaRPr lang="en-US">
               <a:solidFill>
@@ -3408,7 +3411,7 @@
                 </a:solidFill>
               </a:rPr>
               <a:pPr/>
-              <a:t>10/26/2013</a:t>
+              <a:t>10/28/2013</a:t>
             </a:fld>
             <a:endParaRPr lang="en-US">
               <a:solidFill>
@@ -3620,7 +3623,7 @@
                 </a:solidFill>
               </a:rPr>
               <a:pPr/>
-              <a:t>10/26/2013</a:t>
+              <a:t>10/28/2013</a:t>
             </a:fld>
             <a:endParaRPr lang="en-US">
               <a:solidFill>
@@ -3891,7 +3894,7 @@
           <a:p>
             <a:fld id="{FAECF776-F836-4CCD-9497-99E5597B8B5D}" type="datetimeFigureOut">
               <a:rPr lang="en-US" smtClean="0"/>
-              <a:t>10/26/2013</a:t>
+              <a:t>10/28/2013</a:t>
             </a:fld>
             <a:endParaRPr lang="en-US"/>
           </a:p>
@@ -4179,7 +4182,7 @@
           <a:p>
             <a:fld id="{FAECF776-F836-4CCD-9497-99E5597B8B5D}" type="datetimeFigureOut">
               <a:rPr lang="en-US" smtClean="0"/>
-              <a:t>10/26/2013</a:t>
+              <a:t>10/28/2013</a:t>
             </a:fld>
             <a:endParaRPr lang="en-US"/>
           </a:p>
@@ -4601,7 +4604,7 @@
           <a:p>
             <a:fld id="{FAECF776-F836-4CCD-9497-99E5597B8B5D}" type="datetimeFigureOut">
               <a:rPr lang="en-US" smtClean="0"/>
-              <a:t>10/26/2013</a:t>
+              <a:t>10/28/2013</a:t>
             </a:fld>
             <a:endParaRPr lang="en-US"/>
           </a:p>
@@ -4719,7 +4722,7 @@
           <a:p>
             <a:fld id="{FAECF776-F836-4CCD-9497-99E5597B8B5D}" type="datetimeFigureOut">
               <a:rPr lang="en-US" smtClean="0"/>
-              <a:t>10/26/2013</a:t>
+              <a:t>10/28/2013</a:t>
             </a:fld>
             <a:endParaRPr lang="en-US"/>
           </a:p>
@@ -4814,7 +4817,7 @@
           <a:p>
             <a:fld id="{FAECF776-F836-4CCD-9497-99E5597B8B5D}" type="datetimeFigureOut">
               <a:rPr lang="en-US" smtClean="0"/>
-              <a:t>10/26/2013</a:t>
+              <a:t>10/28/2013</a:t>
             </a:fld>
             <a:endParaRPr lang="en-US"/>
           </a:p>
@@ -5091,7 +5094,7 @@
           <a:p>
             <a:fld id="{FAECF776-F836-4CCD-9497-99E5597B8B5D}" type="datetimeFigureOut">
               <a:rPr lang="en-US" smtClean="0"/>
-              <a:t>10/26/2013</a:t>
+              <a:t>10/28/2013</a:t>
             </a:fld>
             <a:endParaRPr lang="en-US"/>
           </a:p>
@@ -5344,7 +5347,7 @@
           <a:p>
             <a:fld id="{FAECF776-F836-4CCD-9497-99E5597B8B5D}" type="datetimeFigureOut">
               <a:rPr lang="en-US" smtClean="0"/>
-              <a:t>10/26/2013</a:t>
+              <a:t>10/28/2013</a:t>
             </a:fld>
             <a:endParaRPr lang="en-US"/>
           </a:p>
@@ -5566,7 +5569,7 @@
           <a:p>
             <a:fld id="{FAECF776-F836-4CCD-9497-99E5597B8B5D}" type="datetimeFigureOut">
               <a:rPr lang="en-US" smtClean="0"/>
-              <a:t>10/26/2013</a:t>
+              <a:t>10/28/2013</a:t>
             </a:fld>
             <a:endParaRPr lang="en-US"/>
           </a:p>
@@ -6083,7 +6086,7 @@
                 </a:solidFill>
               </a:rPr>
               <a:pPr/>
-              <a:t>10/26/2013</a:t>
+              <a:t>10/28/2013</a:t>
             </a:fld>
             <a:endParaRPr lang="en-US">
               <a:solidFill>
@@ -12788,6 +12791,2641 @@
 <file path=ppt/slides/slide17.xml><?xml version="1.0" encoding="utf-8"?>
 <p:sld xmlns:a="http://schemas.openxmlformats.org/drawingml/2006/main" xmlns:r="http://schemas.openxmlformats.org/officeDocument/2006/relationships" xmlns:p="http://schemas.openxmlformats.org/presentationml/2006/main">
   <p:cSld>
+    <p:spTree>
+      <p:nvGrpSpPr>
+        <p:cNvPr id="1" name=""/>
+        <p:cNvGrpSpPr/>
+        <p:nvPr/>
+      </p:nvGrpSpPr>
+      <p:grpSpPr>
+        <a:xfrm>
+          <a:off x="0" y="0"/>
+          <a:ext cx="0" cy="0"/>
+          <a:chOff x="0" y="0"/>
+          <a:chExt cx="0" cy="0"/>
+        </a:xfrm>
+      </p:grpSpPr>
+      <p:sp>
+        <p:nvSpPr>
+          <p:cNvPr id="2" name="Title 1"/>
+          <p:cNvSpPr>
+            <a:spLocks noGrp="1"/>
+          </p:cNvSpPr>
+          <p:nvPr>
+            <p:ph type="title"/>
+          </p:nvPr>
+        </p:nvSpPr>
+        <p:spPr>
+          <a:xfrm>
+            <a:off x="457200" y="274638"/>
+            <a:ext cx="8229600" cy="922114"/>
+          </a:xfrm>
+        </p:spPr>
+        <p:txBody>
+          <a:bodyPr>
+            <a:normAutofit/>
+          </a:bodyPr>
+          <a:lstStyle/>
+          <a:p>
+            <a:r>
+              <a:rPr lang="ru-RU" sz="2800" dirty="0" smtClean="0"/>
+              <a:t>Класс </a:t>
+            </a:r>
+            <a:r>
+              <a:rPr lang="en-US" sz="2800" dirty="0" smtClean="0"/>
+              <a:t>File. </a:t>
+            </a:r>
+            <a:r>
+              <a:rPr lang="ru-RU" sz="2800" dirty="0" smtClean="0"/>
+              <a:t>Быстрое чтение/запись файлов.</a:t>
+            </a:r>
+            <a:endParaRPr lang="en-US" sz="2800" dirty="0"/>
+          </a:p>
+        </p:txBody>
+      </p:sp>
+      <p:sp>
+        <p:nvSpPr>
+          <p:cNvPr id="3" name="Content Placeholder 2"/>
+          <p:cNvSpPr>
+            <a:spLocks noGrp="1"/>
+          </p:cNvSpPr>
+          <p:nvPr>
+            <p:ph idx="1"/>
+          </p:nvPr>
+        </p:nvSpPr>
+        <p:spPr>
+          <a:xfrm>
+            <a:off x="457200" y="1196752"/>
+            <a:ext cx="8229600" cy="748679"/>
+          </a:xfrm>
+        </p:spPr>
+        <p:txBody>
+          <a:bodyPr>
+            <a:normAutofit/>
+          </a:bodyPr>
+          <a:lstStyle/>
+          <a:p>
+            <a:pPr marL="0" indent="0">
+              <a:buNone/>
+            </a:pPr>
+            <a:r>
+              <a:rPr lang="ru-RU" sz="1600" dirty="0" smtClean="0"/>
+              <a:t>Класс </a:t>
+            </a:r>
+            <a:r>
+              <a:rPr lang="en-US" sz="1600" dirty="0" smtClean="0"/>
+              <a:t>File </a:t>
+            </a:r>
+            <a:r>
+              <a:rPr lang="ru-RU" sz="1600" dirty="0" smtClean="0"/>
+              <a:t>содержит ряд статических методов позволяющих прочитать все данные из файла или записать их в него с помощью одного вызова.</a:t>
+            </a:r>
+          </a:p>
+          <a:p>
+            <a:pPr marL="0" indent="0">
+              <a:buNone/>
+            </a:pPr>
+            <a:endParaRPr lang="en-US" sz="1600" dirty="0"/>
+          </a:p>
+        </p:txBody>
+      </p:sp>
+      <p:graphicFrame>
+        <p:nvGraphicFramePr>
+          <p:cNvPr id="4" name="Table 3"/>
+          <p:cNvGraphicFramePr>
+            <a:graphicFrameLocks noGrp="1"/>
+          </p:cNvGraphicFramePr>
+          <p:nvPr>
+            <p:extLst>
+              <p:ext uri="{D42A27DB-BD31-4B8C-83A1-F6EECF244321}">
+                <p14:modId xmlns:p14="http://schemas.microsoft.com/office/powerpoint/2010/main" val="1878610965"/>
+              </p:ext>
+            </p:extLst>
+          </p:nvPr>
+        </p:nvGraphicFramePr>
+        <p:xfrm>
+          <a:off x="492224" y="1940807"/>
+          <a:ext cx="8184232" cy="4297680"/>
+        </p:xfrm>
+        <a:graphic>
+          <a:graphicData uri="http://schemas.openxmlformats.org/drawingml/2006/table">
+            <a:tbl>
+              <a:tblPr firstRow="1" bandRow="1">
+                <a:tableStyleId>{073A0DAA-6AF3-43AB-8588-CEC1D06C72B9}</a:tableStyleId>
+              </a:tblPr>
+              <a:tblGrid>
+                <a:gridCol w="4367808"/>
+                <a:gridCol w="3816424"/>
+              </a:tblGrid>
+              <a:tr h="259433">
+                <a:tc gridSpan="2">
+                  <a:txBody>
+                    <a:bodyPr/>
+                    <a:lstStyle/>
+                    <a:p>
+                      <a:r>
+                        <a:rPr lang="ru-RU" sz="1200" dirty="0" smtClean="0">
+                          <a:solidFill>
+                            <a:schemeClr val="bg1"/>
+                          </a:solidFill>
+                        </a:rPr>
+                        <a:t>Бинарные</a:t>
+                      </a:r>
+                      <a:r>
+                        <a:rPr lang="ru-RU" sz="1200" baseline="0" dirty="0" smtClean="0">
+                          <a:solidFill>
+                            <a:schemeClr val="bg1"/>
+                          </a:solidFill>
+                        </a:rPr>
+                        <a:t> данные</a:t>
+                      </a:r>
+                      <a:endParaRPr lang="en-US" sz="1200" dirty="0">
+                        <a:solidFill>
+                          <a:schemeClr val="bg1"/>
+                        </a:solidFill>
+                      </a:endParaRPr>
+                    </a:p>
+                  </a:txBody>
+                  <a:tcPr>
+                    <a:lnL w="12700" cap="flat" cmpd="sng" algn="ctr">
+                      <a:solidFill>
+                        <a:schemeClr val="accent1"/>
+                      </a:solidFill>
+                      <a:prstDash val="solid"/>
+                      <a:round/>
+                      <a:headEnd type="none" w="med" len="med"/>
+                      <a:tailEnd type="none" w="med" len="med"/>
+                    </a:lnL>
+                    <a:lnR w="12700" cap="flat" cmpd="sng" algn="ctr">
+                      <a:solidFill>
+                        <a:schemeClr val="accent1"/>
+                      </a:solidFill>
+                      <a:prstDash val="solid"/>
+                      <a:round/>
+                      <a:headEnd type="none" w="med" len="med"/>
+                      <a:tailEnd type="none" w="med" len="med"/>
+                    </a:lnR>
+                    <a:lnT w="12700" cap="flat" cmpd="sng" algn="ctr">
+                      <a:solidFill>
+                        <a:schemeClr val="accent1"/>
+                      </a:solidFill>
+                      <a:prstDash val="solid"/>
+                      <a:round/>
+                      <a:headEnd type="none" w="med" len="med"/>
+                      <a:tailEnd type="none" w="med" len="med"/>
+                    </a:lnT>
+                    <a:lnB w="12700" cap="flat" cmpd="sng" algn="ctr">
+                      <a:solidFill>
+                        <a:schemeClr val="accent1"/>
+                      </a:solidFill>
+                      <a:prstDash val="solid"/>
+                      <a:round/>
+                      <a:headEnd type="none" w="med" len="med"/>
+                      <a:tailEnd type="none" w="med" len="med"/>
+                    </a:lnB>
+                    <a:solidFill>
+                      <a:schemeClr val="accent1"/>
+                    </a:solidFill>
+                  </a:tcPr>
+                </a:tc>
+                <a:tc hMerge="1">
+                  <a:txBody>
+                    <a:bodyPr/>
+                    <a:lstStyle/>
+                    <a:p>
+                      <a:endParaRPr lang="en-US"/>
+                    </a:p>
+                  </a:txBody>
+                  <a:tcPr/>
+                </a:tc>
+              </a:tr>
+              <a:tr h="143332">
+                <a:tc>
+                  <a:txBody>
+                    <a:bodyPr/>
+                    <a:lstStyle/>
+                    <a:p>
+                      <a:r>
+                        <a:rPr lang="en-US" sz="1200" dirty="0" smtClean="0">
+                          <a:solidFill>
+                            <a:schemeClr val="accent1"/>
+                          </a:solidFill>
+                        </a:rPr>
+                        <a:t>byte[] </a:t>
+                      </a:r>
+                      <a:r>
+                        <a:rPr lang="en-US" sz="1200" dirty="0" err="1" smtClean="0">
+                          <a:solidFill>
+                            <a:schemeClr val="accent1"/>
+                          </a:solidFill>
+                        </a:rPr>
+                        <a:t>ReadAllBytes</a:t>
+                      </a:r>
+                      <a:r>
+                        <a:rPr lang="en-US" sz="1200" dirty="0" smtClean="0">
+                          <a:solidFill>
+                            <a:schemeClr val="accent1"/>
+                          </a:solidFill>
+                        </a:rPr>
+                        <a:t>(string path)</a:t>
+                      </a:r>
+                      <a:endParaRPr lang="en-US" sz="1200" dirty="0">
+                        <a:solidFill>
+                          <a:schemeClr val="accent1"/>
+                        </a:solidFill>
+                      </a:endParaRPr>
+                    </a:p>
+                  </a:txBody>
+                  <a:tcPr>
+                    <a:lnL w="12700" cap="flat" cmpd="sng" algn="ctr">
+                      <a:solidFill>
+                        <a:schemeClr val="accent1"/>
+                      </a:solidFill>
+                      <a:prstDash val="solid"/>
+                      <a:round/>
+                      <a:headEnd type="none" w="med" len="med"/>
+                      <a:tailEnd type="none" w="med" len="med"/>
+                    </a:lnL>
+                    <a:lnR w="12700" cap="flat" cmpd="sng" algn="ctr">
+                      <a:solidFill>
+                        <a:schemeClr val="accent1"/>
+                      </a:solidFill>
+                      <a:prstDash val="solid"/>
+                      <a:round/>
+                      <a:headEnd type="none" w="med" len="med"/>
+                      <a:tailEnd type="none" w="med" len="med"/>
+                    </a:lnR>
+                    <a:lnT w="12700" cap="flat" cmpd="sng" algn="ctr">
+                      <a:solidFill>
+                        <a:schemeClr val="accent1"/>
+                      </a:solidFill>
+                      <a:prstDash val="solid"/>
+                      <a:round/>
+                      <a:headEnd type="none" w="med" len="med"/>
+                      <a:tailEnd type="none" w="med" len="med"/>
+                    </a:lnT>
+                    <a:lnB w="12700" cap="flat" cmpd="sng" algn="ctr">
+                      <a:solidFill>
+                        <a:schemeClr val="accent1"/>
+                      </a:solidFill>
+                      <a:prstDash val="solid"/>
+                      <a:round/>
+                      <a:headEnd type="none" w="med" len="med"/>
+                      <a:tailEnd type="none" w="med" len="med"/>
+                    </a:lnB>
+                  </a:tcPr>
+                </a:tc>
+                <a:tc>
+                  <a:txBody>
+                    <a:bodyPr/>
+                    <a:lstStyle/>
+                    <a:p>
+                      <a:r>
+                        <a:rPr lang="ru-RU" sz="1200" dirty="0" smtClean="0">
+                          <a:solidFill>
+                            <a:schemeClr val="accent1"/>
+                          </a:solidFill>
+                        </a:rPr>
+                        <a:t>Открывает файл на чтение, читает </a:t>
+                      </a:r>
+                      <a:r>
+                        <a:rPr lang="ru-RU" sz="1200" baseline="0" dirty="0" smtClean="0">
+                          <a:solidFill>
+                            <a:schemeClr val="accent1"/>
+                          </a:solidFill>
+                        </a:rPr>
+                        <a:t>содержимое файла в массив байтов и закрывает файл.</a:t>
+                      </a:r>
+                      <a:endParaRPr lang="en-US" sz="1200" dirty="0">
+                        <a:solidFill>
+                          <a:schemeClr val="accent1"/>
+                        </a:solidFill>
+                      </a:endParaRPr>
+                    </a:p>
+                  </a:txBody>
+                  <a:tcPr>
+                    <a:lnL w="12700" cap="flat" cmpd="sng" algn="ctr">
+                      <a:solidFill>
+                        <a:schemeClr val="accent1"/>
+                      </a:solidFill>
+                      <a:prstDash val="solid"/>
+                      <a:round/>
+                      <a:headEnd type="none" w="med" len="med"/>
+                      <a:tailEnd type="none" w="med" len="med"/>
+                    </a:lnL>
+                    <a:lnR w="12700" cap="flat" cmpd="sng" algn="ctr">
+                      <a:solidFill>
+                        <a:schemeClr val="accent1"/>
+                      </a:solidFill>
+                      <a:prstDash val="solid"/>
+                      <a:round/>
+                      <a:headEnd type="none" w="med" len="med"/>
+                      <a:tailEnd type="none" w="med" len="med"/>
+                    </a:lnR>
+                    <a:lnT w="12700" cap="flat" cmpd="sng" algn="ctr">
+                      <a:solidFill>
+                        <a:schemeClr val="accent1"/>
+                      </a:solidFill>
+                      <a:prstDash val="solid"/>
+                      <a:round/>
+                      <a:headEnd type="none" w="med" len="med"/>
+                      <a:tailEnd type="none" w="med" len="med"/>
+                    </a:lnT>
+                    <a:lnB w="12700" cap="flat" cmpd="sng" algn="ctr">
+                      <a:solidFill>
+                        <a:schemeClr val="accent1"/>
+                      </a:solidFill>
+                      <a:prstDash val="solid"/>
+                      <a:round/>
+                      <a:headEnd type="none" w="med" len="med"/>
+                      <a:tailEnd type="none" w="med" len="med"/>
+                    </a:lnB>
+                  </a:tcPr>
+                </a:tc>
+              </a:tr>
+              <a:tr h="148660">
+                <a:tc>
+                  <a:txBody>
+                    <a:bodyPr/>
+                    <a:lstStyle/>
+                    <a:p>
+                      <a:r>
+                        <a:rPr lang="en-US" sz="1200" dirty="0" smtClean="0">
+                          <a:solidFill>
+                            <a:schemeClr val="accent1"/>
+                          </a:solidFill>
+                        </a:rPr>
+                        <a:t>void </a:t>
+                      </a:r>
+                      <a:r>
+                        <a:rPr lang="en-US" sz="1200" dirty="0" err="1" smtClean="0">
+                          <a:solidFill>
+                            <a:schemeClr val="accent1"/>
+                          </a:solidFill>
+                        </a:rPr>
+                        <a:t>WriteAllBytes</a:t>
+                      </a:r>
+                      <a:r>
+                        <a:rPr lang="en-US" sz="1200" dirty="0" smtClean="0">
+                          <a:solidFill>
+                            <a:schemeClr val="accent1"/>
+                          </a:solidFill>
+                        </a:rPr>
+                        <a:t>(string path, byte[] bytes)</a:t>
+                      </a:r>
+                      <a:endParaRPr lang="en-US" sz="1200" dirty="0">
+                        <a:solidFill>
+                          <a:schemeClr val="accent1"/>
+                        </a:solidFill>
+                      </a:endParaRPr>
+                    </a:p>
+                  </a:txBody>
+                  <a:tcPr>
+                    <a:lnL w="12700" cap="flat" cmpd="sng" algn="ctr">
+                      <a:solidFill>
+                        <a:schemeClr val="accent1"/>
+                      </a:solidFill>
+                      <a:prstDash val="solid"/>
+                      <a:round/>
+                      <a:headEnd type="none" w="med" len="med"/>
+                      <a:tailEnd type="none" w="med" len="med"/>
+                    </a:lnL>
+                    <a:lnR w="12700" cap="flat" cmpd="sng" algn="ctr">
+                      <a:solidFill>
+                        <a:schemeClr val="accent1"/>
+                      </a:solidFill>
+                      <a:prstDash val="solid"/>
+                      <a:round/>
+                      <a:headEnd type="none" w="med" len="med"/>
+                      <a:tailEnd type="none" w="med" len="med"/>
+                    </a:lnR>
+                    <a:lnT w="12700" cap="flat" cmpd="sng" algn="ctr">
+                      <a:solidFill>
+                        <a:schemeClr val="accent1"/>
+                      </a:solidFill>
+                      <a:prstDash val="solid"/>
+                      <a:round/>
+                      <a:headEnd type="none" w="med" len="med"/>
+                      <a:tailEnd type="none" w="med" len="med"/>
+                    </a:lnT>
+                    <a:lnB w="12700" cap="flat" cmpd="sng" algn="ctr">
+                      <a:solidFill>
+                        <a:schemeClr val="accent1"/>
+                      </a:solidFill>
+                      <a:prstDash val="solid"/>
+                      <a:round/>
+                      <a:headEnd type="none" w="med" len="med"/>
+                      <a:tailEnd type="none" w="med" len="med"/>
+                    </a:lnB>
+                  </a:tcPr>
+                </a:tc>
+                <a:tc>
+                  <a:txBody>
+                    <a:bodyPr/>
+                    <a:lstStyle/>
+                    <a:p>
+                      <a:r>
+                        <a:rPr lang="ru-RU" sz="1200" dirty="0" smtClean="0">
+                          <a:solidFill>
+                            <a:schemeClr val="accent1"/>
+                          </a:solidFill>
+                        </a:rPr>
+                        <a:t>Открывает файл на запись,</a:t>
+                      </a:r>
+                      <a:r>
+                        <a:rPr lang="ru-RU" sz="1200" baseline="0" dirty="0" smtClean="0">
+                          <a:solidFill>
+                            <a:schemeClr val="accent1"/>
+                          </a:solidFill>
+                        </a:rPr>
+                        <a:t> записывает массив в него и закрывает файл.</a:t>
+                      </a:r>
+                      <a:endParaRPr lang="en-US" sz="1200" dirty="0">
+                        <a:solidFill>
+                          <a:schemeClr val="accent1"/>
+                        </a:solidFill>
+                      </a:endParaRPr>
+                    </a:p>
+                  </a:txBody>
+                  <a:tcPr>
+                    <a:lnL w="12700" cap="flat" cmpd="sng" algn="ctr">
+                      <a:solidFill>
+                        <a:schemeClr val="accent1"/>
+                      </a:solidFill>
+                      <a:prstDash val="solid"/>
+                      <a:round/>
+                      <a:headEnd type="none" w="med" len="med"/>
+                      <a:tailEnd type="none" w="med" len="med"/>
+                    </a:lnL>
+                    <a:lnR w="12700" cap="flat" cmpd="sng" algn="ctr">
+                      <a:solidFill>
+                        <a:schemeClr val="accent1"/>
+                      </a:solidFill>
+                      <a:prstDash val="solid"/>
+                      <a:round/>
+                      <a:headEnd type="none" w="med" len="med"/>
+                      <a:tailEnd type="none" w="med" len="med"/>
+                    </a:lnR>
+                    <a:lnT w="12700" cap="flat" cmpd="sng" algn="ctr">
+                      <a:solidFill>
+                        <a:schemeClr val="accent1"/>
+                      </a:solidFill>
+                      <a:prstDash val="solid"/>
+                      <a:round/>
+                      <a:headEnd type="none" w="med" len="med"/>
+                      <a:tailEnd type="none" w="med" len="med"/>
+                    </a:lnT>
+                    <a:lnB w="12700" cap="flat" cmpd="sng" algn="ctr">
+                      <a:solidFill>
+                        <a:schemeClr val="accent1"/>
+                      </a:solidFill>
+                      <a:prstDash val="solid"/>
+                      <a:round/>
+                      <a:headEnd type="none" w="med" len="med"/>
+                      <a:tailEnd type="none" w="med" len="med"/>
+                    </a:lnB>
+                  </a:tcPr>
+                </a:tc>
+              </a:tr>
+              <a:tr h="222841">
+                <a:tc gridSpan="2">
+                  <a:txBody>
+                    <a:bodyPr/>
+                    <a:lstStyle/>
+                    <a:p>
+                      <a:r>
+                        <a:rPr lang="ru-RU" sz="1200" b="1" dirty="0" smtClean="0">
+                          <a:solidFill>
+                            <a:schemeClr val="bg1"/>
+                          </a:solidFill>
+                        </a:rPr>
+                        <a:t>Текстовые данные</a:t>
+                      </a:r>
+                      <a:endParaRPr lang="en-US" sz="1200" b="1" dirty="0">
+                        <a:solidFill>
+                          <a:schemeClr val="bg1"/>
+                        </a:solidFill>
+                      </a:endParaRPr>
+                    </a:p>
+                  </a:txBody>
+                  <a:tcPr>
+                    <a:lnL w="12700" cap="flat" cmpd="sng" algn="ctr">
+                      <a:solidFill>
+                        <a:schemeClr val="accent1"/>
+                      </a:solidFill>
+                      <a:prstDash val="solid"/>
+                      <a:round/>
+                      <a:headEnd type="none" w="med" len="med"/>
+                      <a:tailEnd type="none" w="med" len="med"/>
+                    </a:lnL>
+                    <a:lnR w="12700" cap="flat" cmpd="sng" algn="ctr">
+                      <a:solidFill>
+                        <a:schemeClr val="accent1"/>
+                      </a:solidFill>
+                      <a:prstDash val="solid"/>
+                      <a:round/>
+                      <a:headEnd type="none" w="med" len="med"/>
+                      <a:tailEnd type="none" w="med" len="med"/>
+                    </a:lnR>
+                    <a:lnT w="12700" cap="flat" cmpd="sng" algn="ctr">
+                      <a:solidFill>
+                        <a:schemeClr val="accent1"/>
+                      </a:solidFill>
+                      <a:prstDash val="solid"/>
+                      <a:round/>
+                      <a:headEnd type="none" w="med" len="med"/>
+                      <a:tailEnd type="none" w="med" len="med"/>
+                    </a:lnT>
+                    <a:lnB w="12700" cap="flat" cmpd="sng" algn="ctr">
+                      <a:solidFill>
+                        <a:schemeClr val="accent1"/>
+                      </a:solidFill>
+                      <a:prstDash val="solid"/>
+                      <a:round/>
+                      <a:headEnd type="none" w="med" len="med"/>
+                      <a:tailEnd type="none" w="med" len="med"/>
+                    </a:lnB>
+                    <a:solidFill>
+                      <a:schemeClr val="accent1"/>
+                    </a:solidFill>
+                  </a:tcPr>
+                </a:tc>
+                <a:tc hMerge="1">
+                  <a:txBody>
+                    <a:bodyPr/>
+                    <a:lstStyle/>
+                    <a:p>
+                      <a:endParaRPr lang="en-US"/>
+                    </a:p>
+                  </a:txBody>
+                  <a:tcPr/>
+                </a:tc>
+              </a:tr>
+              <a:tr h="0">
+                <a:tc>
+                  <a:txBody>
+                    <a:bodyPr/>
+                    <a:lstStyle/>
+                    <a:p>
+                      <a:r>
+                        <a:rPr lang="en-US" sz="1200" dirty="0" smtClean="0">
+                          <a:solidFill>
+                            <a:schemeClr val="accent1"/>
+                          </a:solidFill>
+                        </a:rPr>
+                        <a:t>string[] </a:t>
+                      </a:r>
+                      <a:r>
+                        <a:rPr lang="en-US" sz="1200" dirty="0" err="1" smtClean="0">
+                          <a:solidFill>
+                            <a:schemeClr val="accent1"/>
+                          </a:solidFill>
+                        </a:rPr>
+                        <a:t>ReadAllLines</a:t>
+                      </a:r>
+                      <a:r>
+                        <a:rPr lang="en-US" sz="1200" dirty="0" smtClean="0">
+                          <a:solidFill>
+                            <a:schemeClr val="accent1"/>
+                          </a:solidFill>
+                        </a:rPr>
+                        <a:t>(string path)</a:t>
+                      </a:r>
+                      <a:endParaRPr lang="en-US" sz="1200" dirty="0">
+                        <a:solidFill>
+                          <a:schemeClr val="accent1"/>
+                        </a:solidFill>
+                      </a:endParaRPr>
+                    </a:p>
+                  </a:txBody>
+                  <a:tcPr>
+                    <a:lnL w="12700" cap="flat" cmpd="sng" algn="ctr">
+                      <a:solidFill>
+                        <a:schemeClr val="accent1"/>
+                      </a:solidFill>
+                      <a:prstDash val="solid"/>
+                      <a:round/>
+                      <a:headEnd type="none" w="med" len="med"/>
+                      <a:tailEnd type="none" w="med" len="med"/>
+                    </a:lnL>
+                    <a:lnR w="12700" cap="flat" cmpd="sng" algn="ctr">
+                      <a:solidFill>
+                        <a:schemeClr val="accent1"/>
+                      </a:solidFill>
+                      <a:prstDash val="solid"/>
+                      <a:round/>
+                      <a:headEnd type="none" w="med" len="med"/>
+                      <a:tailEnd type="none" w="med" len="med"/>
+                    </a:lnR>
+                    <a:lnT w="12700" cap="flat" cmpd="sng" algn="ctr">
+                      <a:solidFill>
+                        <a:schemeClr val="accent1"/>
+                      </a:solidFill>
+                      <a:prstDash val="solid"/>
+                      <a:round/>
+                      <a:headEnd type="none" w="med" len="med"/>
+                      <a:tailEnd type="none" w="med" len="med"/>
+                    </a:lnT>
+                    <a:lnB w="12700" cap="flat" cmpd="sng" algn="ctr">
+                      <a:solidFill>
+                        <a:schemeClr val="accent1"/>
+                      </a:solidFill>
+                      <a:prstDash val="solid"/>
+                      <a:round/>
+                      <a:headEnd type="none" w="med" len="med"/>
+                      <a:tailEnd type="none" w="med" len="med"/>
+                    </a:lnB>
+                  </a:tcPr>
+                </a:tc>
+                <a:tc rowSpan="2">
+                  <a:txBody>
+                    <a:bodyPr/>
+                    <a:lstStyle/>
+                    <a:p>
+                      <a:r>
+                        <a:rPr lang="ru-RU" sz="1200" dirty="0" smtClean="0">
+                          <a:solidFill>
+                            <a:schemeClr val="accent1"/>
+                          </a:solidFill>
+                        </a:rPr>
+                        <a:t>Открывает файл на чтение, </a:t>
+                      </a:r>
+                      <a:r>
+                        <a:rPr lang="ru-RU" sz="1200" dirty="0" smtClean="0">
+                          <a:solidFill>
+                            <a:schemeClr val="accent1"/>
+                          </a:solidFill>
+                        </a:rPr>
+                        <a:t>читает </a:t>
+                      </a:r>
+                      <a:r>
+                        <a:rPr lang="ru-RU" sz="1200" baseline="0" dirty="0" smtClean="0">
+                          <a:solidFill>
+                            <a:schemeClr val="accent1"/>
+                          </a:solidFill>
+                        </a:rPr>
+                        <a:t>содержимое файла в массив строк и закрывает файл. Если кодировка не указана, то используется </a:t>
+                      </a:r>
+                      <a:r>
+                        <a:rPr lang="en-US" sz="1200" baseline="0" dirty="0" smtClean="0">
+                          <a:solidFill>
+                            <a:schemeClr val="accent1"/>
+                          </a:solidFill>
+                        </a:rPr>
+                        <a:t>UTF-8. </a:t>
+                      </a:r>
+                      <a:r>
+                        <a:rPr lang="ru-RU" sz="1200" baseline="0" dirty="0" smtClean="0">
+                          <a:solidFill>
+                            <a:schemeClr val="accent1"/>
+                          </a:solidFill>
+                        </a:rPr>
+                        <a:t>Строки в массиве не содержат переводы строк.</a:t>
+                      </a:r>
+                      <a:endParaRPr lang="en-US" sz="1200" dirty="0">
+                        <a:solidFill>
+                          <a:schemeClr val="accent1"/>
+                        </a:solidFill>
+                      </a:endParaRPr>
+                    </a:p>
+                  </a:txBody>
+                  <a:tcPr>
+                    <a:lnL w="12700" cap="flat" cmpd="sng" algn="ctr">
+                      <a:solidFill>
+                        <a:schemeClr val="accent1"/>
+                      </a:solidFill>
+                      <a:prstDash val="solid"/>
+                      <a:round/>
+                      <a:headEnd type="none" w="med" len="med"/>
+                      <a:tailEnd type="none" w="med" len="med"/>
+                    </a:lnL>
+                    <a:lnR w="12700" cap="flat" cmpd="sng" algn="ctr">
+                      <a:solidFill>
+                        <a:schemeClr val="accent1"/>
+                      </a:solidFill>
+                      <a:prstDash val="solid"/>
+                      <a:round/>
+                      <a:headEnd type="none" w="med" len="med"/>
+                      <a:tailEnd type="none" w="med" len="med"/>
+                    </a:lnR>
+                    <a:lnT w="12700" cap="flat" cmpd="sng" algn="ctr">
+                      <a:solidFill>
+                        <a:schemeClr val="accent1"/>
+                      </a:solidFill>
+                      <a:prstDash val="solid"/>
+                      <a:round/>
+                      <a:headEnd type="none" w="med" len="med"/>
+                      <a:tailEnd type="none" w="med" len="med"/>
+                    </a:lnT>
+                    <a:lnB w="38100" cap="flat" cmpd="sng" algn="ctr">
+                      <a:solidFill>
+                        <a:schemeClr val="accent1"/>
+                      </a:solidFill>
+                      <a:prstDash val="solid"/>
+                      <a:round/>
+                      <a:headEnd type="none" w="med" len="med"/>
+                      <a:tailEnd type="none" w="med" len="med"/>
+                    </a:lnB>
+                  </a:tcPr>
+                </a:tc>
+              </a:tr>
+              <a:tr h="211892">
+                <a:tc>
+                  <a:txBody>
+                    <a:bodyPr/>
+                    <a:lstStyle/>
+                    <a:p>
+                      <a:r>
+                        <a:rPr lang="en-US" sz="1200" dirty="0" smtClean="0">
+                          <a:solidFill>
+                            <a:schemeClr val="accent1"/>
+                          </a:solidFill>
+                        </a:rPr>
+                        <a:t>string[] </a:t>
+                      </a:r>
+                      <a:r>
+                        <a:rPr lang="en-US" sz="1200" dirty="0" err="1" smtClean="0">
+                          <a:solidFill>
+                            <a:schemeClr val="accent1"/>
+                          </a:solidFill>
+                        </a:rPr>
+                        <a:t>ReadAllLines</a:t>
+                      </a:r>
+                      <a:r>
+                        <a:rPr lang="en-US" sz="1200" dirty="0" smtClean="0">
+                          <a:solidFill>
+                            <a:schemeClr val="accent1"/>
+                          </a:solidFill>
+                        </a:rPr>
+                        <a:t>(string path, Encoding encoding)</a:t>
+                      </a:r>
+                      <a:endParaRPr lang="en-US" sz="1200" dirty="0">
+                        <a:solidFill>
+                          <a:schemeClr val="accent1"/>
+                        </a:solidFill>
+                      </a:endParaRPr>
+                    </a:p>
+                  </a:txBody>
+                  <a:tcPr>
+                    <a:lnL w="12700" cap="flat" cmpd="sng" algn="ctr">
+                      <a:solidFill>
+                        <a:schemeClr val="accent1"/>
+                      </a:solidFill>
+                      <a:prstDash val="solid"/>
+                      <a:round/>
+                      <a:headEnd type="none" w="med" len="med"/>
+                      <a:tailEnd type="none" w="med" len="med"/>
+                    </a:lnL>
+                    <a:lnR w="12700" cap="flat" cmpd="sng" algn="ctr">
+                      <a:solidFill>
+                        <a:schemeClr val="accent1"/>
+                      </a:solidFill>
+                      <a:prstDash val="solid"/>
+                      <a:round/>
+                      <a:headEnd type="none" w="med" len="med"/>
+                      <a:tailEnd type="none" w="med" len="med"/>
+                    </a:lnR>
+                    <a:lnT w="12700" cap="flat" cmpd="sng" algn="ctr">
+                      <a:solidFill>
+                        <a:schemeClr val="accent1"/>
+                      </a:solidFill>
+                      <a:prstDash val="solid"/>
+                      <a:round/>
+                      <a:headEnd type="none" w="med" len="med"/>
+                      <a:tailEnd type="none" w="med" len="med"/>
+                    </a:lnT>
+                    <a:lnB w="38100" cap="flat" cmpd="sng" algn="ctr">
+                      <a:solidFill>
+                        <a:schemeClr val="accent1"/>
+                      </a:solidFill>
+                      <a:prstDash val="solid"/>
+                      <a:round/>
+                      <a:headEnd type="none" w="med" len="med"/>
+                      <a:tailEnd type="none" w="med" len="med"/>
+                    </a:lnB>
+                  </a:tcPr>
+                </a:tc>
+                <a:tc vMerge="1">
+                  <a:txBody>
+                    <a:bodyPr/>
+                    <a:lstStyle/>
+                    <a:p>
+                      <a:endParaRPr lang="en-US"/>
+                    </a:p>
+                  </a:txBody>
+                  <a:tcPr/>
+                </a:tc>
+              </a:tr>
+              <a:tr h="246856">
+                <a:tc>
+                  <a:txBody>
+                    <a:bodyPr/>
+                    <a:lstStyle/>
+                    <a:p>
+                      <a:r>
+                        <a:rPr lang="en-US" sz="1200" dirty="0" smtClean="0">
+                          <a:solidFill>
+                            <a:schemeClr val="accent1"/>
+                          </a:solidFill>
+                        </a:rPr>
+                        <a:t>string ReadAllText(string path)</a:t>
+                      </a:r>
+                      <a:endParaRPr lang="en-US" sz="1200" dirty="0">
+                        <a:solidFill>
+                          <a:schemeClr val="accent1"/>
+                        </a:solidFill>
+                      </a:endParaRPr>
+                    </a:p>
+                  </a:txBody>
+                  <a:tcPr>
+                    <a:lnL w="12700" cap="flat" cmpd="sng" algn="ctr">
+                      <a:solidFill>
+                        <a:schemeClr val="accent1"/>
+                      </a:solidFill>
+                      <a:prstDash val="solid"/>
+                      <a:round/>
+                      <a:headEnd type="none" w="med" len="med"/>
+                      <a:tailEnd type="none" w="med" len="med"/>
+                    </a:lnL>
+                    <a:lnR w="12700" cap="flat" cmpd="sng" algn="ctr">
+                      <a:solidFill>
+                        <a:schemeClr val="accent1"/>
+                      </a:solidFill>
+                      <a:prstDash val="solid"/>
+                      <a:round/>
+                      <a:headEnd type="none" w="med" len="med"/>
+                      <a:tailEnd type="none" w="med" len="med"/>
+                    </a:lnR>
+                    <a:lnT w="38100" cap="flat" cmpd="sng" algn="ctr">
+                      <a:solidFill>
+                        <a:schemeClr val="accent1"/>
+                      </a:solidFill>
+                      <a:prstDash val="solid"/>
+                      <a:round/>
+                      <a:headEnd type="none" w="med" len="med"/>
+                      <a:tailEnd type="none" w="med" len="med"/>
+                    </a:lnT>
+                    <a:lnB w="12700" cap="flat" cmpd="sng" algn="ctr">
+                      <a:solidFill>
+                        <a:schemeClr val="accent1"/>
+                      </a:solidFill>
+                      <a:prstDash val="solid"/>
+                      <a:round/>
+                      <a:headEnd type="none" w="med" len="med"/>
+                      <a:tailEnd type="none" w="med" len="med"/>
+                    </a:lnB>
+                  </a:tcPr>
+                </a:tc>
+                <a:tc rowSpan="2">
+                  <a:txBody>
+                    <a:bodyPr/>
+                    <a:lstStyle/>
+                    <a:p>
+                      <a:r>
+                        <a:rPr lang="ru-RU" sz="1200" dirty="0" smtClean="0">
+                          <a:solidFill>
+                            <a:schemeClr val="accent1"/>
+                          </a:solidFill>
+                        </a:rPr>
+                        <a:t>Открывает файл на чтение, читает </a:t>
+                      </a:r>
+                      <a:r>
+                        <a:rPr lang="ru-RU" sz="1200" baseline="0" dirty="0" smtClean="0">
+                          <a:solidFill>
+                            <a:schemeClr val="accent1"/>
+                          </a:solidFill>
+                        </a:rPr>
+                        <a:t>содержимое файла в строку и закрывает файл. Если кодировка не указана, то используется </a:t>
+                      </a:r>
+                      <a:r>
+                        <a:rPr lang="en-US" sz="1200" baseline="0" dirty="0" smtClean="0">
+                          <a:solidFill>
+                            <a:schemeClr val="accent1"/>
+                          </a:solidFill>
+                        </a:rPr>
+                        <a:t>UTF-8.</a:t>
+                      </a:r>
+                      <a:endParaRPr lang="en-US" sz="1200" dirty="0">
+                        <a:solidFill>
+                          <a:schemeClr val="accent1"/>
+                        </a:solidFill>
+                      </a:endParaRPr>
+                    </a:p>
+                  </a:txBody>
+                  <a:tcPr>
+                    <a:lnL w="12700" cap="flat" cmpd="sng" algn="ctr">
+                      <a:solidFill>
+                        <a:schemeClr val="accent1"/>
+                      </a:solidFill>
+                      <a:prstDash val="solid"/>
+                      <a:round/>
+                      <a:headEnd type="none" w="med" len="med"/>
+                      <a:tailEnd type="none" w="med" len="med"/>
+                    </a:lnL>
+                    <a:lnR w="12700" cap="flat" cmpd="sng" algn="ctr">
+                      <a:solidFill>
+                        <a:schemeClr val="accent1"/>
+                      </a:solidFill>
+                      <a:prstDash val="solid"/>
+                      <a:round/>
+                      <a:headEnd type="none" w="med" len="med"/>
+                      <a:tailEnd type="none" w="med" len="med"/>
+                    </a:lnR>
+                    <a:lnT w="38100" cap="flat" cmpd="sng" algn="ctr">
+                      <a:solidFill>
+                        <a:schemeClr val="accent1"/>
+                      </a:solidFill>
+                      <a:prstDash val="solid"/>
+                      <a:round/>
+                      <a:headEnd type="none" w="med" len="med"/>
+                      <a:tailEnd type="none" w="med" len="med"/>
+                    </a:lnT>
+                    <a:lnB w="38100" cap="flat" cmpd="sng" algn="ctr">
+                      <a:solidFill>
+                        <a:schemeClr val="accent1"/>
+                      </a:solidFill>
+                      <a:prstDash val="solid"/>
+                      <a:round/>
+                      <a:headEnd type="none" w="med" len="med"/>
+                      <a:tailEnd type="none" w="med" len="med"/>
+                    </a:lnB>
+                  </a:tcPr>
+                </a:tc>
+              </a:tr>
+              <a:tr h="0">
+                <a:tc>
+                  <a:txBody>
+                    <a:bodyPr/>
+                    <a:lstStyle/>
+                    <a:p>
+                      <a:r>
+                        <a:rPr lang="en-US" sz="1200" dirty="0" smtClean="0">
+                          <a:solidFill>
+                            <a:schemeClr val="accent1"/>
+                          </a:solidFill>
+                        </a:rPr>
+                        <a:t>string ReadAllText(string path, Encoding encoding)</a:t>
+                      </a:r>
+                      <a:endParaRPr lang="en-US" sz="1200" dirty="0">
+                        <a:solidFill>
+                          <a:schemeClr val="accent1"/>
+                        </a:solidFill>
+                      </a:endParaRPr>
+                    </a:p>
+                  </a:txBody>
+                  <a:tcPr>
+                    <a:lnL w="12700" cap="flat" cmpd="sng" algn="ctr">
+                      <a:solidFill>
+                        <a:schemeClr val="accent1"/>
+                      </a:solidFill>
+                      <a:prstDash val="solid"/>
+                      <a:round/>
+                      <a:headEnd type="none" w="med" len="med"/>
+                      <a:tailEnd type="none" w="med" len="med"/>
+                    </a:lnL>
+                    <a:lnR w="12700" cap="flat" cmpd="sng" algn="ctr">
+                      <a:solidFill>
+                        <a:schemeClr val="accent1"/>
+                      </a:solidFill>
+                      <a:prstDash val="solid"/>
+                      <a:round/>
+                      <a:headEnd type="none" w="med" len="med"/>
+                      <a:tailEnd type="none" w="med" len="med"/>
+                    </a:lnR>
+                    <a:lnT w="12700" cap="flat" cmpd="sng" algn="ctr">
+                      <a:solidFill>
+                        <a:schemeClr val="accent1"/>
+                      </a:solidFill>
+                      <a:prstDash val="solid"/>
+                      <a:round/>
+                      <a:headEnd type="none" w="med" len="med"/>
+                      <a:tailEnd type="none" w="med" len="med"/>
+                    </a:lnT>
+                    <a:lnB w="38100" cap="flat" cmpd="sng" algn="ctr">
+                      <a:solidFill>
+                        <a:schemeClr val="accent1"/>
+                      </a:solidFill>
+                      <a:prstDash val="solid"/>
+                      <a:round/>
+                      <a:headEnd type="none" w="med" len="med"/>
+                      <a:tailEnd type="none" w="med" len="med"/>
+                    </a:lnB>
+                  </a:tcPr>
+                </a:tc>
+                <a:tc vMerge="1">
+                  <a:txBody>
+                    <a:bodyPr/>
+                    <a:lstStyle/>
+                    <a:p>
+                      <a:endParaRPr lang="en-US"/>
+                    </a:p>
+                  </a:txBody>
+                  <a:tcPr/>
+                </a:tc>
+              </a:tr>
+              <a:tr h="151224">
+                <a:tc>
+                  <a:txBody>
+                    <a:bodyPr/>
+                    <a:lstStyle/>
+                    <a:p>
+                      <a:r>
+                        <a:rPr lang="en-US" sz="1200" dirty="0" smtClean="0">
+                          <a:solidFill>
+                            <a:schemeClr val="accent1"/>
+                          </a:solidFill>
+                        </a:rPr>
+                        <a:t>void </a:t>
+                      </a:r>
+                      <a:r>
+                        <a:rPr lang="en-US" sz="1200" dirty="0" err="1" smtClean="0">
+                          <a:solidFill>
+                            <a:schemeClr val="accent1"/>
+                          </a:solidFill>
+                        </a:rPr>
+                        <a:t>AppendAllLines</a:t>
+                      </a:r>
+                      <a:r>
+                        <a:rPr lang="en-US" sz="1200" dirty="0" smtClean="0">
+                          <a:solidFill>
+                            <a:schemeClr val="accent1"/>
+                          </a:solidFill>
+                        </a:rPr>
+                        <a:t>(string path, </a:t>
+                      </a:r>
+                      <a:r>
+                        <a:rPr lang="en-US" sz="1200" dirty="0" err="1" smtClean="0">
+                          <a:solidFill>
+                            <a:schemeClr val="accent1"/>
+                          </a:solidFill>
+                        </a:rPr>
+                        <a:t>IEnumerable</a:t>
+                      </a:r>
+                      <a:r>
+                        <a:rPr lang="en-US" sz="1200" dirty="0" smtClean="0">
+                          <a:solidFill>
+                            <a:schemeClr val="accent1"/>
+                          </a:solidFill>
+                        </a:rPr>
+                        <a:t>&lt;string&gt; contents)</a:t>
+                      </a:r>
+                      <a:endParaRPr lang="en-US" sz="1200" dirty="0">
+                        <a:solidFill>
+                          <a:schemeClr val="accent1"/>
+                        </a:solidFill>
+                      </a:endParaRPr>
+                    </a:p>
+                  </a:txBody>
+                  <a:tcPr>
+                    <a:lnL w="12700" cap="flat" cmpd="sng" algn="ctr">
+                      <a:solidFill>
+                        <a:schemeClr val="accent1"/>
+                      </a:solidFill>
+                      <a:prstDash val="solid"/>
+                      <a:round/>
+                      <a:headEnd type="none" w="med" len="med"/>
+                      <a:tailEnd type="none" w="med" len="med"/>
+                    </a:lnL>
+                    <a:lnR w="12700" cap="flat" cmpd="sng" algn="ctr">
+                      <a:solidFill>
+                        <a:schemeClr val="accent1"/>
+                      </a:solidFill>
+                      <a:prstDash val="solid"/>
+                      <a:round/>
+                      <a:headEnd type="none" w="med" len="med"/>
+                      <a:tailEnd type="none" w="med" len="med"/>
+                    </a:lnR>
+                    <a:lnT w="38100" cap="flat" cmpd="sng" algn="ctr">
+                      <a:solidFill>
+                        <a:schemeClr val="accent1"/>
+                      </a:solidFill>
+                      <a:prstDash val="solid"/>
+                      <a:round/>
+                      <a:headEnd type="none" w="med" len="med"/>
+                      <a:tailEnd type="none" w="med" len="med"/>
+                    </a:lnT>
+                    <a:lnB w="12700" cap="flat" cmpd="sng" algn="ctr">
+                      <a:solidFill>
+                        <a:schemeClr val="accent1"/>
+                      </a:solidFill>
+                      <a:prstDash val="solid"/>
+                      <a:round/>
+                      <a:headEnd type="none" w="med" len="med"/>
+                      <a:tailEnd type="none" w="med" len="med"/>
+                    </a:lnB>
+                  </a:tcPr>
+                </a:tc>
+                <a:tc rowSpan="2">
+                  <a:txBody>
+                    <a:bodyPr/>
+                    <a:lstStyle/>
+                    <a:p>
+                      <a:r>
+                        <a:rPr lang="ru-RU" sz="1200" dirty="0" smtClean="0">
+                          <a:solidFill>
+                            <a:schemeClr val="accent1"/>
+                          </a:solidFill>
+                        </a:rPr>
+                        <a:t>Открывает файл на запись,</a:t>
+                      </a:r>
+                      <a:r>
+                        <a:rPr lang="ru-RU" sz="1200" baseline="0" dirty="0" smtClean="0">
+                          <a:solidFill>
+                            <a:schemeClr val="accent1"/>
+                          </a:solidFill>
+                        </a:rPr>
+                        <a:t> дописывает переданные строки в конец файла и закрывает его. Если кодировка не указана, то используется </a:t>
+                      </a:r>
+                      <a:r>
+                        <a:rPr lang="en-US" sz="1200" baseline="0" dirty="0" smtClean="0">
+                          <a:solidFill>
+                            <a:schemeClr val="accent1"/>
+                          </a:solidFill>
+                        </a:rPr>
+                        <a:t>UTF-8.</a:t>
+                      </a:r>
+                      <a:endParaRPr lang="en-US" sz="1200" dirty="0">
+                        <a:solidFill>
+                          <a:schemeClr val="accent1"/>
+                        </a:solidFill>
+                      </a:endParaRPr>
+                    </a:p>
+                  </a:txBody>
+                  <a:tcPr>
+                    <a:lnL w="12700" cap="flat" cmpd="sng" algn="ctr">
+                      <a:solidFill>
+                        <a:schemeClr val="accent1"/>
+                      </a:solidFill>
+                      <a:prstDash val="solid"/>
+                      <a:round/>
+                      <a:headEnd type="none" w="med" len="med"/>
+                      <a:tailEnd type="none" w="med" len="med"/>
+                    </a:lnL>
+                    <a:lnR w="12700" cap="flat" cmpd="sng" algn="ctr">
+                      <a:solidFill>
+                        <a:schemeClr val="accent1"/>
+                      </a:solidFill>
+                      <a:prstDash val="solid"/>
+                      <a:round/>
+                      <a:headEnd type="none" w="med" len="med"/>
+                      <a:tailEnd type="none" w="med" len="med"/>
+                    </a:lnR>
+                    <a:lnT w="38100" cap="flat" cmpd="sng" algn="ctr">
+                      <a:solidFill>
+                        <a:schemeClr val="accent1"/>
+                      </a:solidFill>
+                      <a:prstDash val="solid"/>
+                      <a:round/>
+                      <a:headEnd type="none" w="med" len="med"/>
+                      <a:tailEnd type="none" w="med" len="med"/>
+                    </a:lnT>
+                    <a:lnB w="38100" cap="flat" cmpd="sng" algn="ctr">
+                      <a:solidFill>
+                        <a:schemeClr val="accent1"/>
+                      </a:solidFill>
+                      <a:prstDash val="solid"/>
+                      <a:round/>
+                      <a:headEnd type="none" w="med" len="med"/>
+                      <a:tailEnd type="none" w="med" len="med"/>
+                    </a:lnB>
+                  </a:tcPr>
+                </a:tc>
+              </a:tr>
+              <a:tr h="295692">
+                <a:tc>
+                  <a:txBody>
+                    <a:bodyPr/>
+                    <a:lstStyle/>
+                    <a:p>
+                      <a:r>
+                        <a:rPr lang="en-US" sz="1200" dirty="0" smtClean="0">
+                          <a:solidFill>
+                            <a:schemeClr val="accent1"/>
+                          </a:solidFill>
+                        </a:rPr>
+                        <a:t>void </a:t>
+                      </a:r>
+                      <a:r>
+                        <a:rPr lang="en-US" sz="1200" dirty="0" err="1" smtClean="0">
+                          <a:solidFill>
+                            <a:schemeClr val="accent1"/>
+                          </a:solidFill>
+                        </a:rPr>
+                        <a:t>AppendAllLines</a:t>
+                      </a:r>
+                      <a:r>
+                        <a:rPr lang="en-US" sz="1200" dirty="0" smtClean="0">
+                          <a:solidFill>
+                            <a:schemeClr val="accent1"/>
+                          </a:solidFill>
+                        </a:rPr>
+                        <a:t>(string path, </a:t>
+                      </a:r>
+                      <a:r>
+                        <a:rPr lang="en-US" sz="1200" dirty="0" err="1" smtClean="0">
+                          <a:solidFill>
+                            <a:schemeClr val="accent1"/>
+                          </a:solidFill>
+                        </a:rPr>
+                        <a:t>IEnumerable</a:t>
+                      </a:r>
+                      <a:r>
+                        <a:rPr lang="en-US" sz="1200" dirty="0" smtClean="0">
+                          <a:solidFill>
+                            <a:schemeClr val="accent1"/>
+                          </a:solidFill>
+                        </a:rPr>
+                        <a:t>&lt;string&gt; contents, Encoding encoding)</a:t>
+                      </a:r>
+                      <a:endParaRPr lang="en-US" sz="1200" dirty="0">
+                        <a:solidFill>
+                          <a:schemeClr val="accent1"/>
+                        </a:solidFill>
+                      </a:endParaRPr>
+                    </a:p>
+                  </a:txBody>
+                  <a:tcPr>
+                    <a:lnL w="12700" cap="flat" cmpd="sng" algn="ctr">
+                      <a:solidFill>
+                        <a:schemeClr val="accent1"/>
+                      </a:solidFill>
+                      <a:prstDash val="solid"/>
+                      <a:round/>
+                      <a:headEnd type="none" w="med" len="med"/>
+                      <a:tailEnd type="none" w="med" len="med"/>
+                    </a:lnL>
+                    <a:lnR w="12700" cap="flat" cmpd="sng" algn="ctr">
+                      <a:solidFill>
+                        <a:schemeClr val="accent1"/>
+                      </a:solidFill>
+                      <a:prstDash val="solid"/>
+                      <a:round/>
+                      <a:headEnd type="none" w="med" len="med"/>
+                      <a:tailEnd type="none" w="med" len="med"/>
+                    </a:lnR>
+                    <a:lnT w="12700" cap="flat" cmpd="sng" algn="ctr">
+                      <a:solidFill>
+                        <a:schemeClr val="accent1"/>
+                      </a:solidFill>
+                      <a:prstDash val="solid"/>
+                      <a:round/>
+                      <a:headEnd type="none" w="med" len="med"/>
+                      <a:tailEnd type="none" w="med" len="med"/>
+                    </a:lnT>
+                    <a:lnB w="38100" cap="flat" cmpd="sng" algn="ctr">
+                      <a:solidFill>
+                        <a:schemeClr val="accent1"/>
+                      </a:solidFill>
+                      <a:prstDash val="solid"/>
+                      <a:round/>
+                      <a:headEnd type="none" w="med" len="med"/>
+                      <a:tailEnd type="none" w="med" len="med"/>
+                    </a:lnB>
+                  </a:tcPr>
+                </a:tc>
+                <a:tc vMerge="1">
+                  <a:txBody>
+                    <a:bodyPr/>
+                    <a:lstStyle/>
+                    <a:p>
+                      <a:endParaRPr lang="en-US"/>
+                    </a:p>
+                  </a:txBody>
+                  <a:tcPr/>
+                </a:tc>
+              </a:tr>
+              <a:tr h="0">
+                <a:tc>
+                  <a:txBody>
+                    <a:bodyPr/>
+                    <a:lstStyle/>
+                    <a:p>
+                      <a:r>
+                        <a:rPr lang="en-US" sz="1200" dirty="0" smtClean="0">
+                          <a:solidFill>
+                            <a:schemeClr val="accent1"/>
+                          </a:solidFill>
+                        </a:rPr>
+                        <a:t>void </a:t>
+                      </a:r>
+                      <a:r>
+                        <a:rPr lang="en-US" sz="1200" dirty="0" err="1" smtClean="0">
+                          <a:solidFill>
+                            <a:schemeClr val="accent1"/>
+                          </a:solidFill>
+                        </a:rPr>
+                        <a:t>AppendAllText</a:t>
+                      </a:r>
+                      <a:r>
+                        <a:rPr lang="en-US" sz="1200" dirty="0" smtClean="0">
+                          <a:solidFill>
+                            <a:schemeClr val="accent1"/>
+                          </a:solidFill>
+                        </a:rPr>
+                        <a:t>(string path, string contents)</a:t>
+                      </a:r>
+                    </a:p>
+                  </a:txBody>
+                  <a:tcPr>
+                    <a:lnL w="12700" cap="flat" cmpd="sng" algn="ctr">
+                      <a:solidFill>
+                        <a:schemeClr val="accent1"/>
+                      </a:solidFill>
+                      <a:prstDash val="solid"/>
+                      <a:round/>
+                      <a:headEnd type="none" w="med" len="med"/>
+                      <a:tailEnd type="none" w="med" len="med"/>
+                    </a:lnL>
+                    <a:lnR w="12700" cap="flat" cmpd="sng" algn="ctr">
+                      <a:solidFill>
+                        <a:schemeClr val="accent1"/>
+                      </a:solidFill>
+                      <a:prstDash val="solid"/>
+                      <a:round/>
+                      <a:headEnd type="none" w="med" len="med"/>
+                      <a:tailEnd type="none" w="med" len="med"/>
+                    </a:lnR>
+                    <a:lnT w="38100" cap="flat" cmpd="sng" algn="ctr">
+                      <a:solidFill>
+                        <a:schemeClr val="accent1"/>
+                      </a:solidFill>
+                      <a:prstDash val="solid"/>
+                      <a:round/>
+                      <a:headEnd type="none" w="med" len="med"/>
+                      <a:tailEnd type="none" w="med" len="med"/>
+                    </a:lnT>
+                    <a:lnB w="12700" cap="flat" cmpd="sng" algn="ctr">
+                      <a:solidFill>
+                        <a:schemeClr val="accent1"/>
+                      </a:solidFill>
+                      <a:prstDash val="solid"/>
+                      <a:round/>
+                      <a:headEnd type="none" w="med" len="med"/>
+                      <a:tailEnd type="none" w="med" len="med"/>
+                    </a:lnB>
+                  </a:tcPr>
+                </a:tc>
+                <a:tc rowSpan="2">
+                  <a:txBody>
+                    <a:bodyPr/>
+                    <a:lstStyle/>
+                    <a:p>
+                      <a:pPr marL="0" marR="0" indent="0" algn="l" defTabSz="914400" rtl="0" eaLnBrk="1" fontAlgn="auto" latinLnBrk="0" hangingPunct="1">
+                        <a:lnSpc>
+                          <a:spcPct val="100000"/>
+                        </a:lnSpc>
+                        <a:spcBef>
+                          <a:spcPts val="0"/>
+                        </a:spcBef>
+                        <a:spcAft>
+                          <a:spcPts val="0"/>
+                        </a:spcAft>
+                        <a:buClrTx/>
+                        <a:buSzTx/>
+                        <a:buFontTx/>
+                        <a:buNone/>
+                        <a:tabLst/>
+                        <a:defRPr/>
+                      </a:pPr>
+                      <a:r>
+                        <a:rPr lang="ru-RU" sz="1200" dirty="0" smtClean="0">
+                          <a:solidFill>
+                            <a:schemeClr val="accent1"/>
+                          </a:solidFill>
+                        </a:rPr>
+                        <a:t>Открывает файл на запись,</a:t>
+                      </a:r>
+                      <a:r>
+                        <a:rPr lang="ru-RU" sz="1200" baseline="0" dirty="0" smtClean="0">
+                          <a:solidFill>
+                            <a:schemeClr val="accent1"/>
+                          </a:solidFill>
+                        </a:rPr>
+                        <a:t> дописывает переданную строку в конец файла и закрывает его. Если кодировка не указана, то используется </a:t>
+                      </a:r>
+                      <a:r>
+                        <a:rPr lang="en-US" sz="1200" baseline="0" dirty="0" smtClean="0">
+                          <a:solidFill>
+                            <a:schemeClr val="accent1"/>
+                          </a:solidFill>
+                        </a:rPr>
+                        <a:t>UTF-8.</a:t>
+                      </a:r>
+                      <a:endParaRPr lang="en-US" sz="1200" dirty="0">
+                        <a:solidFill>
+                          <a:schemeClr val="accent1"/>
+                        </a:solidFill>
+                      </a:endParaRPr>
+                    </a:p>
+                  </a:txBody>
+                  <a:tcPr>
+                    <a:lnL w="12700" cap="flat" cmpd="sng" algn="ctr">
+                      <a:solidFill>
+                        <a:schemeClr val="accent1"/>
+                      </a:solidFill>
+                      <a:prstDash val="solid"/>
+                      <a:round/>
+                      <a:headEnd type="none" w="med" len="med"/>
+                      <a:tailEnd type="none" w="med" len="med"/>
+                    </a:lnL>
+                    <a:lnR w="12700" cap="flat" cmpd="sng" algn="ctr">
+                      <a:solidFill>
+                        <a:schemeClr val="accent1"/>
+                      </a:solidFill>
+                      <a:prstDash val="solid"/>
+                      <a:round/>
+                      <a:headEnd type="none" w="med" len="med"/>
+                      <a:tailEnd type="none" w="med" len="med"/>
+                    </a:lnR>
+                    <a:lnT w="38100" cap="flat" cmpd="sng" algn="ctr">
+                      <a:solidFill>
+                        <a:schemeClr val="accent1"/>
+                      </a:solidFill>
+                      <a:prstDash val="solid"/>
+                      <a:round/>
+                      <a:headEnd type="none" w="med" len="med"/>
+                      <a:tailEnd type="none" w="med" len="med"/>
+                    </a:lnT>
+                    <a:lnB w="38100" cap="flat" cmpd="sng" algn="ctr">
+                      <a:solidFill>
+                        <a:schemeClr val="accent1"/>
+                      </a:solidFill>
+                      <a:prstDash val="solid"/>
+                      <a:round/>
+                      <a:headEnd type="none" w="med" len="med"/>
+                      <a:tailEnd type="none" w="med" len="med"/>
+                    </a:lnB>
+                  </a:tcPr>
+                </a:tc>
+              </a:tr>
+              <a:tr h="329972">
+                <a:tc>
+                  <a:txBody>
+                    <a:bodyPr/>
+                    <a:lstStyle/>
+                    <a:p>
+                      <a:pPr marL="0" marR="0" indent="0" algn="l" defTabSz="914400" rtl="0" eaLnBrk="1" fontAlgn="auto" latinLnBrk="0" hangingPunct="1">
+                        <a:lnSpc>
+                          <a:spcPct val="100000"/>
+                        </a:lnSpc>
+                        <a:spcBef>
+                          <a:spcPts val="0"/>
+                        </a:spcBef>
+                        <a:spcAft>
+                          <a:spcPts val="0"/>
+                        </a:spcAft>
+                        <a:buClrTx/>
+                        <a:buSzTx/>
+                        <a:buFontTx/>
+                        <a:buNone/>
+                        <a:tabLst/>
+                        <a:defRPr/>
+                      </a:pPr>
+                      <a:r>
+                        <a:rPr lang="en-US" sz="1200" dirty="0" smtClean="0">
+                          <a:solidFill>
+                            <a:schemeClr val="accent1"/>
+                          </a:solidFill>
+                        </a:rPr>
+                        <a:t>void </a:t>
+                      </a:r>
+                      <a:r>
+                        <a:rPr lang="en-US" sz="1200" dirty="0" err="1" smtClean="0">
+                          <a:solidFill>
+                            <a:schemeClr val="accent1"/>
+                          </a:solidFill>
+                        </a:rPr>
+                        <a:t>AppendAllText</a:t>
+                      </a:r>
+                      <a:r>
+                        <a:rPr lang="en-US" sz="1200" dirty="0" smtClean="0">
+                          <a:solidFill>
+                            <a:schemeClr val="accent1"/>
+                          </a:solidFill>
+                        </a:rPr>
+                        <a:t>(string path, string contents, Encoding encoding)</a:t>
+                      </a:r>
+                      <a:endParaRPr lang="en-US" sz="1200" dirty="0">
+                        <a:solidFill>
+                          <a:schemeClr val="accent1"/>
+                        </a:solidFill>
+                      </a:endParaRPr>
+                    </a:p>
+                  </a:txBody>
+                  <a:tcPr>
+                    <a:lnL w="12700" cap="flat" cmpd="sng" algn="ctr">
+                      <a:solidFill>
+                        <a:schemeClr val="accent1"/>
+                      </a:solidFill>
+                      <a:prstDash val="solid"/>
+                      <a:round/>
+                      <a:headEnd type="none" w="med" len="med"/>
+                      <a:tailEnd type="none" w="med" len="med"/>
+                    </a:lnL>
+                    <a:lnR w="12700" cap="flat" cmpd="sng" algn="ctr">
+                      <a:solidFill>
+                        <a:schemeClr val="accent1"/>
+                      </a:solidFill>
+                      <a:prstDash val="solid"/>
+                      <a:round/>
+                      <a:headEnd type="none" w="med" len="med"/>
+                      <a:tailEnd type="none" w="med" len="med"/>
+                    </a:lnR>
+                    <a:lnT w="12700" cap="flat" cmpd="sng" algn="ctr">
+                      <a:solidFill>
+                        <a:schemeClr val="accent1"/>
+                      </a:solidFill>
+                      <a:prstDash val="solid"/>
+                      <a:round/>
+                      <a:headEnd type="none" w="med" len="med"/>
+                      <a:tailEnd type="none" w="med" len="med"/>
+                    </a:lnT>
+                    <a:lnB w="38100" cap="flat" cmpd="sng" algn="ctr">
+                      <a:solidFill>
+                        <a:schemeClr val="accent1"/>
+                      </a:solidFill>
+                      <a:prstDash val="solid"/>
+                      <a:round/>
+                      <a:headEnd type="none" w="med" len="med"/>
+                      <a:tailEnd type="none" w="med" len="med"/>
+                    </a:lnB>
+                  </a:tcPr>
+                </a:tc>
+                <a:tc vMerge="1">
+                  <a:txBody>
+                    <a:bodyPr/>
+                    <a:lstStyle/>
+                    <a:p>
+                      <a:endParaRPr lang="en-US"/>
+                    </a:p>
+                  </a:txBody>
+                  <a:tcPr/>
+                </a:tc>
+              </a:tr>
+            </a:tbl>
+          </a:graphicData>
+        </a:graphic>
+      </p:graphicFrame>
+    </p:spTree>
+    <p:extLst>
+      <p:ext uri="{BB962C8B-B14F-4D97-AF65-F5344CB8AC3E}">
+        <p14:creationId xmlns:p14="http://schemas.microsoft.com/office/powerpoint/2010/main" val="92285174"/>
+      </p:ext>
+    </p:extLst>
+  </p:cSld>
+  <p:clrMapOvr>
+    <a:masterClrMapping/>
+  </p:clrMapOvr>
+</p:sld>
+</file>
+
+<file path=ppt/slides/slide18.xml><?xml version="1.0" encoding="utf-8"?>
+<p:sld xmlns:a="http://schemas.openxmlformats.org/drawingml/2006/main" xmlns:r="http://schemas.openxmlformats.org/officeDocument/2006/relationships" xmlns:p="http://schemas.openxmlformats.org/presentationml/2006/main">
+  <p:cSld>
+    <p:spTree>
+      <p:nvGrpSpPr>
+        <p:cNvPr id="1" name=""/>
+        <p:cNvGrpSpPr/>
+        <p:nvPr/>
+      </p:nvGrpSpPr>
+      <p:grpSpPr>
+        <a:xfrm>
+          <a:off x="0" y="0"/>
+          <a:ext cx="0" cy="0"/>
+          <a:chOff x="0" y="0"/>
+          <a:chExt cx="0" cy="0"/>
+        </a:xfrm>
+      </p:grpSpPr>
+      <p:sp>
+        <p:nvSpPr>
+          <p:cNvPr id="2" name="Title 1"/>
+          <p:cNvSpPr>
+            <a:spLocks noGrp="1"/>
+          </p:cNvSpPr>
+          <p:nvPr>
+            <p:ph type="title"/>
+          </p:nvPr>
+        </p:nvSpPr>
+        <p:spPr>
+          <a:xfrm>
+            <a:off x="457200" y="274638"/>
+            <a:ext cx="8229600" cy="922114"/>
+          </a:xfrm>
+        </p:spPr>
+        <p:txBody>
+          <a:bodyPr>
+            <a:normAutofit fontScale="90000"/>
+          </a:bodyPr>
+          <a:lstStyle/>
+          <a:p>
+            <a:r>
+              <a:rPr lang="ru-RU" sz="2800" dirty="0" smtClean="0"/>
+              <a:t>Класс </a:t>
+            </a:r>
+            <a:r>
+              <a:rPr lang="en-US" sz="2800" dirty="0" smtClean="0"/>
+              <a:t>File. </a:t>
+            </a:r>
+            <a:r>
+              <a:rPr lang="ru-RU" sz="2800" dirty="0" smtClean="0"/>
+              <a:t>Быстрое чтение/запись файлов.</a:t>
+            </a:r>
+            <a:br>
+              <a:rPr lang="ru-RU" sz="2800" dirty="0" smtClean="0"/>
+            </a:br>
+            <a:r>
+              <a:rPr lang="ru-RU" sz="2800" dirty="0" smtClean="0"/>
+              <a:t>Окончание.</a:t>
+            </a:r>
+            <a:endParaRPr lang="en-US" sz="2800" dirty="0"/>
+          </a:p>
+        </p:txBody>
+      </p:sp>
+      <p:sp>
+        <p:nvSpPr>
+          <p:cNvPr id="3" name="Content Placeholder 2"/>
+          <p:cNvSpPr>
+            <a:spLocks noGrp="1"/>
+          </p:cNvSpPr>
+          <p:nvPr>
+            <p:ph idx="1"/>
+          </p:nvPr>
+        </p:nvSpPr>
+        <p:spPr>
+          <a:xfrm>
+            <a:off x="457200" y="1196752"/>
+            <a:ext cx="8229600" cy="748679"/>
+          </a:xfrm>
+        </p:spPr>
+        <p:txBody>
+          <a:bodyPr>
+            <a:normAutofit/>
+          </a:bodyPr>
+          <a:lstStyle/>
+          <a:p>
+            <a:pPr marL="0" indent="0">
+              <a:buNone/>
+            </a:pPr>
+            <a:r>
+              <a:rPr lang="ru-RU" sz="1600" dirty="0" smtClean="0"/>
+              <a:t>Класс </a:t>
+            </a:r>
+            <a:r>
+              <a:rPr lang="en-US" sz="1600" dirty="0" smtClean="0"/>
+              <a:t>File </a:t>
+            </a:r>
+            <a:r>
+              <a:rPr lang="ru-RU" sz="1600" dirty="0" smtClean="0"/>
+              <a:t>содержит ряд статических методов позволяющих прочитать все данные из файла или записать их в него с помощью одного вызова.</a:t>
+            </a:r>
+          </a:p>
+          <a:p>
+            <a:pPr marL="0" indent="0">
+              <a:buNone/>
+            </a:pPr>
+            <a:endParaRPr lang="en-US" sz="1600" dirty="0"/>
+          </a:p>
+        </p:txBody>
+      </p:sp>
+      <p:graphicFrame>
+        <p:nvGraphicFramePr>
+          <p:cNvPr id="4" name="Table 3"/>
+          <p:cNvGraphicFramePr>
+            <a:graphicFrameLocks noGrp="1"/>
+          </p:cNvGraphicFramePr>
+          <p:nvPr>
+            <p:extLst>
+              <p:ext uri="{D42A27DB-BD31-4B8C-83A1-F6EECF244321}">
+                <p14:modId xmlns:p14="http://schemas.microsoft.com/office/powerpoint/2010/main" val="2375332885"/>
+              </p:ext>
+            </p:extLst>
+          </p:nvPr>
+        </p:nvGraphicFramePr>
+        <p:xfrm>
+          <a:off x="492224" y="1932424"/>
+          <a:ext cx="8184232" cy="2377440"/>
+        </p:xfrm>
+        <a:graphic>
+          <a:graphicData uri="http://schemas.openxmlformats.org/drawingml/2006/table">
+            <a:tbl>
+              <a:tblPr firstRow="1" bandRow="1">
+                <a:tableStyleId>{073A0DAA-6AF3-43AB-8588-CEC1D06C72B9}</a:tableStyleId>
+              </a:tblPr>
+              <a:tblGrid>
+                <a:gridCol w="4367808"/>
+                <a:gridCol w="3816424"/>
+              </a:tblGrid>
+              <a:tr h="222841">
+                <a:tc gridSpan="2">
+                  <a:txBody>
+                    <a:bodyPr/>
+                    <a:lstStyle/>
+                    <a:p>
+                      <a:r>
+                        <a:rPr lang="ru-RU" sz="1200" b="1" dirty="0" smtClean="0">
+                          <a:solidFill>
+                            <a:schemeClr val="bg1"/>
+                          </a:solidFill>
+                        </a:rPr>
+                        <a:t>Текстовые данные</a:t>
+                      </a:r>
+                      <a:endParaRPr lang="en-US" sz="1200" b="1" dirty="0">
+                        <a:solidFill>
+                          <a:schemeClr val="bg1"/>
+                        </a:solidFill>
+                      </a:endParaRPr>
+                    </a:p>
+                  </a:txBody>
+                  <a:tcPr>
+                    <a:lnL w="12700" cap="flat" cmpd="sng" algn="ctr">
+                      <a:solidFill>
+                        <a:schemeClr val="accent1"/>
+                      </a:solidFill>
+                      <a:prstDash val="solid"/>
+                      <a:round/>
+                      <a:headEnd type="none" w="med" len="med"/>
+                      <a:tailEnd type="none" w="med" len="med"/>
+                    </a:lnL>
+                    <a:lnR w="12700" cap="flat" cmpd="sng" algn="ctr">
+                      <a:solidFill>
+                        <a:schemeClr val="accent1"/>
+                      </a:solidFill>
+                      <a:prstDash val="solid"/>
+                      <a:round/>
+                      <a:headEnd type="none" w="med" len="med"/>
+                      <a:tailEnd type="none" w="med" len="med"/>
+                    </a:lnR>
+                    <a:lnT w="12700" cap="flat" cmpd="sng" algn="ctr">
+                      <a:solidFill>
+                        <a:schemeClr val="accent1"/>
+                      </a:solidFill>
+                      <a:prstDash val="solid"/>
+                      <a:round/>
+                      <a:headEnd type="none" w="med" len="med"/>
+                      <a:tailEnd type="none" w="med" len="med"/>
+                    </a:lnT>
+                    <a:lnB w="38100" cap="flat" cmpd="sng" algn="ctr">
+                      <a:solidFill>
+                        <a:schemeClr val="accent1"/>
+                      </a:solidFill>
+                      <a:prstDash val="solid"/>
+                      <a:round/>
+                      <a:headEnd type="none" w="med" len="med"/>
+                      <a:tailEnd type="none" w="med" len="med"/>
+                    </a:lnB>
+                    <a:solidFill>
+                      <a:schemeClr val="accent1"/>
+                    </a:solidFill>
+                  </a:tcPr>
+                </a:tc>
+                <a:tc hMerge="1">
+                  <a:txBody>
+                    <a:bodyPr/>
+                    <a:lstStyle/>
+                    <a:p>
+                      <a:endParaRPr lang="en-US"/>
+                    </a:p>
+                  </a:txBody>
+                  <a:tcPr/>
+                </a:tc>
+              </a:tr>
+              <a:tr h="274320">
+                <a:tc>
+                  <a:txBody>
+                    <a:bodyPr/>
+                    <a:lstStyle/>
+                    <a:p>
+                      <a:pPr marL="0" marR="0" indent="0" algn="l" defTabSz="914400" rtl="0" eaLnBrk="1" fontAlgn="auto" latinLnBrk="0" hangingPunct="1">
+                        <a:lnSpc>
+                          <a:spcPct val="100000"/>
+                        </a:lnSpc>
+                        <a:spcBef>
+                          <a:spcPts val="0"/>
+                        </a:spcBef>
+                        <a:spcAft>
+                          <a:spcPts val="0"/>
+                        </a:spcAft>
+                        <a:buClrTx/>
+                        <a:buSzTx/>
+                        <a:buFontTx/>
+                        <a:buNone/>
+                        <a:tabLst/>
+                        <a:defRPr/>
+                      </a:pPr>
+                      <a:r>
+                        <a:rPr lang="en-US" sz="1200" dirty="0" smtClean="0">
+                          <a:solidFill>
+                            <a:schemeClr val="accent1"/>
+                          </a:solidFill>
+                        </a:rPr>
+                        <a:t>void </a:t>
+                      </a:r>
+                      <a:r>
+                        <a:rPr lang="en-US" sz="1200" dirty="0" err="1" smtClean="0">
+                          <a:solidFill>
+                            <a:schemeClr val="accent1"/>
+                          </a:solidFill>
+                        </a:rPr>
+                        <a:t>WriteAllLines</a:t>
+                      </a:r>
+                      <a:r>
+                        <a:rPr lang="en-US" sz="1200" dirty="0" smtClean="0">
+                          <a:solidFill>
+                            <a:schemeClr val="accent1"/>
+                          </a:solidFill>
+                        </a:rPr>
+                        <a:t>(string path, </a:t>
+                      </a:r>
+                      <a:r>
+                        <a:rPr lang="en-US" sz="1200" dirty="0" err="1" smtClean="0">
+                          <a:solidFill>
+                            <a:schemeClr val="accent1"/>
+                          </a:solidFill>
+                        </a:rPr>
+                        <a:t>IEnumerable</a:t>
+                      </a:r>
+                      <a:r>
+                        <a:rPr lang="en-US" sz="1200" dirty="0" smtClean="0">
+                          <a:solidFill>
+                            <a:schemeClr val="accent1"/>
+                          </a:solidFill>
+                        </a:rPr>
+                        <a:t>&lt;string&gt; contents)</a:t>
+                      </a:r>
+                    </a:p>
+                  </a:txBody>
+                  <a:tcPr>
+                    <a:lnL w="12700" cap="flat" cmpd="sng" algn="ctr">
+                      <a:solidFill>
+                        <a:schemeClr val="accent1"/>
+                      </a:solidFill>
+                      <a:prstDash val="solid"/>
+                      <a:round/>
+                      <a:headEnd type="none" w="med" len="med"/>
+                      <a:tailEnd type="none" w="med" len="med"/>
+                    </a:lnL>
+                    <a:lnR w="12700" cap="flat" cmpd="sng" algn="ctr">
+                      <a:solidFill>
+                        <a:schemeClr val="accent1"/>
+                      </a:solidFill>
+                      <a:prstDash val="solid"/>
+                      <a:round/>
+                      <a:headEnd type="none" w="med" len="med"/>
+                      <a:tailEnd type="none" w="med" len="med"/>
+                    </a:lnR>
+                    <a:lnT w="38100" cap="flat" cmpd="sng" algn="ctr">
+                      <a:solidFill>
+                        <a:schemeClr val="accent1"/>
+                      </a:solidFill>
+                      <a:prstDash val="solid"/>
+                      <a:round/>
+                      <a:headEnd type="none" w="med" len="med"/>
+                      <a:tailEnd type="none" w="med" len="med"/>
+                    </a:lnT>
+                    <a:lnB w="12700" cap="flat" cmpd="sng" algn="ctr">
+                      <a:solidFill>
+                        <a:schemeClr val="accent1"/>
+                      </a:solidFill>
+                      <a:prstDash val="solid"/>
+                      <a:round/>
+                      <a:headEnd type="none" w="med" len="med"/>
+                      <a:tailEnd type="none" w="med" len="med"/>
+                    </a:lnB>
+                  </a:tcPr>
+                </a:tc>
+                <a:tc rowSpan="4">
+                  <a:txBody>
+                    <a:bodyPr/>
+                    <a:lstStyle/>
+                    <a:p>
+                      <a:pPr marL="0" marR="0" indent="0" algn="l" defTabSz="914400" rtl="0" eaLnBrk="1" fontAlgn="auto" latinLnBrk="0" hangingPunct="1">
+                        <a:lnSpc>
+                          <a:spcPct val="100000"/>
+                        </a:lnSpc>
+                        <a:spcBef>
+                          <a:spcPts val="0"/>
+                        </a:spcBef>
+                        <a:spcAft>
+                          <a:spcPts val="0"/>
+                        </a:spcAft>
+                        <a:buClrTx/>
+                        <a:buSzTx/>
+                        <a:buFontTx/>
+                        <a:buNone/>
+                        <a:tabLst/>
+                        <a:defRPr/>
+                      </a:pPr>
+                      <a:r>
+                        <a:rPr lang="ru-RU" sz="1200" dirty="0" smtClean="0">
+                          <a:solidFill>
+                            <a:schemeClr val="accent1"/>
+                          </a:solidFill>
+                        </a:rPr>
+                        <a:t>Открывает файл на запись,</a:t>
+                      </a:r>
+                      <a:r>
+                        <a:rPr lang="ru-RU" sz="1200" baseline="0" dirty="0" smtClean="0">
+                          <a:solidFill>
+                            <a:schemeClr val="accent1"/>
+                          </a:solidFill>
+                        </a:rPr>
+                        <a:t> записывает переданные строки в файл и закрывает его. Если кодировка не указана, то используется </a:t>
+                      </a:r>
+                      <a:r>
+                        <a:rPr lang="en-US" sz="1200" baseline="0" dirty="0" smtClean="0">
+                          <a:solidFill>
+                            <a:schemeClr val="accent1"/>
+                          </a:solidFill>
+                        </a:rPr>
+                        <a:t>UTF-8.</a:t>
+                      </a:r>
+                      <a:r>
+                        <a:rPr lang="ru-RU" sz="1200" baseline="0" dirty="0" smtClean="0">
+                          <a:solidFill>
+                            <a:schemeClr val="accent1"/>
+                          </a:solidFill>
+                        </a:rPr>
+                        <a:t> Переводы строк будут добавлены автоматически.</a:t>
+                      </a:r>
+                      <a:endParaRPr lang="en-US" sz="1200" dirty="0">
+                        <a:solidFill>
+                          <a:schemeClr val="accent1"/>
+                        </a:solidFill>
+                      </a:endParaRPr>
+                    </a:p>
+                  </a:txBody>
+                  <a:tcPr>
+                    <a:lnL w="12700" cap="flat" cmpd="sng" algn="ctr">
+                      <a:solidFill>
+                        <a:schemeClr val="accent1"/>
+                      </a:solidFill>
+                      <a:prstDash val="solid"/>
+                      <a:round/>
+                      <a:headEnd type="none" w="med" len="med"/>
+                      <a:tailEnd type="none" w="med" len="med"/>
+                    </a:lnL>
+                    <a:lnR w="12700" cap="flat" cmpd="sng" algn="ctr">
+                      <a:solidFill>
+                        <a:schemeClr val="accent1"/>
+                      </a:solidFill>
+                      <a:prstDash val="solid"/>
+                      <a:round/>
+                      <a:headEnd type="none" w="med" len="med"/>
+                      <a:tailEnd type="none" w="med" len="med"/>
+                    </a:lnR>
+                    <a:lnT w="38100" cap="flat" cmpd="sng" algn="ctr">
+                      <a:solidFill>
+                        <a:schemeClr val="accent1"/>
+                      </a:solidFill>
+                      <a:prstDash val="solid"/>
+                      <a:round/>
+                      <a:headEnd type="none" w="med" len="med"/>
+                      <a:tailEnd type="none" w="med" len="med"/>
+                    </a:lnT>
+                    <a:lnB w="38100" cap="flat" cmpd="sng" algn="ctr">
+                      <a:solidFill>
+                        <a:schemeClr val="accent1"/>
+                      </a:solidFill>
+                      <a:prstDash val="solid"/>
+                      <a:round/>
+                      <a:headEnd type="none" w="med" len="med"/>
+                      <a:tailEnd type="none" w="med" len="med"/>
+                    </a:lnB>
+                  </a:tcPr>
+                </a:tc>
+              </a:tr>
+              <a:tr h="0">
+                <a:tc>
+                  <a:txBody>
+                    <a:bodyPr/>
+                    <a:lstStyle/>
+                    <a:p>
+                      <a:pPr marL="0" marR="0" indent="0" algn="l" defTabSz="914400" rtl="0" eaLnBrk="1" fontAlgn="auto" latinLnBrk="0" hangingPunct="1">
+                        <a:lnSpc>
+                          <a:spcPct val="100000"/>
+                        </a:lnSpc>
+                        <a:spcBef>
+                          <a:spcPts val="0"/>
+                        </a:spcBef>
+                        <a:spcAft>
+                          <a:spcPts val="0"/>
+                        </a:spcAft>
+                        <a:buClrTx/>
+                        <a:buSzTx/>
+                        <a:buFontTx/>
+                        <a:buNone/>
+                        <a:tabLst/>
+                        <a:defRPr/>
+                      </a:pPr>
+                      <a:r>
+                        <a:rPr lang="en-US" sz="1200" dirty="0" smtClean="0">
+                          <a:solidFill>
+                            <a:schemeClr val="accent1"/>
+                          </a:solidFill>
+                        </a:rPr>
+                        <a:t>void </a:t>
+                      </a:r>
+                      <a:r>
+                        <a:rPr lang="en-US" sz="1200" dirty="0" err="1" smtClean="0">
+                          <a:solidFill>
+                            <a:schemeClr val="accent1"/>
+                          </a:solidFill>
+                        </a:rPr>
+                        <a:t>WriteAllLines</a:t>
+                      </a:r>
+                      <a:r>
+                        <a:rPr lang="en-US" sz="1200" dirty="0" smtClean="0">
+                          <a:solidFill>
+                            <a:schemeClr val="accent1"/>
+                          </a:solidFill>
+                        </a:rPr>
+                        <a:t>(string path,</a:t>
+                      </a:r>
+                      <a:r>
+                        <a:rPr lang="ru-RU" sz="1200" dirty="0" smtClean="0">
+                          <a:solidFill>
+                            <a:schemeClr val="accent1"/>
+                          </a:solidFill>
+                        </a:rPr>
+                        <a:t> </a:t>
+                      </a:r>
+                      <a:r>
+                        <a:rPr lang="en-US" sz="1200" dirty="0" smtClean="0">
+                          <a:solidFill>
+                            <a:schemeClr val="accent1"/>
+                          </a:solidFill>
+                        </a:rPr>
+                        <a:t>string[] contents)</a:t>
+                      </a:r>
+                      <a:endParaRPr lang="en-US" sz="1200" dirty="0">
+                        <a:solidFill>
+                          <a:schemeClr val="accent1"/>
+                        </a:solidFill>
+                      </a:endParaRPr>
+                    </a:p>
+                  </a:txBody>
+                  <a:tcPr>
+                    <a:lnL w="12700" cap="flat" cmpd="sng" algn="ctr">
+                      <a:solidFill>
+                        <a:schemeClr val="accent1"/>
+                      </a:solidFill>
+                      <a:prstDash val="solid"/>
+                      <a:round/>
+                      <a:headEnd type="none" w="med" len="med"/>
+                      <a:tailEnd type="none" w="med" len="med"/>
+                    </a:lnL>
+                    <a:lnR w="12700" cap="flat" cmpd="sng" algn="ctr">
+                      <a:solidFill>
+                        <a:schemeClr val="accent1"/>
+                      </a:solidFill>
+                      <a:prstDash val="solid"/>
+                      <a:round/>
+                      <a:headEnd type="none" w="med" len="med"/>
+                      <a:tailEnd type="none" w="med" len="med"/>
+                    </a:lnR>
+                    <a:lnT w="12700" cap="flat" cmpd="sng" algn="ctr">
+                      <a:solidFill>
+                        <a:schemeClr val="accent1"/>
+                      </a:solidFill>
+                      <a:prstDash val="solid"/>
+                      <a:round/>
+                      <a:headEnd type="none" w="med" len="med"/>
+                      <a:tailEnd type="none" w="med" len="med"/>
+                    </a:lnT>
+                    <a:lnB w="12700" cap="flat" cmpd="sng" algn="ctr">
+                      <a:solidFill>
+                        <a:schemeClr val="accent1"/>
+                      </a:solidFill>
+                      <a:prstDash val="solid"/>
+                      <a:round/>
+                      <a:headEnd type="none" w="med" len="med"/>
+                      <a:tailEnd type="none" w="med" len="med"/>
+                    </a:lnB>
+                  </a:tcPr>
+                </a:tc>
+                <a:tc vMerge="1">
+                  <a:txBody>
+                    <a:bodyPr/>
+                    <a:lstStyle/>
+                    <a:p>
+                      <a:endParaRPr lang="en-US"/>
+                    </a:p>
+                  </a:txBody>
+                  <a:tcPr/>
+                </a:tc>
+              </a:tr>
+              <a:tr h="0">
+                <a:tc>
+                  <a:txBody>
+                    <a:bodyPr/>
+                    <a:lstStyle/>
+                    <a:p>
+                      <a:pPr marL="0" marR="0" indent="0" algn="l" defTabSz="914400" rtl="0" eaLnBrk="1" fontAlgn="auto" latinLnBrk="0" hangingPunct="1">
+                        <a:lnSpc>
+                          <a:spcPct val="100000"/>
+                        </a:lnSpc>
+                        <a:spcBef>
+                          <a:spcPts val="0"/>
+                        </a:spcBef>
+                        <a:spcAft>
+                          <a:spcPts val="0"/>
+                        </a:spcAft>
+                        <a:buClrTx/>
+                        <a:buSzTx/>
+                        <a:buFontTx/>
+                        <a:buNone/>
+                        <a:tabLst/>
+                        <a:defRPr/>
+                      </a:pPr>
+                      <a:r>
+                        <a:rPr lang="en-US" sz="1200" dirty="0" smtClean="0">
+                          <a:solidFill>
+                            <a:schemeClr val="accent1"/>
+                          </a:solidFill>
+                        </a:rPr>
+                        <a:t>void </a:t>
+                      </a:r>
+                      <a:r>
+                        <a:rPr lang="en-US" sz="1200" dirty="0" err="1" smtClean="0">
+                          <a:solidFill>
+                            <a:schemeClr val="accent1"/>
+                          </a:solidFill>
+                        </a:rPr>
+                        <a:t>WriteAllLines</a:t>
+                      </a:r>
+                      <a:r>
+                        <a:rPr lang="en-US" sz="1200" dirty="0" smtClean="0">
+                          <a:solidFill>
+                            <a:schemeClr val="accent1"/>
+                          </a:solidFill>
+                        </a:rPr>
+                        <a:t>(string path, </a:t>
+                      </a:r>
+                      <a:r>
+                        <a:rPr lang="en-US" sz="1200" dirty="0" err="1" smtClean="0">
+                          <a:solidFill>
+                            <a:schemeClr val="accent1"/>
+                          </a:solidFill>
+                        </a:rPr>
+                        <a:t>IEnumerable</a:t>
+                      </a:r>
+                      <a:r>
+                        <a:rPr lang="en-US" sz="1200" dirty="0" smtClean="0">
+                          <a:solidFill>
+                            <a:schemeClr val="accent1"/>
+                          </a:solidFill>
+                        </a:rPr>
+                        <a:t>&lt;string&gt; contents, Encoding encoding)</a:t>
+                      </a:r>
+                      <a:endParaRPr lang="en-US" sz="1200" dirty="0">
+                        <a:solidFill>
+                          <a:schemeClr val="accent1"/>
+                        </a:solidFill>
+                      </a:endParaRPr>
+                    </a:p>
+                  </a:txBody>
+                  <a:tcPr>
+                    <a:lnL w="12700" cap="flat" cmpd="sng" algn="ctr">
+                      <a:solidFill>
+                        <a:schemeClr val="accent1"/>
+                      </a:solidFill>
+                      <a:prstDash val="solid"/>
+                      <a:round/>
+                      <a:headEnd type="none" w="med" len="med"/>
+                      <a:tailEnd type="none" w="med" len="med"/>
+                    </a:lnL>
+                    <a:lnR w="12700" cap="flat" cmpd="sng" algn="ctr">
+                      <a:solidFill>
+                        <a:schemeClr val="accent1"/>
+                      </a:solidFill>
+                      <a:prstDash val="solid"/>
+                      <a:round/>
+                      <a:headEnd type="none" w="med" len="med"/>
+                      <a:tailEnd type="none" w="med" len="med"/>
+                    </a:lnR>
+                    <a:lnT w="12700" cap="flat" cmpd="sng" algn="ctr">
+                      <a:solidFill>
+                        <a:schemeClr val="accent1"/>
+                      </a:solidFill>
+                      <a:prstDash val="solid"/>
+                      <a:round/>
+                      <a:headEnd type="none" w="med" len="med"/>
+                      <a:tailEnd type="none" w="med" len="med"/>
+                    </a:lnT>
+                    <a:lnB w="12700" cap="flat" cmpd="sng" algn="ctr">
+                      <a:solidFill>
+                        <a:schemeClr val="accent1"/>
+                      </a:solidFill>
+                      <a:prstDash val="solid"/>
+                      <a:round/>
+                      <a:headEnd type="none" w="med" len="med"/>
+                      <a:tailEnd type="none" w="med" len="med"/>
+                    </a:lnB>
+                  </a:tcPr>
+                </a:tc>
+                <a:tc vMerge="1">
+                  <a:txBody>
+                    <a:bodyPr/>
+                    <a:lstStyle/>
+                    <a:p>
+                      <a:endParaRPr lang="en-US"/>
+                    </a:p>
+                  </a:txBody>
+                  <a:tcPr/>
+                </a:tc>
+              </a:tr>
+              <a:tr h="118884">
+                <a:tc>
+                  <a:txBody>
+                    <a:bodyPr/>
+                    <a:lstStyle/>
+                    <a:p>
+                      <a:pPr marL="0" marR="0" indent="0" algn="l" defTabSz="914400" rtl="0" eaLnBrk="1" fontAlgn="auto" latinLnBrk="0" hangingPunct="1">
+                        <a:lnSpc>
+                          <a:spcPct val="100000"/>
+                        </a:lnSpc>
+                        <a:spcBef>
+                          <a:spcPts val="0"/>
+                        </a:spcBef>
+                        <a:spcAft>
+                          <a:spcPts val="0"/>
+                        </a:spcAft>
+                        <a:buClrTx/>
+                        <a:buSzTx/>
+                        <a:buFontTx/>
+                        <a:buNone/>
+                        <a:tabLst/>
+                        <a:defRPr/>
+                      </a:pPr>
+                      <a:r>
+                        <a:rPr lang="en-US" sz="1200" dirty="0" smtClean="0">
+                          <a:solidFill>
+                            <a:schemeClr val="accent1"/>
+                          </a:solidFill>
+                        </a:rPr>
+                        <a:t>void </a:t>
+                      </a:r>
+                      <a:r>
+                        <a:rPr lang="en-US" sz="1200" dirty="0" err="1" smtClean="0">
+                          <a:solidFill>
+                            <a:schemeClr val="accent1"/>
+                          </a:solidFill>
+                        </a:rPr>
+                        <a:t>WriteAllLines</a:t>
+                      </a:r>
+                      <a:r>
+                        <a:rPr lang="en-US" sz="1200" dirty="0" smtClean="0">
+                          <a:solidFill>
+                            <a:schemeClr val="accent1"/>
+                          </a:solidFill>
+                        </a:rPr>
+                        <a:t>(string path, string[] contents, Encoding encoding)</a:t>
+                      </a:r>
+                      <a:endParaRPr lang="en-US" sz="1200" dirty="0">
+                        <a:solidFill>
+                          <a:schemeClr val="accent1"/>
+                        </a:solidFill>
+                      </a:endParaRPr>
+                    </a:p>
+                  </a:txBody>
+                  <a:tcPr>
+                    <a:lnL w="12700" cap="flat" cmpd="sng" algn="ctr">
+                      <a:solidFill>
+                        <a:schemeClr val="accent1"/>
+                      </a:solidFill>
+                      <a:prstDash val="solid"/>
+                      <a:round/>
+                      <a:headEnd type="none" w="med" len="med"/>
+                      <a:tailEnd type="none" w="med" len="med"/>
+                    </a:lnL>
+                    <a:lnR w="12700" cap="flat" cmpd="sng" algn="ctr">
+                      <a:solidFill>
+                        <a:schemeClr val="accent1"/>
+                      </a:solidFill>
+                      <a:prstDash val="solid"/>
+                      <a:round/>
+                      <a:headEnd type="none" w="med" len="med"/>
+                      <a:tailEnd type="none" w="med" len="med"/>
+                    </a:lnR>
+                    <a:lnT w="12700" cap="flat" cmpd="sng" algn="ctr">
+                      <a:solidFill>
+                        <a:schemeClr val="accent1"/>
+                      </a:solidFill>
+                      <a:prstDash val="solid"/>
+                      <a:round/>
+                      <a:headEnd type="none" w="med" len="med"/>
+                      <a:tailEnd type="none" w="med" len="med"/>
+                    </a:lnT>
+                    <a:lnB w="38100" cap="flat" cmpd="sng" algn="ctr">
+                      <a:solidFill>
+                        <a:schemeClr val="accent1"/>
+                      </a:solidFill>
+                      <a:prstDash val="solid"/>
+                      <a:round/>
+                      <a:headEnd type="none" w="med" len="med"/>
+                      <a:tailEnd type="none" w="med" len="med"/>
+                    </a:lnB>
+                  </a:tcPr>
+                </a:tc>
+                <a:tc vMerge="1">
+                  <a:txBody>
+                    <a:bodyPr/>
+                    <a:lstStyle/>
+                    <a:p>
+                      <a:endParaRPr lang="en-US"/>
+                    </a:p>
+                  </a:txBody>
+                  <a:tcPr/>
+                </a:tc>
+              </a:tr>
+              <a:tr h="297180">
+                <a:tc>
+                  <a:txBody>
+                    <a:bodyPr/>
+                    <a:lstStyle/>
+                    <a:p>
+                      <a:pPr marL="0" marR="0" indent="0" algn="l" defTabSz="914400" rtl="0" eaLnBrk="1" fontAlgn="auto" latinLnBrk="0" hangingPunct="1">
+                        <a:lnSpc>
+                          <a:spcPct val="100000"/>
+                        </a:lnSpc>
+                        <a:spcBef>
+                          <a:spcPts val="0"/>
+                        </a:spcBef>
+                        <a:spcAft>
+                          <a:spcPts val="0"/>
+                        </a:spcAft>
+                        <a:buClrTx/>
+                        <a:buSzTx/>
+                        <a:buFontTx/>
+                        <a:buNone/>
+                        <a:tabLst/>
+                        <a:defRPr/>
+                      </a:pPr>
+                      <a:r>
+                        <a:rPr lang="en-US" sz="1200" dirty="0" smtClean="0">
+                          <a:solidFill>
+                            <a:schemeClr val="accent1"/>
+                          </a:solidFill>
+                        </a:rPr>
+                        <a:t>void </a:t>
+                      </a:r>
+                      <a:r>
+                        <a:rPr lang="en-US" sz="1200" dirty="0" err="1" smtClean="0">
+                          <a:solidFill>
+                            <a:schemeClr val="accent1"/>
+                          </a:solidFill>
+                        </a:rPr>
+                        <a:t>WriteAllText</a:t>
+                      </a:r>
+                      <a:r>
+                        <a:rPr lang="en-US" sz="1200" dirty="0" smtClean="0">
+                          <a:solidFill>
+                            <a:schemeClr val="accent1"/>
+                          </a:solidFill>
+                        </a:rPr>
+                        <a:t>(string path, string contents)</a:t>
+                      </a:r>
+                    </a:p>
+                  </a:txBody>
+                  <a:tcPr>
+                    <a:lnL w="12700" cap="flat" cmpd="sng" algn="ctr">
+                      <a:solidFill>
+                        <a:schemeClr val="accent1"/>
+                      </a:solidFill>
+                      <a:prstDash val="solid"/>
+                      <a:round/>
+                      <a:headEnd type="none" w="med" len="med"/>
+                      <a:tailEnd type="none" w="med" len="med"/>
+                    </a:lnL>
+                    <a:lnR w="12700" cap="flat" cmpd="sng" algn="ctr">
+                      <a:solidFill>
+                        <a:schemeClr val="accent1"/>
+                      </a:solidFill>
+                      <a:prstDash val="solid"/>
+                      <a:round/>
+                      <a:headEnd type="none" w="med" len="med"/>
+                      <a:tailEnd type="none" w="med" len="med"/>
+                    </a:lnR>
+                    <a:lnT w="38100" cap="flat" cmpd="sng" algn="ctr">
+                      <a:solidFill>
+                        <a:schemeClr val="accent1"/>
+                      </a:solidFill>
+                      <a:prstDash val="solid"/>
+                      <a:round/>
+                      <a:headEnd type="none" w="med" len="med"/>
+                      <a:tailEnd type="none" w="med" len="med"/>
+                    </a:lnT>
+                    <a:lnB w="12700" cap="flat" cmpd="sng" algn="ctr">
+                      <a:solidFill>
+                        <a:schemeClr val="accent1"/>
+                      </a:solidFill>
+                      <a:prstDash val="solid"/>
+                      <a:round/>
+                      <a:headEnd type="none" w="med" len="med"/>
+                      <a:tailEnd type="none" w="med" len="med"/>
+                    </a:lnB>
+                  </a:tcPr>
+                </a:tc>
+                <a:tc rowSpan="2">
+                  <a:txBody>
+                    <a:bodyPr/>
+                    <a:lstStyle/>
+                    <a:p>
+                      <a:r>
+                        <a:rPr lang="ru-RU" sz="1200" dirty="0" smtClean="0">
+                          <a:solidFill>
+                            <a:schemeClr val="accent1"/>
+                          </a:solidFill>
+                        </a:rPr>
+                        <a:t>Открывает файл на запись,</a:t>
+                      </a:r>
+                      <a:r>
+                        <a:rPr lang="ru-RU" sz="1200" baseline="0" dirty="0" smtClean="0">
+                          <a:solidFill>
+                            <a:schemeClr val="accent1"/>
+                          </a:solidFill>
+                        </a:rPr>
+                        <a:t> записывает переданную строку в файл и закрывает его. Если кодировка не указана, то используется </a:t>
+                      </a:r>
+                      <a:r>
+                        <a:rPr lang="en-US" sz="1200" baseline="0" dirty="0" smtClean="0">
+                          <a:solidFill>
+                            <a:schemeClr val="accent1"/>
+                          </a:solidFill>
+                        </a:rPr>
+                        <a:t>UTF-8.</a:t>
+                      </a:r>
+                      <a:endParaRPr lang="en-US" sz="1200" dirty="0">
+                        <a:solidFill>
+                          <a:schemeClr val="accent1"/>
+                        </a:solidFill>
+                      </a:endParaRPr>
+                    </a:p>
+                  </a:txBody>
+                  <a:tcPr>
+                    <a:lnL w="12700" cap="flat" cmpd="sng" algn="ctr">
+                      <a:solidFill>
+                        <a:schemeClr val="accent1"/>
+                      </a:solidFill>
+                      <a:prstDash val="solid"/>
+                      <a:round/>
+                      <a:headEnd type="none" w="med" len="med"/>
+                      <a:tailEnd type="none" w="med" len="med"/>
+                    </a:lnL>
+                    <a:lnR w="12700" cap="flat" cmpd="sng" algn="ctr">
+                      <a:solidFill>
+                        <a:schemeClr val="accent1"/>
+                      </a:solidFill>
+                      <a:prstDash val="solid"/>
+                      <a:round/>
+                      <a:headEnd type="none" w="med" len="med"/>
+                      <a:tailEnd type="none" w="med" len="med"/>
+                    </a:lnR>
+                    <a:lnT w="38100" cap="flat" cmpd="sng" algn="ctr">
+                      <a:solidFill>
+                        <a:schemeClr val="accent1"/>
+                      </a:solidFill>
+                      <a:prstDash val="solid"/>
+                      <a:round/>
+                      <a:headEnd type="none" w="med" len="med"/>
+                      <a:tailEnd type="none" w="med" len="med"/>
+                    </a:lnT>
+                    <a:lnB w="12700" cap="flat" cmpd="sng" algn="ctr">
+                      <a:solidFill>
+                        <a:schemeClr val="accent1"/>
+                      </a:solidFill>
+                      <a:prstDash val="solid"/>
+                      <a:round/>
+                      <a:headEnd type="none" w="med" len="med"/>
+                      <a:tailEnd type="none" w="med" len="med"/>
+                    </a:lnB>
+                  </a:tcPr>
+                </a:tc>
+              </a:tr>
+              <a:tr h="0">
+                <a:tc>
+                  <a:txBody>
+                    <a:bodyPr/>
+                    <a:lstStyle/>
+                    <a:p>
+                      <a:pPr marL="0" marR="0" indent="0" algn="l" defTabSz="914400" rtl="0" eaLnBrk="1" fontAlgn="auto" latinLnBrk="0" hangingPunct="1">
+                        <a:lnSpc>
+                          <a:spcPct val="100000"/>
+                        </a:lnSpc>
+                        <a:spcBef>
+                          <a:spcPts val="0"/>
+                        </a:spcBef>
+                        <a:spcAft>
+                          <a:spcPts val="0"/>
+                        </a:spcAft>
+                        <a:buClrTx/>
+                        <a:buSzTx/>
+                        <a:buFontTx/>
+                        <a:buNone/>
+                        <a:tabLst/>
+                        <a:defRPr/>
+                      </a:pPr>
+                      <a:r>
+                        <a:rPr lang="en-US" sz="1200" dirty="0" smtClean="0">
+                          <a:solidFill>
+                            <a:schemeClr val="accent1"/>
+                          </a:solidFill>
+                        </a:rPr>
+                        <a:t>void </a:t>
+                      </a:r>
+                      <a:r>
+                        <a:rPr lang="en-US" sz="1200" dirty="0" err="1" smtClean="0">
+                          <a:solidFill>
+                            <a:schemeClr val="accent1"/>
+                          </a:solidFill>
+                        </a:rPr>
+                        <a:t>WriteAllText</a:t>
+                      </a:r>
+                      <a:r>
+                        <a:rPr lang="en-US" sz="1200" dirty="0" smtClean="0">
+                          <a:solidFill>
+                            <a:schemeClr val="accent1"/>
+                          </a:solidFill>
+                        </a:rPr>
+                        <a:t>(string path, string contents, Encoding encoding)</a:t>
+                      </a:r>
+                      <a:endParaRPr lang="en-US" sz="1200" dirty="0">
+                        <a:solidFill>
+                          <a:schemeClr val="accent1"/>
+                        </a:solidFill>
+                      </a:endParaRPr>
+                    </a:p>
+                  </a:txBody>
+                  <a:tcPr>
+                    <a:lnL w="12700" cap="flat" cmpd="sng" algn="ctr">
+                      <a:solidFill>
+                        <a:schemeClr val="accent1"/>
+                      </a:solidFill>
+                      <a:prstDash val="solid"/>
+                      <a:round/>
+                      <a:headEnd type="none" w="med" len="med"/>
+                      <a:tailEnd type="none" w="med" len="med"/>
+                    </a:lnL>
+                    <a:lnR w="12700" cap="flat" cmpd="sng" algn="ctr">
+                      <a:solidFill>
+                        <a:schemeClr val="accent1"/>
+                      </a:solidFill>
+                      <a:prstDash val="solid"/>
+                      <a:round/>
+                      <a:headEnd type="none" w="med" len="med"/>
+                      <a:tailEnd type="none" w="med" len="med"/>
+                    </a:lnR>
+                    <a:lnT w="12700" cap="flat" cmpd="sng" algn="ctr">
+                      <a:solidFill>
+                        <a:schemeClr val="accent1"/>
+                      </a:solidFill>
+                      <a:prstDash val="solid"/>
+                      <a:round/>
+                      <a:headEnd type="none" w="med" len="med"/>
+                      <a:tailEnd type="none" w="med" len="med"/>
+                    </a:lnT>
+                    <a:lnB w="12700" cap="flat" cmpd="sng" algn="ctr">
+                      <a:solidFill>
+                        <a:schemeClr val="accent1"/>
+                      </a:solidFill>
+                      <a:prstDash val="solid"/>
+                      <a:round/>
+                      <a:headEnd type="none" w="med" len="med"/>
+                      <a:tailEnd type="none" w="med" len="med"/>
+                    </a:lnB>
+                  </a:tcPr>
+                </a:tc>
+                <a:tc vMerge="1">
+                  <a:txBody>
+                    <a:bodyPr/>
+                    <a:lstStyle/>
+                    <a:p>
+                      <a:endParaRPr lang="en-US"/>
+                    </a:p>
+                  </a:txBody>
+                  <a:tcPr/>
+                </a:tc>
+              </a:tr>
+            </a:tbl>
+          </a:graphicData>
+        </a:graphic>
+      </p:graphicFrame>
+    </p:spTree>
+    <p:extLst>
+      <p:ext uri="{BB962C8B-B14F-4D97-AF65-F5344CB8AC3E}">
+        <p14:creationId xmlns:p14="http://schemas.microsoft.com/office/powerpoint/2010/main" val="47938119"/>
+      </p:ext>
+    </p:extLst>
+  </p:cSld>
+  <p:clrMapOvr>
+    <a:masterClrMapping/>
+  </p:clrMapOvr>
+</p:sld>
+</file>
+
+<file path=ppt/slides/slide19.xml><?xml version="1.0" encoding="utf-8"?>
+<p:sld xmlns:a="http://schemas.openxmlformats.org/drawingml/2006/main" xmlns:r="http://schemas.openxmlformats.org/officeDocument/2006/relationships" xmlns:p="http://schemas.openxmlformats.org/presentationml/2006/main">
+  <p:cSld>
     <p:bg>
       <p:bgPr>
         <a:blipFill dpi="0" rotWithShape="1">
@@ -14225,7 +16863,206 @@
 </p:sld>
 </file>
 
-<file path=ppt/slides/slide18.xml><?xml version="1.0" encoding="utf-8"?>
+<file path=ppt/slides/slide2.xml><?xml version="1.0" encoding="utf-8"?>
+<p:sld xmlns:a="http://schemas.openxmlformats.org/drawingml/2006/main" xmlns:r="http://schemas.openxmlformats.org/officeDocument/2006/relationships" xmlns:p="http://schemas.openxmlformats.org/presentationml/2006/main">
+  <p:cSld>
+    <p:bg>
+      <p:bgPr>
+        <a:blipFill dpi="0" rotWithShape="1">
+          <a:blip r:embed="rId2">
+            <a:lum/>
+          </a:blip>
+          <a:srcRect/>
+          <a:stretch>
+            <a:fillRect/>
+          </a:stretch>
+        </a:blipFill>
+        <a:effectLst/>
+      </p:bgPr>
+    </p:bg>
+    <p:spTree>
+      <p:nvGrpSpPr>
+        <p:cNvPr id="1" name=""/>
+        <p:cNvGrpSpPr/>
+        <p:nvPr/>
+      </p:nvGrpSpPr>
+      <p:grpSpPr>
+        <a:xfrm>
+          <a:off x="0" y="0"/>
+          <a:ext cx="0" cy="0"/>
+          <a:chOff x="0" y="0"/>
+          <a:chExt cx="0" cy="0"/>
+        </a:xfrm>
+      </p:grpSpPr>
+      <p:sp>
+        <p:nvSpPr>
+          <p:cNvPr id="2" name="Title 1"/>
+          <p:cNvSpPr>
+            <a:spLocks noGrp="1"/>
+          </p:cNvSpPr>
+          <p:nvPr>
+            <p:ph type="title"/>
+          </p:nvPr>
+        </p:nvSpPr>
+        <p:spPr/>
+        <p:txBody>
+          <a:bodyPr/>
+          <a:lstStyle/>
+          <a:p>
+            <a:r>
+              <a:rPr lang="ru-RU" dirty="0">
+                <a:solidFill>
+                  <a:schemeClr val="bg1"/>
+                </a:solidFill>
+              </a:rPr>
+              <a:t>Материалы для обучения</a:t>
+            </a:r>
+            <a:endParaRPr lang="en-US" dirty="0">
+              <a:solidFill>
+                <a:schemeClr val="bg1"/>
+              </a:solidFill>
+            </a:endParaRPr>
+          </a:p>
+        </p:txBody>
+      </p:sp>
+      <p:sp>
+        <p:nvSpPr>
+          <p:cNvPr id="3" name="Content Placeholder 2"/>
+          <p:cNvSpPr>
+            <a:spLocks noGrp="1"/>
+          </p:cNvSpPr>
+          <p:nvPr>
+            <p:ph idx="1"/>
+          </p:nvPr>
+        </p:nvSpPr>
+        <p:spPr/>
+        <p:txBody>
+          <a:bodyPr/>
+          <a:lstStyle/>
+          <a:p>
+            <a:r>
+              <a:rPr lang="en-US" dirty="0">
+                <a:solidFill>
+                  <a:schemeClr val="bg1"/>
+                </a:solidFill>
+                <a:hlinkClick r:id="rId3"/>
+              </a:rPr>
+              <a:t>https://</a:t>
+            </a:r>
+            <a:r>
+              <a:rPr lang="en-US" dirty="0" smtClean="0">
+                <a:solidFill>
+                  <a:schemeClr val="bg1"/>
+                </a:solidFill>
+                <a:hlinkClick r:id="rId3"/>
+              </a:rPr>
+              <a:t>github.com/bazile/Training</a:t>
+            </a:r>
+            <a:r>
+              <a:rPr lang="en-US" dirty="0" smtClean="0">
+                <a:solidFill>
+                  <a:schemeClr val="bg1"/>
+                </a:solidFill>
+              </a:rPr>
+              <a:t/>
+            </a:r>
+            <a:br>
+              <a:rPr lang="en-US" dirty="0" smtClean="0">
+                <a:solidFill>
+                  <a:schemeClr val="bg1"/>
+                </a:solidFill>
+              </a:rPr>
+            </a:br>
+            <a:r>
+              <a:rPr lang="ru-RU" dirty="0" smtClean="0">
+                <a:solidFill>
+                  <a:schemeClr val="bg1"/>
+                </a:solidFill>
+              </a:rPr>
+              <a:t>Презентации и примеры кода используемые во время занятия</a:t>
+            </a:r>
+          </a:p>
+          <a:p>
+            <a:endParaRPr lang="ru-RU" dirty="0" smtClean="0">
+              <a:solidFill>
+                <a:schemeClr val="bg1"/>
+              </a:solidFill>
+            </a:endParaRPr>
+          </a:p>
+          <a:p>
+            <a:r>
+              <a:rPr lang="en-US" dirty="0">
+                <a:solidFill>
+                  <a:schemeClr val="bg1"/>
+                </a:solidFill>
+                <a:hlinkClick r:id="rId4"/>
+              </a:rPr>
+              <a:t>http://belhard.nullptr.ru</a:t>
+            </a:r>
+            <a:r>
+              <a:rPr lang="en-US" dirty="0" smtClean="0">
+                <a:solidFill>
+                  <a:schemeClr val="bg1"/>
+                </a:solidFill>
+                <a:hlinkClick r:id="rId4"/>
+              </a:rPr>
+              <a:t>/</a:t>
+            </a:r>
+            <a:r>
+              <a:rPr lang="ru-RU" dirty="0" smtClean="0">
+                <a:solidFill>
+                  <a:schemeClr val="bg1"/>
+                </a:solidFill>
+              </a:rPr>
+              <a:t/>
+            </a:r>
+            <a:br>
+              <a:rPr lang="ru-RU" dirty="0" smtClean="0">
+                <a:solidFill>
+                  <a:schemeClr val="bg1"/>
+                </a:solidFill>
+              </a:rPr>
+            </a:br>
+            <a:r>
+              <a:rPr lang="ru-RU" dirty="0" smtClean="0">
+                <a:solidFill>
+                  <a:schemeClr val="bg1"/>
+                </a:solidFill>
+              </a:rPr>
+              <a:t>Книги, примеры к ним и другие полезные файлы.</a:t>
+            </a:r>
+            <a:endParaRPr lang="ru-RU" dirty="0">
+              <a:solidFill>
+                <a:schemeClr val="bg1"/>
+              </a:solidFill>
+            </a:endParaRPr>
+          </a:p>
+          <a:p>
+            <a:endParaRPr lang="en-US" dirty="0"/>
+          </a:p>
+        </p:txBody>
+      </p:sp>
+    </p:spTree>
+    <p:extLst>
+      <p:ext uri="{BB962C8B-B14F-4D97-AF65-F5344CB8AC3E}">
+        <p14:creationId xmlns:p14="http://schemas.microsoft.com/office/powerpoint/2010/main" val="306762039"/>
+      </p:ext>
+    </p:extLst>
+  </p:cSld>
+  <p:clrMapOvr>
+    <a:masterClrMapping/>
+  </p:clrMapOvr>
+  <p:timing>
+    <p:tnLst>
+      <p:par>
+        <p:cTn id="1" dur="indefinite" restart="never" nodeType="tmRoot"/>
+      </p:par>
+    </p:tnLst>
+  </p:timing>
+</p:sld>
+</file>
+
+<file path=ppt/slides/slide20.xml><?xml version="1.0" encoding="utf-8"?>
 <p:sld xmlns:a="http://schemas.openxmlformats.org/drawingml/2006/main" xmlns:r="http://schemas.openxmlformats.org/officeDocument/2006/relationships" xmlns:p="http://schemas.openxmlformats.org/presentationml/2006/main">
   <p:cSld>
     <p:bg>
@@ -15171,7 +18008,7 @@
 </p:sld>
 </file>
 
-<file path=ppt/slides/slide19.xml><?xml version="1.0" encoding="utf-8"?>
+<file path=ppt/slides/slide21.xml><?xml version="1.0" encoding="utf-8"?>
 <p:sld xmlns:a="http://schemas.openxmlformats.org/drawingml/2006/main" xmlns:r="http://schemas.openxmlformats.org/officeDocument/2006/relationships" xmlns:p="http://schemas.openxmlformats.org/presentationml/2006/main">
   <p:cSld>
     <p:bg>
@@ -16139,206 +18976,7 @@
 </p:sld>
 </file>
 
-<file path=ppt/slides/slide2.xml><?xml version="1.0" encoding="utf-8"?>
-<p:sld xmlns:a="http://schemas.openxmlformats.org/drawingml/2006/main" xmlns:r="http://schemas.openxmlformats.org/officeDocument/2006/relationships" xmlns:p="http://schemas.openxmlformats.org/presentationml/2006/main">
-  <p:cSld>
-    <p:bg>
-      <p:bgPr>
-        <a:blipFill dpi="0" rotWithShape="1">
-          <a:blip r:embed="rId2">
-            <a:lum/>
-          </a:blip>
-          <a:srcRect/>
-          <a:stretch>
-            <a:fillRect/>
-          </a:stretch>
-        </a:blipFill>
-        <a:effectLst/>
-      </p:bgPr>
-    </p:bg>
-    <p:spTree>
-      <p:nvGrpSpPr>
-        <p:cNvPr id="1" name=""/>
-        <p:cNvGrpSpPr/>
-        <p:nvPr/>
-      </p:nvGrpSpPr>
-      <p:grpSpPr>
-        <a:xfrm>
-          <a:off x="0" y="0"/>
-          <a:ext cx="0" cy="0"/>
-          <a:chOff x="0" y="0"/>
-          <a:chExt cx="0" cy="0"/>
-        </a:xfrm>
-      </p:grpSpPr>
-      <p:sp>
-        <p:nvSpPr>
-          <p:cNvPr id="2" name="Title 1"/>
-          <p:cNvSpPr>
-            <a:spLocks noGrp="1"/>
-          </p:cNvSpPr>
-          <p:nvPr>
-            <p:ph type="title"/>
-          </p:nvPr>
-        </p:nvSpPr>
-        <p:spPr/>
-        <p:txBody>
-          <a:bodyPr/>
-          <a:lstStyle/>
-          <a:p>
-            <a:r>
-              <a:rPr lang="ru-RU" dirty="0">
-                <a:solidFill>
-                  <a:schemeClr val="bg1"/>
-                </a:solidFill>
-              </a:rPr>
-              <a:t>Материалы для обучения</a:t>
-            </a:r>
-            <a:endParaRPr lang="en-US" dirty="0">
-              <a:solidFill>
-                <a:schemeClr val="bg1"/>
-              </a:solidFill>
-            </a:endParaRPr>
-          </a:p>
-        </p:txBody>
-      </p:sp>
-      <p:sp>
-        <p:nvSpPr>
-          <p:cNvPr id="3" name="Content Placeholder 2"/>
-          <p:cNvSpPr>
-            <a:spLocks noGrp="1"/>
-          </p:cNvSpPr>
-          <p:nvPr>
-            <p:ph idx="1"/>
-          </p:nvPr>
-        </p:nvSpPr>
-        <p:spPr/>
-        <p:txBody>
-          <a:bodyPr/>
-          <a:lstStyle/>
-          <a:p>
-            <a:r>
-              <a:rPr lang="en-US" dirty="0">
-                <a:solidFill>
-                  <a:schemeClr val="bg1"/>
-                </a:solidFill>
-                <a:hlinkClick r:id="rId3"/>
-              </a:rPr>
-              <a:t>https://</a:t>
-            </a:r>
-            <a:r>
-              <a:rPr lang="en-US" dirty="0" smtClean="0">
-                <a:solidFill>
-                  <a:schemeClr val="bg1"/>
-                </a:solidFill>
-                <a:hlinkClick r:id="rId3"/>
-              </a:rPr>
-              <a:t>github.com/bazile/Training</a:t>
-            </a:r>
-            <a:r>
-              <a:rPr lang="en-US" dirty="0" smtClean="0">
-                <a:solidFill>
-                  <a:schemeClr val="bg1"/>
-                </a:solidFill>
-              </a:rPr>
-              <a:t/>
-            </a:r>
-            <a:br>
-              <a:rPr lang="en-US" dirty="0" smtClean="0">
-                <a:solidFill>
-                  <a:schemeClr val="bg1"/>
-                </a:solidFill>
-              </a:rPr>
-            </a:br>
-            <a:r>
-              <a:rPr lang="ru-RU" dirty="0" smtClean="0">
-                <a:solidFill>
-                  <a:schemeClr val="bg1"/>
-                </a:solidFill>
-              </a:rPr>
-              <a:t>Презентации и примеры кода используемые во время занятия</a:t>
-            </a:r>
-          </a:p>
-          <a:p>
-            <a:endParaRPr lang="ru-RU" dirty="0" smtClean="0">
-              <a:solidFill>
-                <a:schemeClr val="bg1"/>
-              </a:solidFill>
-            </a:endParaRPr>
-          </a:p>
-          <a:p>
-            <a:r>
-              <a:rPr lang="en-US" dirty="0">
-                <a:solidFill>
-                  <a:schemeClr val="bg1"/>
-                </a:solidFill>
-                <a:hlinkClick r:id="rId4"/>
-              </a:rPr>
-              <a:t>http://belhard.nullptr.ru</a:t>
-            </a:r>
-            <a:r>
-              <a:rPr lang="en-US" dirty="0" smtClean="0">
-                <a:solidFill>
-                  <a:schemeClr val="bg1"/>
-                </a:solidFill>
-                <a:hlinkClick r:id="rId4"/>
-              </a:rPr>
-              <a:t>/</a:t>
-            </a:r>
-            <a:r>
-              <a:rPr lang="ru-RU" dirty="0" smtClean="0">
-                <a:solidFill>
-                  <a:schemeClr val="bg1"/>
-                </a:solidFill>
-              </a:rPr>
-              <a:t/>
-            </a:r>
-            <a:br>
-              <a:rPr lang="ru-RU" dirty="0" smtClean="0">
-                <a:solidFill>
-                  <a:schemeClr val="bg1"/>
-                </a:solidFill>
-              </a:rPr>
-            </a:br>
-            <a:r>
-              <a:rPr lang="ru-RU" dirty="0" smtClean="0">
-                <a:solidFill>
-                  <a:schemeClr val="bg1"/>
-                </a:solidFill>
-              </a:rPr>
-              <a:t>Книги, примеры к ним и другие полезные файлы.</a:t>
-            </a:r>
-            <a:endParaRPr lang="ru-RU" dirty="0">
-              <a:solidFill>
-                <a:schemeClr val="bg1"/>
-              </a:solidFill>
-            </a:endParaRPr>
-          </a:p>
-          <a:p>
-            <a:endParaRPr lang="en-US" dirty="0"/>
-          </a:p>
-        </p:txBody>
-      </p:sp>
-    </p:spTree>
-    <p:extLst>
-      <p:ext uri="{BB962C8B-B14F-4D97-AF65-F5344CB8AC3E}">
-        <p14:creationId xmlns:p14="http://schemas.microsoft.com/office/powerpoint/2010/main" val="306762039"/>
-      </p:ext>
-    </p:extLst>
-  </p:cSld>
-  <p:clrMapOvr>
-    <a:masterClrMapping/>
-  </p:clrMapOvr>
-  <p:timing>
-    <p:tnLst>
-      <p:par>
-        <p:cTn id="1" dur="indefinite" restart="never" nodeType="tmRoot"/>
-      </p:par>
-    </p:tnLst>
-  </p:timing>
-</p:sld>
-</file>
-
-<file path=ppt/slides/slide20.xml><?xml version="1.0" encoding="utf-8"?>
+<file path=ppt/slides/slide22.xml><?xml version="1.0" encoding="utf-8"?>
 <p:sld xmlns:a="http://schemas.openxmlformats.org/drawingml/2006/main" xmlns:r="http://schemas.openxmlformats.org/officeDocument/2006/relationships" xmlns:p="http://schemas.openxmlformats.org/presentationml/2006/main">
   <p:cSld>
     <p:bg>
@@ -17515,7 +20153,92 @@
 </p:sld>
 </file>
 
-<file path=ppt/slides/slide21.xml><?xml version="1.0" encoding="utf-8"?>
+<file path=ppt/slides/slide23.xml><?xml version="1.0" encoding="utf-8"?>
+<p:sld xmlns:a="http://schemas.openxmlformats.org/drawingml/2006/main" xmlns:r="http://schemas.openxmlformats.org/officeDocument/2006/relationships" xmlns:p="http://schemas.openxmlformats.org/presentationml/2006/main">
+  <p:cSld>
+    <p:spTree>
+      <p:nvGrpSpPr>
+        <p:cNvPr id="1" name=""/>
+        <p:cNvGrpSpPr/>
+        <p:nvPr/>
+      </p:nvGrpSpPr>
+      <p:grpSpPr>
+        <a:xfrm>
+          <a:off x="0" y="0"/>
+          <a:ext cx="0" cy="0"/>
+          <a:chOff x="0" y="0"/>
+          <a:chExt cx="0" cy="0"/>
+        </a:xfrm>
+      </p:grpSpPr>
+      <p:sp>
+        <p:nvSpPr>
+          <p:cNvPr id="2" name="Title 1"/>
+          <p:cNvSpPr>
+            <a:spLocks noGrp="1"/>
+          </p:cNvSpPr>
+          <p:nvPr>
+            <p:ph type="title"/>
+          </p:nvPr>
+        </p:nvSpPr>
+        <p:spPr/>
+        <p:txBody>
+          <a:bodyPr/>
+          <a:lstStyle/>
+          <a:p>
+            <a:r>
+              <a:rPr lang="ru-RU" dirty="0" smtClean="0"/>
+              <a:t>Архивация/</a:t>
+            </a:r>
+            <a:endParaRPr lang="en-US" dirty="0"/>
+          </a:p>
+        </p:txBody>
+      </p:sp>
+      <p:sp>
+        <p:nvSpPr>
+          <p:cNvPr id="3" name="Content Placeholder 2"/>
+          <p:cNvSpPr>
+            <a:spLocks noGrp="1"/>
+          </p:cNvSpPr>
+          <p:nvPr>
+            <p:ph idx="1"/>
+          </p:nvPr>
+        </p:nvSpPr>
+        <p:spPr/>
+        <p:txBody>
+          <a:bodyPr/>
+          <a:lstStyle/>
+          <a:p>
+            <a:pPr marL="0" indent="0">
+              <a:buNone/>
+            </a:pPr>
+            <a:r>
+              <a:rPr lang="en-US" dirty="0" err="1" smtClean="0"/>
+              <a:t>System.IO.Compression</a:t>
+            </a:r>
+            <a:endParaRPr lang="en-US" dirty="0" smtClean="0"/>
+          </a:p>
+          <a:p>
+            <a:pPr marL="0" indent="0">
+              <a:buNone/>
+            </a:pPr>
+            <a:endParaRPr lang="en-US" dirty="0"/>
+          </a:p>
+        </p:txBody>
+      </p:sp>
+    </p:spTree>
+    <p:extLst>
+      <p:ext uri="{BB962C8B-B14F-4D97-AF65-F5344CB8AC3E}">
+        <p14:creationId xmlns:p14="http://schemas.microsoft.com/office/powerpoint/2010/main" val="1322073642"/>
+      </p:ext>
+    </p:extLst>
+  </p:cSld>
+  <p:clrMapOvr>
+    <a:masterClrMapping/>
+  </p:clrMapOvr>
+</p:sld>
+</file>
+
+<file path=ppt/slides/slide24.xml><?xml version="1.0" encoding="utf-8"?>
 <p:sld xmlns:a="http://schemas.openxmlformats.org/drawingml/2006/main" xmlns:r="http://schemas.openxmlformats.org/officeDocument/2006/relationships" xmlns:p="http://schemas.openxmlformats.org/presentationml/2006/main">
   <p:cSld>
     <p:bg>
@@ -17599,15 +20322,7 @@
             </a:pPr>
             <a:r>
               <a:rPr lang="ru-RU" dirty="0" smtClean="0"/>
-              <a:t>Сериализация – механизм сохранения значения переменной </a:t>
-            </a:r>
-            <a:r>
-              <a:rPr lang="ru-RU" dirty="0" smtClean="0"/>
-              <a:t>типа </a:t>
-            </a:r>
-            <a:r>
-              <a:rPr lang="ru-RU" dirty="0" smtClean="0"/>
-              <a:t>в поток с возможностью последующего востановления точной копии (десериализация).</a:t>
+              <a:t>Сериализация – механизм сохранения значения переменной типа в поток с возможностью последующего востановления точной копии (десериализация).</a:t>
             </a:r>
             <a:endParaRPr lang="en-US" dirty="0" smtClean="0"/>
           </a:p>
@@ -17627,11 +20342,7 @@
             </a:r>
             <a:r>
               <a:rPr lang="ru-RU" dirty="0" smtClean="0"/>
-              <a:t> поддерживает бинарную и </a:t>
-            </a:r>
-            <a:r>
-              <a:rPr lang="ru-RU" dirty="0" smtClean="0"/>
-              <a:t>текстовую</a:t>
+              <a:t> поддерживает бинарную и текстовую</a:t>
             </a:r>
             <a:r>
               <a:rPr lang="en-US" dirty="0" smtClean="0"/>
@@ -17655,11 +20366,7 @@
             </a:r>
             <a:r>
               <a:rPr lang="ru-RU" dirty="0" smtClean="0"/>
-              <a:t>сериализацию</a:t>
-            </a:r>
-            <a:r>
-              <a:rPr lang="ru-RU" dirty="0" smtClean="0"/>
-              <a:t>. При необходимости можно реализовать собственный механизм.</a:t>
+              <a:t>сериализацию. При необходимости можно реализовать собственный механизм.</a:t>
             </a:r>
             <a:endParaRPr lang="en-US" dirty="0"/>
           </a:p>
@@ -17685,7 +20392,7 @@
 </p:sld>
 </file>
 
-<file path=ppt/slides/slide22.xml><?xml version="1.0" encoding="utf-8"?>
+<file path=ppt/slides/slide25.xml><?xml version="1.0" encoding="utf-8"?>
 <p:sld xmlns:a="http://schemas.openxmlformats.org/drawingml/2006/main" xmlns:r="http://schemas.openxmlformats.org/officeDocument/2006/relationships" xmlns:p="http://schemas.openxmlformats.org/presentationml/2006/main">
   <p:cSld>
     <p:bg>
@@ -19899,7 +22606,7 @@
 </p:sld>
 </file>
 
-<file path=ppt/slides/slide23.xml><?xml version="1.0" encoding="utf-8"?>
+<file path=ppt/slides/slide26.xml><?xml version="1.0" encoding="utf-8"?>
 <p:sld xmlns:a="http://schemas.openxmlformats.org/drawingml/2006/main" xmlns:r="http://schemas.openxmlformats.org/officeDocument/2006/relationships" xmlns:p="http://schemas.openxmlformats.org/presentationml/2006/main">
   <p:cSld>
     <p:bg>
@@ -22296,7 +25003,7 @@
 </p:sld>
 </file>
 
-<file path=ppt/slides/slide24.xml><?xml version="1.0" encoding="utf-8"?>
+<file path=ppt/slides/slide27.xml><?xml version="1.0" encoding="utf-8"?>
 <p:sld xmlns:a="http://schemas.openxmlformats.org/drawingml/2006/main" xmlns:r="http://schemas.openxmlformats.org/officeDocument/2006/relationships" xmlns:p="http://schemas.openxmlformats.org/presentationml/2006/main">
   <p:cSld>
     <p:bg>

</xml_diff>

<commit_message>
Minor tweaks to DriveInfo example
</commit_message>
<xml_diff>
--- a/Presentation/lesson-04-io.pptx
+++ b/Presentation/lesson-04-io.pptx
@@ -320,7 +320,7 @@
             <a:fld id="{FAECF776-F836-4CCD-9497-99E5597B8B5D}" type="datetimeFigureOut">
               <a:rPr lang="en-US" smtClean="0"/>
               <a:pPr/>
-              <a:t>2/11/2014</a:t>
+              <a:t>3/30/2014</a:t>
             </a:fld>
             <a:endParaRPr lang="en-US"/>
           </a:p>
@@ -492,7 +492,7 @@
             <a:fld id="{FAECF776-F836-4CCD-9497-99E5597B8B5D}" type="datetimeFigureOut">
               <a:rPr lang="en-US" smtClean="0"/>
               <a:pPr/>
-              <a:t>2/11/2014</a:t>
+              <a:t>3/30/2014</a:t>
             </a:fld>
             <a:endParaRPr lang="en-US"/>
           </a:p>
@@ -674,7 +674,7 @@
             <a:fld id="{FAECF776-F836-4CCD-9497-99E5597B8B5D}" type="datetimeFigureOut">
               <a:rPr lang="en-US" smtClean="0"/>
               <a:pPr/>
-              <a:t>2/11/2014</a:t>
+              <a:t>3/30/2014</a:t>
             </a:fld>
             <a:endParaRPr lang="en-US"/>
           </a:p>
@@ -924,7 +924,7 @@
                 </a:solidFill>
               </a:rPr>
               <a:pPr/>
-              <a:t>2/11/2014</a:t>
+              <a:t>3/30/2014</a:t>
             </a:fld>
             <a:endParaRPr lang="en-US">
               <a:solidFill>
@@ -1126,7 +1126,7 @@
                 </a:solidFill>
               </a:rPr>
               <a:pPr/>
-              <a:t>2/11/2014</a:t>
+              <a:t>3/30/2014</a:t>
             </a:fld>
             <a:endParaRPr lang="en-US">
               <a:solidFill>
@@ -1404,7 +1404,7 @@
                 </a:solidFill>
               </a:rPr>
               <a:pPr/>
-              <a:t>2/11/2014</a:t>
+              <a:t>3/30/2014</a:t>
             </a:fld>
             <a:endParaRPr lang="en-US">
               <a:solidFill>
@@ -1724,7 +1724,7 @@
                 </a:solidFill>
               </a:rPr>
               <a:pPr/>
-              <a:t>2/11/2014</a:t>
+              <a:t>3/30/2014</a:t>
             </a:fld>
             <a:endParaRPr lang="en-US">
               <a:solidFill>
@@ -2178,7 +2178,7 @@
                 </a:solidFill>
               </a:rPr>
               <a:pPr/>
-              <a:t>2/11/2014</a:t>
+              <a:t>3/30/2014</a:t>
             </a:fld>
             <a:endParaRPr lang="en-US">
               <a:solidFill>
@@ -2328,7 +2328,7 @@
                 </a:solidFill>
               </a:rPr>
               <a:pPr/>
-              <a:t>2/11/2014</a:t>
+              <a:t>3/30/2014</a:t>
             </a:fld>
             <a:endParaRPr lang="en-US">
               <a:solidFill>
@@ -2455,7 +2455,7 @@
                 </a:solidFill>
               </a:rPr>
               <a:pPr/>
-              <a:t>2/11/2014</a:t>
+              <a:t>3/30/2014</a:t>
             </a:fld>
             <a:endParaRPr lang="en-US">
               <a:solidFill>
@@ -2764,7 +2764,7 @@
                 </a:solidFill>
               </a:rPr>
               <a:pPr/>
-              <a:t>2/11/2014</a:t>
+              <a:t>3/30/2014</a:t>
             </a:fld>
             <a:endParaRPr lang="en-US">
               <a:solidFill>
@@ -2960,7 +2960,7 @@
             <a:fld id="{FAECF776-F836-4CCD-9497-99E5597B8B5D}" type="datetimeFigureOut">
               <a:rPr lang="en-US" smtClean="0"/>
               <a:pPr/>
-              <a:t>2/11/2014</a:t>
+              <a:t>3/30/2014</a:t>
             </a:fld>
             <a:endParaRPr lang="en-US"/>
           </a:p>
@@ -3221,7 +3221,7 @@
                 </a:solidFill>
               </a:rPr>
               <a:pPr/>
-              <a:t>2/11/2014</a:t>
+              <a:t>3/30/2014</a:t>
             </a:fld>
             <a:endParaRPr lang="en-US">
               <a:solidFill>
@@ -3423,7 +3423,7 @@
                 </a:solidFill>
               </a:rPr>
               <a:pPr/>
-              <a:t>2/11/2014</a:t>
+              <a:t>3/30/2014</a:t>
             </a:fld>
             <a:endParaRPr lang="en-US">
               <a:solidFill>
@@ -3635,7 +3635,7 @@
                 </a:solidFill>
               </a:rPr>
               <a:pPr/>
-              <a:t>2/11/2014</a:t>
+              <a:t>3/30/2014</a:t>
             </a:fld>
             <a:endParaRPr lang="en-US">
               <a:solidFill>
@@ -3907,7 +3907,7 @@
             <a:fld id="{FAECF776-F836-4CCD-9497-99E5597B8B5D}" type="datetimeFigureOut">
               <a:rPr lang="en-US" smtClean="0"/>
               <a:pPr/>
-              <a:t>2/11/2014</a:t>
+              <a:t>3/30/2014</a:t>
             </a:fld>
             <a:endParaRPr lang="en-US"/>
           </a:p>
@@ -4197,7 +4197,7 @@
             <a:fld id="{FAECF776-F836-4CCD-9497-99E5597B8B5D}" type="datetimeFigureOut">
               <a:rPr lang="en-US" smtClean="0"/>
               <a:pPr/>
-              <a:t>2/11/2014</a:t>
+              <a:t>3/30/2014</a:t>
             </a:fld>
             <a:endParaRPr lang="en-US"/>
           </a:p>
@@ -4621,7 +4621,7 @@
             <a:fld id="{FAECF776-F836-4CCD-9497-99E5597B8B5D}" type="datetimeFigureOut">
               <a:rPr lang="en-US" smtClean="0"/>
               <a:pPr/>
-              <a:t>2/11/2014</a:t>
+              <a:t>3/30/2014</a:t>
             </a:fld>
             <a:endParaRPr lang="en-US"/>
           </a:p>
@@ -4741,7 +4741,7 @@
             <a:fld id="{FAECF776-F836-4CCD-9497-99E5597B8B5D}" type="datetimeFigureOut">
               <a:rPr lang="en-US" smtClean="0"/>
               <a:pPr/>
-              <a:t>2/11/2014</a:t>
+              <a:t>3/30/2014</a:t>
             </a:fld>
             <a:endParaRPr lang="en-US"/>
           </a:p>
@@ -4838,7 +4838,7 @@
             <a:fld id="{FAECF776-F836-4CCD-9497-99E5597B8B5D}" type="datetimeFigureOut">
               <a:rPr lang="en-US" smtClean="0"/>
               <a:pPr/>
-              <a:t>2/11/2014</a:t>
+              <a:t>3/30/2014</a:t>
             </a:fld>
             <a:endParaRPr lang="en-US"/>
           </a:p>
@@ -5117,7 +5117,7 @@
             <a:fld id="{FAECF776-F836-4CCD-9497-99E5597B8B5D}" type="datetimeFigureOut">
               <a:rPr lang="en-US" smtClean="0"/>
               <a:pPr/>
-              <a:t>2/11/2014</a:t>
+              <a:t>3/30/2014</a:t>
             </a:fld>
             <a:endParaRPr lang="en-US"/>
           </a:p>
@@ -5372,7 +5372,7 @@
             <a:fld id="{FAECF776-F836-4CCD-9497-99E5597B8B5D}" type="datetimeFigureOut">
               <a:rPr lang="en-US" smtClean="0"/>
               <a:pPr/>
-              <a:t>2/11/2014</a:t>
+              <a:t>3/30/2014</a:t>
             </a:fld>
             <a:endParaRPr lang="en-US"/>
           </a:p>
@@ -5596,7 +5596,7 @@
             <a:fld id="{FAECF776-F836-4CCD-9497-99E5597B8B5D}" type="datetimeFigureOut">
               <a:rPr lang="en-US" smtClean="0"/>
               <a:pPr/>
-              <a:t>2/11/2014</a:t>
+              <a:t>3/30/2014</a:t>
             </a:fld>
             <a:endParaRPr lang="en-US"/>
           </a:p>
@@ -6114,7 +6114,7 @@
                 </a:solidFill>
               </a:rPr>
               <a:pPr/>
-              <a:t>2/11/2014</a:t>
+              <a:t>3/30/2014</a:t>
             </a:fld>
             <a:endParaRPr lang="en-US">
               <a:solidFill>
@@ -8118,394 +8118,6 @@
       </p:sp>
       <p:sp>
         <p:nvSpPr>
-          <p:cNvPr id="23553" name="Rectangle 1"/>
-          <p:cNvSpPr>
-            <a:spLocks noChangeArrowheads="1"/>
-          </p:cNvSpPr>
-          <p:nvPr/>
-        </p:nvSpPr>
-        <p:spPr bwMode="auto">
-          <a:xfrm>
-            <a:off x="152400" y="1828800"/>
-            <a:ext cx="8839200" cy="3046413"/>
-          </a:xfrm>
-          <a:prstGeom prst="rect">
-            <a:avLst/>
-          </a:prstGeom>
-          <a:noFill/>
-          <a:ln w="9525">
-            <a:solidFill>
-              <a:schemeClr val="bg1">
-                <a:lumMod val="65000"/>
-              </a:schemeClr>
-            </a:solidFill>
-            <a:miter lim="800000"/>
-            <a:headEnd/>
-            <a:tailEnd/>
-          </a:ln>
-          <a:effectLst/>
-        </p:spPr>
-        <p:txBody>
-          <a:bodyPr anchor="ctr">
-            <a:spAutoFit/>
-          </a:bodyPr>
-          <a:lstStyle/>
-          <a:p>
-            <a:pPr eaLnBrk="0" hangingPunct="0">
-              <a:defRPr/>
-            </a:pPr>
-            <a:r>
-              <a:rPr lang="be-BY" sz="1200" dirty="0">
-                <a:solidFill>
-                  <a:schemeClr val="bg1"/>
-                </a:solidFill>
-                <a:latin typeface="Courier New" pitchFamily="49" charset="0"/>
-                <a:ea typeface="Calibri" pitchFamily="34" charset="0"/>
-                <a:cs typeface="Courier New" pitchFamily="49" charset="0"/>
-              </a:rPr>
-              <a:t>            //DriveInfo di = new DriveInfo(@"C:\");</a:t>
-            </a:r>
-            <a:endParaRPr lang="be-BY" sz="1200" dirty="0">
-              <a:solidFill>
-                <a:schemeClr val="bg1"/>
-              </a:solidFill>
-              <a:latin typeface="Arial" pitchFamily="34" charset="0"/>
-            </a:endParaRPr>
-          </a:p>
-          <a:p>
-            <a:pPr eaLnBrk="0" hangingPunct="0">
-              <a:defRPr/>
-            </a:pPr>
-            <a:r>
-              <a:rPr lang="be-BY" sz="1200" dirty="0">
-                <a:solidFill>
-                  <a:schemeClr val="bg1"/>
-                </a:solidFill>
-                <a:latin typeface="Courier New" pitchFamily="49" charset="0"/>
-                <a:ea typeface="Calibri" pitchFamily="34" charset="0"/>
-                <a:cs typeface="Courier New" pitchFamily="49" charset="0"/>
-              </a:rPr>
-              <a:t>            DriveInfo[] dr = DriveInfo.GetDrives();</a:t>
-            </a:r>
-            <a:endParaRPr lang="be-BY" sz="1200" dirty="0">
-              <a:solidFill>
-                <a:schemeClr val="bg1"/>
-              </a:solidFill>
-              <a:latin typeface="Arial" pitchFamily="34" charset="0"/>
-            </a:endParaRPr>
-          </a:p>
-          <a:p>
-            <a:pPr eaLnBrk="0" hangingPunct="0">
-              <a:defRPr/>
-            </a:pPr>
-            <a:r>
-              <a:rPr lang="be-BY" sz="1200" dirty="0">
-                <a:solidFill>
-                  <a:schemeClr val="bg1"/>
-                </a:solidFill>
-                <a:latin typeface="Courier New" pitchFamily="49" charset="0"/>
-                <a:ea typeface="Calibri" pitchFamily="34" charset="0"/>
-                <a:cs typeface="Courier New" pitchFamily="49" charset="0"/>
-              </a:rPr>
-              <a:t>            foreach (DriveInfo di in dr)</a:t>
-            </a:r>
-            <a:endParaRPr lang="be-BY" sz="1200" dirty="0">
-              <a:solidFill>
-                <a:schemeClr val="bg1"/>
-              </a:solidFill>
-              <a:latin typeface="Arial" pitchFamily="34" charset="0"/>
-            </a:endParaRPr>
-          </a:p>
-          <a:p>
-            <a:pPr eaLnBrk="0" hangingPunct="0">
-              <a:defRPr/>
-            </a:pPr>
-            <a:r>
-              <a:rPr lang="be-BY" sz="1200" dirty="0">
-                <a:solidFill>
-                  <a:schemeClr val="bg1"/>
-                </a:solidFill>
-                <a:latin typeface="Courier New" pitchFamily="49" charset="0"/>
-                <a:ea typeface="Calibri" pitchFamily="34" charset="0"/>
-                <a:cs typeface="Courier New" pitchFamily="49" charset="0"/>
-              </a:rPr>
-              <a:t>            {</a:t>
-            </a:r>
-            <a:endParaRPr lang="be-BY" sz="1200" dirty="0">
-              <a:solidFill>
-                <a:schemeClr val="bg1"/>
-              </a:solidFill>
-              <a:latin typeface="Arial" pitchFamily="34" charset="0"/>
-            </a:endParaRPr>
-          </a:p>
-          <a:p>
-            <a:pPr eaLnBrk="0" hangingPunct="0">
-              <a:defRPr/>
-            </a:pPr>
-            <a:r>
-              <a:rPr lang="be-BY" sz="1200" dirty="0">
-                <a:solidFill>
-                  <a:schemeClr val="bg1"/>
-                </a:solidFill>
-                <a:latin typeface="Courier New" pitchFamily="49" charset="0"/>
-                <a:ea typeface="Calibri" pitchFamily="34" charset="0"/>
-                <a:cs typeface="Courier New" pitchFamily="49" charset="0"/>
-              </a:rPr>
-              <a:t>                Console.WriteLine("---------------------------------");</a:t>
-            </a:r>
-            <a:endParaRPr lang="be-BY" sz="1200" dirty="0">
-              <a:solidFill>
-                <a:schemeClr val="bg1"/>
-              </a:solidFill>
-              <a:latin typeface="Arial" pitchFamily="34" charset="0"/>
-            </a:endParaRPr>
-          </a:p>
-          <a:p>
-            <a:pPr eaLnBrk="0" hangingPunct="0">
-              <a:defRPr/>
-            </a:pPr>
-            <a:r>
-              <a:rPr lang="be-BY" sz="1200" dirty="0">
-                <a:solidFill>
-                  <a:schemeClr val="bg1"/>
-                </a:solidFill>
-                <a:latin typeface="Courier New" pitchFamily="49" charset="0"/>
-                <a:ea typeface="Calibri" pitchFamily="34" charset="0"/>
-                <a:cs typeface="Courier New" pitchFamily="49" charset="0"/>
-              </a:rPr>
-              <a:t>                Console.WriteLine("Type:  {0}", di.DriveType);</a:t>
-            </a:r>
-            <a:endParaRPr lang="be-BY" sz="1200" dirty="0">
-              <a:solidFill>
-                <a:schemeClr val="bg1"/>
-              </a:solidFill>
-              <a:latin typeface="Arial" pitchFamily="34" charset="0"/>
-            </a:endParaRPr>
-          </a:p>
-          <a:p>
-            <a:pPr eaLnBrk="0" hangingPunct="0">
-              <a:defRPr/>
-            </a:pPr>
-            <a:r>
-              <a:rPr lang="be-BY" sz="1200" dirty="0">
-                <a:solidFill>
-                  <a:schemeClr val="bg1"/>
-                </a:solidFill>
-                <a:latin typeface="Courier New" pitchFamily="49" charset="0"/>
-                <a:ea typeface="Calibri" pitchFamily="34" charset="0"/>
-                <a:cs typeface="Courier New" pitchFamily="49" charset="0"/>
-              </a:rPr>
-              <a:t>                Console.WriteLine("Name:  {0}", di.Name);</a:t>
-            </a:r>
-            <a:endParaRPr lang="be-BY" sz="1200" dirty="0">
-              <a:solidFill>
-                <a:schemeClr val="bg1"/>
-              </a:solidFill>
-              <a:latin typeface="Arial" pitchFamily="34" charset="0"/>
-            </a:endParaRPr>
-          </a:p>
-          <a:p>
-            <a:pPr eaLnBrk="0" hangingPunct="0">
-              <a:defRPr/>
-            </a:pPr>
-            <a:r>
-              <a:rPr lang="be-BY" sz="1200" dirty="0">
-                <a:solidFill>
-                  <a:schemeClr val="bg1"/>
-                </a:solidFill>
-                <a:latin typeface="Courier New" pitchFamily="49" charset="0"/>
-                <a:ea typeface="Calibri" pitchFamily="34" charset="0"/>
-                <a:cs typeface="Courier New" pitchFamily="49" charset="0"/>
-              </a:rPr>
-              <a:t>                if (di.IsReady == false)</a:t>
-            </a:r>
-            <a:endParaRPr lang="be-BY" sz="1200" dirty="0">
-              <a:solidFill>
-                <a:schemeClr val="bg1"/>
-              </a:solidFill>
-              <a:latin typeface="Arial" pitchFamily="34" charset="0"/>
-            </a:endParaRPr>
-          </a:p>
-          <a:p>
-            <a:pPr eaLnBrk="0" hangingPunct="0">
-              <a:defRPr/>
-            </a:pPr>
-            <a:r>
-              <a:rPr lang="be-BY" sz="1200" dirty="0">
-                <a:solidFill>
-                  <a:schemeClr val="bg1"/>
-                </a:solidFill>
-                <a:latin typeface="Courier New" pitchFamily="49" charset="0"/>
-                <a:ea typeface="Calibri" pitchFamily="34" charset="0"/>
-                <a:cs typeface="Courier New" pitchFamily="49" charset="0"/>
-              </a:rPr>
-              <a:t>                    continue;</a:t>
-            </a:r>
-            <a:endParaRPr lang="be-BY" sz="1200" dirty="0">
-              <a:solidFill>
-                <a:schemeClr val="bg1"/>
-              </a:solidFill>
-              <a:latin typeface="Arial" pitchFamily="34" charset="0"/>
-            </a:endParaRPr>
-          </a:p>
-          <a:p>
-            <a:pPr eaLnBrk="0" hangingPunct="0">
-              <a:defRPr/>
-            </a:pPr>
-            <a:r>
-              <a:rPr lang="be-BY" sz="1200" dirty="0">
-                <a:solidFill>
-                  <a:schemeClr val="bg1"/>
-                </a:solidFill>
-                <a:latin typeface="Courier New" pitchFamily="49" charset="0"/>
-                <a:ea typeface="Calibri" pitchFamily="34" charset="0"/>
-                <a:cs typeface="Courier New" pitchFamily="49" charset="0"/>
-              </a:rPr>
-              <a:t>                Console.WriteLine("Formt: {0}", di.DriveFormat);</a:t>
-            </a:r>
-            <a:endParaRPr lang="be-BY" sz="1200" dirty="0">
-              <a:solidFill>
-                <a:schemeClr val="bg1"/>
-              </a:solidFill>
-              <a:latin typeface="Arial" pitchFamily="34" charset="0"/>
-            </a:endParaRPr>
-          </a:p>
-          <a:p>
-            <a:pPr eaLnBrk="0" hangingPunct="0">
-              <a:defRPr/>
-            </a:pPr>
-            <a:r>
-              <a:rPr lang="be-BY" sz="1200" dirty="0">
-                <a:solidFill>
-                  <a:schemeClr val="bg1"/>
-                </a:solidFill>
-                <a:latin typeface="Courier New" pitchFamily="49" charset="0"/>
-                <a:ea typeface="Calibri" pitchFamily="34" charset="0"/>
-                <a:cs typeface="Courier New" pitchFamily="49" charset="0"/>
-              </a:rPr>
-              <a:t>                Console.WriteLine("Ready: {0}", di.IsReady);</a:t>
-            </a:r>
-            <a:endParaRPr lang="be-BY" sz="1200" dirty="0">
-              <a:solidFill>
-                <a:schemeClr val="bg1"/>
-              </a:solidFill>
-              <a:latin typeface="Arial" pitchFamily="34" charset="0"/>
-            </a:endParaRPr>
-          </a:p>
-          <a:p>
-            <a:pPr eaLnBrk="0" hangingPunct="0">
-              <a:defRPr/>
-            </a:pPr>
-            <a:r>
-              <a:rPr lang="be-BY" sz="1200" dirty="0">
-                <a:solidFill>
-                  <a:schemeClr val="bg1"/>
-                </a:solidFill>
-                <a:latin typeface="Courier New" pitchFamily="49" charset="0"/>
-                <a:ea typeface="Calibri" pitchFamily="34" charset="0"/>
-                <a:cs typeface="Courier New" pitchFamily="49" charset="0"/>
-              </a:rPr>
-              <a:t>                Console.WriteLine("Root:  {0}", di.RootDirectory);</a:t>
-            </a:r>
-            <a:endParaRPr lang="be-BY" sz="1200" dirty="0">
-              <a:solidFill>
-                <a:schemeClr val="bg1"/>
-              </a:solidFill>
-              <a:latin typeface="Arial" pitchFamily="34" charset="0"/>
-            </a:endParaRPr>
-          </a:p>
-          <a:p>
-            <a:pPr eaLnBrk="0" hangingPunct="0">
-              <a:defRPr/>
-            </a:pPr>
-            <a:r>
-              <a:rPr lang="be-BY" sz="1200" dirty="0">
-                <a:solidFill>
-                  <a:schemeClr val="bg1"/>
-                </a:solidFill>
-                <a:latin typeface="Courier New" pitchFamily="49" charset="0"/>
-                <a:ea typeface="Calibri" pitchFamily="34" charset="0"/>
-                <a:cs typeface="Courier New" pitchFamily="49" charset="0"/>
-              </a:rPr>
-              <a:t>                Console.WriteLine("Free Spase: {0:N0} bytes", di.TotalFreeSpace);</a:t>
-            </a:r>
-            <a:endParaRPr lang="be-BY" sz="1200" dirty="0">
-              <a:solidFill>
-                <a:schemeClr val="bg1"/>
-              </a:solidFill>
-              <a:latin typeface="Arial" pitchFamily="34" charset="0"/>
-            </a:endParaRPr>
-          </a:p>
-          <a:p>
-            <a:pPr eaLnBrk="0" hangingPunct="0">
-              <a:defRPr/>
-            </a:pPr>
-            <a:r>
-              <a:rPr lang="be-BY" sz="1200" dirty="0">
-                <a:solidFill>
-                  <a:schemeClr val="bg1"/>
-                </a:solidFill>
-                <a:latin typeface="Courier New" pitchFamily="49" charset="0"/>
-                <a:ea typeface="Calibri" pitchFamily="34" charset="0"/>
-                <a:cs typeface="Courier New" pitchFamily="49" charset="0"/>
-              </a:rPr>
-              <a:t>                Console.WriteLine("Size:  {0:N0} bytes", di.TotalSize);</a:t>
-            </a:r>
-            <a:endParaRPr lang="be-BY" sz="1200" dirty="0">
-              <a:solidFill>
-                <a:schemeClr val="bg1"/>
-              </a:solidFill>
-              <a:latin typeface="Arial" pitchFamily="34" charset="0"/>
-            </a:endParaRPr>
-          </a:p>
-          <a:p>
-            <a:pPr eaLnBrk="0" hangingPunct="0">
-              <a:defRPr/>
-            </a:pPr>
-            <a:r>
-              <a:rPr lang="be-BY" sz="1200" dirty="0">
-                <a:solidFill>
-                  <a:schemeClr val="bg1"/>
-                </a:solidFill>
-                <a:latin typeface="Courier New" pitchFamily="49" charset="0"/>
-                <a:ea typeface="Calibri" pitchFamily="34" charset="0"/>
-                <a:cs typeface="Courier New" pitchFamily="49" charset="0"/>
-              </a:rPr>
-              <a:t>                Console.WriteLine("Label: {0}", di.VolumeLabel);</a:t>
-            </a:r>
-            <a:endParaRPr lang="be-BY" sz="1200" dirty="0">
-              <a:solidFill>
-                <a:schemeClr val="bg1"/>
-              </a:solidFill>
-              <a:latin typeface="Arial" pitchFamily="34" charset="0"/>
-            </a:endParaRPr>
-          </a:p>
-          <a:p>
-            <a:pPr eaLnBrk="0" hangingPunct="0">
-              <a:defRPr/>
-            </a:pPr>
-            <a:r>
-              <a:rPr lang="be-BY" sz="1200" dirty="0">
-                <a:solidFill>
-                  <a:schemeClr val="bg1"/>
-                </a:solidFill>
-                <a:latin typeface="Courier New" pitchFamily="49" charset="0"/>
-                <a:ea typeface="Calibri" pitchFamily="34" charset="0"/>
-                <a:cs typeface="Courier New" pitchFamily="49" charset="0"/>
-              </a:rPr>
-              <a:t>            }</a:t>
-            </a:r>
-            <a:endParaRPr lang="be-BY" sz="1200" dirty="0">
-              <a:solidFill>
-                <a:schemeClr val="bg1"/>
-              </a:solidFill>
-              <a:latin typeface="Arial" pitchFamily="34" charset="0"/>
-            </a:endParaRPr>
-          </a:p>
-        </p:txBody>
-      </p:sp>
-      <p:sp>
-        <p:nvSpPr>
           <p:cNvPr id="4100" name="TextBox 6"/>
           <p:cNvSpPr txBox="1">
             <a:spLocks noChangeArrowheads="1"/>
@@ -8854,6 +8466,1442 @@
               </a:solidFill>
               <a:latin typeface="Courier New" pitchFamily="49" charset="0"/>
               <a:cs typeface="Calibri" pitchFamily="34" charset="0"/>
+            </a:endParaRPr>
+          </a:p>
+        </p:txBody>
+      </p:sp>
+      <p:sp>
+        <p:nvSpPr>
+          <p:cNvPr id="2" name="Rectangle 1"/>
+          <p:cNvSpPr>
+            <a:spLocks noChangeArrowheads="1"/>
+          </p:cNvSpPr>
+          <p:nvPr/>
+        </p:nvSpPr>
+        <p:spPr bwMode="auto">
+          <a:xfrm>
+            <a:off x="247300" y="2204864"/>
+            <a:ext cx="8649401" cy="3231654"/>
+          </a:xfrm>
+          <a:prstGeom prst="rect">
+            <a:avLst/>
+          </a:prstGeom>
+          <a:solidFill>
+            <a:srgbClr val="FFFFFF"/>
+          </a:solidFill>
+          <a:ln>
+            <a:noFill/>
+          </a:ln>
+          <a:effectLst/>
+          <a:extLst>
+            <a:ext uri="{91240B29-F687-4F45-9708-019B960494DF}">
+              <a14:hiddenLine xmlns:a14="http://schemas.microsoft.com/office/drawing/2010/main" w="9525">
+                <a:solidFill>
+                  <a:schemeClr val="tx1"/>
+                </a:solidFill>
+                <a:miter lim="800000"/>
+                <a:headEnd/>
+                <a:tailEnd/>
+              </a14:hiddenLine>
+            </a:ext>
+            <a:ext uri="{AF507438-7753-43E0-B8FC-AC1667EBCBE1}">
+              <a14:hiddenEffects xmlns:a14="http://schemas.microsoft.com/office/drawing/2010/main">
+                <a:effectLst>
+                  <a:outerShdw dist="35921" dir="2700000" algn="ctr" rotWithShape="0">
+                    <a:schemeClr val="bg2"/>
+                  </a:outerShdw>
+                </a:effectLst>
+              </a14:hiddenEffects>
+            </a:ext>
+          </a:extLst>
+        </p:spPr>
+        <p:txBody>
+          <a:bodyPr vert="horz" wrap="square" lIns="91440" tIns="45720" rIns="91440" bIns="45720" numCol="1" anchor="ctr" anchorCtr="0" compatLnSpc="1">
+            <a:prstTxWarp prst="textNoShape">
+              <a:avLst/>
+            </a:prstTxWarp>
+            <a:spAutoFit/>
+          </a:bodyPr>
+          <a:lstStyle/>
+          <a:p>
+            <a:pPr marL="0" marR="0" lvl="0" indent="0" algn="l" defTabSz="914400" rtl="0" eaLnBrk="1" fontAlgn="base" latinLnBrk="0" hangingPunct="1">
+              <a:lnSpc>
+                <a:spcPct val="100000"/>
+              </a:lnSpc>
+              <a:spcBef>
+                <a:spcPct val="0"/>
+              </a:spcBef>
+              <a:spcAft>
+                <a:spcPct val="0"/>
+              </a:spcAft>
+              <a:buClrTx/>
+              <a:buSzTx/>
+              <a:buFontTx/>
+              <a:buNone/>
+              <a:tabLst/>
+            </a:pPr>
+            <a:r>
+              <a:rPr kumimoji="0" lang="ru-RU" altLang="ru-RU" sz="1200" b="0" i="0" u="none" strike="noStrike" cap="none" normalizeH="0" baseline="0" dirty="0" smtClean="0">
+                <a:ln>
+                  <a:noFill/>
+                </a:ln>
+                <a:solidFill>
+                  <a:srgbClr val="008000"/>
+                </a:solidFill>
+                <a:effectLst/>
+                <a:latin typeface="Courier New" panose="02070309020205020404" pitchFamily="49" charset="0"/>
+                <a:cs typeface="Courier New" panose="02070309020205020404" pitchFamily="49" charset="0"/>
+              </a:rPr>
+              <a:t>//DriveInfo di = new DriveInfo(@"C:\");</a:t>
+            </a:r>
+            <a:endParaRPr lang="en-US" altLang="ru-RU" sz="1200" dirty="0">
+              <a:solidFill>
+                <a:srgbClr val="000000"/>
+              </a:solidFill>
+              <a:latin typeface="Courier New" panose="02070309020205020404" pitchFamily="49" charset="0"/>
+              <a:cs typeface="Courier New" panose="02070309020205020404" pitchFamily="49" charset="0"/>
+            </a:endParaRPr>
+          </a:p>
+          <a:p>
+            <a:pPr marL="0" marR="0" lvl="0" indent="0" algn="l" defTabSz="914400" rtl="0" eaLnBrk="1" fontAlgn="base" latinLnBrk="0" hangingPunct="1">
+              <a:lnSpc>
+                <a:spcPct val="100000"/>
+              </a:lnSpc>
+              <a:spcBef>
+                <a:spcPct val="0"/>
+              </a:spcBef>
+              <a:spcAft>
+                <a:spcPct val="0"/>
+              </a:spcAft>
+              <a:buClrTx/>
+              <a:buSzTx/>
+              <a:buFontTx/>
+              <a:buNone/>
+              <a:tabLst/>
+            </a:pPr>
+            <a:r>
+              <a:rPr kumimoji="0" lang="ru-RU" altLang="ru-RU" sz="1200" b="0" i="0" u="none" strike="noStrike" cap="none" normalizeH="0" baseline="0" dirty="0" smtClean="0">
+                <a:ln>
+                  <a:noFill/>
+                </a:ln>
+                <a:solidFill>
+                  <a:srgbClr val="2B91AF"/>
+                </a:solidFill>
+                <a:effectLst/>
+                <a:latin typeface="Courier New" panose="02070309020205020404" pitchFamily="49" charset="0"/>
+                <a:cs typeface="Courier New" panose="02070309020205020404" pitchFamily="49" charset="0"/>
+              </a:rPr>
+              <a:t>DriveInfo</a:t>
+            </a:r>
+            <a:r>
+              <a:rPr kumimoji="0" lang="ru-RU" altLang="ru-RU" sz="1200" b="0" i="0" u="none" strike="noStrike" cap="none" normalizeH="0" baseline="0" dirty="0" smtClean="0">
+                <a:ln>
+                  <a:noFill/>
+                </a:ln>
+                <a:solidFill>
+                  <a:srgbClr val="000000"/>
+                </a:solidFill>
+                <a:effectLst/>
+                <a:latin typeface="Courier New" panose="02070309020205020404" pitchFamily="49" charset="0"/>
+                <a:cs typeface="Courier New" panose="02070309020205020404" pitchFamily="49" charset="0"/>
+              </a:rPr>
+              <a:t>[] drives = </a:t>
+            </a:r>
+            <a:r>
+              <a:rPr kumimoji="0" lang="ru-RU" altLang="ru-RU" sz="1200" b="0" i="0" u="none" strike="noStrike" cap="none" normalizeH="0" baseline="0" dirty="0" smtClean="0">
+                <a:ln>
+                  <a:noFill/>
+                </a:ln>
+                <a:solidFill>
+                  <a:srgbClr val="2B91AF"/>
+                </a:solidFill>
+                <a:effectLst/>
+                <a:latin typeface="Courier New" panose="02070309020205020404" pitchFamily="49" charset="0"/>
+                <a:cs typeface="Courier New" panose="02070309020205020404" pitchFamily="49" charset="0"/>
+              </a:rPr>
+              <a:t>DriveInfo</a:t>
+            </a:r>
+            <a:r>
+              <a:rPr kumimoji="0" lang="ru-RU" altLang="ru-RU" sz="1200" b="0" i="0" u="none" strike="noStrike" cap="none" normalizeH="0" baseline="0" dirty="0" smtClean="0">
+                <a:ln>
+                  <a:noFill/>
+                </a:ln>
+                <a:solidFill>
+                  <a:srgbClr val="000000"/>
+                </a:solidFill>
+                <a:effectLst/>
+                <a:latin typeface="Courier New" panose="02070309020205020404" pitchFamily="49" charset="0"/>
+                <a:cs typeface="Courier New" panose="02070309020205020404" pitchFamily="49" charset="0"/>
+              </a:rPr>
+              <a:t>.GetDrives();</a:t>
+            </a:r>
+            <a:endParaRPr kumimoji="0" lang="en-US" altLang="ru-RU" sz="1200" b="0" i="0" u="none" strike="noStrike" cap="none" normalizeH="0" baseline="0" dirty="0" smtClean="0">
+              <a:ln>
+                <a:noFill/>
+              </a:ln>
+              <a:solidFill>
+                <a:srgbClr val="000000"/>
+              </a:solidFill>
+              <a:effectLst/>
+              <a:latin typeface="Courier New" panose="02070309020205020404" pitchFamily="49" charset="0"/>
+              <a:cs typeface="Courier New" panose="02070309020205020404" pitchFamily="49" charset="0"/>
+            </a:endParaRPr>
+          </a:p>
+          <a:p>
+            <a:pPr marL="0" marR="0" lvl="0" indent="0" algn="l" defTabSz="914400" rtl="0" eaLnBrk="1" fontAlgn="base" latinLnBrk="0" hangingPunct="1">
+              <a:lnSpc>
+                <a:spcPct val="100000"/>
+              </a:lnSpc>
+              <a:spcBef>
+                <a:spcPct val="0"/>
+              </a:spcBef>
+              <a:spcAft>
+                <a:spcPct val="0"/>
+              </a:spcAft>
+              <a:buClrTx/>
+              <a:buSzTx/>
+              <a:buFontTx/>
+              <a:buNone/>
+              <a:tabLst/>
+            </a:pPr>
+            <a:r>
+              <a:rPr kumimoji="0" lang="ru-RU" altLang="ru-RU" sz="1200" b="0" i="0" u="none" strike="noStrike" cap="none" normalizeH="0" baseline="0" dirty="0" smtClean="0">
+                <a:ln>
+                  <a:noFill/>
+                </a:ln>
+                <a:solidFill>
+                  <a:srgbClr val="0000FF"/>
+                </a:solidFill>
+                <a:effectLst/>
+                <a:latin typeface="Courier New" panose="02070309020205020404" pitchFamily="49" charset="0"/>
+                <a:cs typeface="Courier New" panose="02070309020205020404" pitchFamily="49" charset="0"/>
+              </a:rPr>
+              <a:t>foreach</a:t>
+            </a:r>
+            <a:r>
+              <a:rPr kumimoji="0" lang="ru-RU" altLang="ru-RU" sz="1200" b="0" i="0" u="none" strike="noStrike" cap="none" normalizeH="0" baseline="0" dirty="0" smtClean="0">
+                <a:ln>
+                  <a:noFill/>
+                </a:ln>
+                <a:solidFill>
+                  <a:srgbClr val="000000"/>
+                </a:solidFill>
+                <a:effectLst/>
+                <a:latin typeface="Courier New" panose="02070309020205020404" pitchFamily="49" charset="0"/>
+                <a:cs typeface="Courier New" panose="02070309020205020404" pitchFamily="49" charset="0"/>
+              </a:rPr>
+              <a:t> (</a:t>
+            </a:r>
+            <a:r>
+              <a:rPr kumimoji="0" lang="ru-RU" altLang="ru-RU" sz="1200" b="0" i="0" u="none" strike="noStrike" cap="none" normalizeH="0" baseline="0" dirty="0" smtClean="0">
+                <a:ln>
+                  <a:noFill/>
+                </a:ln>
+                <a:solidFill>
+                  <a:srgbClr val="2B91AF"/>
+                </a:solidFill>
+                <a:effectLst/>
+                <a:latin typeface="Courier New" panose="02070309020205020404" pitchFamily="49" charset="0"/>
+                <a:cs typeface="Courier New" panose="02070309020205020404" pitchFamily="49" charset="0"/>
+              </a:rPr>
+              <a:t>DriveInfo</a:t>
+            </a:r>
+            <a:r>
+              <a:rPr kumimoji="0" lang="ru-RU" altLang="ru-RU" sz="1200" b="0" i="0" u="none" strike="noStrike" cap="none" normalizeH="0" baseline="0" dirty="0" smtClean="0">
+                <a:ln>
+                  <a:noFill/>
+                </a:ln>
+                <a:solidFill>
+                  <a:srgbClr val="000000"/>
+                </a:solidFill>
+                <a:effectLst/>
+                <a:latin typeface="Courier New" panose="02070309020205020404" pitchFamily="49" charset="0"/>
+                <a:cs typeface="Courier New" panose="02070309020205020404" pitchFamily="49" charset="0"/>
+              </a:rPr>
+              <a:t> di </a:t>
+            </a:r>
+            <a:r>
+              <a:rPr kumimoji="0" lang="ru-RU" altLang="ru-RU" sz="1200" b="0" i="0" u="none" strike="noStrike" cap="none" normalizeH="0" baseline="0" dirty="0" smtClean="0">
+                <a:ln>
+                  <a:noFill/>
+                </a:ln>
+                <a:solidFill>
+                  <a:srgbClr val="0000FF"/>
+                </a:solidFill>
+                <a:effectLst/>
+                <a:latin typeface="Courier New" panose="02070309020205020404" pitchFamily="49" charset="0"/>
+                <a:cs typeface="Courier New" panose="02070309020205020404" pitchFamily="49" charset="0"/>
+              </a:rPr>
+              <a:t>in</a:t>
+            </a:r>
+            <a:r>
+              <a:rPr kumimoji="0" lang="ru-RU" altLang="ru-RU" sz="1200" b="0" i="0" u="none" strike="noStrike" cap="none" normalizeH="0" baseline="0" dirty="0" smtClean="0">
+                <a:ln>
+                  <a:noFill/>
+                </a:ln>
+                <a:solidFill>
+                  <a:srgbClr val="000000"/>
+                </a:solidFill>
+                <a:effectLst/>
+                <a:latin typeface="Courier New" panose="02070309020205020404" pitchFamily="49" charset="0"/>
+                <a:cs typeface="Courier New" panose="02070309020205020404" pitchFamily="49" charset="0"/>
+              </a:rPr>
+              <a:t> drives)</a:t>
+            </a:r>
+            <a:endParaRPr kumimoji="0" lang="en-US" altLang="ru-RU" sz="1200" b="0" i="0" u="none" strike="noStrike" cap="none" normalizeH="0" baseline="0" dirty="0" smtClean="0">
+              <a:ln>
+                <a:noFill/>
+              </a:ln>
+              <a:solidFill>
+                <a:srgbClr val="000000"/>
+              </a:solidFill>
+              <a:effectLst/>
+              <a:latin typeface="Courier New" panose="02070309020205020404" pitchFamily="49" charset="0"/>
+              <a:cs typeface="Courier New" panose="02070309020205020404" pitchFamily="49" charset="0"/>
+            </a:endParaRPr>
+          </a:p>
+          <a:p>
+            <a:pPr marL="0" marR="0" lvl="0" indent="0" algn="l" defTabSz="914400" rtl="0" eaLnBrk="1" fontAlgn="base" latinLnBrk="0" hangingPunct="1">
+              <a:lnSpc>
+                <a:spcPct val="100000"/>
+              </a:lnSpc>
+              <a:spcBef>
+                <a:spcPct val="0"/>
+              </a:spcBef>
+              <a:spcAft>
+                <a:spcPct val="0"/>
+              </a:spcAft>
+              <a:buClrTx/>
+              <a:buSzTx/>
+              <a:buFontTx/>
+              <a:buNone/>
+              <a:tabLst/>
+            </a:pPr>
+            <a:r>
+              <a:rPr kumimoji="0" lang="ru-RU" altLang="ru-RU" sz="1200" b="0" i="0" u="none" strike="noStrike" cap="none" normalizeH="0" baseline="0" dirty="0" smtClean="0">
+                <a:ln>
+                  <a:noFill/>
+                </a:ln>
+                <a:solidFill>
+                  <a:srgbClr val="000000"/>
+                </a:solidFill>
+                <a:effectLst/>
+                <a:latin typeface="Courier New" panose="02070309020205020404" pitchFamily="49" charset="0"/>
+                <a:cs typeface="Courier New" panose="02070309020205020404" pitchFamily="49" charset="0"/>
+              </a:rPr>
+              <a:t>{</a:t>
+            </a:r>
+            <a:endParaRPr kumimoji="0" lang="en-US" altLang="ru-RU" sz="1200" b="0" i="0" u="none" strike="noStrike" cap="none" normalizeH="0" baseline="0" dirty="0" smtClean="0">
+              <a:ln>
+                <a:noFill/>
+              </a:ln>
+              <a:solidFill>
+                <a:srgbClr val="000000"/>
+              </a:solidFill>
+              <a:effectLst/>
+              <a:latin typeface="Courier New" panose="02070309020205020404" pitchFamily="49" charset="0"/>
+              <a:cs typeface="Courier New" panose="02070309020205020404" pitchFamily="49" charset="0"/>
+            </a:endParaRPr>
+          </a:p>
+          <a:p>
+            <a:pPr marL="0" marR="0" lvl="0" indent="0" algn="l" defTabSz="914400" rtl="0" eaLnBrk="1" fontAlgn="base" latinLnBrk="0" hangingPunct="1">
+              <a:lnSpc>
+                <a:spcPct val="100000"/>
+              </a:lnSpc>
+              <a:spcBef>
+                <a:spcPct val="0"/>
+              </a:spcBef>
+              <a:spcAft>
+                <a:spcPct val="0"/>
+              </a:spcAft>
+              <a:buClrTx/>
+              <a:buSzTx/>
+              <a:buFontTx/>
+              <a:buNone/>
+              <a:tabLst/>
+            </a:pPr>
+            <a:r>
+              <a:rPr lang="en-US" altLang="ru-RU" sz="1200" dirty="0">
+                <a:solidFill>
+                  <a:srgbClr val="000000"/>
+                </a:solidFill>
+                <a:latin typeface="Courier New" panose="02070309020205020404" pitchFamily="49" charset="0"/>
+                <a:cs typeface="Courier New" panose="02070309020205020404" pitchFamily="49" charset="0"/>
+              </a:rPr>
+              <a:t>	</a:t>
+            </a:r>
+            <a:r>
+              <a:rPr kumimoji="0" lang="ru-RU" altLang="ru-RU" sz="1200" b="0" i="0" u="none" strike="noStrike" cap="none" normalizeH="0" baseline="0" dirty="0" smtClean="0">
+                <a:ln>
+                  <a:noFill/>
+                </a:ln>
+                <a:solidFill>
+                  <a:srgbClr val="2B91AF"/>
+                </a:solidFill>
+                <a:effectLst/>
+                <a:latin typeface="Courier New" panose="02070309020205020404" pitchFamily="49" charset="0"/>
+                <a:cs typeface="Courier New" panose="02070309020205020404" pitchFamily="49" charset="0"/>
+              </a:rPr>
+              <a:t>Console</a:t>
+            </a:r>
+            <a:r>
+              <a:rPr kumimoji="0" lang="ru-RU" altLang="ru-RU" sz="1200" b="0" i="0" u="none" strike="noStrike" cap="none" normalizeH="0" baseline="0" dirty="0" smtClean="0">
+                <a:ln>
+                  <a:noFill/>
+                </a:ln>
+                <a:solidFill>
+                  <a:srgbClr val="000000"/>
+                </a:solidFill>
+                <a:effectLst/>
+                <a:latin typeface="Courier New" panose="02070309020205020404" pitchFamily="49" charset="0"/>
+                <a:cs typeface="Courier New" panose="02070309020205020404" pitchFamily="49" charset="0"/>
+              </a:rPr>
+              <a:t>.WriteLine(</a:t>
+            </a:r>
+            <a:r>
+              <a:rPr kumimoji="0" lang="ru-RU" altLang="ru-RU" sz="1200" b="0" i="0" u="none" strike="noStrike" cap="none" normalizeH="0" baseline="0" dirty="0" smtClean="0">
+                <a:ln>
+                  <a:noFill/>
+                </a:ln>
+                <a:solidFill>
+                  <a:srgbClr val="A31515"/>
+                </a:solidFill>
+                <a:effectLst/>
+                <a:latin typeface="Courier New" panose="02070309020205020404" pitchFamily="49" charset="0"/>
+                <a:cs typeface="Courier New" panose="02070309020205020404" pitchFamily="49" charset="0"/>
+              </a:rPr>
+              <a:t>"---------------------------------"</a:t>
+            </a:r>
+            <a:r>
+              <a:rPr kumimoji="0" lang="ru-RU" altLang="ru-RU" sz="1200" b="0" i="0" u="none" strike="noStrike" cap="none" normalizeH="0" baseline="0" dirty="0" smtClean="0">
+                <a:ln>
+                  <a:noFill/>
+                </a:ln>
+                <a:solidFill>
+                  <a:srgbClr val="000000"/>
+                </a:solidFill>
+                <a:effectLst/>
+                <a:latin typeface="Courier New" panose="02070309020205020404" pitchFamily="49" charset="0"/>
+                <a:cs typeface="Courier New" panose="02070309020205020404" pitchFamily="49" charset="0"/>
+              </a:rPr>
+              <a:t>);</a:t>
+            </a:r>
+            <a:endParaRPr kumimoji="0" lang="en-US" altLang="ru-RU" sz="1200" b="0" i="0" u="none" strike="noStrike" cap="none" normalizeH="0" baseline="0" dirty="0" smtClean="0">
+              <a:ln>
+                <a:noFill/>
+              </a:ln>
+              <a:solidFill>
+                <a:srgbClr val="000000"/>
+              </a:solidFill>
+              <a:effectLst/>
+              <a:latin typeface="Courier New" panose="02070309020205020404" pitchFamily="49" charset="0"/>
+              <a:cs typeface="Courier New" panose="02070309020205020404" pitchFamily="49" charset="0"/>
+            </a:endParaRPr>
+          </a:p>
+          <a:p>
+            <a:pPr marL="0" marR="0" lvl="0" indent="0" algn="l" defTabSz="914400" rtl="0" eaLnBrk="1" fontAlgn="base" latinLnBrk="0" hangingPunct="1">
+              <a:lnSpc>
+                <a:spcPct val="100000"/>
+              </a:lnSpc>
+              <a:spcBef>
+                <a:spcPct val="0"/>
+              </a:spcBef>
+              <a:spcAft>
+                <a:spcPct val="0"/>
+              </a:spcAft>
+              <a:buClrTx/>
+              <a:buSzTx/>
+              <a:buFontTx/>
+              <a:buNone/>
+              <a:tabLst/>
+            </a:pPr>
+            <a:r>
+              <a:rPr lang="en-US" altLang="ru-RU" sz="1200" dirty="0">
+                <a:solidFill>
+                  <a:srgbClr val="000000"/>
+                </a:solidFill>
+                <a:latin typeface="Courier New" panose="02070309020205020404" pitchFamily="49" charset="0"/>
+                <a:cs typeface="Courier New" panose="02070309020205020404" pitchFamily="49" charset="0"/>
+              </a:rPr>
+              <a:t>	</a:t>
+            </a:r>
+            <a:r>
+              <a:rPr kumimoji="0" lang="ru-RU" altLang="ru-RU" sz="1200" b="0" i="0" u="none" strike="noStrike" cap="none" normalizeH="0" baseline="0" dirty="0" smtClean="0">
+                <a:ln>
+                  <a:noFill/>
+                </a:ln>
+                <a:solidFill>
+                  <a:srgbClr val="2B91AF"/>
+                </a:solidFill>
+                <a:effectLst/>
+                <a:latin typeface="Courier New" panose="02070309020205020404" pitchFamily="49" charset="0"/>
+                <a:cs typeface="Courier New" panose="02070309020205020404" pitchFamily="49" charset="0"/>
+              </a:rPr>
+              <a:t>Console</a:t>
+            </a:r>
+            <a:r>
+              <a:rPr kumimoji="0" lang="ru-RU" altLang="ru-RU" sz="1200" b="0" i="0" u="none" strike="noStrike" cap="none" normalizeH="0" baseline="0" dirty="0" smtClean="0">
+                <a:ln>
+                  <a:noFill/>
+                </a:ln>
+                <a:solidFill>
+                  <a:srgbClr val="000000"/>
+                </a:solidFill>
+                <a:effectLst/>
+                <a:latin typeface="Courier New" panose="02070309020205020404" pitchFamily="49" charset="0"/>
+                <a:cs typeface="Courier New" panose="02070309020205020404" pitchFamily="49" charset="0"/>
+              </a:rPr>
+              <a:t>.WriteLine(</a:t>
+            </a:r>
+            <a:r>
+              <a:rPr kumimoji="0" lang="ru-RU" altLang="ru-RU" sz="1200" b="0" i="0" u="none" strike="noStrike" cap="none" normalizeH="0" baseline="0" dirty="0" smtClean="0">
+                <a:ln>
+                  <a:noFill/>
+                </a:ln>
+                <a:solidFill>
+                  <a:srgbClr val="A31515"/>
+                </a:solidFill>
+                <a:effectLst/>
+                <a:latin typeface="Courier New" panose="02070309020205020404" pitchFamily="49" charset="0"/>
+                <a:cs typeface="Courier New" panose="02070309020205020404" pitchFamily="49" charset="0"/>
+              </a:rPr>
+              <a:t>"Type      : {0}"</a:t>
+            </a:r>
+            <a:r>
+              <a:rPr kumimoji="0" lang="ru-RU" altLang="ru-RU" sz="1200" b="0" i="0" u="none" strike="noStrike" cap="none" normalizeH="0" baseline="0" dirty="0" smtClean="0">
+                <a:ln>
+                  <a:noFill/>
+                </a:ln>
+                <a:solidFill>
+                  <a:srgbClr val="000000"/>
+                </a:solidFill>
+                <a:effectLst/>
+                <a:latin typeface="Courier New" panose="02070309020205020404" pitchFamily="49" charset="0"/>
+                <a:cs typeface="Courier New" panose="02070309020205020404" pitchFamily="49" charset="0"/>
+              </a:rPr>
+              <a:t>, di.DriveType);</a:t>
+            </a:r>
+            <a:endParaRPr kumimoji="0" lang="en-US" altLang="ru-RU" sz="1200" b="0" i="0" u="none" strike="noStrike" cap="none" normalizeH="0" baseline="0" dirty="0" smtClean="0">
+              <a:ln>
+                <a:noFill/>
+              </a:ln>
+              <a:solidFill>
+                <a:srgbClr val="000000"/>
+              </a:solidFill>
+              <a:effectLst/>
+              <a:latin typeface="Courier New" panose="02070309020205020404" pitchFamily="49" charset="0"/>
+              <a:cs typeface="Courier New" panose="02070309020205020404" pitchFamily="49" charset="0"/>
+            </a:endParaRPr>
+          </a:p>
+          <a:p>
+            <a:pPr marL="0" marR="0" lvl="0" indent="0" algn="l" defTabSz="914400" rtl="0" eaLnBrk="1" fontAlgn="base" latinLnBrk="0" hangingPunct="1">
+              <a:lnSpc>
+                <a:spcPct val="100000"/>
+              </a:lnSpc>
+              <a:spcBef>
+                <a:spcPct val="0"/>
+              </a:spcBef>
+              <a:spcAft>
+                <a:spcPct val="0"/>
+              </a:spcAft>
+              <a:buClrTx/>
+              <a:buSzTx/>
+              <a:buFontTx/>
+              <a:buNone/>
+              <a:tabLst/>
+            </a:pPr>
+            <a:r>
+              <a:rPr lang="en-US" altLang="ru-RU" sz="1200" dirty="0">
+                <a:solidFill>
+                  <a:srgbClr val="000000"/>
+                </a:solidFill>
+                <a:latin typeface="Courier New" panose="02070309020205020404" pitchFamily="49" charset="0"/>
+                <a:cs typeface="Courier New" panose="02070309020205020404" pitchFamily="49" charset="0"/>
+              </a:rPr>
+              <a:t>	</a:t>
+            </a:r>
+            <a:r>
+              <a:rPr kumimoji="0" lang="ru-RU" altLang="ru-RU" sz="1200" b="0" i="0" u="none" strike="noStrike" cap="none" normalizeH="0" baseline="0" dirty="0" smtClean="0">
+                <a:ln>
+                  <a:noFill/>
+                </a:ln>
+                <a:solidFill>
+                  <a:srgbClr val="2B91AF"/>
+                </a:solidFill>
+                <a:effectLst/>
+                <a:latin typeface="Courier New" panose="02070309020205020404" pitchFamily="49" charset="0"/>
+                <a:cs typeface="Courier New" panose="02070309020205020404" pitchFamily="49" charset="0"/>
+              </a:rPr>
+              <a:t>Console</a:t>
+            </a:r>
+            <a:r>
+              <a:rPr kumimoji="0" lang="ru-RU" altLang="ru-RU" sz="1200" b="0" i="0" u="none" strike="noStrike" cap="none" normalizeH="0" baseline="0" dirty="0" smtClean="0">
+                <a:ln>
+                  <a:noFill/>
+                </a:ln>
+                <a:solidFill>
+                  <a:srgbClr val="000000"/>
+                </a:solidFill>
+                <a:effectLst/>
+                <a:latin typeface="Courier New" panose="02070309020205020404" pitchFamily="49" charset="0"/>
+                <a:cs typeface="Courier New" panose="02070309020205020404" pitchFamily="49" charset="0"/>
+              </a:rPr>
+              <a:t>.WriteLine(</a:t>
+            </a:r>
+            <a:r>
+              <a:rPr kumimoji="0" lang="ru-RU" altLang="ru-RU" sz="1200" b="0" i="0" u="none" strike="noStrike" cap="none" normalizeH="0" baseline="0" dirty="0" smtClean="0">
+                <a:ln>
+                  <a:noFill/>
+                </a:ln>
+                <a:solidFill>
+                  <a:srgbClr val="A31515"/>
+                </a:solidFill>
+                <a:effectLst/>
+                <a:latin typeface="Courier New" panose="02070309020205020404" pitchFamily="49" charset="0"/>
+                <a:cs typeface="Courier New" panose="02070309020205020404" pitchFamily="49" charset="0"/>
+              </a:rPr>
+              <a:t>"Name      : {0}"</a:t>
+            </a:r>
+            <a:r>
+              <a:rPr kumimoji="0" lang="ru-RU" altLang="ru-RU" sz="1200" b="0" i="0" u="none" strike="noStrike" cap="none" normalizeH="0" baseline="0" dirty="0" smtClean="0">
+                <a:ln>
+                  <a:noFill/>
+                </a:ln>
+                <a:solidFill>
+                  <a:srgbClr val="000000"/>
+                </a:solidFill>
+                <a:effectLst/>
+                <a:latin typeface="Courier New" panose="02070309020205020404" pitchFamily="49" charset="0"/>
+                <a:cs typeface="Courier New" panose="02070309020205020404" pitchFamily="49" charset="0"/>
+              </a:rPr>
+              <a:t>, di.Name);</a:t>
+            </a:r>
+            <a:endParaRPr kumimoji="0" lang="en-US" altLang="ru-RU" sz="1200" b="0" i="0" u="none" strike="noStrike" cap="none" normalizeH="0" baseline="0" dirty="0" smtClean="0">
+              <a:ln>
+                <a:noFill/>
+              </a:ln>
+              <a:solidFill>
+                <a:srgbClr val="000000"/>
+              </a:solidFill>
+              <a:effectLst/>
+              <a:latin typeface="Courier New" panose="02070309020205020404" pitchFamily="49" charset="0"/>
+              <a:cs typeface="Courier New" panose="02070309020205020404" pitchFamily="49" charset="0"/>
+            </a:endParaRPr>
+          </a:p>
+          <a:p>
+            <a:pPr marL="0" marR="0" lvl="0" indent="0" algn="l" defTabSz="914400" rtl="0" eaLnBrk="1" fontAlgn="base" latinLnBrk="0" hangingPunct="1">
+              <a:lnSpc>
+                <a:spcPct val="100000"/>
+              </a:lnSpc>
+              <a:spcBef>
+                <a:spcPct val="0"/>
+              </a:spcBef>
+              <a:spcAft>
+                <a:spcPct val="0"/>
+              </a:spcAft>
+              <a:buClrTx/>
+              <a:buSzTx/>
+              <a:buFontTx/>
+              <a:buNone/>
+              <a:tabLst/>
+            </a:pPr>
+            <a:r>
+              <a:rPr lang="en-US" altLang="ru-RU" sz="1200" dirty="0">
+                <a:solidFill>
+                  <a:srgbClr val="000000"/>
+                </a:solidFill>
+                <a:latin typeface="Courier New" panose="02070309020205020404" pitchFamily="49" charset="0"/>
+                <a:cs typeface="Courier New" panose="02070309020205020404" pitchFamily="49" charset="0"/>
+              </a:rPr>
+              <a:t>	</a:t>
+            </a:r>
+            <a:r>
+              <a:rPr kumimoji="0" lang="ru-RU" altLang="ru-RU" sz="1200" b="0" i="0" u="none" strike="noStrike" cap="none" normalizeH="0" baseline="0" dirty="0" smtClean="0">
+                <a:ln>
+                  <a:noFill/>
+                </a:ln>
+                <a:solidFill>
+                  <a:srgbClr val="0000FF"/>
+                </a:solidFill>
+                <a:effectLst/>
+                <a:latin typeface="Courier New" panose="02070309020205020404" pitchFamily="49" charset="0"/>
+                <a:cs typeface="Courier New" panose="02070309020205020404" pitchFamily="49" charset="0"/>
+              </a:rPr>
+              <a:t>if</a:t>
+            </a:r>
+            <a:r>
+              <a:rPr kumimoji="0" lang="ru-RU" altLang="ru-RU" sz="1200" b="0" i="0" u="none" strike="noStrike" cap="none" normalizeH="0" baseline="0" dirty="0" smtClean="0">
+                <a:ln>
+                  <a:noFill/>
+                </a:ln>
+                <a:solidFill>
+                  <a:srgbClr val="000000"/>
+                </a:solidFill>
+                <a:effectLst/>
+                <a:latin typeface="Courier New" panose="02070309020205020404" pitchFamily="49" charset="0"/>
+                <a:cs typeface="Courier New" panose="02070309020205020404" pitchFamily="49" charset="0"/>
+              </a:rPr>
+              <a:t> (di.IsReady)</a:t>
+            </a:r>
+            <a:endParaRPr kumimoji="0" lang="en-US" altLang="ru-RU" sz="1200" b="0" i="0" u="none" strike="noStrike" cap="none" normalizeH="0" baseline="0" dirty="0" smtClean="0">
+              <a:ln>
+                <a:noFill/>
+              </a:ln>
+              <a:solidFill>
+                <a:srgbClr val="000000"/>
+              </a:solidFill>
+              <a:effectLst/>
+              <a:latin typeface="Courier New" panose="02070309020205020404" pitchFamily="49" charset="0"/>
+              <a:cs typeface="Courier New" panose="02070309020205020404" pitchFamily="49" charset="0"/>
+            </a:endParaRPr>
+          </a:p>
+          <a:p>
+            <a:pPr marL="0" marR="0" lvl="0" indent="0" algn="l" defTabSz="914400" rtl="0" eaLnBrk="1" fontAlgn="base" latinLnBrk="0" hangingPunct="1">
+              <a:lnSpc>
+                <a:spcPct val="100000"/>
+              </a:lnSpc>
+              <a:spcBef>
+                <a:spcPct val="0"/>
+              </a:spcBef>
+              <a:spcAft>
+                <a:spcPct val="0"/>
+              </a:spcAft>
+              <a:buClrTx/>
+              <a:buSzTx/>
+              <a:buFontTx/>
+              <a:buNone/>
+              <a:tabLst/>
+            </a:pPr>
+            <a:r>
+              <a:rPr lang="en-US" altLang="ru-RU" sz="1200" dirty="0">
+                <a:solidFill>
+                  <a:srgbClr val="000000"/>
+                </a:solidFill>
+                <a:latin typeface="Courier New" panose="02070309020205020404" pitchFamily="49" charset="0"/>
+                <a:cs typeface="Courier New" panose="02070309020205020404" pitchFamily="49" charset="0"/>
+              </a:rPr>
+              <a:t>	</a:t>
+            </a:r>
+            <a:r>
+              <a:rPr kumimoji="0" lang="ru-RU" altLang="ru-RU" sz="1200" b="0" i="0" u="none" strike="noStrike" cap="none" normalizeH="0" baseline="0" dirty="0" smtClean="0">
+                <a:ln>
+                  <a:noFill/>
+                </a:ln>
+                <a:solidFill>
+                  <a:srgbClr val="000000"/>
+                </a:solidFill>
+                <a:effectLst/>
+                <a:latin typeface="Courier New" panose="02070309020205020404" pitchFamily="49" charset="0"/>
+                <a:cs typeface="Courier New" panose="02070309020205020404" pitchFamily="49" charset="0"/>
+              </a:rPr>
+              <a:t>{</a:t>
+            </a:r>
+            <a:endParaRPr kumimoji="0" lang="en-US" altLang="ru-RU" sz="1200" b="0" i="0" u="none" strike="noStrike" cap="none" normalizeH="0" baseline="0" dirty="0" smtClean="0">
+              <a:ln>
+                <a:noFill/>
+              </a:ln>
+              <a:solidFill>
+                <a:srgbClr val="000000"/>
+              </a:solidFill>
+              <a:effectLst/>
+              <a:latin typeface="Courier New" panose="02070309020205020404" pitchFamily="49" charset="0"/>
+              <a:cs typeface="Courier New" panose="02070309020205020404" pitchFamily="49" charset="0"/>
+            </a:endParaRPr>
+          </a:p>
+          <a:p>
+            <a:pPr marL="0" marR="0" lvl="0" indent="0" algn="l" defTabSz="914400" rtl="0" eaLnBrk="1" fontAlgn="base" latinLnBrk="0" hangingPunct="1">
+              <a:lnSpc>
+                <a:spcPct val="100000"/>
+              </a:lnSpc>
+              <a:spcBef>
+                <a:spcPct val="0"/>
+              </a:spcBef>
+              <a:spcAft>
+                <a:spcPct val="0"/>
+              </a:spcAft>
+              <a:buClrTx/>
+              <a:buSzTx/>
+              <a:buFontTx/>
+              <a:buNone/>
+              <a:tabLst/>
+            </a:pPr>
+            <a:r>
+              <a:rPr lang="en-US" altLang="ru-RU" sz="1200" dirty="0">
+                <a:solidFill>
+                  <a:srgbClr val="000000"/>
+                </a:solidFill>
+                <a:latin typeface="Courier New" panose="02070309020205020404" pitchFamily="49" charset="0"/>
+                <a:cs typeface="Courier New" panose="02070309020205020404" pitchFamily="49" charset="0"/>
+              </a:rPr>
+              <a:t>	</a:t>
+            </a:r>
+            <a:r>
+              <a:rPr lang="en-US" altLang="ru-RU" sz="1200" dirty="0" smtClean="0">
+                <a:solidFill>
+                  <a:srgbClr val="000000"/>
+                </a:solidFill>
+                <a:latin typeface="Courier New" panose="02070309020205020404" pitchFamily="49" charset="0"/>
+                <a:cs typeface="Courier New" panose="02070309020205020404" pitchFamily="49" charset="0"/>
+              </a:rPr>
+              <a:t>	</a:t>
+            </a:r>
+            <a:r>
+              <a:rPr kumimoji="0" lang="ru-RU" altLang="ru-RU" sz="1200" b="0" i="0" u="none" strike="noStrike" cap="none" normalizeH="0" baseline="0" dirty="0" smtClean="0">
+                <a:ln>
+                  <a:noFill/>
+                </a:ln>
+                <a:solidFill>
+                  <a:srgbClr val="2B91AF"/>
+                </a:solidFill>
+                <a:effectLst/>
+                <a:latin typeface="Courier New" panose="02070309020205020404" pitchFamily="49" charset="0"/>
+                <a:cs typeface="Courier New" panose="02070309020205020404" pitchFamily="49" charset="0"/>
+              </a:rPr>
+              <a:t>Console</a:t>
+            </a:r>
+            <a:r>
+              <a:rPr kumimoji="0" lang="ru-RU" altLang="ru-RU" sz="1200" b="0" i="0" u="none" strike="noStrike" cap="none" normalizeH="0" baseline="0" dirty="0" smtClean="0">
+                <a:ln>
+                  <a:noFill/>
+                </a:ln>
+                <a:solidFill>
+                  <a:srgbClr val="000000"/>
+                </a:solidFill>
+                <a:effectLst/>
+                <a:latin typeface="Courier New" panose="02070309020205020404" pitchFamily="49" charset="0"/>
+                <a:cs typeface="Courier New" panose="02070309020205020404" pitchFamily="49" charset="0"/>
+              </a:rPr>
+              <a:t>.WriteLine(</a:t>
+            </a:r>
+            <a:r>
+              <a:rPr kumimoji="0" lang="ru-RU" altLang="ru-RU" sz="1200" b="0" i="0" u="none" strike="noStrike" cap="none" normalizeH="0" baseline="0" dirty="0" smtClean="0">
+                <a:ln>
+                  <a:noFill/>
+                </a:ln>
+                <a:solidFill>
+                  <a:srgbClr val="A31515"/>
+                </a:solidFill>
+                <a:effectLst/>
+                <a:latin typeface="Courier New" panose="02070309020205020404" pitchFamily="49" charset="0"/>
+                <a:cs typeface="Courier New" panose="02070309020205020404" pitchFamily="49" charset="0"/>
+              </a:rPr>
+              <a:t>"Format    : {0}"</a:t>
+            </a:r>
+            <a:r>
+              <a:rPr kumimoji="0" lang="ru-RU" altLang="ru-RU" sz="1200" b="0" i="0" u="none" strike="noStrike" cap="none" normalizeH="0" baseline="0" dirty="0" smtClean="0">
+                <a:ln>
+                  <a:noFill/>
+                </a:ln>
+                <a:solidFill>
+                  <a:srgbClr val="000000"/>
+                </a:solidFill>
+                <a:effectLst/>
+                <a:latin typeface="Courier New" panose="02070309020205020404" pitchFamily="49" charset="0"/>
+                <a:cs typeface="Courier New" panose="02070309020205020404" pitchFamily="49" charset="0"/>
+              </a:rPr>
+              <a:t>, di.DriveFormat);</a:t>
+            </a:r>
+            <a:endParaRPr kumimoji="0" lang="en-US" altLang="ru-RU" sz="1200" b="0" i="0" u="none" strike="noStrike" cap="none" normalizeH="0" baseline="0" dirty="0" smtClean="0">
+              <a:ln>
+                <a:noFill/>
+              </a:ln>
+              <a:solidFill>
+                <a:srgbClr val="000000"/>
+              </a:solidFill>
+              <a:effectLst/>
+              <a:latin typeface="Courier New" panose="02070309020205020404" pitchFamily="49" charset="0"/>
+              <a:cs typeface="Courier New" panose="02070309020205020404" pitchFamily="49" charset="0"/>
+            </a:endParaRPr>
+          </a:p>
+          <a:p>
+            <a:pPr marL="0" marR="0" lvl="0" indent="0" algn="l" defTabSz="914400" rtl="0" eaLnBrk="1" fontAlgn="base" latinLnBrk="0" hangingPunct="1">
+              <a:lnSpc>
+                <a:spcPct val="100000"/>
+              </a:lnSpc>
+              <a:spcBef>
+                <a:spcPct val="0"/>
+              </a:spcBef>
+              <a:spcAft>
+                <a:spcPct val="0"/>
+              </a:spcAft>
+              <a:buClrTx/>
+              <a:buSzTx/>
+              <a:buFontTx/>
+              <a:buNone/>
+              <a:tabLst/>
+            </a:pPr>
+            <a:r>
+              <a:rPr kumimoji="0" lang="en-US" altLang="ru-RU" sz="1200" b="0" i="0" u="none" strike="noStrike" cap="none" normalizeH="0" baseline="0" dirty="0" smtClean="0">
+                <a:ln>
+                  <a:noFill/>
+                </a:ln>
+                <a:solidFill>
+                  <a:srgbClr val="2B91AF"/>
+                </a:solidFill>
+                <a:effectLst/>
+                <a:latin typeface="Courier New" panose="02070309020205020404" pitchFamily="49" charset="0"/>
+                <a:cs typeface="Courier New" panose="02070309020205020404" pitchFamily="49" charset="0"/>
+              </a:rPr>
+              <a:t>		</a:t>
+            </a:r>
+            <a:r>
+              <a:rPr kumimoji="0" lang="ru-RU" altLang="ru-RU" sz="1200" b="0" i="0" u="none" strike="noStrike" cap="none" normalizeH="0" baseline="0" dirty="0" smtClean="0">
+                <a:ln>
+                  <a:noFill/>
+                </a:ln>
+                <a:solidFill>
+                  <a:srgbClr val="2B91AF"/>
+                </a:solidFill>
+                <a:effectLst/>
+                <a:latin typeface="Courier New" panose="02070309020205020404" pitchFamily="49" charset="0"/>
+                <a:cs typeface="Courier New" panose="02070309020205020404" pitchFamily="49" charset="0"/>
+              </a:rPr>
+              <a:t>Console</a:t>
+            </a:r>
+            <a:r>
+              <a:rPr kumimoji="0" lang="ru-RU" altLang="ru-RU" sz="1200" b="0" i="0" u="none" strike="noStrike" cap="none" normalizeH="0" baseline="0" dirty="0" smtClean="0">
+                <a:ln>
+                  <a:noFill/>
+                </a:ln>
+                <a:solidFill>
+                  <a:srgbClr val="000000"/>
+                </a:solidFill>
+                <a:effectLst/>
+                <a:latin typeface="Courier New" panose="02070309020205020404" pitchFamily="49" charset="0"/>
+                <a:cs typeface="Courier New" panose="02070309020205020404" pitchFamily="49" charset="0"/>
+              </a:rPr>
+              <a:t>.WriteLine(</a:t>
+            </a:r>
+            <a:r>
+              <a:rPr kumimoji="0" lang="ru-RU" altLang="ru-RU" sz="1200" b="0" i="0" u="none" strike="noStrike" cap="none" normalizeH="0" baseline="0" dirty="0" smtClean="0">
+                <a:ln>
+                  <a:noFill/>
+                </a:ln>
+                <a:solidFill>
+                  <a:srgbClr val="A31515"/>
+                </a:solidFill>
+                <a:effectLst/>
+                <a:latin typeface="Courier New" panose="02070309020205020404" pitchFamily="49" charset="0"/>
+                <a:cs typeface="Courier New" panose="02070309020205020404" pitchFamily="49" charset="0"/>
+              </a:rPr>
+              <a:t>"Ready     : {0}"</a:t>
+            </a:r>
+            <a:r>
+              <a:rPr kumimoji="0" lang="ru-RU" altLang="ru-RU" sz="1200" b="0" i="0" u="none" strike="noStrike" cap="none" normalizeH="0" baseline="0" dirty="0" smtClean="0">
+                <a:ln>
+                  <a:noFill/>
+                </a:ln>
+                <a:solidFill>
+                  <a:srgbClr val="000000"/>
+                </a:solidFill>
+                <a:effectLst/>
+                <a:latin typeface="Courier New" panose="02070309020205020404" pitchFamily="49" charset="0"/>
+                <a:cs typeface="Courier New" panose="02070309020205020404" pitchFamily="49" charset="0"/>
+              </a:rPr>
+              <a:t>, di.IsReady);</a:t>
+            </a:r>
+            <a:endParaRPr kumimoji="0" lang="en-US" altLang="ru-RU" sz="1200" b="0" i="0" u="none" strike="noStrike" cap="none" normalizeH="0" baseline="0" dirty="0" smtClean="0">
+              <a:ln>
+                <a:noFill/>
+              </a:ln>
+              <a:solidFill>
+                <a:srgbClr val="000000"/>
+              </a:solidFill>
+              <a:effectLst/>
+              <a:latin typeface="Courier New" panose="02070309020205020404" pitchFamily="49" charset="0"/>
+              <a:cs typeface="Courier New" panose="02070309020205020404" pitchFamily="49" charset="0"/>
+            </a:endParaRPr>
+          </a:p>
+          <a:p>
+            <a:pPr marL="0" marR="0" lvl="0" indent="0" algn="l" defTabSz="914400" rtl="0" eaLnBrk="1" fontAlgn="base" latinLnBrk="0" hangingPunct="1">
+              <a:lnSpc>
+                <a:spcPct val="100000"/>
+              </a:lnSpc>
+              <a:spcBef>
+                <a:spcPct val="0"/>
+              </a:spcBef>
+              <a:spcAft>
+                <a:spcPct val="0"/>
+              </a:spcAft>
+              <a:buClrTx/>
+              <a:buSzTx/>
+              <a:buFontTx/>
+              <a:buNone/>
+              <a:tabLst/>
+            </a:pPr>
+            <a:r>
+              <a:rPr kumimoji="0" lang="en-US" altLang="ru-RU" sz="1200" b="0" i="0" u="none" strike="noStrike" cap="none" normalizeH="0" baseline="0" dirty="0" smtClean="0">
+                <a:ln>
+                  <a:noFill/>
+                </a:ln>
+                <a:solidFill>
+                  <a:srgbClr val="2B91AF"/>
+                </a:solidFill>
+                <a:effectLst/>
+                <a:latin typeface="Courier New" panose="02070309020205020404" pitchFamily="49" charset="0"/>
+                <a:cs typeface="Courier New" panose="02070309020205020404" pitchFamily="49" charset="0"/>
+              </a:rPr>
+              <a:t>		</a:t>
+            </a:r>
+            <a:r>
+              <a:rPr kumimoji="0" lang="ru-RU" altLang="ru-RU" sz="1200" b="0" i="0" u="none" strike="noStrike" cap="none" normalizeH="0" baseline="0" dirty="0" smtClean="0">
+                <a:ln>
+                  <a:noFill/>
+                </a:ln>
+                <a:solidFill>
+                  <a:srgbClr val="2B91AF"/>
+                </a:solidFill>
+                <a:effectLst/>
+                <a:latin typeface="Courier New" panose="02070309020205020404" pitchFamily="49" charset="0"/>
+                <a:cs typeface="Courier New" panose="02070309020205020404" pitchFamily="49" charset="0"/>
+              </a:rPr>
+              <a:t>Console</a:t>
+            </a:r>
+            <a:r>
+              <a:rPr kumimoji="0" lang="ru-RU" altLang="ru-RU" sz="1200" b="0" i="0" u="none" strike="noStrike" cap="none" normalizeH="0" baseline="0" dirty="0" smtClean="0">
+                <a:ln>
+                  <a:noFill/>
+                </a:ln>
+                <a:solidFill>
+                  <a:srgbClr val="000000"/>
+                </a:solidFill>
+                <a:effectLst/>
+                <a:latin typeface="Courier New" panose="02070309020205020404" pitchFamily="49" charset="0"/>
+                <a:cs typeface="Courier New" panose="02070309020205020404" pitchFamily="49" charset="0"/>
+              </a:rPr>
+              <a:t>.WriteLine(</a:t>
+            </a:r>
+            <a:r>
+              <a:rPr kumimoji="0" lang="ru-RU" altLang="ru-RU" sz="1200" b="0" i="0" u="none" strike="noStrike" cap="none" normalizeH="0" baseline="0" dirty="0" smtClean="0">
+                <a:ln>
+                  <a:noFill/>
+                </a:ln>
+                <a:solidFill>
+                  <a:srgbClr val="A31515"/>
+                </a:solidFill>
+                <a:effectLst/>
+                <a:latin typeface="Courier New" panose="02070309020205020404" pitchFamily="49" charset="0"/>
+                <a:cs typeface="Courier New" panose="02070309020205020404" pitchFamily="49" charset="0"/>
+              </a:rPr>
+              <a:t>"Root      : {0}"</a:t>
+            </a:r>
+            <a:r>
+              <a:rPr kumimoji="0" lang="ru-RU" altLang="ru-RU" sz="1200" b="0" i="0" u="none" strike="noStrike" cap="none" normalizeH="0" baseline="0" dirty="0" smtClean="0">
+                <a:ln>
+                  <a:noFill/>
+                </a:ln>
+                <a:solidFill>
+                  <a:srgbClr val="000000"/>
+                </a:solidFill>
+                <a:effectLst/>
+                <a:latin typeface="Courier New" panose="02070309020205020404" pitchFamily="49" charset="0"/>
+                <a:cs typeface="Courier New" panose="02070309020205020404" pitchFamily="49" charset="0"/>
+              </a:rPr>
+              <a:t>, di.RootDirectory);</a:t>
+            </a:r>
+            <a:endParaRPr kumimoji="0" lang="en-US" altLang="ru-RU" sz="1200" b="0" i="0" u="none" strike="noStrike" cap="none" normalizeH="0" baseline="0" dirty="0" smtClean="0">
+              <a:ln>
+                <a:noFill/>
+              </a:ln>
+              <a:solidFill>
+                <a:srgbClr val="000000"/>
+              </a:solidFill>
+              <a:effectLst/>
+              <a:latin typeface="Courier New" panose="02070309020205020404" pitchFamily="49" charset="0"/>
+              <a:cs typeface="Courier New" panose="02070309020205020404" pitchFamily="49" charset="0"/>
+            </a:endParaRPr>
+          </a:p>
+          <a:p>
+            <a:pPr marL="0" marR="0" lvl="0" indent="0" algn="l" defTabSz="914400" rtl="0" eaLnBrk="1" fontAlgn="base" latinLnBrk="0" hangingPunct="1">
+              <a:lnSpc>
+                <a:spcPct val="100000"/>
+              </a:lnSpc>
+              <a:spcBef>
+                <a:spcPct val="0"/>
+              </a:spcBef>
+              <a:spcAft>
+                <a:spcPct val="0"/>
+              </a:spcAft>
+              <a:buClrTx/>
+              <a:buSzTx/>
+              <a:buFontTx/>
+              <a:buNone/>
+              <a:tabLst/>
+            </a:pPr>
+            <a:r>
+              <a:rPr kumimoji="0" lang="en-US" altLang="ru-RU" sz="1200" b="0" i="0" u="none" strike="noStrike" cap="none" normalizeH="0" baseline="0" dirty="0" smtClean="0">
+                <a:ln>
+                  <a:noFill/>
+                </a:ln>
+                <a:solidFill>
+                  <a:srgbClr val="2B91AF"/>
+                </a:solidFill>
+                <a:effectLst/>
+                <a:latin typeface="Courier New" panose="02070309020205020404" pitchFamily="49" charset="0"/>
+                <a:cs typeface="Courier New" panose="02070309020205020404" pitchFamily="49" charset="0"/>
+              </a:rPr>
+              <a:t>		</a:t>
+            </a:r>
+            <a:r>
+              <a:rPr kumimoji="0" lang="ru-RU" altLang="ru-RU" sz="1200" b="0" i="0" u="none" strike="noStrike" cap="none" normalizeH="0" baseline="0" dirty="0" smtClean="0">
+                <a:ln>
+                  <a:noFill/>
+                </a:ln>
+                <a:solidFill>
+                  <a:srgbClr val="2B91AF"/>
+                </a:solidFill>
+                <a:effectLst/>
+                <a:latin typeface="Courier New" panose="02070309020205020404" pitchFamily="49" charset="0"/>
+                <a:cs typeface="Courier New" panose="02070309020205020404" pitchFamily="49" charset="0"/>
+              </a:rPr>
+              <a:t>Console</a:t>
+            </a:r>
+            <a:r>
+              <a:rPr kumimoji="0" lang="ru-RU" altLang="ru-RU" sz="1200" b="0" i="0" u="none" strike="noStrike" cap="none" normalizeH="0" baseline="0" dirty="0" smtClean="0">
+                <a:ln>
+                  <a:noFill/>
+                </a:ln>
+                <a:solidFill>
+                  <a:srgbClr val="000000"/>
+                </a:solidFill>
+                <a:effectLst/>
+                <a:latin typeface="Courier New" panose="02070309020205020404" pitchFamily="49" charset="0"/>
+                <a:cs typeface="Courier New" panose="02070309020205020404" pitchFamily="49" charset="0"/>
+              </a:rPr>
+              <a:t>.WriteLine(</a:t>
+            </a:r>
+            <a:r>
+              <a:rPr kumimoji="0" lang="ru-RU" altLang="ru-RU" sz="1200" b="0" i="0" u="none" strike="noStrike" cap="none" normalizeH="0" baseline="0" dirty="0" smtClean="0">
+                <a:ln>
+                  <a:noFill/>
+                </a:ln>
+                <a:solidFill>
+                  <a:srgbClr val="A31515"/>
+                </a:solidFill>
+                <a:effectLst/>
+                <a:latin typeface="Courier New" panose="02070309020205020404" pitchFamily="49" charset="0"/>
+                <a:cs typeface="Courier New" panose="02070309020205020404" pitchFamily="49" charset="0"/>
+              </a:rPr>
+              <a:t>"Free space: {0:N0} bytes"</a:t>
+            </a:r>
+            <a:r>
+              <a:rPr kumimoji="0" lang="ru-RU" altLang="ru-RU" sz="1200" b="0" i="0" u="none" strike="noStrike" cap="none" normalizeH="0" baseline="0" dirty="0" smtClean="0">
+                <a:ln>
+                  <a:noFill/>
+                </a:ln>
+                <a:solidFill>
+                  <a:srgbClr val="000000"/>
+                </a:solidFill>
+                <a:effectLst/>
+                <a:latin typeface="Courier New" panose="02070309020205020404" pitchFamily="49" charset="0"/>
+                <a:cs typeface="Courier New" panose="02070309020205020404" pitchFamily="49" charset="0"/>
+              </a:rPr>
+              <a:t>, di.TotalFreeSpace);</a:t>
+            </a:r>
+            <a:endParaRPr kumimoji="0" lang="en-US" altLang="ru-RU" sz="1200" b="0" i="0" u="none" strike="noStrike" cap="none" normalizeH="0" baseline="0" dirty="0" smtClean="0">
+              <a:ln>
+                <a:noFill/>
+              </a:ln>
+              <a:solidFill>
+                <a:srgbClr val="000000"/>
+              </a:solidFill>
+              <a:effectLst/>
+              <a:latin typeface="Courier New" panose="02070309020205020404" pitchFamily="49" charset="0"/>
+              <a:cs typeface="Courier New" panose="02070309020205020404" pitchFamily="49" charset="0"/>
+            </a:endParaRPr>
+          </a:p>
+          <a:p>
+            <a:pPr marL="0" marR="0" lvl="0" indent="0" algn="l" defTabSz="914400" rtl="0" eaLnBrk="1" fontAlgn="base" latinLnBrk="0" hangingPunct="1">
+              <a:lnSpc>
+                <a:spcPct val="100000"/>
+              </a:lnSpc>
+              <a:spcBef>
+                <a:spcPct val="0"/>
+              </a:spcBef>
+              <a:spcAft>
+                <a:spcPct val="0"/>
+              </a:spcAft>
+              <a:buClrTx/>
+              <a:buSzTx/>
+              <a:buFontTx/>
+              <a:buNone/>
+              <a:tabLst/>
+            </a:pPr>
+            <a:r>
+              <a:rPr kumimoji="0" lang="en-US" altLang="ru-RU" sz="1200" b="0" i="0" u="none" strike="noStrike" cap="none" normalizeH="0" baseline="0" dirty="0" smtClean="0">
+                <a:ln>
+                  <a:noFill/>
+                </a:ln>
+                <a:solidFill>
+                  <a:srgbClr val="2B91AF"/>
+                </a:solidFill>
+                <a:effectLst/>
+                <a:latin typeface="Courier New" panose="02070309020205020404" pitchFamily="49" charset="0"/>
+                <a:cs typeface="Courier New" panose="02070309020205020404" pitchFamily="49" charset="0"/>
+              </a:rPr>
+              <a:t>		</a:t>
+            </a:r>
+            <a:r>
+              <a:rPr kumimoji="0" lang="ru-RU" altLang="ru-RU" sz="1200" b="0" i="0" u="none" strike="noStrike" cap="none" normalizeH="0" baseline="0" dirty="0" smtClean="0">
+                <a:ln>
+                  <a:noFill/>
+                </a:ln>
+                <a:solidFill>
+                  <a:srgbClr val="2B91AF"/>
+                </a:solidFill>
+                <a:effectLst/>
+                <a:latin typeface="Courier New" panose="02070309020205020404" pitchFamily="49" charset="0"/>
+                <a:cs typeface="Courier New" panose="02070309020205020404" pitchFamily="49" charset="0"/>
+              </a:rPr>
+              <a:t>Console</a:t>
+            </a:r>
+            <a:r>
+              <a:rPr kumimoji="0" lang="ru-RU" altLang="ru-RU" sz="1200" b="0" i="0" u="none" strike="noStrike" cap="none" normalizeH="0" baseline="0" dirty="0" smtClean="0">
+                <a:ln>
+                  <a:noFill/>
+                </a:ln>
+                <a:solidFill>
+                  <a:srgbClr val="000000"/>
+                </a:solidFill>
+                <a:effectLst/>
+                <a:latin typeface="Courier New" panose="02070309020205020404" pitchFamily="49" charset="0"/>
+                <a:cs typeface="Courier New" panose="02070309020205020404" pitchFamily="49" charset="0"/>
+              </a:rPr>
+              <a:t>.WriteLine(</a:t>
+            </a:r>
+            <a:r>
+              <a:rPr kumimoji="0" lang="ru-RU" altLang="ru-RU" sz="1200" b="0" i="0" u="none" strike="noStrike" cap="none" normalizeH="0" baseline="0" dirty="0" smtClean="0">
+                <a:ln>
+                  <a:noFill/>
+                </a:ln>
+                <a:solidFill>
+                  <a:srgbClr val="A31515"/>
+                </a:solidFill>
+                <a:effectLst/>
+                <a:latin typeface="Courier New" panose="02070309020205020404" pitchFamily="49" charset="0"/>
+                <a:cs typeface="Courier New" panose="02070309020205020404" pitchFamily="49" charset="0"/>
+              </a:rPr>
+              <a:t>"Size      : {0:N0} bytes"</a:t>
+            </a:r>
+            <a:r>
+              <a:rPr kumimoji="0" lang="ru-RU" altLang="ru-RU" sz="1200" b="0" i="0" u="none" strike="noStrike" cap="none" normalizeH="0" baseline="0" dirty="0" smtClean="0">
+                <a:ln>
+                  <a:noFill/>
+                </a:ln>
+                <a:solidFill>
+                  <a:srgbClr val="000000"/>
+                </a:solidFill>
+                <a:effectLst/>
+                <a:latin typeface="Courier New" panose="02070309020205020404" pitchFamily="49" charset="0"/>
+                <a:cs typeface="Courier New" panose="02070309020205020404" pitchFamily="49" charset="0"/>
+              </a:rPr>
+              <a:t>, di.TotalSize);</a:t>
+            </a:r>
+            <a:endParaRPr kumimoji="0" lang="en-US" altLang="ru-RU" sz="1200" b="0" i="0" u="none" strike="noStrike" cap="none" normalizeH="0" baseline="0" dirty="0" smtClean="0">
+              <a:ln>
+                <a:noFill/>
+              </a:ln>
+              <a:solidFill>
+                <a:srgbClr val="000000"/>
+              </a:solidFill>
+              <a:effectLst/>
+              <a:latin typeface="Courier New" panose="02070309020205020404" pitchFamily="49" charset="0"/>
+              <a:cs typeface="Courier New" panose="02070309020205020404" pitchFamily="49" charset="0"/>
+            </a:endParaRPr>
+          </a:p>
+          <a:p>
+            <a:pPr marL="0" marR="0" lvl="0" indent="0" algn="l" defTabSz="914400" rtl="0" eaLnBrk="1" fontAlgn="base" latinLnBrk="0" hangingPunct="1">
+              <a:lnSpc>
+                <a:spcPct val="100000"/>
+              </a:lnSpc>
+              <a:spcBef>
+                <a:spcPct val="0"/>
+              </a:spcBef>
+              <a:spcAft>
+                <a:spcPct val="0"/>
+              </a:spcAft>
+              <a:buClrTx/>
+              <a:buSzTx/>
+              <a:buFontTx/>
+              <a:buNone/>
+              <a:tabLst/>
+            </a:pPr>
+            <a:r>
+              <a:rPr kumimoji="0" lang="en-US" altLang="ru-RU" sz="1200" b="0" i="0" u="none" strike="noStrike" cap="none" normalizeH="0" baseline="0" dirty="0" smtClean="0">
+                <a:ln>
+                  <a:noFill/>
+                </a:ln>
+                <a:solidFill>
+                  <a:srgbClr val="2B91AF"/>
+                </a:solidFill>
+                <a:effectLst/>
+                <a:latin typeface="Courier New" panose="02070309020205020404" pitchFamily="49" charset="0"/>
+                <a:cs typeface="Courier New" panose="02070309020205020404" pitchFamily="49" charset="0"/>
+              </a:rPr>
+              <a:t>		</a:t>
+            </a:r>
+            <a:r>
+              <a:rPr kumimoji="0" lang="ru-RU" altLang="ru-RU" sz="1200" b="0" i="0" u="none" strike="noStrike" cap="none" normalizeH="0" baseline="0" dirty="0" smtClean="0">
+                <a:ln>
+                  <a:noFill/>
+                </a:ln>
+                <a:solidFill>
+                  <a:srgbClr val="2B91AF"/>
+                </a:solidFill>
+                <a:effectLst/>
+                <a:latin typeface="Courier New" panose="02070309020205020404" pitchFamily="49" charset="0"/>
+                <a:cs typeface="Courier New" panose="02070309020205020404" pitchFamily="49" charset="0"/>
+              </a:rPr>
+              <a:t>Console</a:t>
+            </a:r>
+            <a:r>
+              <a:rPr kumimoji="0" lang="ru-RU" altLang="ru-RU" sz="1200" b="0" i="0" u="none" strike="noStrike" cap="none" normalizeH="0" baseline="0" dirty="0" smtClean="0">
+                <a:ln>
+                  <a:noFill/>
+                </a:ln>
+                <a:solidFill>
+                  <a:srgbClr val="000000"/>
+                </a:solidFill>
+                <a:effectLst/>
+                <a:latin typeface="Courier New" panose="02070309020205020404" pitchFamily="49" charset="0"/>
+                <a:cs typeface="Courier New" panose="02070309020205020404" pitchFamily="49" charset="0"/>
+              </a:rPr>
+              <a:t>.WriteLine(</a:t>
+            </a:r>
+            <a:r>
+              <a:rPr kumimoji="0" lang="ru-RU" altLang="ru-RU" sz="1200" b="0" i="0" u="none" strike="noStrike" cap="none" normalizeH="0" baseline="0" dirty="0" smtClean="0">
+                <a:ln>
+                  <a:noFill/>
+                </a:ln>
+                <a:solidFill>
+                  <a:srgbClr val="A31515"/>
+                </a:solidFill>
+                <a:effectLst/>
+                <a:latin typeface="Courier New" panose="02070309020205020404" pitchFamily="49" charset="0"/>
+                <a:cs typeface="Courier New" panose="02070309020205020404" pitchFamily="49" charset="0"/>
+              </a:rPr>
+              <a:t>"Label     : {0}"</a:t>
+            </a:r>
+            <a:r>
+              <a:rPr kumimoji="0" lang="ru-RU" altLang="ru-RU" sz="1200" b="0" i="0" u="none" strike="noStrike" cap="none" normalizeH="0" baseline="0" dirty="0" smtClean="0">
+                <a:ln>
+                  <a:noFill/>
+                </a:ln>
+                <a:solidFill>
+                  <a:srgbClr val="000000"/>
+                </a:solidFill>
+                <a:effectLst/>
+                <a:latin typeface="Courier New" panose="02070309020205020404" pitchFamily="49" charset="0"/>
+                <a:cs typeface="Courier New" panose="02070309020205020404" pitchFamily="49" charset="0"/>
+              </a:rPr>
+              <a:t>, di.VolumeLabel);</a:t>
+            </a:r>
+            <a:endParaRPr kumimoji="0" lang="en-US" altLang="ru-RU" sz="1200" b="0" i="0" u="none" strike="noStrike" cap="none" normalizeH="0" baseline="0" dirty="0" smtClean="0">
+              <a:ln>
+                <a:noFill/>
+              </a:ln>
+              <a:solidFill>
+                <a:srgbClr val="000000"/>
+              </a:solidFill>
+              <a:effectLst/>
+              <a:latin typeface="Courier New" panose="02070309020205020404" pitchFamily="49" charset="0"/>
+              <a:cs typeface="Courier New" panose="02070309020205020404" pitchFamily="49" charset="0"/>
+            </a:endParaRPr>
+          </a:p>
+          <a:p>
+            <a:pPr marL="0" marR="0" lvl="0" indent="0" algn="l" defTabSz="914400" rtl="0" eaLnBrk="1" fontAlgn="base" latinLnBrk="0" hangingPunct="1">
+              <a:lnSpc>
+                <a:spcPct val="100000"/>
+              </a:lnSpc>
+              <a:spcBef>
+                <a:spcPct val="0"/>
+              </a:spcBef>
+              <a:spcAft>
+                <a:spcPct val="0"/>
+              </a:spcAft>
+              <a:buClrTx/>
+              <a:buSzTx/>
+              <a:buFontTx/>
+              <a:buNone/>
+              <a:tabLst/>
+            </a:pPr>
+            <a:r>
+              <a:rPr lang="en-US" altLang="ru-RU" sz="1200" dirty="0">
+                <a:solidFill>
+                  <a:srgbClr val="000000"/>
+                </a:solidFill>
+                <a:latin typeface="Courier New" panose="02070309020205020404" pitchFamily="49" charset="0"/>
+                <a:cs typeface="Courier New" panose="02070309020205020404" pitchFamily="49" charset="0"/>
+              </a:rPr>
+              <a:t>	</a:t>
+            </a:r>
+            <a:r>
+              <a:rPr kumimoji="0" lang="ru-RU" altLang="ru-RU" sz="1200" b="0" i="0" u="none" strike="noStrike" cap="none" normalizeH="0" baseline="0" dirty="0" smtClean="0">
+                <a:ln>
+                  <a:noFill/>
+                </a:ln>
+                <a:solidFill>
+                  <a:srgbClr val="000000"/>
+                </a:solidFill>
+                <a:effectLst/>
+                <a:latin typeface="Courier New" panose="02070309020205020404" pitchFamily="49" charset="0"/>
+                <a:cs typeface="Courier New" panose="02070309020205020404" pitchFamily="49" charset="0"/>
+              </a:rPr>
+              <a:t>}</a:t>
+            </a:r>
+            <a:endParaRPr kumimoji="0" lang="en-US" altLang="ru-RU" sz="1200" b="0" i="0" u="none" strike="noStrike" cap="none" normalizeH="0" baseline="0" dirty="0" smtClean="0">
+              <a:ln>
+                <a:noFill/>
+              </a:ln>
+              <a:solidFill>
+                <a:srgbClr val="000000"/>
+              </a:solidFill>
+              <a:effectLst/>
+              <a:latin typeface="Courier New" panose="02070309020205020404" pitchFamily="49" charset="0"/>
+              <a:cs typeface="Courier New" panose="02070309020205020404" pitchFamily="49" charset="0"/>
+            </a:endParaRPr>
+          </a:p>
+          <a:p>
+            <a:pPr marL="0" marR="0" lvl="0" indent="0" algn="l" defTabSz="914400" rtl="0" eaLnBrk="1" fontAlgn="base" latinLnBrk="0" hangingPunct="1">
+              <a:lnSpc>
+                <a:spcPct val="100000"/>
+              </a:lnSpc>
+              <a:spcBef>
+                <a:spcPct val="0"/>
+              </a:spcBef>
+              <a:spcAft>
+                <a:spcPct val="0"/>
+              </a:spcAft>
+              <a:buClrTx/>
+              <a:buSzTx/>
+              <a:buFontTx/>
+              <a:buNone/>
+              <a:tabLst/>
+            </a:pPr>
+            <a:r>
+              <a:rPr kumimoji="0" lang="ru-RU" altLang="ru-RU" sz="1200" b="0" i="0" u="none" strike="noStrike" cap="none" normalizeH="0" baseline="0" dirty="0" smtClean="0">
+                <a:ln>
+                  <a:noFill/>
+                </a:ln>
+                <a:solidFill>
+                  <a:srgbClr val="000000"/>
+                </a:solidFill>
+                <a:effectLst/>
+                <a:latin typeface="Courier New" panose="02070309020205020404" pitchFamily="49" charset="0"/>
+                <a:cs typeface="Courier New" panose="02070309020205020404" pitchFamily="49" charset="0"/>
+              </a:rPr>
+              <a:t>}</a:t>
+            </a:r>
+            <a:endParaRPr kumimoji="0" lang="ru-RU" altLang="ru-RU" sz="1200" b="0" i="0" u="none" strike="noStrike" cap="none" normalizeH="0" baseline="0" dirty="0" smtClean="0">
+              <a:ln>
+                <a:noFill/>
+              </a:ln>
+              <a:solidFill>
+                <a:schemeClr val="tx1"/>
+              </a:solidFill>
+              <a:effectLst/>
+              <a:latin typeface="Courier New" panose="02070309020205020404" pitchFamily="49" charset="0"/>
+              <a:cs typeface="Courier New" panose="02070309020205020404" pitchFamily="49" charset="0"/>
             </a:endParaRPr>
           </a:p>
         </p:txBody>

</xml_diff>

<commit_message>
Minor changes to IO presentation
</commit_message>
<xml_diff>
--- a/Presentation/lesson-04-io.pptx
+++ b/Presentation/lesson-04-io.pptx
@@ -13327,21 +13327,22 @@
             </a:r>
             <a:r>
               <a:rPr lang="ru-RU" sz="1600" dirty="0"/>
-              <a:t>и папок можно применять класс </a:t>
-            </a:r>
-            <a:r>
-              <a:rPr lang="be-BY" sz="1600" dirty="0">
-                <a:solidFill>
-                  <a:srgbClr val="008080"/>
-                </a:solidFill>
-                <a:latin typeface="Courier New" pitchFamily="49" charset="0"/>
-                <a:ea typeface="Calibri" pitchFamily="34" charset="0"/>
-                <a:cs typeface="Courier New" pitchFamily="49" charset="0"/>
-              </a:rPr>
-              <a:t>Path</a:t>
-            </a:r>
-            <a:r>
-              <a:rPr lang="ru-RU" sz="1600" dirty="0"/>
+              <a:t>и папок можно применять </a:t>
+            </a:r>
+            <a:r>
+              <a:rPr lang="ru-RU" sz="1600" dirty="0" smtClean="0"/>
+              <a:t>клас</a:t>
+            </a:r>
+            <a:r>
+              <a:rPr lang="en-US" sz="1600" dirty="0" smtClean="0"/>
+              <a:t>c </a:t>
+            </a:r>
+            <a:r>
+              <a:rPr lang="en-US" sz="1600" dirty="0" err="1" smtClean="0"/>
+              <a:t>System.IO.Path</a:t>
+            </a:r>
+            <a:r>
+              <a:rPr lang="ru-RU" sz="1600" dirty="0" smtClean="0"/>
               <a:t>.</a:t>
             </a:r>
             <a:endParaRPr lang="be-BY" sz="1600" dirty="0">

</xml_diff>

<commit_message>
Info on path limits and C# demo
</commit_message>
<xml_diff>
--- a/Presentation/lesson-04-io.pptx
+++ b/Presentation/lesson-04-io.pptx
@@ -39,7 +39,8 @@
     <p:sldId id="278" r:id="rId33"/>
     <p:sldId id="279" r:id="rId34"/>
     <p:sldId id="280" r:id="rId35"/>
-    <p:sldId id="271" r:id="rId36"/>
+    <p:sldId id="297" r:id="rId36"/>
+    <p:sldId id="271" r:id="rId37"/>
   </p:sldIdLst>
   <p:sldSz cx="9144000" cy="6858000" type="screen4x3"/>
   <p:notesSz cx="6858000" cy="9144000"/>
@@ -323,7 +324,7 @@
             <a:fld id="{FAECF776-F836-4CCD-9497-99E5597B8B5D}" type="datetimeFigureOut">
               <a:rPr lang="en-US" smtClean="0"/>
               <a:pPr/>
-              <a:t>8/15/2014</a:t>
+              <a:t>8/25/2014</a:t>
             </a:fld>
             <a:endParaRPr lang="en-US"/>
           </a:p>
@@ -495,7 +496,7 @@
             <a:fld id="{FAECF776-F836-4CCD-9497-99E5597B8B5D}" type="datetimeFigureOut">
               <a:rPr lang="en-US" smtClean="0"/>
               <a:pPr/>
-              <a:t>8/15/2014</a:t>
+              <a:t>8/25/2014</a:t>
             </a:fld>
             <a:endParaRPr lang="en-US"/>
           </a:p>
@@ -677,7 +678,7 @@
             <a:fld id="{FAECF776-F836-4CCD-9497-99E5597B8B5D}" type="datetimeFigureOut">
               <a:rPr lang="en-US" smtClean="0"/>
               <a:pPr/>
-              <a:t>8/15/2014</a:t>
+              <a:t>8/25/2014</a:t>
             </a:fld>
             <a:endParaRPr lang="en-US"/>
           </a:p>
@@ -927,7 +928,7 @@
                 </a:solidFill>
               </a:rPr>
               <a:pPr/>
-              <a:t>8/15/2014</a:t>
+              <a:t>8/25/2014</a:t>
             </a:fld>
             <a:endParaRPr lang="en-US">
               <a:solidFill>
@@ -1129,7 +1130,7 @@
                 </a:solidFill>
               </a:rPr>
               <a:pPr/>
-              <a:t>8/15/2014</a:t>
+              <a:t>8/25/2014</a:t>
             </a:fld>
             <a:endParaRPr lang="en-US">
               <a:solidFill>
@@ -1407,7 +1408,7 @@
                 </a:solidFill>
               </a:rPr>
               <a:pPr/>
-              <a:t>8/15/2014</a:t>
+              <a:t>8/25/2014</a:t>
             </a:fld>
             <a:endParaRPr lang="en-US">
               <a:solidFill>
@@ -1727,7 +1728,7 @@
                 </a:solidFill>
               </a:rPr>
               <a:pPr/>
-              <a:t>8/15/2014</a:t>
+              <a:t>8/25/2014</a:t>
             </a:fld>
             <a:endParaRPr lang="en-US">
               <a:solidFill>
@@ -2181,7 +2182,7 @@
                 </a:solidFill>
               </a:rPr>
               <a:pPr/>
-              <a:t>8/15/2014</a:t>
+              <a:t>8/25/2014</a:t>
             </a:fld>
             <a:endParaRPr lang="en-US">
               <a:solidFill>
@@ -2331,7 +2332,7 @@
                 </a:solidFill>
               </a:rPr>
               <a:pPr/>
-              <a:t>8/15/2014</a:t>
+              <a:t>8/25/2014</a:t>
             </a:fld>
             <a:endParaRPr lang="en-US">
               <a:solidFill>
@@ -2458,7 +2459,7 @@
                 </a:solidFill>
               </a:rPr>
               <a:pPr/>
-              <a:t>8/15/2014</a:t>
+              <a:t>8/25/2014</a:t>
             </a:fld>
             <a:endParaRPr lang="en-US">
               <a:solidFill>
@@ -2767,7 +2768,7 @@
                 </a:solidFill>
               </a:rPr>
               <a:pPr/>
-              <a:t>8/15/2014</a:t>
+              <a:t>8/25/2014</a:t>
             </a:fld>
             <a:endParaRPr lang="en-US">
               <a:solidFill>
@@ -2963,7 +2964,7 @@
             <a:fld id="{FAECF776-F836-4CCD-9497-99E5597B8B5D}" type="datetimeFigureOut">
               <a:rPr lang="en-US" smtClean="0"/>
               <a:pPr/>
-              <a:t>8/15/2014</a:t>
+              <a:t>8/25/2014</a:t>
             </a:fld>
             <a:endParaRPr lang="en-US"/>
           </a:p>
@@ -3224,7 +3225,7 @@
                 </a:solidFill>
               </a:rPr>
               <a:pPr/>
-              <a:t>8/15/2014</a:t>
+              <a:t>8/25/2014</a:t>
             </a:fld>
             <a:endParaRPr lang="en-US">
               <a:solidFill>
@@ -3426,7 +3427,7 @@
                 </a:solidFill>
               </a:rPr>
               <a:pPr/>
-              <a:t>8/15/2014</a:t>
+              <a:t>8/25/2014</a:t>
             </a:fld>
             <a:endParaRPr lang="en-US">
               <a:solidFill>
@@ -3638,7 +3639,7 @@
                 </a:solidFill>
               </a:rPr>
               <a:pPr/>
-              <a:t>8/15/2014</a:t>
+              <a:t>8/25/2014</a:t>
             </a:fld>
             <a:endParaRPr lang="en-US">
               <a:solidFill>
@@ -3910,7 +3911,7 @@
             <a:fld id="{FAECF776-F836-4CCD-9497-99E5597B8B5D}" type="datetimeFigureOut">
               <a:rPr lang="en-US" smtClean="0"/>
               <a:pPr/>
-              <a:t>8/15/2014</a:t>
+              <a:t>8/25/2014</a:t>
             </a:fld>
             <a:endParaRPr lang="en-US"/>
           </a:p>
@@ -4200,7 +4201,7 @@
             <a:fld id="{FAECF776-F836-4CCD-9497-99E5597B8B5D}" type="datetimeFigureOut">
               <a:rPr lang="en-US" smtClean="0"/>
               <a:pPr/>
-              <a:t>8/15/2014</a:t>
+              <a:t>8/25/2014</a:t>
             </a:fld>
             <a:endParaRPr lang="en-US"/>
           </a:p>
@@ -4624,7 +4625,7 @@
             <a:fld id="{FAECF776-F836-4CCD-9497-99E5597B8B5D}" type="datetimeFigureOut">
               <a:rPr lang="en-US" smtClean="0"/>
               <a:pPr/>
-              <a:t>8/15/2014</a:t>
+              <a:t>8/25/2014</a:t>
             </a:fld>
             <a:endParaRPr lang="en-US"/>
           </a:p>
@@ -4744,7 +4745,7 @@
             <a:fld id="{FAECF776-F836-4CCD-9497-99E5597B8B5D}" type="datetimeFigureOut">
               <a:rPr lang="en-US" smtClean="0"/>
               <a:pPr/>
-              <a:t>8/15/2014</a:t>
+              <a:t>8/25/2014</a:t>
             </a:fld>
             <a:endParaRPr lang="en-US"/>
           </a:p>
@@ -4841,7 +4842,7 @@
             <a:fld id="{FAECF776-F836-4CCD-9497-99E5597B8B5D}" type="datetimeFigureOut">
               <a:rPr lang="en-US" smtClean="0"/>
               <a:pPr/>
-              <a:t>8/15/2014</a:t>
+              <a:t>8/25/2014</a:t>
             </a:fld>
             <a:endParaRPr lang="en-US"/>
           </a:p>
@@ -5120,7 +5121,7 @@
             <a:fld id="{FAECF776-F836-4CCD-9497-99E5597B8B5D}" type="datetimeFigureOut">
               <a:rPr lang="en-US" smtClean="0"/>
               <a:pPr/>
-              <a:t>8/15/2014</a:t>
+              <a:t>8/25/2014</a:t>
             </a:fld>
             <a:endParaRPr lang="en-US"/>
           </a:p>
@@ -5375,7 +5376,7 @@
             <a:fld id="{FAECF776-F836-4CCD-9497-99E5597B8B5D}" type="datetimeFigureOut">
               <a:rPr lang="en-US" smtClean="0"/>
               <a:pPr/>
-              <a:t>8/15/2014</a:t>
+              <a:t>8/25/2014</a:t>
             </a:fld>
             <a:endParaRPr lang="en-US"/>
           </a:p>
@@ -5599,7 +5600,7 @@
             <a:fld id="{FAECF776-F836-4CCD-9497-99E5597B8B5D}" type="datetimeFigureOut">
               <a:rPr lang="en-US" smtClean="0"/>
               <a:pPr/>
-              <a:t>8/15/2014</a:t>
+              <a:t>8/25/2014</a:t>
             </a:fld>
             <a:endParaRPr lang="en-US"/>
           </a:p>
@@ -6117,7 +6118,7 @@
                 </a:solidFill>
               </a:rPr>
               <a:pPr/>
-              <a:t>8/15/2014</a:t>
+              <a:t>8/25/2014</a:t>
             </a:fld>
             <a:endParaRPr lang="en-US">
               <a:solidFill>
@@ -15715,7 +15716,7 @@
         <p:spPr bwMode="auto">
           <a:xfrm>
             <a:off x="152400" y="838200"/>
-            <a:ext cx="8839200" cy="2062103"/>
+            <a:ext cx="8839200" cy="1569660"/>
           </a:xfrm>
           <a:prstGeom prst="rect">
             <a:avLst/>
@@ -15853,8 +15854,8 @@
                 <a:solidFill>
                   <a:schemeClr val="bg1"/>
                 </a:solidFill>
-                <a:latin typeface="Courier New" pitchFamily="49" charset="0"/>
-                <a:cs typeface="Calibri" pitchFamily="34" charset="0"/>
+                <a:latin typeface="Arial" panose="020B0604020202020204" pitchFamily="34" charset="0"/>
+                <a:cs typeface="Arial" panose="020B0604020202020204" pitchFamily="34" charset="0"/>
               </a:rPr>
               <a:t>Используйте расширение </a:t>
             </a:r>
@@ -15863,8 +15864,8 @@
                 <a:solidFill>
                   <a:schemeClr val="bg1"/>
                 </a:solidFill>
-                <a:latin typeface="Courier New" pitchFamily="49" charset="0"/>
-                <a:cs typeface="Calibri" pitchFamily="34" charset="0"/>
+                <a:latin typeface="Arial" panose="020B0604020202020204" pitchFamily="34" charset="0"/>
+                <a:cs typeface="Arial" panose="020B0604020202020204" pitchFamily="34" charset="0"/>
               </a:rPr>
               <a:t>tmp</a:t>
             </a:r>
@@ -15873,8 +15874,8 @@
                 <a:solidFill>
                   <a:schemeClr val="bg1"/>
                 </a:solidFill>
-                <a:latin typeface="Courier New" pitchFamily="49" charset="0"/>
-                <a:cs typeface="Calibri" pitchFamily="34" charset="0"/>
+                <a:latin typeface="Arial" panose="020B0604020202020204" pitchFamily="34" charset="0"/>
+                <a:cs typeface="Arial" panose="020B0604020202020204" pitchFamily="34" charset="0"/>
               </a:rPr>
               <a:t>!</a:t>
             </a:r>
@@ -15885,8 +15886,8 @@
               <a:solidFill>
                 <a:schemeClr val="bg1"/>
               </a:solidFill>
-              <a:latin typeface="Courier New" pitchFamily="49" charset="0"/>
-              <a:cs typeface="Calibri" pitchFamily="34" charset="0"/>
+              <a:latin typeface="Arial" panose="020B0604020202020204" pitchFamily="34" charset="0"/>
+              <a:cs typeface="Arial" panose="020B0604020202020204" pitchFamily="34" charset="0"/>
             </a:endParaRPr>
           </a:p>
           <a:p>
@@ -15896,8 +15897,8 @@
                 <a:solidFill>
                   <a:schemeClr val="bg1"/>
                 </a:solidFill>
-                <a:latin typeface="Courier New" pitchFamily="49" charset="0"/>
-                <a:cs typeface="Calibri" pitchFamily="34" charset="0"/>
+                <a:latin typeface="Arial" panose="020B0604020202020204" pitchFamily="34" charset="0"/>
+                <a:cs typeface="Arial" panose="020B0604020202020204" pitchFamily="34" charset="0"/>
               </a:rPr>
               <a:t>Path.GetTempPath</a:t>
             </a:r>
@@ -15906,8 +15907,8 @@
                 <a:solidFill>
                   <a:schemeClr val="bg1"/>
                 </a:solidFill>
-                <a:latin typeface="Courier New" pitchFamily="49" charset="0"/>
-                <a:cs typeface="Calibri" pitchFamily="34" charset="0"/>
+                <a:latin typeface="Arial" panose="020B0604020202020204" pitchFamily="34" charset="0"/>
+                <a:cs typeface="Arial" panose="020B0604020202020204" pitchFamily="34" charset="0"/>
               </a:rPr>
               <a:t>() – </a:t>
             </a:r>
@@ -15916,8 +15917,8 @@
                 <a:solidFill>
                   <a:schemeClr val="bg1"/>
                 </a:solidFill>
-                <a:latin typeface="Courier New" pitchFamily="49" charset="0"/>
-                <a:cs typeface="Calibri" pitchFamily="34" charset="0"/>
+                <a:latin typeface="Arial" panose="020B0604020202020204" pitchFamily="34" charset="0"/>
+                <a:cs typeface="Arial" panose="020B0604020202020204" pitchFamily="34" charset="0"/>
               </a:rPr>
               <a:t>возвращает путь к временному каталогу текущего пользователя</a:t>
             </a:r>
@@ -15928,8 +15929,8 @@
               <a:solidFill>
                 <a:schemeClr val="bg1"/>
               </a:solidFill>
-              <a:latin typeface="Courier New" pitchFamily="49" charset="0"/>
-              <a:cs typeface="Calibri" pitchFamily="34" charset="0"/>
+              <a:latin typeface="Arial" panose="020B0604020202020204" pitchFamily="34" charset="0"/>
+              <a:cs typeface="Arial" panose="020B0604020202020204" pitchFamily="34" charset="0"/>
             </a:endParaRPr>
           </a:p>
           <a:p>
@@ -15939,8 +15940,8 @@
                 <a:solidFill>
                   <a:schemeClr val="bg1"/>
                 </a:solidFill>
-                <a:latin typeface="Courier New" pitchFamily="49" charset="0"/>
-                <a:cs typeface="Calibri" pitchFamily="34" charset="0"/>
+                <a:latin typeface="Arial" panose="020B0604020202020204" pitchFamily="34" charset="0"/>
+                <a:cs typeface="Arial" panose="020B0604020202020204" pitchFamily="34" charset="0"/>
               </a:rPr>
               <a:t>Path.GetTempFileName</a:t>
             </a:r>
@@ -15949,8 +15950,8 @@
                 <a:solidFill>
                   <a:schemeClr val="bg1"/>
                 </a:solidFill>
-                <a:latin typeface="Courier New" pitchFamily="49" charset="0"/>
-                <a:cs typeface="Calibri" pitchFamily="34" charset="0"/>
+                <a:latin typeface="Arial" panose="020B0604020202020204" pitchFamily="34" charset="0"/>
+                <a:cs typeface="Arial" panose="020B0604020202020204" pitchFamily="34" charset="0"/>
               </a:rPr>
               <a:t>()</a:t>
             </a:r>
@@ -15959,8 +15960,8 @@
                 <a:solidFill>
                   <a:schemeClr val="bg1"/>
                 </a:solidFill>
-                <a:latin typeface="Courier New" pitchFamily="49" charset="0"/>
-                <a:cs typeface="Calibri" pitchFamily="34" charset="0"/>
+                <a:latin typeface="Arial" panose="020B0604020202020204" pitchFamily="34" charset="0"/>
+                <a:cs typeface="Arial" panose="020B0604020202020204" pitchFamily="34" charset="0"/>
               </a:rPr>
               <a:t> – создает файл нулевой длины с уникальным именем внутри </a:t>
             </a:r>
@@ -15969,8 +15970,8 @@
                 <a:solidFill>
                   <a:schemeClr val="bg1"/>
                 </a:solidFill>
-                <a:latin typeface="Courier New" pitchFamily="49" charset="0"/>
-                <a:cs typeface="Calibri" pitchFamily="34" charset="0"/>
+                <a:latin typeface="Arial" panose="020B0604020202020204" pitchFamily="34" charset="0"/>
+                <a:cs typeface="Arial" panose="020B0604020202020204" pitchFamily="34" charset="0"/>
               </a:rPr>
               <a:t>временного каталога текущего </a:t>
             </a:r>
@@ -15979,8 +15980,8 @@
                 <a:solidFill>
                   <a:schemeClr val="bg1"/>
                 </a:solidFill>
-                <a:latin typeface="Courier New" pitchFamily="49" charset="0"/>
-                <a:cs typeface="Calibri" pitchFamily="34" charset="0"/>
+                <a:latin typeface="Arial" panose="020B0604020202020204" pitchFamily="34" charset="0"/>
+                <a:cs typeface="Arial" panose="020B0604020202020204" pitchFamily="34" charset="0"/>
               </a:rPr>
               <a:t>пользователя и возвращает полный путь к нему</a:t>
             </a:r>
@@ -15988,8 +15989,8 @@
               <a:solidFill>
                 <a:schemeClr val="bg1"/>
               </a:solidFill>
-              <a:latin typeface="Courier New" pitchFamily="49" charset="0"/>
-              <a:cs typeface="Calibri" pitchFamily="34" charset="0"/>
+              <a:latin typeface="Arial" panose="020B0604020202020204" pitchFamily="34" charset="0"/>
+              <a:cs typeface="Arial" panose="020B0604020202020204" pitchFamily="34" charset="0"/>
             </a:endParaRPr>
           </a:p>
         </p:txBody>
@@ -16004,7 +16005,7 @@
         </p:nvSpPr>
         <p:spPr bwMode="auto">
           <a:xfrm>
-            <a:off x="395536" y="2996952"/>
+            <a:off x="395536" y="2780928"/>
             <a:ext cx="8352927" cy="461665"/>
           </a:xfrm>
           <a:prstGeom prst="rect">
@@ -16059,8 +16060,8 @@
         </p:nvSpPr>
         <p:spPr bwMode="auto">
           <a:xfrm>
-            <a:off x="152400" y="3530923"/>
-            <a:ext cx="8839200" cy="4031873"/>
+            <a:off x="152400" y="3314899"/>
+            <a:ext cx="8839200" cy="3046988"/>
           </a:xfrm>
           <a:prstGeom prst="rect">
             <a:avLst/>
@@ -16198,8 +16199,8 @@
                 <a:solidFill>
                   <a:schemeClr val="bg1"/>
                 </a:solidFill>
-                <a:latin typeface="Courier New" pitchFamily="49" charset="0"/>
-                <a:cs typeface="Calibri" pitchFamily="34" charset="0"/>
+                <a:latin typeface="Arial" panose="020B0604020202020204" pitchFamily="34" charset="0"/>
+                <a:cs typeface="Arial" panose="020B0604020202020204" pitchFamily="34" charset="0"/>
               </a:rPr>
               <a:t>Не полагайтесь на </a:t>
             </a:r>
@@ -16208,8 +16209,8 @@
                 <a:solidFill>
                   <a:schemeClr val="bg1"/>
                 </a:solidFill>
-                <a:latin typeface="Courier New" pitchFamily="49" charset="0"/>
-                <a:cs typeface="Calibri" pitchFamily="34" charset="0"/>
+                <a:latin typeface="Arial" panose="020B0604020202020204" pitchFamily="34" charset="0"/>
+                <a:cs typeface="Arial" panose="020B0604020202020204" pitchFamily="34" charset="0"/>
               </a:rPr>
               <a:t>свойство </a:t>
             </a:r>
@@ -16218,8 +16219,8 @@
                 <a:solidFill>
                   <a:schemeClr val="bg1"/>
                 </a:solidFill>
-                <a:latin typeface="Courier New" pitchFamily="49" charset="0"/>
-                <a:cs typeface="Calibri" pitchFamily="34" charset="0"/>
+                <a:latin typeface="Arial" panose="020B0604020202020204" pitchFamily="34" charset="0"/>
+                <a:cs typeface="Arial" panose="020B0604020202020204" pitchFamily="34" charset="0"/>
               </a:rPr>
               <a:t>Environment.CurrentDirectory</a:t>
             </a:r>
@@ -16228,8 +16229,8 @@
                 <a:solidFill>
                   <a:schemeClr val="bg1"/>
                 </a:solidFill>
-                <a:latin typeface="Courier New" pitchFamily="49" charset="0"/>
-                <a:cs typeface="Calibri" pitchFamily="34" charset="0"/>
+                <a:latin typeface="Arial" panose="020B0604020202020204" pitchFamily="34" charset="0"/>
+                <a:cs typeface="Arial" panose="020B0604020202020204" pitchFamily="34" charset="0"/>
               </a:rPr>
               <a:t> </a:t>
             </a:r>
@@ -16238,18 +16239,88 @@
                 <a:solidFill>
                   <a:schemeClr val="bg1"/>
                 </a:solidFill>
-                <a:latin typeface="Courier New" pitchFamily="49" charset="0"/>
-                <a:cs typeface="Calibri" pitchFamily="34" charset="0"/>
-              </a:rPr>
-              <a:t>т.к. оно зависит от внешней среды откуда запущена программа.</a:t>
+                <a:latin typeface="Arial" panose="020B0604020202020204" pitchFamily="34" charset="0"/>
+                <a:cs typeface="Arial" panose="020B0604020202020204" pitchFamily="34" charset="0"/>
+              </a:rPr>
+              <a:t>и метод </a:t>
+            </a:r>
+            <a:r>
+              <a:rPr lang="en-US" sz="1600" dirty="0" err="1">
+                <a:solidFill>
+                  <a:schemeClr val="bg1"/>
+                </a:solidFill>
+                <a:latin typeface="Arial" panose="020B0604020202020204" pitchFamily="34" charset="0"/>
+                <a:cs typeface="Arial" panose="020B0604020202020204" pitchFamily="34" charset="0"/>
+              </a:rPr>
+              <a:t>Directory.SetCurrentDirectory</a:t>
+            </a:r>
+            <a:r>
+              <a:rPr lang="en-US" sz="1600" dirty="0">
+                <a:solidFill>
+                  <a:schemeClr val="bg1"/>
+                </a:solidFill>
+                <a:latin typeface="Arial" panose="020B0604020202020204" pitchFamily="34" charset="0"/>
+                <a:cs typeface="Arial" panose="020B0604020202020204" pitchFamily="34" charset="0"/>
+              </a:rPr>
+              <a:t>() </a:t>
+            </a:r>
+            <a:r>
+              <a:rPr lang="ru-RU" sz="1600" dirty="0" smtClean="0">
+                <a:solidFill>
+                  <a:schemeClr val="bg1"/>
+                </a:solidFill>
+                <a:latin typeface="Arial" panose="020B0604020202020204" pitchFamily="34" charset="0"/>
+                <a:cs typeface="Arial" panose="020B0604020202020204" pitchFamily="34" charset="0"/>
+              </a:rPr>
+              <a:t>т.к</a:t>
+            </a:r>
+            <a:r>
+              <a:rPr lang="ru-RU" sz="1600" dirty="0" smtClean="0">
+                <a:solidFill>
+                  <a:schemeClr val="bg1"/>
+                </a:solidFill>
+                <a:latin typeface="Arial" panose="020B0604020202020204" pitchFamily="34" charset="0"/>
+                <a:cs typeface="Arial" panose="020B0604020202020204" pitchFamily="34" charset="0"/>
+              </a:rPr>
+              <a:t>. </a:t>
+            </a:r>
+            <a:r>
+              <a:rPr lang="ru-RU" sz="1600" dirty="0">
+                <a:solidFill>
+                  <a:schemeClr val="bg1"/>
+                </a:solidFill>
+                <a:latin typeface="Arial" panose="020B0604020202020204" pitchFamily="34" charset="0"/>
+                <a:cs typeface="Arial" panose="020B0604020202020204" pitchFamily="34" charset="0"/>
+              </a:rPr>
+              <a:t>и</a:t>
+            </a:r>
+            <a:r>
+              <a:rPr lang="ru-RU" sz="1600" dirty="0" smtClean="0">
+                <a:solidFill>
+                  <a:schemeClr val="bg1"/>
+                </a:solidFill>
+                <a:latin typeface="Arial" panose="020B0604020202020204" pitchFamily="34" charset="0"/>
+                <a:cs typeface="Arial" panose="020B0604020202020204" pitchFamily="34" charset="0"/>
+              </a:rPr>
+              <a:t>х значение </a:t>
+            </a:r>
+            <a:r>
+              <a:rPr lang="ru-RU" sz="1600" dirty="0" smtClean="0">
+                <a:solidFill>
+                  <a:schemeClr val="bg1"/>
+                </a:solidFill>
+                <a:latin typeface="Arial" panose="020B0604020202020204" pitchFamily="34" charset="0"/>
+                <a:cs typeface="Arial" panose="020B0604020202020204" pitchFamily="34" charset="0"/>
+              </a:rPr>
+              <a:t>зависит от внешней среды откуда запущена программа.</a:t>
             </a:r>
             <a:r>
               <a:rPr lang="en-US" sz="1600" dirty="0" smtClean="0">
                 <a:solidFill>
                   <a:schemeClr val="bg1"/>
                 </a:solidFill>
-                <a:latin typeface="Courier New" pitchFamily="49" charset="0"/>
-                <a:cs typeface="Calibri" pitchFamily="34" charset="0"/>
+                <a:latin typeface="Arial" panose="020B0604020202020204" pitchFamily="34" charset="0"/>
+                <a:cs typeface="Arial" panose="020B0604020202020204" pitchFamily="34" charset="0"/>
               </a:rPr>
               <a:t> </a:t>
             </a:r>
@@ -16258,8 +16329,8 @@
                 <a:solidFill>
                   <a:schemeClr val="bg1"/>
                 </a:solidFill>
-                <a:latin typeface="Courier New" pitchFamily="49" charset="0"/>
-                <a:cs typeface="Calibri" pitchFamily="34" charset="0"/>
+                <a:latin typeface="Arial" panose="020B0604020202020204" pitchFamily="34" charset="0"/>
+                <a:cs typeface="Arial" panose="020B0604020202020204" pitchFamily="34" charset="0"/>
               </a:rPr>
               <a:t>Например, «текущий каталог» может быть разным в следующих ситуациях:</a:t>
             </a:r>
@@ -16274,10 +16345,30 @@
                 <a:solidFill>
                   <a:schemeClr val="bg1"/>
                 </a:solidFill>
-                <a:latin typeface="Courier New" pitchFamily="49" charset="0"/>
-                <a:cs typeface="Calibri" pitchFamily="34" charset="0"/>
-              </a:rPr>
-              <a:t>При запуске приложения через ярлык с измененным «рабоичим каталогом»</a:t>
+                <a:latin typeface="Arial" panose="020B0604020202020204" pitchFamily="34" charset="0"/>
+                <a:cs typeface="Arial" panose="020B0604020202020204" pitchFamily="34" charset="0"/>
+              </a:rPr>
+              <a:t>При запуске приложения через ярлык с измененным «</a:t>
+            </a:r>
+            <a:r>
+              <a:rPr lang="ru-RU" sz="1600" dirty="0" smtClean="0">
+                <a:solidFill>
+                  <a:schemeClr val="bg1"/>
+                </a:solidFill>
+                <a:latin typeface="Arial" panose="020B0604020202020204" pitchFamily="34" charset="0"/>
+                <a:cs typeface="Arial" panose="020B0604020202020204" pitchFamily="34" charset="0"/>
+              </a:rPr>
+              <a:t>рабочим </a:t>
+            </a:r>
+            <a:r>
+              <a:rPr lang="ru-RU" sz="1600" dirty="0" smtClean="0">
+                <a:solidFill>
+                  <a:schemeClr val="bg1"/>
+                </a:solidFill>
+                <a:latin typeface="Arial" panose="020B0604020202020204" pitchFamily="34" charset="0"/>
+                <a:cs typeface="Arial" panose="020B0604020202020204" pitchFamily="34" charset="0"/>
+              </a:rPr>
+              <a:t>каталогом»</a:t>
             </a:r>
           </a:p>
           <a:p>
@@ -16290,8 +16381,8 @@
                 <a:solidFill>
                   <a:schemeClr val="bg1"/>
                 </a:solidFill>
-                <a:latin typeface="Courier New" pitchFamily="49" charset="0"/>
-                <a:cs typeface="Calibri" pitchFamily="34" charset="0"/>
+                <a:latin typeface="Arial" panose="020B0604020202020204" pitchFamily="34" charset="0"/>
+                <a:cs typeface="Arial" panose="020B0604020202020204" pitchFamily="34" charset="0"/>
               </a:rPr>
               <a:t>При использовании </a:t>
             </a:r>
@@ -16300,8 +16391,8 @@
                 <a:solidFill>
                   <a:schemeClr val="bg1"/>
                 </a:solidFill>
-                <a:latin typeface="Courier New" pitchFamily="49" charset="0"/>
-                <a:cs typeface="Calibri" pitchFamily="34" charset="0"/>
+                <a:latin typeface="Arial" panose="020B0604020202020204" pitchFamily="34" charset="0"/>
+                <a:cs typeface="Arial" panose="020B0604020202020204" pitchFamily="34" charset="0"/>
               </a:rPr>
               <a:t>OpenFileDialog</a:t>
             </a:r>
@@ -16310,8 +16401,8 @@
                 <a:solidFill>
                   <a:schemeClr val="bg1"/>
                 </a:solidFill>
-                <a:latin typeface="Courier New" pitchFamily="49" charset="0"/>
-                <a:cs typeface="Calibri" pitchFamily="34" charset="0"/>
+                <a:latin typeface="Arial" panose="020B0604020202020204" pitchFamily="34" charset="0"/>
+                <a:cs typeface="Arial" panose="020B0604020202020204" pitchFamily="34" charset="0"/>
               </a:rPr>
               <a:t>/</a:t>
             </a:r>
@@ -16320,8 +16411,8 @@
                 <a:solidFill>
                   <a:schemeClr val="bg1"/>
                 </a:solidFill>
-                <a:latin typeface="Courier New" pitchFamily="49" charset="0"/>
-                <a:cs typeface="Calibri" pitchFamily="34" charset="0"/>
+                <a:latin typeface="Arial" panose="020B0604020202020204" pitchFamily="34" charset="0"/>
+                <a:cs typeface="Arial" panose="020B0604020202020204" pitchFamily="34" charset="0"/>
               </a:rPr>
               <a:t>SaveFileDialog</a:t>
             </a:r>
@@ -16329,8 +16420,8 @@
               <a:solidFill>
                 <a:schemeClr val="bg1"/>
               </a:solidFill>
-              <a:latin typeface="Courier New" pitchFamily="49" charset="0"/>
-              <a:cs typeface="Calibri" pitchFamily="34" charset="0"/>
+              <a:latin typeface="Arial" panose="020B0604020202020204" pitchFamily="34" charset="0"/>
+              <a:cs typeface="Arial" panose="020B0604020202020204" pitchFamily="34" charset="0"/>
             </a:endParaRPr>
           </a:p>
           <a:p>
@@ -16343,8 +16434,8 @@
                 <a:solidFill>
                   <a:schemeClr val="bg1"/>
                 </a:solidFill>
-                <a:latin typeface="Courier New" pitchFamily="49" charset="0"/>
-                <a:cs typeface="Calibri" pitchFamily="34" charset="0"/>
+                <a:latin typeface="Arial" panose="020B0604020202020204" pitchFamily="34" charset="0"/>
+                <a:cs typeface="Arial" panose="020B0604020202020204" pitchFamily="34" charset="0"/>
               </a:rPr>
               <a:t>При запуске приложения из под планировщика </a:t>
             </a:r>
@@ -16353,8 +16444,8 @@
                 <a:solidFill>
                   <a:schemeClr val="bg1"/>
                 </a:solidFill>
-                <a:latin typeface="Courier New" pitchFamily="49" charset="0"/>
-                <a:cs typeface="Calibri" pitchFamily="34" charset="0"/>
+                <a:latin typeface="Arial" panose="020B0604020202020204" pitchFamily="34" charset="0"/>
+                <a:cs typeface="Arial" panose="020B0604020202020204" pitchFamily="34" charset="0"/>
               </a:rPr>
               <a:t>Windows </a:t>
             </a:r>
@@ -16363,8 +16454,8 @@
                 <a:solidFill>
                   <a:schemeClr val="bg1"/>
                 </a:solidFill>
-                <a:latin typeface="Courier New" pitchFamily="49" charset="0"/>
-                <a:cs typeface="Calibri" pitchFamily="34" charset="0"/>
+                <a:latin typeface="Arial" panose="020B0604020202020204" pitchFamily="34" charset="0"/>
+                <a:cs typeface="Arial" panose="020B0604020202020204" pitchFamily="34" charset="0"/>
               </a:rPr>
               <a:t>(</a:t>
             </a:r>
@@ -16373,8 +16464,8 @@
                 <a:solidFill>
                   <a:schemeClr val="bg1"/>
                 </a:solidFill>
-                <a:latin typeface="Courier New" pitchFamily="49" charset="0"/>
-                <a:cs typeface="Calibri" pitchFamily="34" charset="0"/>
+                <a:latin typeface="Arial" panose="020B0604020202020204" pitchFamily="34" charset="0"/>
+                <a:cs typeface="Arial" panose="020B0604020202020204" pitchFamily="34" charset="0"/>
               </a:rPr>
               <a:t>Windows Scheduler) </a:t>
             </a:r>
@@ -16383,18 +16474,28 @@
                 <a:solidFill>
                   <a:schemeClr val="bg1"/>
                 </a:solidFill>
-                <a:latin typeface="Courier New" pitchFamily="49" charset="0"/>
-                <a:cs typeface="Calibri" pitchFamily="34" charset="0"/>
+                <a:latin typeface="Arial" panose="020B0604020202020204" pitchFamily="34" charset="0"/>
+                <a:cs typeface="Arial" panose="020B0604020202020204" pitchFamily="34" charset="0"/>
               </a:rPr>
               <a:t>или с помощью </a:t>
             </a:r>
             <a:r>
+              <a:rPr lang="ru-RU" sz="1600" dirty="0" smtClean="0">
+                <a:solidFill>
+                  <a:schemeClr val="bg1"/>
+                </a:solidFill>
+                <a:latin typeface="Arial" panose="020B0604020202020204" pitchFamily="34" charset="0"/>
+                <a:cs typeface="Arial" panose="020B0604020202020204" pitchFamily="34" charset="0"/>
+              </a:rPr>
+              <a:t>команды </a:t>
+            </a:r>
+            <a:r>
               <a:rPr lang="en-US" sz="1600" dirty="0" err="1" smtClean="0">
                 <a:solidFill>
                   <a:schemeClr val="bg1"/>
                 </a:solidFill>
-                <a:latin typeface="Courier New" pitchFamily="49" charset="0"/>
-                <a:cs typeface="Calibri" pitchFamily="34" charset="0"/>
+                <a:latin typeface="Arial" panose="020B0604020202020204" pitchFamily="34" charset="0"/>
+                <a:cs typeface="Arial" panose="020B0604020202020204" pitchFamily="34" charset="0"/>
               </a:rPr>
               <a:t>runas</a:t>
             </a:r>
@@ -16402,8 +16503,8 @@
               <a:solidFill>
                 <a:schemeClr val="bg1"/>
               </a:solidFill>
-              <a:latin typeface="Courier New" pitchFamily="49" charset="0"/>
-              <a:cs typeface="Calibri" pitchFamily="34" charset="0"/>
+              <a:latin typeface="Arial" panose="020B0604020202020204" pitchFamily="34" charset="0"/>
+              <a:cs typeface="Arial" panose="020B0604020202020204" pitchFamily="34" charset="0"/>
             </a:endParaRPr>
           </a:p>
           <a:p>
@@ -16416,18 +16517,48 @@
                 <a:solidFill>
                   <a:schemeClr val="bg1"/>
                 </a:solidFill>
-                <a:latin typeface="Courier New" pitchFamily="49" charset="0"/>
-                <a:cs typeface="Calibri" pitchFamily="34" charset="0"/>
-              </a:rPr>
-              <a:t>При запуске другого приложения используя </a:t>
+                <a:latin typeface="Arial" panose="020B0604020202020204" pitchFamily="34" charset="0"/>
+                <a:cs typeface="Arial" panose="020B0604020202020204" pitchFamily="34" charset="0"/>
+              </a:rPr>
+              <a:t>При запуске </a:t>
+            </a:r>
+            <a:r>
+              <a:rPr lang="ru-RU" sz="1600" dirty="0" smtClean="0">
+                <a:solidFill>
+                  <a:schemeClr val="bg1"/>
+                </a:solidFill>
+                <a:latin typeface="Arial" panose="020B0604020202020204" pitchFamily="34" charset="0"/>
+                <a:cs typeface="Arial" panose="020B0604020202020204" pitchFamily="34" charset="0"/>
+              </a:rPr>
+              <a:t>из другого </a:t>
+            </a:r>
+            <a:r>
+              <a:rPr lang="ru-RU" sz="1600" dirty="0" smtClean="0">
+                <a:solidFill>
+                  <a:schemeClr val="bg1"/>
+                </a:solidFill>
+                <a:latin typeface="Arial" panose="020B0604020202020204" pitchFamily="34" charset="0"/>
+                <a:cs typeface="Arial" panose="020B0604020202020204" pitchFamily="34" charset="0"/>
+              </a:rPr>
+              <a:t>приложения </a:t>
+            </a:r>
+            <a:r>
+              <a:rPr lang="ru-RU" sz="1600" dirty="0" smtClean="0">
+                <a:solidFill>
+                  <a:schemeClr val="bg1"/>
+                </a:solidFill>
+                <a:latin typeface="Arial" panose="020B0604020202020204" pitchFamily="34" charset="0"/>
+                <a:cs typeface="Arial" panose="020B0604020202020204" pitchFamily="34" charset="0"/>
+              </a:rPr>
+              <a:t>использующего </a:t>
             </a:r>
             <a:r>
               <a:rPr lang="en-US" sz="1600" dirty="0" err="1" smtClean="0">
                 <a:solidFill>
                   <a:schemeClr val="bg1"/>
                 </a:solidFill>
-                <a:latin typeface="Courier New" pitchFamily="49" charset="0"/>
-                <a:cs typeface="Calibri" pitchFamily="34" charset="0"/>
+                <a:latin typeface="Arial" panose="020B0604020202020204" pitchFamily="34" charset="0"/>
+                <a:cs typeface="Arial" panose="020B0604020202020204" pitchFamily="34" charset="0"/>
               </a:rPr>
               <a:t>ProcessStartInfo.WorkingDirectory</a:t>
             </a:r>
@@ -16435,62 +16566,9 @@
               <a:solidFill>
                 <a:schemeClr val="bg1"/>
               </a:solidFill>
-              <a:latin typeface="Courier New" pitchFamily="49" charset="0"/>
-              <a:cs typeface="Calibri" pitchFamily="34" charset="0"/>
+              <a:latin typeface="Arial" panose="020B0604020202020204" pitchFamily="34" charset="0"/>
+              <a:cs typeface="Arial" panose="020B0604020202020204" pitchFamily="34" charset="0"/>
             </a:endParaRPr>
-          </a:p>
-          <a:p>
-            <a:pPr eaLnBrk="1" hangingPunct="1"/>
-            <a:endParaRPr lang="ru-RU" sz="1600" dirty="0" smtClean="0">
-              <a:solidFill>
-                <a:schemeClr val="bg1"/>
-              </a:solidFill>
-              <a:latin typeface="Courier New" pitchFamily="49" charset="0"/>
-              <a:cs typeface="Calibri" pitchFamily="34" charset="0"/>
-            </a:endParaRPr>
-          </a:p>
-          <a:p>
-            <a:pPr eaLnBrk="1" hangingPunct="1"/>
-            <a:r>
-              <a:rPr lang="ru-RU" sz="1600" dirty="0" smtClean="0">
-                <a:solidFill>
-                  <a:schemeClr val="bg1"/>
-                </a:solidFill>
-                <a:latin typeface="Courier New" pitchFamily="49" charset="0"/>
-                <a:cs typeface="Calibri" pitchFamily="34" charset="0"/>
-              </a:rPr>
-              <a:t>По той же причине лучше избегать использовать метод </a:t>
-            </a:r>
-            <a:r>
-              <a:rPr lang="en-US" sz="1600" dirty="0" err="1" smtClean="0">
-                <a:solidFill>
-                  <a:schemeClr val="bg1"/>
-                </a:solidFill>
-                <a:latin typeface="Courier New" pitchFamily="49" charset="0"/>
-                <a:cs typeface="Calibri" pitchFamily="34" charset="0"/>
-              </a:rPr>
-              <a:t>Directory.SetCurrentDirectory</a:t>
-            </a:r>
-            <a:r>
-              <a:rPr lang="en-US" sz="1600" dirty="0" smtClean="0">
-                <a:solidFill>
-                  <a:schemeClr val="bg1"/>
-                </a:solidFill>
-                <a:latin typeface="Courier New" pitchFamily="49" charset="0"/>
-                <a:cs typeface="Calibri" pitchFamily="34" charset="0"/>
-              </a:rPr>
-              <a:t>()</a:t>
-            </a:r>
-            <a:r>
-              <a:rPr lang="ru-RU" sz="1600" dirty="0" smtClean="0">
-                <a:solidFill>
-                  <a:schemeClr val="bg1"/>
-                </a:solidFill>
-                <a:latin typeface="Courier New" pitchFamily="49" charset="0"/>
-                <a:cs typeface="Calibri" pitchFamily="34" charset="0"/>
-              </a:rPr>
-              <a:t>.</a:t>
-            </a:r>
           </a:p>
           <a:p>
             <a:pPr eaLnBrk="1" hangingPunct="1"/>
@@ -16498,8 +16576,8 @@
               <a:solidFill>
                 <a:schemeClr val="bg1"/>
               </a:solidFill>
-              <a:latin typeface="Courier New" pitchFamily="49" charset="0"/>
-              <a:cs typeface="Calibri" pitchFamily="34" charset="0"/>
+              <a:latin typeface="Arial" panose="020B0604020202020204" pitchFamily="34" charset="0"/>
+              <a:cs typeface="Arial" panose="020B0604020202020204" pitchFamily="34" charset="0"/>
             </a:endParaRPr>
           </a:p>
           <a:p>
@@ -16509,18 +16587,38 @@
                 <a:solidFill>
                   <a:schemeClr val="bg1"/>
                 </a:solidFill>
-                <a:latin typeface="Courier New" pitchFamily="49" charset="0"/>
-                <a:cs typeface="Calibri" pitchFamily="34" charset="0"/>
-              </a:rPr>
-              <a:t>Вместо этого используйте полные пути собранные с помощью методом класса </a:t>
+                <a:latin typeface="Arial" panose="020B0604020202020204" pitchFamily="34" charset="0"/>
+                <a:cs typeface="Arial" panose="020B0604020202020204" pitchFamily="34" charset="0"/>
+              </a:rPr>
+              <a:t>Вместо этого используйте полные пути собранные с помощью </a:t>
+            </a:r>
+            <a:r>
+              <a:rPr lang="ru-RU" sz="1600" dirty="0" smtClean="0">
+                <a:solidFill>
+                  <a:schemeClr val="bg1"/>
+                </a:solidFill>
+                <a:latin typeface="Arial" panose="020B0604020202020204" pitchFamily="34" charset="0"/>
+                <a:cs typeface="Arial" panose="020B0604020202020204" pitchFamily="34" charset="0"/>
+              </a:rPr>
+              <a:t>методов из </a:t>
+            </a:r>
+            <a:r>
+              <a:rPr lang="ru-RU" sz="1600" dirty="0" smtClean="0">
+                <a:solidFill>
+                  <a:schemeClr val="bg1"/>
+                </a:solidFill>
+                <a:latin typeface="Arial" panose="020B0604020202020204" pitchFamily="34" charset="0"/>
+                <a:cs typeface="Arial" panose="020B0604020202020204" pitchFamily="34" charset="0"/>
+              </a:rPr>
+              <a:t>класса </a:t>
             </a:r>
             <a:r>
               <a:rPr lang="en-US" sz="1600" dirty="0" err="1" smtClean="0">
                 <a:solidFill>
                   <a:schemeClr val="bg1"/>
                 </a:solidFill>
-                <a:latin typeface="Courier New" pitchFamily="49" charset="0"/>
-                <a:cs typeface="Calibri" pitchFamily="34" charset="0"/>
+                <a:latin typeface="Arial" panose="020B0604020202020204" pitchFamily="34" charset="0"/>
+                <a:cs typeface="Arial" panose="020B0604020202020204" pitchFamily="34" charset="0"/>
               </a:rPr>
               <a:t>Systen.IO.Path</a:t>
             </a:r>
@@ -16528,8 +16626,8 @@
               <a:solidFill>
                 <a:schemeClr val="bg1"/>
               </a:solidFill>
-              <a:latin typeface="Courier New" pitchFamily="49" charset="0"/>
-              <a:cs typeface="Calibri" pitchFamily="34" charset="0"/>
+              <a:latin typeface="Arial" panose="020B0604020202020204" pitchFamily="34" charset="0"/>
+              <a:cs typeface="Arial" panose="020B0604020202020204" pitchFamily="34" charset="0"/>
             </a:endParaRPr>
           </a:p>
         </p:txBody>
@@ -30893,6 +30991,246 @@
   <p:cSld>
     <p:bg>
       <p:bgPr>
+        <a:blipFill dpi="0" rotWithShape="1">
+          <a:blip r:embed="rId2">
+            <a:lum/>
+          </a:blip>
+          <a:srcRect/>
+          <a:stretch>
+            <a:fillRect/>
+          </a:stretch>
+        </a:blipFill>
+        <a:effectLst/>
+      </p:bgPr>
+    </p:bg>
+    <p:spTree>
+      <p:nvGrpSpPr>
+        <p:cNvPr id="1" name=""/>
+        <p:cNvGrpSpPr/>
+        <p:nvPr/>
+      </p:nvGrpSpPr>
+      <p:grpSpPr>
+        <a:xfrm>
+          <a:off x="0" y="0"/>
+          <a:ext cx="0" cy="0"/>
+          <a:chOff x="0" y="0"/>
+          <a:chExt cx="0" cy="0"/>
+        </a:xfrm>
+      </p:grpSpPr>
+      <p:sp>
+        <p:nvSpPr>
+          <p:cNvPr id="2" name="Title 1"/>
+          <p:cNvSpPr>
+            <a:spLocks noGrp="1"/>
+          </p:cNvSpPr>
+          <p:nvPr>
+            <p:ph type="title"/>
+          </p:nvPr>
+        </p:nvSpPr>
+        <p:spPr/>
+        <p:txBody>
+          <a:bodyPr/>
+          <a:lstStyle/>
+          <a:p>
+            <a:r>
+              <a:rPr lang="ru-RU" dirty="0" smtClean="0"/>
+              <a:t>Ограничения на длину пути</a:t>
+            </a:r>
+            <a:endParaRPr lang="en-US" dirty="0"/>
+          </a:p>
+        </p:txBody>
+      </p:sp>
+      <p:sp>
+        <p:nvSpPr>
+          <p:cNvPr id="3" name="Content Placeholder 2"/>
+          <p:cNvSpPr>
+            <a:spLocks noGrp="1"/>
+          </p:cNvSpPr>
+          <p:nvPr>
+            <p:ph idx="1"/>
+          </p:nvPr>
+        </p:nvSpPr>
+        <p:spPr/>
+        <p:txBody>
+          <a:bodyPr>
+            <a:normAutofit fontScale="70000" lnSpcReduction="20000"/>
+          </a:bodyPr>
+          <a:lstStyle/>
+          <a:p>
+            <a:pPr marL="0" indent="0">
+              <a:buNone/>
+            </a:pPr>
+            <a:r>
+              <a:rPr lang="ru-RU" dirty="0" smtClean="0"/>
+              <a:t>ОС </a:t>
+            </a:r>
+            <a:r>
+              <a:rPr lang="en-US" dirty="0" smtClean="0"/>
+              <a:t>Windows </a:t>
+            </a:r>
+            <a:r>
+              <a:rPr lang="ru-RU" dirty="0" smtClean="0"/>
+              <a:t>поддерживает пути длиной до 32 Кб, однако в </a:t>
+            </a:r>
+            <a:r>
+              <a:rPr lang="en-US" dirty="0" smtClean="0"/>
+              <a:t>.NET </a:t>
+            </a:r>
+            <a:r>
+              <a:rPr lang="ru-RU" dirty="0" smtClean="0"/>
+              <a:t>мы ограничены следующими значениями:</a:t>
+            </a:r>
+          </a:p>
+          <a:p>
+            <a:pPr marL="0" indent="0">
+              <a:buNone/>
+            </a:pPr>
+            <a:endParaRPr lang="ru-RU" dirty="0" smtClean="0"/>
+          </a:p>
+          <a:p>
+            <a:r>
+              <a:rPr lang="ru-RU" dirty="0" smtClean="0"/>
+              <a:t>Максимальная длина полного имени каталога</a:t>
+            </a:r>
+            <a:r>
+              <a:rPr lang="en-US" dirty="0"/>
+              <a:t>  </a:t>
+            </a:r>
+            <a:r>
+              <a:rPr lang="ru-RU" dirty="0" smtClean="0"/>
+              <a:t>– 247 символов</a:t>
+            </a:r>
+          </a:p>
+          <a:p>
+            <a:r>
+              <a:rPr lang="ru-RU" dirty="0"/>
+              <a:t>Максимальная длина </a:t>
+            </a:r>
+            <a:r>
+              <a:rPr lang="ru-RU" dirty="0" smtClean="0"/>
+              <a:t>полного имени файла</a:t>
+            </a:r>
+            <a:r>
+              <a:rPr lang="en-US" dirty="0"/>
+              <a:t>  </a:t>
+            </a:r>
+            <a:r>
+              <a:rPr lang="ru-RU" dirty="0" smtClean="0"/>
+              <a:t>– 259 символов.</a:t>
+            </a:r>
+          </a:p>
+          <a:p>
+            <a:pPr marL="0" indent="0">
+              <a:buNone/>
+            </a:pPr>
+            <a:endParaRPr lang="ru-RU" dirty="0" smtClean="0"/>
+          </a:p>
+          <a:p>
+            <a:pPr marL="0" indent="0">
+              <a:buNone/>
+            </a:pPr>
+            <a:r>
+              <a:rPr lang="ru-RU" dirty="0" smtClean="0"/>
+              <a:t>Это не так страшно как может показаться т.к. Проводник </a:t>
+            </a:r>
+            <a:r>
+              <a:rPr lang="en-US" dirty="0" smtClean="0"/>
+              <a:t>Windows </a:t>
+            </a:r>
+            <a:r>
+              <a:rPr lang="ru-RU" dirty="0" smtClean="0"/>
+              <a:t>тоже не умеет работать с длинными путями.</a:t>
+            </a:r>
+          </a:p>
+          <a:p>
+            <a:pPr marL="0" indent="0">
+              <a:buNone/>
+            </a:pPr>
+            <a:endParaRPr lang="ru-RU" dirty="0" smtClean="0"/>
+          </a:p>
+          <a:p>
+            <a:pPr marL="0" indent="0">
+              <a:buNone/>
+            </a:pPr>
+            <a:r>
+              <a:rPr lang="ru-RU" dirty="0" smtClean="0"/>
+              <a:t>Рекомендую избегать создания слишком длинных путей.</a:t>
+            </a:r>
+          </a:p>
+          <a:p>
+            <a:pPr marL="0" indent="0">
+              <a:buNone/>
+            </a:pPr>
+            <a:endParaRPr lang="ru-RU" dirty="0"/>
+          </a:p>
+          <a:p>
+            <a:pPr marL="0" indent="0">
+              <a:buNone/>
+            </a:pPr>
+            <a:r>
+              <a:rPr lang="ru-RU" sz="4000" smtClean="0">
+                <a:solidFill>
+                  <a:srgbClr val="FFC000"/>
+                </a:solidFill>
+                <a:sym typeface="Wingdings"/>
+              </a:rPr>
+              <a:t></a:t>
+            </a:r>
+            <a:r>
+              <a:rPr lang="ru-RU" smtClean="0">
+                <a:sym typeface="Wingdings"/>
+              </a:rPr>
+              <a:t> </a:t>
+            </a:r>
+            <a:r>
+              <a:rPr lang="ru-RU" smtClean="0"/>
+              <a:t>См. </a:t>
+            </a:r>
+            <a:r>
+              <a:rPr lang="ru-RU" dirty="0" smtClean="0"/>
+              <a:t>также пример </a:t>
+            </a:r>
+            <a:r>
+              <a:rPr lang="en-US" dirty="0" smtClean="0"/>
+              <a:t>L04-S03-IO</a:t>
+            </a:r>
+            <a:r>
+              <a:rPr lang="ru-RU" dirty="0" smtClean="0"/>
+              <a:t>\</a:t>
+            </a:r>
+            <a:r>
+              <a:rPr lang="en-US" dirty="0" err="1" smtClean="0"/>
+              <a:t>PathLimits</a:t>
+            </a:r>
+            <a:endParaRPr lang="en-US" dirty="0"/>
+          </a:p>
+        </p:txBody>
+      </p:sp>
+    </p:spTree>
+    <p:extLst>
+      <p:ext uri="{BB962C8B-B14F-4D97-AF65-F5344CB8AC3E}">
+        <p14:creationId xmlns:p14="http://schemas.microsoft.com/office/powerpoint/2010/main" val="3295503496"/>
+      </p:ext>
+    </p:extLst>
+  </p:cSld>
+  <p:clrMapOvr>
+    <a:masterClrMapping/>
+  </p:clrMapOvr>
+  <p:timing>
+    <p:tnLst>
+      <p:par>
+        <p:cTn id="1" dur="indefinite" restart="never" nodeType="tmRoot"/>
+      </p:par>
+    </p:tnLst>
+  </p:timing>
+</p:sld>
+</file>
+
+<file path=ppt/slides/slide35.xml><?xml version="1.0" encoding="utf-8"?>
+<p:sld xmlns:a="http://schemas.openxmlformats.org/drawingml/2006/main" xmlns:r="http://schemas.openxmlformats.org/officeDocument/2006/relationships" xmlns:p="http://schemas.openxmlformats.org/presentationml/2006/main">
+  <p:cSld>
+    <p:bg>
+      <p:bgPr>
         <a:solidFill>
           <a:srgbClr val="6600CC"/>
         </a:solidFill>

</xml_diff>

<commit_message>
Added file metadata view demo
</commit_message>
<xml_diff>
--- a/Presentation/lesson-04-io.pptx
+++ b/Presentation/lesson-04-io.pptx
@@ -37,8 +37,9 @@
     <p:sldId id="268" r:id="rId31"/>
     <p:sldId id="287" r:id="rId32"/>
     <p:sldId id="278" r:id="rId33"/>
-    <p:sldId id="297" r:id="rId34"/>
-    <p:sldId id="271" r:id="rId35"/>
+    <p:sldId id="298" r:id="rId34"/>
+    <p:sldId id="297" r:id="rId35"/>
+    <p:sldId id="271" r:id="rId36"/>
   </p:sldIdLst>
   <p:sldSz cx="9144000" cy="6858000" type="screen4x3"/>
   <p:notesSz cx="6858000" cy="9144000"/>
@@ -322,7 +323,7 @@
             <a:fld id="{FAECF776-F836-4CCD-9497-99E5597B8B5D}" type="datetimeFigureOut">
               <a:rPr lang="en-US" smtClean="0"/>
               <a:pPr/>
-              <a:t>8/25/2014</a:t>
+              <a:t>8/26/2014</a:t>
             </a:fld>
             <a:endParaRPr lang="en-US"/>
           </a:p>
@@ -494,7 +495,7 @@
             <a:fld id="{FAECF776-F836-4CCD-9497-99E5597B8B5D}" type="datetimeFigureOut">
               <a:rPr lang="en-US" smtClean="0"/>
               <a:pPr/>
-              <a:t>8/25/2014</a:t>
+              <a:t>8/26/2014</a:t>
             </a:fld>
             <a:endParaRPr lang="en-US"/>
           </a:p>
@@ -676,7 +677,7 @@
             <a:fld id="{FAECF776-F836-4CCD-9497-99E5597B8B5D}" type="datetimeFigureOut">
               <a:rPr lang="en-US" smtClean="0"/>
               <a:pPr/>
-              <a:t>8/25/2014</a:t>
+              <a:t>8/26/2014</a:t>
             </a:fld>
             <a:endParaRPr lang="en-US"/>
           </a:p>
@@ -926,7 +927,7 @@
                 </a:solidFill>
               </a:rPr>
               <a:pPr/>
-              <a:t>8/25/2014</a:t>
+              <a:t>8/26/2014</a:t>
             </a:fld>
             <a:endParaRPr lang="en-US">
               <a:solidFill>
@@ -1128,7 +1129,7 @@
                 </a:solidFill>
               </a:rPr>
               <a:pPr/>
-              <a:t>8/25/2014</a:t>
+              <a:t>8/26/2014</a:t>
             </a:fld>
             <a:endParaRPr lang="en-US">
               <a:solidFill>
@@ -1406,7 +1407,7 @@
                 </a:solidFill>
               </a:rPr>
               <a:pPr/>
-              <a:t>8/25/2014</a:t>
+              <a:t>8/26/2014</a:t>
             </a:fld>
             <a:endParaRPr lang="en-US">
               <a:solidFill>
@@ -1726,7 +1727,7 @@
                 </a:solidFill>
               </a:rPr>
               <a:pPr/>
-              <a:t>8/25/2014</a:t>
+              <a:t>8/26/2014</a:t>
             </a:fld>
             <a:endParaRPr lang="en-US">
               <a:solidFill>
@@ -2180,7 +2181,7 @@
                 </a:solidFill>
               </a:rPr>
               <a:pPr/>
-              <a:t>8/25/2014</a:t>
+              <a:t>8/26/2014</a:t>
             </a:fld>
             <a:endParaRPr lang="en-US">
               <a:solidFill>
@@ -2330,7 +2331,7 @@
                 </a:solidFill>
               </a:rPr>
               <a:pPr/>
-              <a:t>8/25/2014</a:t>
+              <a:t>8/26/2014</a:t>
             </a:fld>
             <a:endParaRPr lang="en-US">
               <a:solidFill>
@@ -2457,7 +2458,7 @@
                 </a:solidFill>
               </a:rPr>
               <a:pPr/>
-              <a:t>8/25/2014</a:t>
+              <a:t>8/26/2014</a:t>
             </a:fld>
             <a:endParaRPr lang="en-US">
               <a:solidFill>
@@ -2766,7 +2767,7 @@
                 </a:solidFill>
               </a:rPr>
               <a:pPr/>
-              <a:t>8/25/2014</a:t>
+              <a:t>8/26/2014</a:t>
             </a:fld>
             <a:endParaRPr lang="en-US">
               <a:solidFill>
@@ -2962,7 +2963,7 @@
             <a:fld id="{FAECF776-F836-4CCD-9497-99E5597B8B5D}" type="datetimeFigureOut">
               <a:rPr lang="en-US" smtClean="0"/>
               <a:pPr/>
-              <a:t>8/25/2014</a:t>
+              <a:t>8/26/2014</a:t>
             </a:fld>
             <a:endParaRPr lang="en-US"/>
           </a:p>
@@ -3223,7 +3224,7 @@
                 </a:solidFill>
               </a:rPr>
               <a:pPr/>
-              <a:t>8/25/2014</a:t>
+              <a:t>8/26/2014</a:t>
             </a:fld>
             <a:endParaRPr lang="en-US">
               <a:solidFill>
@@ -3425,7 +3426,7 @@
                 </a:solidFill>
               </a:rPr>
               <a:pPr/>
-              <a:t>8/25/2014</a:t>
+              <a:t>8/26/2014</a:t>
             </a:fld>
             <a:endParaRPr lang="en-US">
               <a:solidFill>
@@ -3637,7 +3638,7 @@
                 </a:solidFill>
               </a:rPr>
               <a:pPr/>
-              <a:t>8/25/2014</a:t>
+              <a:t>8/26/2014</a:t>
             </a:fld>
             <a:endParaRPr lang="en-US">
               <a:solidFill>
@@ -3909,7 +3910,7 @@
             <a:fld id="{FAECF776-F836-4CCD-9497-99E5597B8B5D}" type="datetimeFigureOut">
               <a:rPr lang="en-US" smtClean="0"/>
               <a:pPr/>
-              <a:t>8/25/2014</a:t>
+              <a:t>8/26/2014</a:t>
             </a:fld>
             <a:endParaRPr lang="en-US"/>
           </a:p>
@@ -4199,7 +4200,7 @@
             <a:fld id="{FAECF776-F836-4CCD-9497-99E5597B8B5D}" type="datetimeFigureOut">
               <a:rPr lang="en-US" smtClean="0"/>
               <a:pPr/>
-              <a:t>8/25/2014</a:t>
+              <a:t>8/26/2014</a:t>
             </a:fld>
             <a:endParaRPr lang="en-US"/>
           </a:p>
@@ -4623,7 +4624,7 @@
             <a:fld id="{FAECF776-F836-4CCD-9497-99E5597B8B5D}" type="datetimeFigureOut">
               <a:rPr lang="en-US" smtClean="0"/>
               <a:pPr/>
-              <a:t>8/25/2014</a:t>
+              <a:t>8/26/2014</a:t>
             </a:fld>
             <a:endParaRPr lang="en-US"/>
           </a:p>
@@ -4743,7 +4744,7 @@
             <a:fld id="{FAECF776-F836-4CCD-9497-99E5597B8B5D}" type="datetimeFigureOut">
               <a:rPr lang="en-US" smtClean="0"/>
               <a:pPr/>
-              <a:t>8/25/2014</a:t>
+              <a:t>8/26/2014</a:t>
             </a:fld>
             <a:endParaRPr lang="en-US"/>
           </a:p>
@@ -4840,7 +4841,7 @@
             <a:fld id="{FAECF776-F836-4CCD-9497-99E5597B8B5D}" type="datetimeFigureOut">
               <a:rPr lang="en-US" smtClean="0"/>
               <a:pPr/>
-              <a:t>8/25/2014</a:t>
+              <a:t>8/26/2014</a:t>
             </a:fld>
             <a:endParaRPr lang="en-US"/>
           </a:p>
@@ -5119,7 +5120,7 @@
             <a:fld id="{FAECF776-F836-4CCD-9497-99E5597B8B5D}" type="datetimeFigureOut">
               <a:rPr lang="en-US" smtClean="0"/>
               <a:pPr/>
-              <a:t>8/25/2014</a:t>
+              <a:t>8/26/2014</a:t>
             </a:fld>
             <a:endParaRPr lang="en-US"/>
           </a:p>
@@ -5374,7 +5375,7 @@
             <a:fld id="{FAECF776-F836-4CCD-9497-99E5597B8B5D}" type="datetimeFigureOut">
               <a:rPr lang="en-US" smtClean="0"/>
               <a:pPr/>
-              <a:t>8/25/2014</a:t>
+              <a:t>8/26/2014</a:t>
             </a:fld>
             <a:endParaRPr lang="en-US"/>
           </a:p>
@@ -5598,7 +5599,7 @@
             <a:fld id="{FAECF776-F836-4CCD-9497-99E5597B8B5D}" type="datetimeFigureOut">
               <a:rPr lang="en-US" smtClean="0"/>
               <a:pPr/>
-              <a:t>8/25/2014</a:t>
+              <a:t>8/26/2014</a:t>
             </a:fld>
             <a:endParaRPr lang="en-US"/>
           </a:p>
@@ -6116,7 +6117,7 @@
                 </a:solidFill>
               </a:rPr>
               <a:pPr/>
-              <a:t>8/25/2014</a:t>
+              <a:t>8/26/2014</a:t>
             </a:fld>
             <a:endParaRPr lang="en-US">
               <a:solidFill>
@@ -7874,7 +7875,9 @@
         </p:nvSpPr>
         <p:spPr/>
         <p:txBody>
-          <a:bodyPr/>
+          <a:bodyPr>
+            <a:normAutofit fontScale="85000" lnSpcReduction="20000"/>
+          </a:bodyPr>
           <a:lstStyle/>
           <a:p>
             <a:pPr marL="0" indent="0">
@@ -7916,8 +7919,32 @@
           <a:p>
             <a:pPr lvl="1"/>
             <a:r>
+              <a:rPr lang="en-US" dirty="0" err="1"/>
+              <a:t>System.IO.Pipes.</a:t>
+            </a:r>
+            <a:r>
+              <a:rPr lang="en-US" dirty="0" err="1">
+                <a:solidFill>
+                  <a:srgbClr val="FFFF00"/>
+                </a:solidFill>
+              </a:rPr>
+              <a:t>PipeStream</a:t>
+            </a:r>
+            <a:endParaRPr lang="ru-RU" dirty="0" smtClean="0">
+              <a:solidFill>
+                <a:srgbClr val="FFFF00"/>
+              </a:solidFill>
+            </a:endParaRPr>
+          </a:p>
+          <a:p>
+            <a:pPr lvl="1"/>
+            <a:r>
               <a:rPr lang="ru-RU" dirty="0" smtClean="0"/>
-              <a:t>Архивация данных (</a:t>
+              <a:t>Архивация </a:t>
+            </a:r>
+            <a:r>
+              <a:rPr lang="ru-RU" dirty="0" smtClean="0"/>
+              <a:t>данных (</a:t>
             </a:r>
             <a:r>
               <a:rPr lang="en-US" dirty="0" err="1" smtClean="0"/>
@@ -7928,6 +7955,58 @@
               <a:t>)</a:t>
             </a:r>
             <a:endParaRPr lang="ru-RU" dirty="0" smtClean="0"/>
+          </a:p>
+          <a:p>
+            <a:pPr lvl="1"/>
+            <a:r>
+              <a:rPr lang="en-US" dirty="0" err="1" smtClean="0"/>
+              <a:t>System.Security.Cryptography.</a:t>
+            </a:r>
+            <a:r>
+              <a:rPr lang="en-US" dirty="0" err="1" smtClean="0">
+                <a:solidFill>
+                  <a:srgbClr val="FFFF00"/>
+                </a:solidFill>
+              </a:rPr>
+              <a:t>CryptoStream</a:t>
+            </a:r>
+            <a:endParaRPr lang="ru-RU" dirty="0" smtClean="0">
+              <a:solidFill>
+                <a:srgbClr val="FFFF00"/>
+              </a:solidFill>
+            </a:endParaRPr>
+          </a:p>
+          <a:p>
+            <a:pPr lvl="1"/>
+            <a:r>
+              <a:rPr lang="en-US" dirty="0" err="1" smtClean="0"/>
+              <a:t>System.Net.Sockets.</a:t>
+            </a:r>
+            <a:r>
+              <a:rPr lang="en-US" dirty="0" err="1" smtClean="0">
+                <a:solidFill>
+                  <a:srgbClr val="FFFF00"/>
+                </a:solidFill>
+              </a:rPr>
+              <a:t>NetworkStream</a:t>
+            </a:r>
+            <a:r>
+              <a:rPr lang="ru-RU" dirty="0"/>
+              <a:t> </a:t>
+            </a:r>
+            <a:endParaRPr lang="ru-RU" dirty="0" smtClean="0"/>
+          </a:p>
+          <a:p>
+            <a:pPr lvl="1"/>
+            <a:r>
+              <a:rPr lang="en-US" dirty="0" smtClean="0"/>
+              <a:t>…</a:t>
+            </a:r>
+            <a:endParaRPr lang="ru-RU" dirty="0" smtClean="0">
+              <a:solidFill>
+                <a:srgbClr val="FFFF00"/>
+              </a:solidFill>
+            </a:endParaRPr>
           </a:p>
         </p:txBody>
       </p:sp>
@@ -26366,11 +26445,7 @@
             </a:r>
             <a:r>
               <a:rPr lang="ru-RU" dirty="0" smtClean="0"/>
-              <a:t>сериализацию. При необходимости можно реализовать собственный механизм</a:t>
-            </a:r>
-            <a:r>
-              <a:rPr lang="ru-RU" dirty="0" smtClean="0"/>
-              <a:t>.</a:t>
+              <a:t>сериализацию. При необходимости можно реализовать собственный механизм.</a:t>
             </a:r>
             <a:endParaRPr lang="en-US" dirty="0" smtClean="0"/>
           </a:p>
@@ -26444,6 +26519,185 @@
 </file>
 
 <file path=ppt/slides/slide32.xml><?xml version="1.0" encoding="utf-8"?>
+<p:sld xmlns:a="http://schemas.openxmlformats.org/drawingml/2006/main" xmlns:r="http://schemas.openxmlformats.org/officeDocument/2006/relationships" xmlns:p="http://schemas.openxmlformats.org/presentationml/2006/main">
+  <p:cSld>
+    <p:spTree>
+      <p:nvGrpSpPr>
+        <p:cNvPr id="1" name=""/>
+        <p:cNvGrpSpPr/>
+        <p:nvPr/>
+      </p:nvGrpSpPr>
+      <p:grpSpPr>
+        <a:xfrm>
+          <a:off x="0" y="0"/>
+          <a:ext cx="0" cy="0"/>
+          <a:chOff x="0" y="0"/>
+          <a:chExt cx="0" cy="0"/>
+        </a:xfrm>
+      </p:grpSpPr>
+      <p:sp>
+        <p:nvSpPr>
+          <p:cNvPr id="2" name="Title 1"/>
+          <p:cNvSpPr>
+            <a:spLocks noGrp="1"/>
+          </p:cNvSpPr>
+          <p:nvPr>
+            <p:ph type="title"/>
+          </p:nvPr>
+        </p:nvSpPr>
+        <p:spPr/>
+        <p:txBody>
+          <a:bodyPr/>
+          <a:lstStyle/>
+          <a:p>
+            <a:r>
+              <a:rPr lang="ru-RU" dirty="0" smtClean="0"/>
+              <a:t>Метаданные файлов</a:t>
+            </a:r>
+            <a:endParaRPr lang="ru-RU" dirty="0"/>
+          </a:p>
+        </p:txBody>
+      </p:sp>
+      <p:sp>
+        <p:nvSpPr>
+          <p:cNvPr id="3" name="Content Placeholder 2"/>
+          <p:cNvSpPr>
+            <a:spLocks noGrp="1"/>
+          </p:cNvSpPr>
+          <p:nvPr>
+            <p:ph idx="1"/>
+          </p:nvPr>
+        </p:nvSpPr>
+        <p:spPr/>
+        <p:txBody>
+          <a:bodyPr>
+            <a:normAutofit lnSpcReduction="10000"/>
+          </a:bodyPr>
+          <a:lstStyle/>
+          <a:p>
+            <a:pPr marL="0" indent="0">
+              <a:buNone/>
+            </a:pPr>
+            <a:r>
+              <a:rPr lang="en-US" dirty="0" smtClean="0"/>
+              <a:t>Windows </a:t>
+            </a:r>
+            <a:r>
+              <a:rPr lang="ru-RU" dirty="0" smtClean="0"/>
+              <a:t>позволяет читать метаданные из различных файлов. Например</a:t>
+            </a:r>
+            <a:r>
+              <a:rPr lang="en-US" dirty="0" smtClean="0"/>
+              <a:t>, ID </a:t>
+            </a:r>
+            <a:r>
+              <a:rPr lang="ru-RU" dirty="0" smtClean="0"/>
+              <a:t>теги из </a:t>
+            </a:r>
+            <a:r>
+              <a:rPr lang="en-US" dirty="0" smtClean="0"/>
+              <a:t>mp3 </a:t>
+            </a:r>
+            <a:r>
+              <a:rPr lang="ru-RU" dirty="0" smtClean="0"/>
+              <a:t>файлов</a:t>
+            </a:r>
+            <a:r>
+              <a:rPr lang="en-US" dirty="0" smtClean="0"/>
+              <a:t>, EXIF</a:t>
+            </a:r>
+            <a:r>
+              <a:rPr lang="ru-RU" dirty="0"/>
+              <a:t> </a:t>
+            </a:r>
+            <a:r>
+              <a:rPr lang="ru-RU" dirty="0" smtClean="0"/>
+              <a:t>из фотографий и т.д. В самом </a:t>
+            </a:r>
+            <a:r>
+              <a:rPr lang="en-US" dirty="0" smtClean="0"/>
+              <a:t>.NET </a:t>
+            </a:r>
+            <a:r>
+              <a:rPr lang="ru-RU" dirty="0" smtClean="0"/>
+              <a:t>нет встроенных классов для работы с метаданными файлов и понадобится установить </a:t>
+            </a:r>
+            <a:r>
+              <a:rPr lang="en-US" dirty="0" smtClean="0"/>
+              <a:t>NuGet </a:t>
+            </a:r>
+            <a:r>
+              <a:rPr lang="ru-RU" dirty="0" smtClean="0"/>
+              <a:t>пакет </a:t>
+            </a:r>
+            <a:r>
+              <a:rPr lang="en-US" dirty="0" err="1" smtClean="0"/>
+              <a:t>Microsoft.WindowsAPICodePack.Shell</a:t>
+            </a:r>
+            <a:r>
+              <a:rPr lang="ru-RU" dirty="0" smtClean="0"/>
+              <a:t>.</a:t>
+            </a:r>
+          </a:p>
+          <a:p>
+            <a:pPr marL="0" indent="0">
+              <a:buNone/>
+            </a:pPr>
+            <a:endParaRPr lang="ru-RU" dirty="0"/>
+          </a:p>
+          <a:p>
+            <a:pPr marL="0" indent="0">
+              <a:buNone/>
+            </a:pPr>
+            <a:r>
+              <a:rPr lang="ru-RU" sz="4000" dirty="0">
+                <a:solidFill>
+                  <a:srgbClr val="FFC000"/>
+                </a:solidFill>
+                <a:sym typeface="Wingdings"/>
+              </a:rPr>
+              <a:t></a:t>
+            </a:r>
+            <a:r>
+              <a:rPr lang="ru-RU" dirty="0">
+                <a:sym typeface="Wingdings"/>
+              </a:rPr>
+              <a:t> </a:t>
+            </a:r>
+            <a:r>
+              <a:rPr lang="ru-RU" dirty="0"/>
+              <a:t>См. пример </a:t>
+            </a:r>
+            <a:r>
+              <a:rPr lang="en-US" dirty="0"/>
+              <a:t>L04-S03-IO</a:t>
+            </a:r>
+            <a:r>
+              <a:rPr lang="ru-RU" dirty="0" smtClean="0"/>
+              <a:t>\</a:t>
+            </a:r>
+            <a:r>
+              <a:rPr lang="en-US" dirty="0" err="1" smtClean="0"/>
+              <a:t>FileMetadataViewer</a:t>
+            </a:r>
+            <a:endParaRPr lang="ru-RU" dirty="0"/>
+          </a:p>
+        </p:txBody>
+      </p:sp>
+    </p:spTree>
+    <p:extLst>
+      <p:ext uri="{BB962C8B-B14F-4D97-AF65-F5344CB8AC3E}">
+        <p14:creationId xmlns:p14="http://schemas.microsoft.com/office/powerpoint/2010/main" val="640264607"/>
+      </p:ext>
+    </p:extLst>
+  </p:cSld>
+  <p:clrMapOvr>
+    <a:masterClrMapping/>
+  </p:clrMapOvr>
+</p:sld>
+</file>
+
+<file path=ppt/slides/slide33.xml><?xml version="1.0" encoding="utf-8"?>
 <p:sld xmlns:a="http://schemas.openxmlformats.org/drawingml/2006/main" xmlns:r="http://schemas.openxmlformats.org/officeDocument/2006/relationships" xmlns:p="http://schemas.openxmlformats.org/presentationml/2006/main">
   <p:cSld>
     <p:bg>
@@ -26679,7 +26933,7 @@
 </p:sld>
 </file>
 
-<file path=ppt/slides/slide33.xml><?xml version="1.0" encoding="utf-8"?>
+<file path=ppt/slides/slide34.xml><?xml version="1.0" encoding="utf-8"?>
 <p:sld xmlns:a="http://schemas.openxmlformats.org/drawingml/2006/main" xmlns:r="http://schemas.openxmlformats.org/officeDocument/2006/relationships" xmlns:p="http://schemas.openxmlformats.org/presentationml/2006/main">
   <p:cSld>
     <p:bg>

</xml_diff>

<commit_message>
Added DriveInfo class demo
</commit_message>
<xml_diff>
--- a/Presentation/lesson-04-io.pptx
+++ b/Presentation/lesson-04-io.pptx
@@ -323,7 +323,7 @@
             <a:fld id="{FAECF776-F836-4CCD-9497-99E5597B8B5D}" type="datetimeFigureOut">
               <a:rPr lang="en-US" smtClean="0"/>
               <a:pPr/>
-              <a:t>8/26/2014</a:t>
+              <a:t>8/28/2014</a:t>
             </a:fld>
             <a:endParaRPr lang="en-US"/>
           </a:p>
@@ -495,7 +495,7 @@
             <a:fld id="{FAECF776-F836-4CCD-9497-99E5597B8B5D}" type="datetimeFigureOut">
               <a:rPr lang="en-US" smtClean="0"/>
               <a:pPr/>
-              <a:t>8/26/2014</a:t>
+              <a:t>8/28/2014</a:t>
             </a:fld>
             <a:endParaRPr lang="en-US"/>
           </a:p>
@@ -677,7 +677,7 @@
             <a:fld id="{FAECF776-F836-4CCD-9497-99E5597B8B5D}" type="datetimeFigureOut">
               <a:rPr lang="en-US" smtClean="0"/>
               <a:pPr/>
-              <a:t>8/26/2014</a:t>
+              <a:t>8/28/2014</a:t>
             </a:fld>
             <a:endParaRPr lang="en-US"/>
           </a:p>
@@ -927,7 +927,7 @@
                 </a:solidFill>
               </a:rPr>
               <a:pPr/>
-              <a:t>8/26/2014</a:t>
+              <a:t>8/28/2014</a:t>
             </a:fld>
             <a:endParaRPr lang="en-US">
               <a:solidFill>
@@ -1129,7 +1129,7 @@
                 </a:solidFill>
               </a:rPr>
               <a:pPr/>
-              <a:t>8/26/2014</a:t>
+              <a:t>8/28/2014</a:t>
             </a:fld>
             <a:endParaRPr lang="en-US">
               <a:solidFill>
@@ -1407,7 +1407,7 @@
                 </a:solidFill>
               </a:rPr>
               <a:pPr/>
-              <a:t>8/26/2014</a:t>
+              <a:t>8/28/2014</a:t>
             </a:fld>
             <a:endParaRPr lang="en-US">
               <a:solidFill>
@@ -1727,7 +1727,7 @@
                 </a:solidFill>
               </a:rPr>
               <a:pPr/>
-              <a:t>8/26/2014</a:t>
+              <a:t>8/28/2014</a:t>
             </a:fld>
             <a:endParaRPr lang="en-US">
               <a:solidFill>
@@ -2181,7 +2181,7 @@
                 </a:solidFill>
               </a:rPr>
               <a:pPr/>
-              <a:t>8/26/2014</a:t>
+              <a:t>8/28/2014</a:t>
             </a:fld>
             <a:endParaRPr lang="en-US">
               <a:solidFill>
@@ -2331,7 +2331,7 @@
                 </a:solidFill>
               </a:rPr>
               <a:pPr/>
-              <a:t>8/26/2014</a:t>
+              <a:t>8/28/2014</a:t>
             </a:fld>
             <a:endParaRPr lang="en-US">
               <a:solidFill>
@@ -2458,7 +2458,7 @@
                 </a:solidFill>
               </a:rPr>
               <a:pPr/>
-              <a:t>8/26/2014</a:t>
+              <a:t>8/28/2014</a:t>
             </a:fld>
             <a:endParaRPr lang="en-US">
               <a:solidFill>
@@ -2767,7 +2767,7 @@
                 </a:solidFill>
               </a:rPr>
               <a:pPr/>
-              <a:t>8/26/2014</a:t>
+              <a:t>8/28/2014</a:t>
             </a:fld>
             <a:endParaRPr lang="en-US">
               <a:solidFill>
@@ -2963,7 +2963,7 @@
             <a:fld id="{FAECF776-F836-4CCD-9497-99E5597B8B5D}" type="datetimeFigureOut">
               <a:rPr lang="en-US" smtClean="0"/>
               <a:pPr/>
-              <a:t>8/26/2014</a:t>
+              <a:t>8/28/2014</a:t>
             </a:fld>
             <a:endParaRPr lang="en-US"/>
           </a:p>
@@ -3224,7 +3224,7 @@
                 </a:solidFill>
               </a:rPr>
               <a:pPr/>
-              <a:t>8/26/2014</a:t>
+              <a:t>8/28/2014</a:t>
             </a:fld>
             <a:endParaRPr lang="en-US">
               <a:solidFill>
@@ -3426,7 +3426,7 @@
                 </a:solidFill>
               </a:rPr>
               <a:pPr/>
-              <a:t>8/26/2014</a:t>
+              <a:t>8/28/2014</a:t>
             </a:fld>
             <a:endParaRPr lang="en-US">
               <a:solidFill>
@@ -3638,7 +3638,7 @@
                 </a:solidFill>
               </a:rPr>
               <a:pPr/>
-              <a:t>8/26/2014</a:t>
+              <a:t>8/28/2014</a:t>
             </a:fld>
             <a:endParaRPr lang="en-US">
               <a:solidFill>
@@ -3910,7 +3910,7 @@
             <a:fld id="{FAECF776-F836-4CCD-9497-99E5597B8B5D}" type="datetimeFigureOut">
               <a:rPr lang="en-US" smtClean="0"/>
               <a:pPr/>
-              <a:t>8/26/2014</a:t>
+              <a:t>8/28/2014</a:t>
             </a:fld>
             <a:endParaRPr lang="en-US"/>
           </a:p>
@@ -4200,7 +4200,7 @@
             <a:fld id="{FAECF776-F836-4CCD-9497-99E5597B8B5D}" type="datetimeFigureOut">
               <a:rPr lang="en-US" smtClean="0"/>
               <a:pPr/>
-              <a:t>8/26/2014</a:t>
+              <a:t>8/28/2014</a:t>
             </a:fld>
             <a:endParaRPr lang="en-US"/>
           </a:p>
@@ -4624,7 +4624,7 @@
             <a:fld id="{FAECF776-F836-4CCD-9497-99E5597B8B5D}" type="datetimeFigureOut">
               <a:rPr lang="en-US" smtClean="0"/>
               <a:pPr/>
-              <a:t>8/26/2014</a:t>
+              <a:t>8/28/2014</a:t>
             </a:fld>
             <a:endParaRPr lang="en-US"/>
           </a:p>
@@ -4744,7 +4744,7 @@
             <a:fld id="{FAECF776-F836-4CCD-9497-99E5597B8B5D}" type="datetimeFigureOut">
               <a:rPr lang="en-US" smtClean="0"/>
               <a:pPr/>
-              <a:t>8/26/2014</a:t>
+              <a:t>8/28/2014</a:t>
             </a:fld>
             <a:endParaRPr lang="en-US"/>
           </a:p>
@@ -4841,7 +4841,7 @@
             <a:fld id="{FAECF776-F836-4CCD-9497-99E5597B8B5D}" type="datetimeFigureOut">
               <a:rPr lang="en-US" smtClean="0"/>
               <a:pPr/>
-              <a:t>8/26/2014</a:t>
+              <a:t>8/28/2014</a:t>
             </a:fld>
             <a:endParaRPr lang="en-US"/>
           </a:p>
@@ -5120,7 +5120,7 @@
             <a:fld id="{FAECF776-F836-4CCD-9497-99E5597B8B5D}" type="datetimeFigureOut">
               <a:rPr lang="en-US" smtClean="0"/>
               <a:pPr/>
-              <a:t>8/26/2014</a:t>
+              <a:t>8/28/2014</a:t>
             </a:fld>
             <a:endParaRPr lang="en-US"/>
           </a:p>
@@ -5375,7 +5375,7 @@
             <a:fld id="{FAECF776-F836-4CCD-9497-99E5597B8B5D}" type="datetimeFigureOut">
               <a:rPr lang="en-US" smtClean="0"/>
               <a:pPr/>
-              <a:t>8/26/2014</a:t>
+              <a:t>8/28/2014</a:t>
             </a:fld>
             <a:endParaRPr lang="en-US"/>
           </a:p>
@@ -5599,7 +5599,7 @@
             <a:fld id="{FAECF776-F836-4CCD-9497-99E5597B8B5D}" type="datetimeFigureOut">
               <a:rPr lang="en-US" smtClean="0"/>
               <a:pPr/>
-              <a:t>8/26/2014</a:t>
+              <a:t>8/28/2014</a:t>
             </a:fld>
             <a:endParaRPr lang="en-US"/>
           </a:p>
@@ -6117,7 +6117,7 @@
                 </a:solidFill>
               </a:rPr>
               <a:pPr/>
-              <a:t>8/26/2014</a:t>
+              <a:t>8/28/2014</a:t>
             </a:fld>
             <a:endParaRPr lang="en-US">
               <a:solidFill>
@@ -7940,11 +7940,7 @@
             <a:pPr lvl="1"/>
             <a:r>
               <a:rPr lang="ru-RU" dirty="0" smtClean="0"/>
-              <a:t>Архивация </a:t>
-            </a:r>
-            <a:r>
-              <a:rPr lang="ru-RU" dirty="0" smtClean="0"/>
-              <a:t>данных (</a:t>
+              <a:t>Архивация данных (</a:t>
             </a:r>
             <a:r>
               <a:rPr lang="en-US" dirty="0" err="1" smtClean="0"/>
@@ -8568,8 +8564,8 @@
         </p:nvSpPr>
         <p:spPr bwMode="auto">
           <a:xfrm>
-            <a:off x="247300" y="2204864"/>
-            <a:ext cx="8649401" cy="3231654"/>
+            <a:off x="243079" y="2060262"/>
+            <a:ext cx="8649401" cy="3600986"/>
           </a:xfrm>
           <a:prstGeom prst="rect">
             <a:avLst/>
@@ -8612,6 +8608,1247 @@
           </a:bodyPr>
           <a:lstStyle/>
           <a:p>
+            <a:r>
+              <a:rPr kumimoji="0" lang="ru-RU" altLang="ru-RU" sz="1200" b="0" i="0" u="none" strike="noStrike" cap="none" normalizeH="0" baseline="0" dirty="0" smtClean="0">
+                <a:ln>
+                  <a:noFill/>
+                </a:ln>
+                <a:solidFill>
+                  <a:srgbClr val="008000"/>
+                </a:solidFill>
+                <a:effectLst/>
+                <a:latin typeface="Courier New" panose="02070309020205020404" pitchFamily="49" charset="0"/>
+                <a:cs typeface="Courier New" panose="02070309020205020404" pitchFamily="49" charset="0"/>
+              </a:rPr>
+              <a:t>//DriveInfo d</a:t>
+            </a:r>
+            <a:r>
+              <a:rPr kumimoji="0" lang="en-US" altLang="ru-RU" sz="1200" b="0" i="0" u="none" strike="noStrike" cap="none" normalizeH="0" baseline="0" dirty="0" err="1" smtClean="0">
+                <a:ln>
+                  <a:noFill/>
+                </a:ln>
+                <a:solidFill>
+                  <a:srgbClr val="008000"/>
+                </a:solidFill>
+                <a:effectLst/>
+                <a:latin typeface="Courier New" panose="02070309020205020404" pitchFamily="49" charset="0"/>
+                <a:cs typeface="Courier New" panose="02070309020205020404" pitchFamily="49" charset="0"/>
+              </a:rPr>
+              <a:t>rvInf</a:t>
+            </a:r>
+            <a:r>
+              <a:rPr kumimoji="0" lang="ru-RU" altLang="ru-RU" sz="1200" b="0" i="0" u="none" strike="noStrike" cap="none" normalizeH="0" baseline="0" dirty="0" smtClean="0">
+                <a:ln>
+                  <a:noFill/>
+                </a:ln>
+                <a:solidFill>
+                  <a:srgbClr val="008000"/>
+                </a:solidFill>
+                <a:effectLst/>
+                <a:latin typeface="Courier New" panose="02070309020205020404" pitchFamily="49" charset="0"/>
+                <a:cs typeface="Courier New" panose="02070309020205020404" pitchFamily="49" charset="0"/>
+              </a:rPr>
+              <a:t> = new DriveInfo(@"C:\");</a:t>
+            </a:r>
+            <a:endParaRPr kumimoji="0" lang="en-US" altLang="ru-RU" sz="1200" b="0" i="0" u="none" strike="noStrike" cap="none" normalizeH="0" baseline="0" dirty="0" smtClean="0">
+              <a:ln>
+                <a:noFill/>
+              </a:ln>
+              <a:solidFill>
+                <a:srgbClr val="008000"/>
+              </a:solidFill>
+              <a:effectLst/>
+              <a:latin typeface="Courier New" panose="02070309020205020404" pitchFamily="49" charset="0"/>
+              <a:cs typeface="Courier New" panose="02070309020205020404" pitchFamily="49" charset="0"/>
+            </a:endParaRPr>
+          </a:p>
+          <a:p>
+            <a:r>
+              <a:rPr lang="en-US" sz="1200" dirty="0" err="1" smtClean="0">
+                <a:solidFill>
+                  <a:srgbClr val="2B91AF"/>
+                </a:solidFill>
+                <a:latin typeface="Consolas"/>
+              </a:rPr>
+              <a:t>DriveInfo</a:t>
+            </a:r>
+            <a:r>
+              <a:rPr lang="en-US" sz="1200" dirty="0">
+                <a:solidFill>
+                  <a:prstClr val="black"/>
+                </a:solidFill>
+                <a:latin typeface="Consolas"/>
+              </a:rPr>
+              <a:t>[] drives = </a:t>
+            </a:r>
+            <a:r>
+              <a:rPr lang="en-US" sz="1200" dirty="0" err="1">
+                <a:solidFill>
+                  <a:srgbClr val="2B91AF"/>
+                </a:solidFill>
+                <a:latin typeface="Consolas"/>
+              </a:rPr>
+              <a:t>DriveInfo</a:t>
+            </a:r>
+            <a:r>
+              <a:rPr lang="en-US" sz="1200" dirty="0" err="1">
+                <a:solidFill>
+                  <a:prstClr val="black"/>
+                </a:solidFill>
+                <a:latin typeface="Consolas"/>
+              </a:rPr>
+              <a:t>.GetDrives</a:t>
+            </a:r>
+            <a:r>
+              <a:rPr lang="en-US" sz="1200" dirty="0">
+                <a:solidFill>
+                  <a:prstClr val="black"/>
+                </a:solidFill>
+                <a:latin typeface="Consolas"/>
+              </a:rPr>
+              <a:t>();</a:t>
+            </a:r>
+          </a:p>
+          <a:p>
+            <a:r>
+              <a:rPr lang="en-US" sz="1200" dirty="0" err="1">
+                <a:solidFill>
+                  <a:srgbClr val="0000FF"/>
+                </a:solidFill>
+                <a:latin typeface="Consolas"/>
+              </a:rPr>
+              <a:t>foreach</a:t>
+            </a:r>
+            <a:r>
+              <a:rPr lang="en-US" sz="1200" dirty="0">
+                <a:solidFill>
+                  <a:prstClr val="black"/>
+                </a:solidFill>
+                <a:latin typeface="Consolas"/>
+              </a:rPr>
+              <a:t> (</a:t>
+            </a:r>
+            <a:r>
+              <a:rPr lang="en-US" sz="1200" dirty="0" err="1">
+                <a:solidFill>
+                  <a:srgbClr val="2B91AF"/>
+                </a:solidFill>
+                <a:latin typeface="Consolas"/>
+              </a:rPr>
+              <a:t>DriveInfo</a:t>
+            </a:r>
+            <a:r>
+              <a:rPr lang="en-US" sz="1200" dirty="0">
+                <a:solidFill>
+                  <a:prstClr val="black"/>
+                </a:solidFill>
+                <a:latin typeface="Consolas"/>
+              </a:rPr>
+              <a:t> </a:t>
+            </a:r>
+            <a:r>
+              <a:rPr lang="en-US" sz="1200" dirty="0" err="1" smtClean="0">
+                <a:solidFill>
+                  <a:prstClr val="black"/>
+                </a:solidFill>
+                <a:latin typeface="Consolas"/>
+              </a:rPr>
+              <a:t>driInf</a:t>
+            </a:r>
+            <a:r>
+              <a:rPr lang="en-US" sz="1200" dirty="0" smtClean="0">
+                <a:solidFill>
+                  <a:prstClr val="black"/>
+                </a:solidFill>
+                <a:latin typeface="Consolas"/>
+              </a:rPr>
+              <a:t> </a:t>
+            </a:r>
+            <a:r>
+              <a:rPr lang="en-US" sz="1200" dirty="0">
+                <a:solidFill>
+                  <a:srgbClr val="0000FF"/>
+                </a:solidFill>
+                <a:latin typeface="Consolas"/>
+              </a:rPr>
+              <a:t>in</a:t>
+            </a:r>
+            <a:r>
+              <a:rPr lang="en-US" sz="1200" dirty="0">
+                <a:solidFill>
+                  <a:prstClr val="black"/>
+                </a:solidFill>
+                <a:latin typeface="Consolas"/>
+              </a:rPr>
+              <a:t> drives)</a:t>
+            </a:r>
+          </a:p>
+          <a:p>
+            <a:r>
+              <a:rPr lang="ru-RU" sz="1200" dirty="0">
+                <a:solidFill>
+                  <a:prstClr val="black"/>
+                </a:solidFill>
+                <a:latin typeface="Consolas"/>
+              </a:rPr>
+              <a:t>{</a:t>
+            </a:r>
+          </a:p>
+          <a:p>
+            <a:r>
+              <a:rPr lang="en-US" sz="1200" dirty="0" smtClean="0">
+                <a:solidFill>
+                  <a:srgbClr val="2B91AF"/>
+                </a:solidFill>
+                <a:latin typeface="Consolas"/>
+              </a:rPr>
+              <a:t>    </a:t>
+            </a:r>
+            <a:r>
+              <a:rPr lang="en-US" sz="1200" dirty="0" err="1" smtClean="0">
+                <a:solidFill>
+                  <a:srgbClr val="2B91AF"/>
+                </a:solidFill>
+                <a:latin typeface="Consolas"/>
+              </a:rPr>
+              <a:t>Console</a:t>
+            </a:r>
+            <a:r>
+              <a:rPr lang="en-US" sz="1200" dirty="0" err="1" smtClean="0">
+                <a:solidFill>
+                  <a:prstClr val="black"/>
+                </a:solidFill>
+                <a:latin typeface="Consolas"/>
+              </a:rPr>
+              <a:t>.WriteLine</a:t>
+            </a:r>
+            <a:r>
+              <a:rPr lang="en-US" sz="1200" dirty="0">
+                <a:solidFill>
+                  <a:prstClr val="black"/>
+                </a:solidFill>
+                <a:latin typeface="Consolas"/>
+              </a:rPr>
+              <a:t>(</a:t>
+            </a:r>
+            <a:r>
+              <a:rPr lang="en-US" sz="1200" dirty="0">
+                <a:solidFill>
+                  <a:srgbClr val="A31515"/>
+                </a:solidFill>
+                <a:latin typeface="Consolas"/>
+              </a:rPr>
+              <a:t>"---------------------------------"</a:t>
+            </a:r>
+            <a:r>
+              <a:rPr lang="en-US" sz="1200" dirty="0">
+                <a:solidFill>
+                  <a:prstClr val="black"/>
+                </a:solidFill>
+                <a:latin typeface="Consolas"/>
+              </a:rPr>
+              <a:t>);</a:t>
+            </a:r>
+          </a:p>
+          <a:p>
+            <a:r>
+              <a:rPr lang="en-US" sz="1200" dirty="0" smtClean="0">
+                <a:solidFill>
+                  <a:srgbClr val="2B91AF"/>
+                </a:solidFill>
+                <a:latin typeface="Consolas"/>
+              </a:rPr>
+              <a:t>    </a:t>
+            </a:r>
+            <a:r>
+              <a:rPr lang="en-US" sz="1200" dirty="0" err="1" smtClean="0">
+                <a:solidFill>
+                  <a:srgbClr val="2B91AF"/>
+                </a:solidFill>
+                <a:latin typeface="Consolas"/>
+              </a:rPr>
+              <a:t>Console</a:t>
+            </a:r>
+            <a:r>
+              <a:rPr lang="en-US" sz="1200" dirty="0" err="1" smtClean="0">
+                <a:solidFill>
+                  <a:prstClr val="black"/>
+                </a:solidFill>
+                <a:latin typeface="Consolas"/>
+              </a:rPr>
+              <a:t>.WriteLine</a:t>
+            </a:r>
+            <a:r>
+              <a:rPr lang="en-US" sz="1200" dirty="0">
+                <a:solidFill>
+                  <a:prstClr val="black"/>
+                </a:solidFill>
+                <a:latin typeface="Consolas"/>
+              </a:rPr>
+              <a:t>(</a:t>
+            </a:r>
+            <a:r>
+              <a:rPr lang="en-US" sz="1200" dirty="0">
+                <a:solidFill>
+                  <a:srgbClr val="A31515"/>
+                </a:solidFill>
+                <a:latin typeface="Consolas"/>
+              </a:rPr>
+              <a:t>"</a:t>
+            </a:r>
+            <a:r>
+              <a:rPr lang="ru-RU" sz="1200" dirty="0">
+                <a:solidFill>
+                  <a:srgbClr val="A31515"/>
+                </a:solidFill>
+                <a:latin typeface="Consolas"/>
+              </a:rPr>
+              <a:t>Тип диска       : </a:t>
+            </a:r>
+            <a:r>
+              <a:rPr lang="ru-RU" sz="1200" dirty="0">
+                <a:solidFill>
+                  <a:srgbClr val="3CB371"/>
+                </a:solidFill>
+                <a:latin typeface="Consolas"/>
+              </a:rPr>
+              <a:t>{0}</a:t>
+            </a:r>
+            <a:r>
+              <a:rPr lang="ru-RU" sz="1200" dirty="0">
+                <a:solidFill>
+                  <a:srgbClr val="A31515"/>
+                </a:solidFill>
+                <a:latin typeface="Consolas"/>
+              </a:rPr>
+              <a:t>"</a:t>
+            </a:r>
+            <a:r>
+              <a:rPr lang="ru-RU" sz="1200" dirty="0">
+                <a:solidFill>
+                  <a:prstClr val="black"/>
+                </a:solidFill>
+                <a:latin typeface="Consolas"/>
+              </a:rPr>
+              <a:t>, </a:t>
+            </a:r>
+            <a:r>
+              <a:rPr lang="en-US" sz="1200" dirty="0" err="1" smtClean="0">
+                <a:solidFill>
+                  <a:prstClr val="black"/>
+                </a:solidFill>
+                <a:latin typeface="Consolas"/>
+              </a:rPr>
+              <a:t>driveInfo.DriveType</a:t>
+            </a:r>
+            <a:r>
+              <a:rPr lang="en-US" sz="1200" dirty="0">
+                <a:solidFill>
+                  <a:prstClr val="black"/>
+                </a:solidFill>
+                <a:latin typeface="Consolas"/>
+              </a:rPr>
+              <a:t>);</a:t>
+            </a:r>
+          </a:p>
+          <a:p>
+            <a:r>
+              <a:rPr lang="en-US" sz="1200" dirty="0" smtClean="0">
+                <a:solidFill>
+                  <a:srgbClr val="2B91AF"/>
+                </a:solidFill>
+                <a:latin typeface="Consolas"/>
+              </a:rPr>
+              <a:t>    </a:t>
+            </a:r>
+            <a:r>
+              <a:rPr lang="en-US" sz="1200" dirty="0" err="1" smtClean="0">
+                <a:solidFill>
+                  <a:srgbClr val="2B91AF"/>
+                </a:solidFill>
+                <a:latin typeface="Consolas"/>
+              </a:rPr>
+              <a:t>Console</a:t>
+            </a:r>
+            <a:r>
+              <a:rPr lang="en-US" sz="1200" dirty="0" err="1" smtClean="0">
+                <a:solidFill>
+                  <a:prstClr val="black"/>
+                </a:solidFill>
+                <a:latin typeface="Consolas"/>
+              </a:rPr>
+              <a:t>.WriteLine</a:t>
+            </a:r>
+            <a:r>
+              <a:rPr lang="en-US" sz="1200" dirty="0">
+                <a:solidFill>
+                  <a:prstClr val="black"/>
+                </a:solidFill>
+                <a:latin typeface="Consolas"/>
+              </a:rPr>
+              <a:t>(</a:t>
+            </a:r>
+            <a:r>
+              <a:rPr lang="en-US" sz="1200" dirty="0">
+                <a:solidFill>
+                  <a:srgbClr val="A31515"/>
+                </a:solidFill>
+                <a:latin typeface="Consolas"/>
+              </a:rPr>
+              <a:t>"</a:t>
+            </a:r>
+            <a:r>
+              <a:rPr lang="ru-RU" sz="1200" dirty="0">
+                <a:solidFill>
+                  <a:srgbClr val="A31515"/>
+                </a:solidFill>
+                <a:latin typeface="Consolas"/>
+              </a:rPr>
+              <a:t>Имя             : </a:t>
+            </a:r>
+            <a:r>
+              <a:rPr lang="ru-RU" sz="1200" dirty="0">
+                <a:solidFill>
+                  <a:srgbClr val="3CB371"/>
+                </a:solidFill>
+                <a:latin typeface="Consolas"/>
+              </a:rPr>
+              <a:t>{0}</a:t>
+            </a:r>
+            <a:r>
+              <a:rPr lang="ru-RU" sz="1200" dirty="0">
+                <a:solidFill>
+                  <a:srgbClr val="A31515"/>
+                </a:solidFill>
+                <a:latin typeface="Consolas"/>
+              </a:rPr>
+              <a:t>"</a:t>
+            </a:r>
+            <a:r>
+              <a:rPr lang="ru-RU" sz="1200" dirty="0">
+                <a:solidFill>
+                  <a:prstClr val="black"/>
+                </a:solidFill>
+                <a:latin typeface="Consolas"/>
+              </a:rPr>
+              <a:t>, </a:t>
+            </a:r>
+            <a:r>
+              <a:rPr lang="en-US" sz="1200" dirty="0" err="1">
+                <a:solidFill>
+                  <a:prstClr val="black"/>
+                </a:solidFill>
+                <a:latin typeface="Consolas"/>
+              </a:rPr>
+              <a:t>driveInfo</a:t>
+            </a:r>
+            <a:r>
+              <a:rPr lang="en-US" sz="1200" dirty="0" err="1" smtClean="0">
+                <a:solidFill>
+                  <a:prstClr val="black"/>
+                </a:solidFill>
+                <a:latin typeface="Consolas"/>
+              </a:rPr>
+              <a:t>.Name</a:t>
+            </a:r>
+            <a:r>
+              <a:rPr lang="en-US" sz="1200" dirty="0">
+                <a:solidFill>
+                  <a:prstClr val="black"/>
+                </a:solidFill>
+                <a:latin typeface="Consolas"/>
+              </a:rPr>
+              <a:t>);</a:t>
+            </a:r>
+          </a:p>
+          <a:p>
+            <a:r>
+              <a:rPr lang="en-US" sz="1200" dirty="0">
+                <a:solidFill>
+                  <a:srgbClr val="2B91AF"/>
+                </a:solidFill>
+                <a:latin typeface="Consolas"/>
+              </a:rPr>
+              <a:t> </a:t>
+            </a:r>
+            <a:r>
+              <a:rPr lang="en-US" sz="1200" dirty="0" smtClean="0">
+                <a:solidFill>
+                  <a:srgbClr val="2B91AF"/>
+                </a:solidFill>
+                <a:latin typeface="Consolas"/>
+              </a:rPr>
+              <a:t>   </a:t>
+            </a:r>
+            <a:r>
+              <a:rPr lang="en-US" sz="1200" dirty="0" smtClean="0">
+                <a:solidFill>
+                  <a:srgbClr val="0000FF"/>
+                </a:solidFill>
+                <a:latin typeface="Consolas"/>
+              </a:rPr>
+              <a:t>if</a:t>
+            </a:r>
+            <a:r>
+              <a:rPr lang="en-US" sz="1200" dirty="0" smtClean="0">
+                <a:solidFill>
+                  <a:prstClr val="black"/>
+                </a:solidFill>
+                <a:latin typeface="Consolas"/>
+              </a:rPr>
+              <a:t> </a:t>
+            </a:r>
+            <a:r>
+              <a:rPr lang="en-US" sz="1200" dirty="0">
+                <a:solidFill>
+                  <a:prstClr val="black"/>
+                </a:solidFill>
+                <a:latin typeface="Consolas"/>
+              </a:rPr>
+              <a:t>(</a:t>
+            </a:r>
+            <a:r>
+              <a:rPr lang="en-US" sz="1200" dirty="0" err="1">
+                <a:solidFill>
+                  <a:prstClr val="black"/>
+                </a:solidFill>
+                <a:latin typeface="Consolas"/>
+              </a:rPr>
+              <a:t>drvInf.IsReady</a:t>
+            </a:r>
+            <a:r>
+              <a:rPr lang="en-US" sz="1200" dirty="0">
+                <a:solidFill>
+                  <a:prstClr val="black"/>
+                </a:solidFill>
+                <a:latin typeface="Consolas"/>
+              </a:rPr>
+              <a:t>)</a:t>
+            </a:r>
+          </a:p>
+          <a:p>
+            <a:r>
+              <a:rPr lang="en-US" sz="1200" dirty="0" smtClean="0">
+                <a:solidFill>
+                  <a:prstClr val="black"/>
+                </a:solidFill>
+                <a:latin typeface="Consolas"/>
+              </a:rPr>
+              <a:t>    </a:t>
+            </a:r>
+            <a:r>
+              <a:rPr lang="ru-RU" sz="1200" dirty="0" smtClean="0">
+                <a:solidFill>
+                  <a:prstClr val="black"/>
+                </a:solidFill>
+                <a:latin typeface="Consolas"/>
+              </a:rPr>
+              <a:t>{</a:t>
+            </a:r>
+            <a:endParaRPr lang="ru-RU" sz="1200" dirty="0">
+              <a:solidFill>
+                <a:prstClr val="black"/>
+              </a:solidFill>
+              <a:latin typeface="Consolas"/>
+            </a:endParaRPr>
+          </a:p>
+          <a:p>
+            <a:r>
+              <a:rPr lang="en-US" sz="1200" dirty="0" smtClean="0">
+                <a:solidFill>
+                  <a:srgbClr val="2B91AF"/>
+                </a:solidFill>
+                <a:latin typeface="Consolas"/>
+              </a:rPr>
+              <a:t>        </a:t>
+            </a:r>
+            <a:r>
+              <a:rPr lang="en-US" sz="1200" dirty="0" err="1" smtClean="0">
+                <a:solidFill>
+                  <a:srgbClr val="2B91AF"/>
+                </a:solidFill>
+                <a:latin typeface="Consolas"/>
+              </a:rPr>
+              <a:t>Console</a:t>
+            </a:r>
+            <a:r>
+              <a:rPr lang="en-US" sz="1200" dirty="0" err="1" smtClean="0">
+                <a:solidFill>
+                  <a:prstClr val="black"/>
+                </a:solidFill>
+                <a:latin typeface="Consolas"/>
+              </a:rPr>
+              <a:t>.WriteLine</a:t>
+            </a:r>
+            <a:r>
+              <a:rPr lang="en-US" sz="1200" dirty="0">
+                <a:solidFill>
+                  <a:prstClr val="black"/>
+                </a:solidFill>
+                <a:latin typeface="Consolas"/>
+              </a:rPr>
+              <a:t>(</a:t>
+            </a:r>
+            <a:r>
+              <a:rPr lang="en-US" sz="1200" dirty="0">
+                <a:solidFill>
+                  <a:srgbClr val="A31515"/>
+                </a:solidFill>
+                <a:latin typeface="Consolas"/>
+              </a:rPr>
+              <a:t>"</a:t>
+            </a:r>
+            <a:r>
+              <a:rPr lang="ru-RU" sz="1200" dirty="0">
+                <a:solidFill>
+                  <a:srgbClr val="A31515"/>
+                </a:solidFill>
+                <a:latin typeface="Consolas"/>
+              </a:rPr>
+              <a:t>Файловая система: </a:t>
+            </a:r>
+            <a:r>
+              <a:rPr lang="ru-RU" sz="1200" dirty="0">
+                <a:solidFill>
+                  <a:srgbClr val="3CB371"/>
+                </a:solidFill>
+                <a:latin typeface="Consolas"/>
+              </a:rPr>
+              <a:t>{0}</a:t>
+            </a:r>
+            <a:r>
+              <a:rPr lang="ru-RU" sz="1200" dirty="0">
+                <a:solidFill>
+                  <a:srgbClr val="A31515"/>
+                </a:solidFill>
+                <a:latin typeface="Consolas"/>
+              </a:rPr>
+              <a:t>"</a:t>
+            </a:r>
+            <a:r>
+              <a:rPr lang="ru-RU" sz="1200" dirty="0">
+                <a:solidFill>
+                  <a:prstClr val="black"/>
+                </a:solidFill>
+                <a:latin typeface="Consolas"/>
+              </a:rPr>
+              <a:t>, </a:t>
+            </a:r>
+            <a:r>
+              <a:rPr lang="en-US" sz="1200" dirty="0" err="1">
+                <a:solidFill>
+                  <a:prstClr val="black"/>
+                </a:solidFill>
+                <a:latin typeface="Consolas"/>
+              </a:rPr>
+              <a:t>driveInfo</a:t>
+            </a:r>
+            <a:r>
+              <a:rPr lang="en-US" sz="1200" dirty="0" err="1" smtClean="0">
+                <a:solidFill>
+                  <a:prstClr val="black"/>
+                </a:solidFill>
+                <a:latin typeface="Consolas"/>
+              </a:rPr>
+              <a:t>.DriveFormat</a:t>
+            </a:r>
+            <a:r>
+              <a:rPr lang="en-US" sz="1200" dirty="0">
+                <a:solidFill>
+                  <a:prstClr val="black"/>
+                </a:solidFill>
+                <a:latin typeface="Consolas"/>
+              </a:rPr>
+              <a:t>);</a:t>
+            </a:r>
+          </a:p>
+          <a:p>
+            <a:r>
+              <a:rPr lang="en-US" sz="1200" dirty="0" smtClean="0">
+                <a:solidFill>
+                  <a:srgbClr val="2B91AF"/>
+                </a:solidFill>
+                <a:latin typeface="Consolas"/>
+              </a:rPr>
+              <a:t>        </a:t>
+            </a:r>
+            <a:r>
+              <a:rPr lang="en-US" sz="1200" dirty="0" err="1" smtClean="0">
+                <a:solidFill>
+                  <a:srgbClr val="2B91AF"/>
+                </a:solidFill>
+                <a:latin typeface="Consolas"/>
+              </a:rPr>
+              <a:t>Console</a:t>
+            </a:r>
+            <a:r>
+              <a:rPr lang="en-US" sz="1200" dirty="0" err="1" smtClean="0">
+                <a:solidFill>
+                  <a:prstClr val="black"/>
+                </a:solidFill>
+                <a:latin typeface="Consolas"/>
+              </a:rPr>
+              <a:t>.WriteLine</a:t>
+            </a:r>
+            <a:r>
+              <a:rPr lang="en-US" sz="1200" dirty="0">
+                <a:solidFill>
+                  <a:prstClr val="black"/>
+                </a:solidFill>
+                <a:latin typeface="Consolas"/>
+              </a:rPr>
+              <a:t>(</a:t>
+            </a:r>
+            <a:r>
+              <a:rPr lang="en-US" sz="1200" dirty="0">
+                <a:solidFill>
+                  <a:srgbClr val="A31515"/>
+                </a:solidFill>
+                <a:latin typeface="Consolas"/>
+              </a:rPr>
+              <a:t>"</a:t>
+            </a:r>
+            <a:r>
+              <a:rPr lang="ru-RU" sz="1200" dirty="0">
+                <a:solidFill>
+                  <a:srgbClr val="A31515"/>
+                </a:solidFill>
+                <a:latin typeface="Consolas"/>
+              </a:rPr>
+              <a:t>Готов?          : </a:t>
+            </a:r>
+            <a:r>
+              <a:rPr lang="ru-RU" sz="1200" dirty="0">
+                <a:solidFill>
+                  <a:srgbClr val="3CB371"/>
+                </a:solidFill>
+                <a:latin typeface="Consolas"/>
+              </a:rPr>
+              <a:t>{0}</a:t>
+            </a:r>
+            <a:r>
+              <a:rPr lang="ru-RU" sz="1200" dirty="0">
+                <a:solidFill>
+                  <a:srgbClr val="A31515"/>
+                </a:solidFill>
+                <a:latin typeface="Consolas"/>
+              </a:rPr>
+              <a:t>"</a:t>
+            </a:r>
+            <a:r>
+              <a:rPr lang="ru-RU" sz="1200" dirty="0">
+                <a:solidFill>
+                  <a:prstClr val="black"/>
+                </a:solidFill>
+                <a:latin typeface="Consolas"/>
+              </a:rPr>
+              <a:t>, </a:t>
+            </a:r>
+            <a:r>
+              <a:rPr lang="en-US" sz="1200" dirty="0" err="1">
+                <a:solidFill>
+                  <a:prstClr val="black"/>
+                </a:solidFill>
+                <a:latin typeface="Consolas"/>
+              </a:rPr>
+              <a:t>driveInfo</a:t>
+            </a:r>
+            <a:r>
+              <a:rPr lang="en-US" sz="1200" dirty="0" err="1" smtClean="0">
+                <a:solidFill>
+                  <a:prstClr val="black"/>
+                </a:solidFill>
+                <a:latin typeface="Consolas"/>
+              </a:rPr>
+              <a:t>.IsReady</a:t>
+            </a:r>
+            <a:r>
+              <a:rPr lang="en-US" sz="1200" dirty="0">
+                <a:solidFill>
+                  <a:prstClr val="black"/>
+                </a:solidFill>
+                <a:latin typeface="Consolas"/>
+              </a:rPr>
+              <a:t>);</a:t>
+            </a:r>
+          </a:p>
+          <a:p>
+            <a:r>
+              <a:rPr lang="en-US" sz="1200" dirty="0" smtClean="0">
+                <a:solidFill>
+                  <a:srgbClr val="2B91AF"/>
+                </a:solidFill>
+                <a:latin typeface="Consolas"/>
+              </a:rPr>
+              <a:t>        </a:t>
+            </a:r>
+            <a:r>
+              <a:rPr lang="en-US" sz="1200" dirty="0" err="1" smtClean="0">
+                <a:solidFill>
+                  <a:srgbClr val="2B91AF"/>
+                </a:solidFill>
+                <a:latin typeface="Consolas"/>
+              </a:rPr>
+              <a:t>Console</a:t>
+            </a:r>
+            <a:r>
+              <a:rPr lang="en-US" sz="1200" dirty="0" err="1" smtClean="0">
+                <a:solidFill>
+                  <a:prstClr val="black"/>
+                </a:solidFill>
+                <a:latin typeface="Consolas"/>
+              </a:rPr>
+              <a:t>.WriteLine</a:t>
+            </a:r>
+            <a:r>
+              <a:rPr lang="en-US" sz="1200" dirty="0">
+                <a:solidFill>
+                  <a:prstClr val="black"/>
+                </a:solidFill>
+                <a:latin typeface="Consolas"/>
+              </a:rPr>
+              <a:t>(</a:t>
+            </a:r>
+            <a:r>
+              <a:rPr lang="en-US" sz="1200" dirty="0">
+                <a:solidFill>
+                  <a:srgbClr val="A31515"/>
+                </a:solidFill>
+                <a:latin typeface="Consolas"/>
+              </a:rPr>
+              <a:t>"</a:t>
+            </a:r>
+            <a:r>
+              <a:rPr lang="ru-RU" sz="1200" dirty="0">
+                <a:solidFill>
+                  <a:srgbClr val="A31515"/>
+                </a:solidFill>
+                <a:latin typeface="Consolas"/>
+              </a:rPr>
+              <a:t>Корень          : </a:t>
+            </a:r>
+            <a:r>
+              <a:rPr lang="ru-RU" sz="1200" dirty="0">
+                <a:solidFill>
+                  <a:srgbClr val="3CB371"/>
+                </a:solidFill>
+                <a:latin typeface="Consolas"/>
+              </a:rPr>
+              <a:t>{0}</a:t>
+            </a:r>
+            <a:r>
+              <a:rPr lang="ru-RU" sz="1200" dirty="0">
+                <a:solidFill>
+                  <a:srgbClr val="A31515"/>
+                </a:solidFill>
+                <a:latin typeface="Consolas"/>
+              </a:rPr>
+              <a:t>"</a:t>
+            </a:r>
+            <a:r>
+              <a:rPr lang="ru-RU" sz="1200" dirty="0">
+                <a:solidFill>
+                  <a:prstClr val="black"/>
+                </a:solidFill>
+                <a:latin typeface="Consolas"/>
+              </a:rPr>
+              <a:t>, </a:t>
+            </a:r>
+            <a:r>
+              <a:rPr lang="en-US" sz="1200" dirty="0" err="1">
+                <a:solidFill>
+                  <a:prstClr val="black"/>
+                </a:solidFill>
+                <a:latin typeface="Consolas"/>
+              </a:rPr>
+              <a:t>driveInfo</a:t>
+            </a:r>
+            <a:r>
+              <a:rPr lang="en-US" sz="1200" dirty="0" err="1" smtClean="0">
+                <a:solidFill>
+                  <a:prstClr val="black"/>
+                </a:solidFill>
+                <a:latin typeface="Consolas"/>
+              </a:rPr>
+              <a:t>.RootDirectory</a:t>
+            </a:r>
+            <a:r>
+              <a:rPr lang="en-US" sz="1200" dirty="0">
+                <a:solidFill>
+                  <a:prstClr val="black"/>
+                </a:solidFill>
+                <a:latin typeface="Consolas"/>
+              </a:rPr>
+              <a:t>);</a:t>
+            </a:r>
+          </a:p>
+          <a:p>
+            <a:r>
+              <a:rPr lang="pt-BR" sz="1200" dirty="0" smtClean="0">
+                <a:solidFill>
+                  <a:srgbClr val="2B91AF"/>
+                </a:solidFill>
+                <a:latin typeface="Consolas"/>
+              </a:rPr>
+              <a:t>        Console</a:t>
+            </a:r>
+            <a:r>
+              <a:rPr lang="pt-BR" sz="1200" dirty="0" smtClean="0">
+                <a:solidFill>
+                  <a:prstClr val="black"/>
+                </a:solidFill>
+                <a:latin typeface="Consolas"/>
+              </a:rPr>
+              <a:t>.WriteLine</a:t>
+            </a:r>
+            <a:r>
+              <a:rPr lang="pt-BR" sz="1200" dirty="0">
+                <a:solidFill>
+                  <a:prstClr val="black"/>
+                </a:solidFill>
+                <a:latin typeface="Consolas"/>
+              </a:rPr>
+              <a:t>(</a:t>
+            </a:r>
+            <a:r>
+              <a:rPr lang="pt-BR" sz="1200" dirty="0">
+                <a:solidFill>
+                  <a:srgbClr val="A31515"/>
+                </a:solidFill>
+                <a:latin typeface="Consolas"/>
+              </a:rPr>
+              <a:t>"Свободное место : </a:t>
+            </a:r>
+            <a:r>
+              <a:rPr lang="pt-BR" sz="1200" dirty="0">
+                <a:solidFill>
+                  <a:srgbClr val="3CB371"/>
+                </a:solidFill>
+                <a:latin typeface="Consolas"/>
+              </a:rPr>
+              <a:t>{0:N0}</a:t>
+            </a:r>
+            <a:r>
+              <a:rPr lang="pt-BR" sz="1200" dirty="0">
+                <a:solidFill>
+                  <a:srgbClr val="A31515"/>
+                </a:solidFill>
+                <a:latin typeface="Consolas"/>
+              </a:rPr>
+              <a:t> bytes"</a:t>
+            </a:r>
+            <a:r>
+              <a:rPr lang="pt-BR" sz="1200" dirty="0">
+                <a:solidFill>
+                  <a:prstClr val="black"/>
+                </a:solidFill>
+                <a:latin typeface="Consolas"/>
+              </a:rPr>
+              <a:t>, </a:t>
+            </a:r>
+            <a:r>
+              <a:rPr lang="en-US" sz="1200" dirty="0" err="1">
+                <a:solidFill>
+                  <a:prstClr val="black"/>
+                </a:solidFill>
+                <a:latin typeface="Consolas"/>
+              </a:rPr>
+              <a:t>driveInfo</a:t>
+            </a:r>
+            <a:r>
+              <a:rPr lang="pt-BR" sz="1200" dirty="0" smtClean="0">
+                <a:solidFill>
+                  <a:prstClr val="black"/>
+                </a:solidFill>
+                <a:latin typeface="Consolas"/>
+              </a:rPr>
+              <a:t>.TotalFreeSpace</a:t>
+            </a:r>
+            <a:r>
+              <a:rPr lang="pt-BR" sz="1200" dirty="0">
+                <a:solidFill>
+                  <a:prstClr val="black"/>
+                </a:solidFill>
+                <a:latin typeface="Consolas"/>
+              </a:rPr>
+              <a:t>);</a:t>
+            </a:r>
+          </a:p>
+          <a:p>
+            <a:r>
+              <a:rPr lang="en-US" sz="1200" dirty="0" smtClean="0">
+                <a:solidFill>
+                  <a:srgbClr val="2B91AF"/>
+                </a:solidFill>
+                <a:latin typeface="Consolas"/>
+              </a:rPr>
+              <a:t>        </a:t>
+            </a:r>
+            <a:r>
+              <a:rPr lang="en-US" sz="1200" dirty="0" err="1" smtClean="0">
+                <a:solidFill>
+                  <a:srgbClr val="2B91AF"/>
+                </a:solidFill>
+                <a:latin typeface="Consolas"/>
+              </a:rPr>
+              <a:t>Console</a:t>
+            </a:r>
+            <a:r>
+              <a:rPr lang="en-US" sz="1200" dirty="0" err="1" smtClean="0">
+                <a:solidFill>
+                  <a:prstClr val="black"/>
+                </a:solidFill>
+                <a:latin typeface="Consolas"/>
+              </a:rPr>
+              <a:t>.WriteLine</a:t>
+            </a:r>
+            <a:r>
+              <a:rPr lang="en-US" sz="1200" dirty="0">
+                <a:solidFill>
+                  <a:prstClr val="black"/>
+                </a:solidFill>
+                <a:latin typeface="Consolas"/>
+              </a:rPr>
+              <a:t>(</a:t>
+            </a:r>
+            <a:r>
+              <a:rPr lang="en-US" sz="1200" dirty="0">
+                <a:solidFill>
+                  <a:srgbClr val="A31515"/>
+                </a:solidFill>
+                <a:latin typeface="Consolas"/>
+              </a:rPr>
+              <a:t>"</a:t>
+            </a:r>
+            <a:r>
+              <a:rPr lang="ru-RU" sz="1200" dirty="0">
+                <a:solidFill>
+                  <a:srgbClr val="A31515"/>
+                </a:solidFill>
+                <a:latin typeface="Consolas"/>
+              </a:rPr>
+              <a:t>Размер          : </a:t>
+            </a:r>
+            <a:r>
+              <a:rPr lang="ru-RU" sz="1200" dirty="0">
+                <a:solidFill>
+                  <a:srgbClr val="3CB371"/>
+                </a:solidFill>
+                <a:latin typeface="Consolas"/>
+              </a:rPr>
+              <a:t>{0:</a:t>
+            </a:r>
+            <a:r>
+              <a:rPr lang="en-US" sz="1200" dirty="0">
+                <a:solidFill>
+                  <a:srgbClr val="3CB371"/>
+                </a:solidFill>
+                <a:latin typeface="Consolas"/>
+              </a:rPr>
+              <a:t>N0}</a:t>
+            </a:r>
+            <a:r>
+              <a:rPr lang="en-US" sz="1200" dirty="0">
+                <a:solidFill>
+                  <a:srgbClr val="A31515"/>
+                </a:solidFill>
+                <a:latin typeface="Consolas"/>
+              </a:rPr>
+              <a:t> bytes"</a:t>
+            </a:r>
+            <a:r>
+              <a:rPr lang="en-US" sz="1200" dirty="0">
+                <a:solidFill>
+                  <a:prstClr val="black"/>
+                </a:solidFill>
+                <a:latin typeface="Consolas"/>
+              </a:rPr>
+              <a:t>, </a:t>
+            </a:r>
+            <a:r>
+              <a:rPr lang="en-US" sz="1200" dirty="0" err="1">
+                <a:solidFill>
+                  <a:prstClr val="black"/>
+                </a:solidFill>
+                <a:latin typeface="Consolas"/>
+              </a:rPr>
+              <a:t>driveInfo</a:t>
+            </a:r>
+            <a:r>
+              <a:rPr lang="en-US" sz="1200" dirty="0" err="1" smtClean="0">
+                <a:solidFill>
+                  <a:prstClr val="black"/>
+                </a:solidFill>
+                <a:latin typeface="Consolas"/>
+              </a:rPr>
+              <a:t>.TotalSize</a:t>
+            </a:r>
+            <a:r>
+              <a:rPr lang="en-US" sz="1200" dirty="0">
+                <a:solidFill>
+                  <a:prstClr val="black"/>
+                </a:solidFill>
+                <a:latin typeface="Consolas"/>
+              </a:rPr>
+              <a:t>);</a:t>
+            </a:r>
+          </a:p>
+          <a:p>
+            <a:r>
+              <a:rPr lang="en-US" sz="1200" dirty="0" smtClean="0">
+                <a:solidFill>
+                  <a:srgbClr val="2B91AF"/>
+                </a:solidFill>
+                <a:latin typeface="Consolas"/>
+              </a:rPr>
+              <a:t>        </a:t>
+            </a:r>
+            <a:r>
+              <a:rPr lang="en-US" sz="1200" dirty="0" err="1" smtClean="0">
+                <a:solidFill>
+                  <a:srgbClr val="2B91AF"/>
+                </a:solidFill>
+                <a:latin typeface="Consolas"/>
+              </a:rPr>
+              <a:t>Console</a:t>
+            </a:r>
+            <a:r>
+              <a:rPr lang="en-US" sz="1200" dirty="0" err="1" smtClean="0">
+                <a:solidFill>
+                  <a:prstClr val="black"/>
+                </a:solidFill>
+                <a:latin typeface="Consolas"/>
+              </a:rPr>
+              <a:t>.WriteLine</a:t>
+            </a:r>
+            <a:r>
+              <a:rPr lang="en-US" sz="1200" dirty="0">
+                <a:solidFill>
+                  <a:prstClr val="black"/>
+                </a:solidFill>
+                <a:latin typeface="Consolas"/>
+              </a:rPr>
+              <a:t>(</a:t>
+            </a:r>
+            <a:r>
+              <a:rPr lang="en-US" sz="1200" dirty="0">
+                <a:solidFill>
+                  <a:srgbClr val="A31515"/>
+                </a:solidFill>
+                <a:latin typeface="Consolas"/>
+              </a:rPr>
+              <a:t>"</a:t>
+            </a:r>
+            <a:r>
+              <a:rPr lang="ru-RU" sz="1200" dirty="0">
+                <a:solidFill>
+                  <a:srgbClr val="A31515"/>
+                </a:solidFill>
+                <a:latin typeface="Consolas"/>
+              </a:rPr>
+              <a:t>Метка диска     : </a:t>
+            </a:r>
+            <a:r>
+              <a:rPr lang="ru-RU" sz="1200" dirty="0">
+                <a:solidFill>
+                  <a:srgbClr val="3CB371"/>
+                </a:solidFill>
+                <a:latin typeface="Consolas"/>
+              </a:rPr>
+              <a:t>{0}</a:t>
+            </a:r>
+            <a:r>
+              <a:rPr lang="ru-RU" sz="1200" dirty="0">
+                <a:solidFill>
+                  <a:srgbClr val="A31515"/>
+                </a:solidFill>
+                <a:latin typeface="Consolas"/>
+              </a:rPr>
+              <a:t>"</a:t>
+            </a:r>
+            <a:r>
+              <a:rPr lang="ru-RU" sz="1200" dirty="0">
+                <a:solidFill>
+                  <a:prstClr val="black"/>
+                </a:solidFill>
+                <a:latin typeface="Consolas"/>
+              </a:rPr>
+              <a:t>, </a:t>
+            </a:r>
+            <a:r>
+              <a:rPr lang="en-US" sz="1200" dirty="0" err="1">
+                <a:solidFill>
+                  <a:prstClr val="black"/>
+                </a:solidFill>
+                <a:latin typeface="Consolas"/>
+              </a:rPr>
+              <a:t>driveInfo</a:t>
+            </a:r>
+            <a:r>
+              <a:rPr lang="en-US" sz="1200" dirty="0" err="1" smtClean="0">
+                <a:solidFill>
+                  <a:prstClr val="black"/>
+                </a:solidFill>
+                <a:latin typeface="Consolas"/>
+              </a:rPr>
+              <a:t>.VolumeLabel</a:t>
+            </a:r>
+            <a:r>
+              <a:rPr lang="en-US" sz="1200" dirty="0">
+                <a:solidFill>
+                  <a:prstClr val="black"/>
+                </a:solidFill>
+                <a:latin typeface="Consolas"/>
+              </a:rPr>
+              <a:t>);</a:t>
+            </a:r>
+          </a:p>
+          <a:p>
+            <a:r>
+              <a:rPr lang="en-US" sz="1200" dirty="0" smtClean="0">
+                <a:solidFill>
+                  <a:prstClr val="black"/>
+                </a:solidFill>
+                <a:latin typeface="Consolas"/>
+              </a:rPr>
+              <a:t>    </a:t>
+            </a:r>
+            <a:r>
+              <a:rPr lang="ru-RU" sz="1200" dirty="0" smtClean="0">
+                <a:solidFill>
+                  <a:prstClr val="black"/>
+                </a:solidFill>
+                <a:latin typeface="Consolas"/>
+              </a:rPr>
+              <a:t>}</a:t>
+            </a:r>
+            <a:endParaRPr lang="ru-RU" sz="1200" dirty="0">
+              <a:solidFill>
+                <a:prstClr val="black"/>
+              </a:solidFill>
+              <a:latin typeface="Consolas"/>
+            </a:endParaRPr>
+          </a:p>
+          <a:p>
+            <a:r>
+              <a:rPr lang="ru-RU" sz="1200" dirty="0">
+                <a:solidFill>
+                  <a:prstClr val="black"/>
+                </a:solidFill>
+                <a:latin typeface="Consolas"/>
+              </a:rPr>
+              <a:t>}</a:t>
+            </a:r>
+          </a:p>
+          <a:p>
+            <a:endParaRPr lang="ru-RU" sz="1200" dirty="0">
+              <a:solidFill>
+                <a:prstClr val="black"/>
+              </a:solidFill>
+              <a:latin typeface="Consolas"/>
+            </a:endParaRPr>
+          </a:p>
+          <a:p>
             <a:pPr marL="0" marR="0" lvl="0" indent="0" algn="l" defTabSz="914400" rtl="0" eaLnBrk="1" fontAlgn="base" latinLnBrk="0" hangingPunct="1">
               <a:lnSpc>
                 <a:spcPct val="100000"/>
@@ -8628,1366 +9865,10 @@
               <a:buNone/>
               <a:tabLst/>
             </a:pPr>
-            <a:r>
-              <a:rPr kumimoji="0" lang="ru-RU" altLang="ru-RU" sz="1200" b="0" i="0" u="none" strike="noStrike" cap="none" normalizeH="0" baseline="0" dirty="0" smtClean="0">
-                <a:ln>
-                  <a:noFill/>
-                </a:ln>
-                <a:solidFill>
-                  <a:srgbClr val="008000"/>
-                </a:solidFill>
-                <a:effectLst/>
-                <a:latin typeface="Courier New" panose="02070309020205020404" pitchFamily="49" charset="0"/>
-                <a:cs typeface="Courier New" panose="02070309020205020404" pitchFamily="49" charset="0"/>
-              </a:rPr>
-              <a:t>//DriveInfo di = new DriveInfo(@"C:\");</a:t>
-            </a:r>
             <a:endParaRPr lang="en-US" altLang="ru-RU" sz="1200" dirty="0">
               <a:solidFill>
                 <a:srgbClr val="000000"/>
               </a:solidFill>
-              <a:latin typeface="Courier New" panose="02070309020205020404" pitchFamily="49" charset="0"/>
-              <a:cs typeface="Courier New" panose="02070309020205020404" pitchFamily="49" charset="0"/>
-            </a:endParaRPr>
-          </a:p>
-          <a:p>
-            <a:pPr marL="0" marR="0" lvl="0" indent="0" algn="l" defTabSz="914400" rtl="0" eaLnBrk="1" fontAlgn="base" latinLnBrk="0" hangingPunct="1">
-              <a:lnSpc>
-                <a:spcPct val="100000"/>
-              </a:lnSpc>
-              <a:spcBef>
-                <a:spcPct val="0"/>
-              </a:spcBef>
-              <a:spcAft>
-                <a:spcPct val="0"/>
-              </a:spcAft>
-              <a:buClrTx/>
-              <a:buSzTx/>
-              <a:buFontTx/>
-              <a:buNone/>
-              <a:tabLst/>
-            </a:pPr>
-            <a:r>
-              <a:rPr kumimoji="0" lang="ru-RU" altLang="ru-RU" sz="1200" b="0" i="0" u="none" strike="noStrike" cap="none" normalizeH="0" baseline="0" dirty="0" smtClean="0">
-                <a:ln>
-                  <a:noFill/>
-                </a:ln>
-                <a:solidFill>
-                  <a:srgbClr val="2B91AF"/>
-                </a:solidFill>
-                <a:effectLst/>
-                <a:latin typeface="Courier New" panose="02070309020205020404" pitchFamily="49" charset="0"/>
-                <a:cs typeface="Courier New" panose="02070309020205020404" pitchFamily="49" charset="0"/>
-              </a:rPr>
-              <a:t>DriveInfo</a:t>
-            </a:r>
-            <a:r>
-              <a:rPr kumimoji="0" lang="ru-RU" altLang="ru-RU" sz="1200" b="0" i="0" u="none" strike="noStrike" cap="none" normalizeH="0" baseline="0" dirty="0" smtClean="0">
-                <a:ln>
-                  <a:noFill/>
-                </a:ln>
-                <a:solidFill>
-                  <a:srgbClr val="000000"/>
-                </a:solidFill>
-                <a:effectLst/>
-                <a:latin typeface="Courier New" panose="02070309020205020404" pitchFamily="49" charset="0"/>
-                <a:cs typeface="Courier New" panose="02070309020205020404" pitchFamily="49" charset="0"/>
-              </a:rPr>
-              <a:t>[] drives = </a:t>
-            </a:r>
-            <a:r>
-              <a:rPr kumimoji="0" lang="ru-RU" altLang="ru-RU" sz="1200" b="0" i="0" u="none" strike="noStrike" cap="none" normalizeH="0" baseline="0" dirty="0" smtClean="0">
-                <a:ln>
-                  <a:noFill/>
-                </a:ln>
-                <a:solidFill>
-                  <a:srgbClr val="2B91AF"/>
-                </a:solidFill>
-                <a:effectLst/>
-                <a:latin typeface="Courier New" panose="02070309020205020404" pitchFamily="49" charset="0"/>
-                <a:cs typeface="Courier New" panose="02070309020205020404" pitchFamily="49" charset="0"/>
-              </a:rPr>
-              <a:t>DriveInfo</a:t>
-            </a:r>
-            <a:r>
-              <a:rPr kumimoji="0" lang="ru-RU" altLang="ru-RU" sz="1200" b="0" i="0" u="none" strike="noStrike" cap="none" normalizeH="0" baseline="0" dirty="0" smtClean="0">
-                <a:ln>
-                  <a:noFill/>
-                </a:ln>
-                <a:solidFill>
-                  <a:srgbClr val="000000"/>
-                </a:solidFill>
-                <a:effectLst/>
-                <a:latin typeface="Courier New" panose="02070309020205020404" pitchFamily="49" charset="0"/>
-                <a:cs typeface="Courier New" panose="02070309020205020404" pitchFamily="49" charset="0"/>
-              </a:rPr>
-              <a:t>.GetDrives();</a:t>
-            </a:r>
-            <a:endParaRPr kumimoji="0" lang="en-US" altLang="ru-RU" sz="1200" b="0" i="0" u="none" strike="noStrike" cap="none" normalizeH="0" baseline="0" dirty="0" smtClean="0">
-              <a:ln>
-                <a:noFill/>
-              </a:ln>
-              <a:solidFill>
-                <a:srgbClr val="000000"/>
-              </a:solidFill>
-              <a:effectLst/>
-              <a:latin typeface="Courier New" panose="02070309020205020404" pitchFamily="49" charset="0"/>
-              <a:cs typeface="Courier New" panose="02070309020205020404" pitchFamily="49" charset="0"/>
-            </a:endParaRPr>
-          </a:p>
-          <a:p>
-            <a:pPr marL="0" marR="0" lvl="0" indent="0" algn="l" defTabSz="914400" rtl="0" eaLnBrk="1" fontAlgn="base" latinLnBrk="0" hangingPunct="1">
-              <a:lnSpc>
-                <a:spcPct val="100000"/>
-              </a:lnSpc>
-              <a:spcBef>
-                <a:spcPct val="0"/>
-              </a:spcBef>
-              <a:spcAft>
-                <a:spcPct val="0"/>
-              </a:spcAft>
-              <a:buClrTx/>
-              <a:buSzTx/>
-              <a:buFontTx/>
-              <a:buNone/>
-              <a:tabLst/>
-            </a:pPr>
-            <a:r>
-              <a:rPr kumimoji="0" lang="ru-RU" altLang="ru-RU" sz="1200" b="0" i="0" u="none" strike="noStrike" cap="none" normalizeH="0" baseline="0" dirty="0" smtClean="0">
-                <a:ln>
-                  <a:noFill/>
-                </a:ln>
-                <a:solidFill>
-                  <a:srgbClr val="0000FF"/>
-                </a:solidFill>
-                <a:effectLst/>
-                <a:latin typeface="Courier New" panose="02070309020205020404" pitchFamily="49" charset="0"/>
-                <a:cs typeface="Courier New" panose="02070309020205020404" pitchFamily="49" charset="0"/>
-              </a:rPr>
-              <a:t>foreach</a:t>
-            </a:r>
-            <a:r>
-              <a:rPr kumimoji="0" lang="ru-RU" altLang="ru-RU" sz="1200" b="0" i="0" u="none" strike="noStrike" cap="none" normalizeH="0" baseline="0" dirty="0" smtClean="0">
-                <a:ln>
-                  <a:noFill/>
-                </a:ln>
-                <a:solidFill>
-                  <a:srgbClr val="000000"/>
-                </a:solidFill>
-                <a:effectLst/>
-                <a:latin typeface="Courier New" panose="02070309020205020404" pitchFamily="49" charset="0"/>
-                <a:cs typeface="Courier New" panose="02070309020205020404" pitchFamily="49" charset="0"/>
-              </a:rPr>
-              <a:t> (</a:t>
-            </a:r>
-            <a:r>
-              <a:rPr kumimoji="0" lang="ru-RU" altLang="ru-RU" sz="1200" b="0" i="0" u="none" strike="noStrike" cap="none" normalizeH="0" baseline="0" dirty="0" smtClean="0">
-                <a:ln>
-                  <a:noFill/>
-                </a:ln>
-                <a:solidFill>
-                  <a:srgbClr val="2B91AF"/>
-                </a:solidFill>
-                <a:effectLst/>
-                <a:latin typeface="Courier New" panose="02070309020205020404" pitchFamily="49" charset="0"/>
-                <a:cs typeface="Courier New" panose="02070309020205020404" pitchFamily="49" charset="0"/>
-              </a:rPr>
-              <a:t>DriveInfo</a:t>
-            </a:r>
-            <a:r>
-              <a:rPr kumimoji="0" lang="ru-RU" altLang="ru-RU" sz="1200" b="0" i="0" u="none" strike="noStrike" cap="none" normalizeH="0" baseline="0" dirty="0" smtClean="0">
-                <a:ln>
-                  <a:noFill/>
-                </a:ln>
-                <a:solidFill>
-                  <a:srgbClr val="000000"/>
-                </a:solidFill>
-                <a:effectLst/>
-                <a:latin typeface="Courier New" panose="02070309020205020404" pitchFamily="49" charset="0"/>
-                <a:cs typeface="Courier New" panose="02070309020205020404" pitchFamily="49" charset="0"/>
-              </a:rPr>
-              <a:t> di </a:t>
-            </a:r>
-            <a:r>
-              <a:rPr kumimoji="0" lang="ru-RU" altLang="ru-RU" sz="1200" b="0" i="0" u="none" strike="noStrike" cap="none" normalizeH="0" baseline="0" dirty="0" smtClean="0">
-                <a:ln>
-                  <a:noFill/>
-                </a:ln>
-                <a:solidFill>
-                  <a:srgbClr val="0000FF"/>
-                </a:solidFill>
-                <a:effectLst/>
-                <a:latin typeface="Courier New" panose="02070309020205020404" pitchFamily="49" charset="0"/>
-                <a:cs typeface="Courier New" panose="02070309020205020404" pitchFamily="49" charset="0"/>
-              </a:rPr>
-              <a:t>in</a:t>
-            </a:r>
-            <a:r>
-              <a:rPr kumimoji="0" lang="ru-RU" altLang="ru-RU" sz="1200" b="0" i="0" u="none" strike="noStrike" cap="none" normalizeH="0" baseline="0" dirty="0" smtClean="0">
-                <a:ln>
-                  <a:noFill/>
-                </a:ln>
-                <a:solidFill>
-                  <a:srgbClr val="000000"/>
-                </a:solidFill>
-                <a:effectLst/>
-                <a:latin typeface="Courier New" panose="02070309020205020404" pitchFamily="49" charset="0"/>
-                <a:cs typeface="Courier New" panose="02070309020205020404" pitchFamily="49" charset="0"/>
-              </a:rPr>
-              <a:t> drives)</a:t>
-            </a:r>
-            <a:endParaRPr kumimoji="0" lang="en-US" altLang="ru-RU" sz="1200" b="0" i="0" u="none" strike="noStrike" cap="none" normalizeH="0" baseline="0" dirty="0" smtClean="0">
-              <a:ln>
-                <a:noFill/>
-              </a:ln>
-              <a:solidFill>
-                <a:srgbClr val="000000"/>
-              </a:solidFill>
-              <a:effectLst/>
-              <a:latin typeface="Courier New" panose="02070309020205020404" pitchFamily="49" charset="0"/>
-              <a:cs typeface="Courier New" panose="02070309020205020404" pitchFamily="49" charset="0"/>
-            </a:endParaRPr>
-          </a:p>
-          <a:p>
-            <a:pPr marL="0" marR="0" lvl="0" indent="0" algn="l" defTabSz="914400" rtl="0" eaLnBrk="1" fontAlgn="base" latinLnBrk="0" hangingPunct="1">
-              <a:lnSpc>
-                <a:spcPct val="100000"/>
-              </a:lnSpc>
-              <a:spcBef>
-                <a:spcPct val="0"/>
-              </a:spcBef>
-              <a:spcAft>
-                <a:spcPct val="0"/>
-              </a:spcAft>
-              <a:buClrTx/>
-              <a:buSzTx/>
-              <a:buFontTx/>
-              <a:buNone/>
-              <a:tabLst/>
-            </a:pPr>
-            <a:r>
-              <a:rPr kumimoji="0" lang="ru-RU" altLang="ru-RU" sz="1200" b="0" i="0" u="none" strike="noStrike" cap="none" normalizeH="0" baseline="0" dirty="0" smtClean="0">
-                <a:ln>
-                  <a:noFill/>
-                </a:ln>
-                <a:solidFill>
-                  <a:srgbClr val="000000"/>
-                </a:solidFill>
-                <a:effectLst/>
-                <a:latin typeface="Courier New" panose="02070309020205020404" pitchFamily="49" charset="0"/>
-                <a:cs typeface="Courier New" panose="02070309020205020404" pitchFamily="49" charset="0"/>
-              </a:rPr>
-              <a:t>{</a:t>
-            </a:r>
-            <a:endParaRPr kumimoji="0" lang="en-US" altLang="ru-RU" sz="1200" b="0" i="0" u="none" strike="noStrike" cap="none" normalizeH="0" baseline="0" dirty="0" smtClean="0">
-              <a:ln>
-                <a:noFill/>
-              </a:ln>
-              <a:solidFill>
-                <a:srgbClr val="000000"/>
-              </a:solidFill>
-              <a:effectLst/>
-              <a:latin typeface="Courier New" panose="02070309020205020404" pitchFamily="49" charset="0"/>
-              <a:cs typeface="Courier New" panose="02070309020205020404" pitchFamily="49" charset="0"/>
-            </a:endParaRPr>
-          </a:p>
-          <a:p>
-            <a:pPr marL="0" marR="0" lvl="0" indent="0" algn="l" defTabSz="914400" rtl="0" eaLnBrk="1" fontAlgn="base" latinLnBrk="0" hangingPunct="1">
-              <a:lnSpc>
-                <a:spcPct val="100000"/>
-              </a:lnSpc>
-              <a:spcBef>
-                <a:spcPct val="0"/>
-              </a:spcBef>
-              <a:spcAft>
-                <a:spcPct val="0"/>
-              </a:spcAft>
-              <a:buClrTx/>
-              <a:buSzTx/>
-              <a:buFontTx/>
-              <a:buNone/>
-              <a:tabLst/>
-            </a:pPr>
-            <a:r>
-              <a:rPr lang="en-US" altLang="ru-RU" sz="1200" dirty="0">
-                <a:solidFill>
-                  <a:srgbClr val="000000"/>
-                </a:solidFill>
-                <a:latin typeface="Courier New" panose="02070309020205020404" pitchFamily="49" charset="0"/>
-                <a:cs typeface="Courier New" panose="02070309020205020404" pitchFamily="49" charset="0"/>
-              </a:rPr>
-              <a:t>	</a:t>
-            </a:r>
-            <a:r>
-              <a:rPr kumimoji="0" lang="ru-RU" altLang="ru-RU" sz="1200" b="0" i="0" u="none" strike="noStrike" cap="none" normalizeH="0" baseline="0" dirty="0" smtClean="0">
-                <a:ln>
-                  <a:noFill/>
-                </a:ln>
-                <a:solidFill>
-                  <a:srgbClr val="2B91AF"/>
-                </a:solidFill>
-                <a:effectLst/>
-                <a:latin typeface="Courier New" panose="02070309020205020404" pitchFamily="49" charset="0"/>
-                <a:cs typeface="Courier New" panose="02070309020205020404" pitchFamily="49" charset="0"/>
-              </a:rPr>
-              <a:t>Console</a:t>
-            </a:r>
-            <a:r>
-              <a:rPr kumimoji="0" lang="ru-RU" altLang="ru-RU" sz="1200" b="0" i="0" u="none" strike="noStrike" cap="none" normalizeH="0" baseline="0" dirty="0" smtClean="0">
-                <a:ln>
-                  <a:noFill/>
-                </a:ln>
-                <a:solidFill>
-                  <a:srgbClr val="000000"/>
-                </a:solidFill>
-                <a:effectLst/>
-                <a:latin typeface="Courier New" panose="02070309020205020404" pitchFamily="49" charset="0"/>
-                <a:cs typeface="Courier New" panose="02070309020205020404" pitchFamily="49" charset="0"/>
-              </a:rPr>
-              <a:t>.WriteLine(</a:t>
-            </a:r>
-            <a:r>
-              <a:rPr kumimoji="0" lang="ru-RU" altLang="ru-RU" sz="1200" b="0" i="0" u="none" strike="noStrike" cap="none" normalizeH="0" baseline="0" dirty="0" smtClean="0">
-                <a:ln>
-                  <a:noFill/>
-                </a:ln>
-                <a:solidFill>
-                  <a:srgbClr val="A31515"/>
-                </a:solidFill>
-                <a:effectLst/>
-                <a:latin typeface="Courier New" panose="02070309020205020404" pitchFamily="49" charset="0"/>
-                <a:cs typeface="Courier New" panose="02070309020205020404" pitchFamily="49" charset="0"/>
-              </a:rPr>
-              <a:t>"---------------------------------"</a:t>
-            </a:r>
-            <a:r>
-              <a:rPr kumimoji="0" lang="ru-RU" altLang="ru-RU" sz="1200" b="0" i="0" u="none" strike="noStrike" cap="none" normalizeH="0" baseline="0" dirty="0" smtClean="0">
-                <a:ln>
-                  <a:noFill/>
-                </a:ln>
-                <a:solidFill>
-                  <a:srgbClr val="000000"/>
-                </a:solidFill>
-                <a:effectLst/>
-                <a:latin typeface="Courier New" panose="02070309020205020404" pitchFamily="49" charset="0"/>
-                <a:cs typeface="Courier New" panose="02070309020205020404" pitchFamily="49" charset="0"/>
-              </a:rPr>
-              <a:t>);</a:t>
-            </a:r>
-            <a:endParaRPr kumimoji="0" lang="en-US" altLang="ru-RU" sz="1200" b="0" i="0" u="none" strike="noStrike" cap="none" normalizeH="0" baseline="0" dirty="0" smtClean="0">
-              <a:ln>
-                <a:noFill/>
-              </a:ln>
-              <a:solidFill>
-                <a:srgbClr val="000000"/>
-              </a:solidFill>
-              <a:effectLst/>
-              <a:latin typeface="Courier New" panose="02070309020205020404" pitchFamily="49" charset="0"/>
-              <a:cs typeface="Courier New" panose="02070309020205020404" pitchFamily="49" charset="0"/>
-            </a:endParaRPr>
-          </a:p>
-          <a:p>
-            <a:pPr marL="0" marR="0" lvl="0" indent="0" algn="l" defTabSz="914400" rtl="0" eaLnBrk="1" fontAlgn="base" latinLnBrk="0" hangingPunct="1">
-              <a:lnSpc>
-                <a:spcPct val="100000"/>
-              </a:lnSpc>
-              <a:spcBef>
-                <a:spcPct val="0"/>
-              </a:spcBef>
-              <a:spcAft>
-                <a:spcPct val="0"/>
-              </a:spcAft>
-              <a:buClrTx/>
-              <a:buSzTx/>
-              <a:buFontTx/>
-              <a:buNone/>
-              <a:tabLst/>
-            </a:pPr>
-            <a:r>
-              <a:rPr lang="en-US" altLang="ru-RU" sz="1200" dirty="0">
-                <a:solidFill>
-                  <a:srgbClr val="000000"/>
-                </a:solidFill>
-                <a:latin typeface="Courier New" panose="02070309020205020404" pitchFamily="49" charset="0"/>
-                <a:cs typeface="Courier New" panose="02070309020205020404" pitchFamily="49" charset="0"/>
-              </a:rPr>
-              <a:t>	</a:t>
-            </a:r>
-            <a:r>
-              <a:rPr kumimoji="0" lang="ru-RU" altLang="ru-RU" sz="1200" b="0" i="0" u="none" strike="noStrike" cap="none" normalizeH="0" baseline="0" dirty="0" smtClean="0">
-                <a:ln>
-                  <a:noFill/>
-                </a:ln>
-                <a:solidFill>
-                  <a:srgbClr val="2B91AF"/>
-                </a:solidFill>
-                <a:effectLst/>
-                <a:latin typeface="Courier New" panose="02070309020205020404" pitchFamily="49" charset="0"/>
-                <a:cs typeface="Courier New" panose="02070309020205020404" pitchFamily="49" charset="0"/>
-              </a:rPr>
-              <a:t>Console</a:t>
-            </a:r>
-            <a:r>
-              <a:rPr kumimoji="0" lang="ru-RU" altLang="ru-RU" sz="1200" b="0" i="0" u="none" strike="noStrike" cap="none" normalizeH="0" baseline="0" dirty="0" smtClean="0">
-                <a:ln>
-                  <a:noFill/>
-                </a:ln>
-                <a:solidFill>
-                  <a:srgbClr val="000000"/>
-                </a:solidFill>
-                <a:effectLst/>
-                <a:latin typeface="Courier New" panose="02070309020205020404" pitchFamily="49" charset="0"/>
-                <a:cs typeface="Courier New" panose="02070309020205020404" pitchFamily="49" charset="0"/>
-              </a:rPr>
-              <a:t>.WriteLine(</a:t>
-            </a:r>
-            <a:r>
-              <a:rPr kumimoji="0" lang="ru-RU" altLang="ru-RU" sz="1200" b="0" i="0" u="none" strike="noStrike" cap="none" normalizeH="0" baseline="0" dirty="0" smtClean="0">
-                <a:ln>
-                  <a:noFill/>
-                </a:ln>
-                <a:solidFill>
-                  <a:srgbClr val="A31515"/>
-                </a:solidFill>
-                <a:effectLst/>
-                <a:latin typeface="Courier New" panose="02070309020205020404" pitchFamily="49" charset="0"/>
-                <a:cs typeface="Courier New" panose="02070309020205020404" pitchFamily="49" charset="0"/>
-              </a:rPr>
-              <a:t>"Type      : {0}"</a:t>
-            </a:r>
-            <a:r>
-              <a:rPr kumimoji="0" lang="ru-RU" altLang="ru-RU" sz="1200" b="0" i="0" u="none" strike="noStrike" cap="none" normalizeH="0" baseline="0" dirty="0" smtClean="0">
-                <a:ln>
-                  <a:noFill/>
-                </a:ln>
-                <a:solidFill>
-                  <a:srgbClr val="000000"/>
-                </a:solidFill>
-                <a:effectLst/>
-                <a:latin typeface="Courier New" panose="02070309020205020404" pitchFamily="49" charset="0"/>
-                <a:cs typeface="Courier New" panose="02070309020205020404" pitchFamily="49" charset="0"/>
-              </a:rPr>
-              <a:t>, di.DriveType);</a:t>
-            </a:r>
-            <a:endParaRPr kumimoji="0" lang="en-US" altLang="ru-RU" sz="1200" b="0" i="0" u="none" strike="noStrike" cap="none" normalizeH="0" baseline="0" dirty="0" smtClean="0">
-              <a:ln>
-                <a:noFill/>
-              </a:ln>
-              <a:solidFill>
-                <a:srgbClr val="000000"/>
-              </a:solidFill>
-              <a:effectLst/>
-              <a:latin typeface="Courier New" panose="02070309020205020404" pitchFamily="49" charset="0"/>
-              <a:cs typeface="Courier New" panose="02070309020205020404" pitchFamily="49" charset="0"/>
-            </a:endParaRPr>
-          </a:p>
-          <a:p>
-            <a:pPr marL="0" marR="0" lvl="0" indent="0" algn="l" defTabSz="914400" rtl="0" eaLnBrk="1" fontAlgn="base" latinLnBrk="0" hangingPunct="1">
-              <a:lnSpc>
-                <a:spcPct val="100000"/>
-              </a:lnSpc>
-              <a:spcBef>
-                <a:spcPct val="0"/>
-              </a:spcBef>
-              <a:spcAft>
-                <a:spcPct val="0"/>
-              </a:spcAft>
-              <a:buClrTx/>
-              <a:buSzTx/>
-              <a:buFontTx/>
-              <a:buNone/>
-              <a:tabLst/>
-            </a:pPr>
-            <a:r>
-              <a:rPr lang="en-US" altLang="ru-RU" sz="1200" dirty="0">
-                <a:solidFill>
-                  <a:srgbClr val="000000"/>
-                </a:solidFill>
-                <a:latin typeface="Courier New" panose="02070309020205020404" pitchFamily="49" charset="0"/>
-                <a:cs typeface="Courier New" panose="02070309020205020404" pitchFamily="49" charset="0"/>
-              </a:rPr>
-              <a:t>	</a:t>
-            </a:r>
-            <a:r>
-              <a:rPr kumimoji="0" lang="ru-RU" altLang="ru-RU" sz="1200" b="0" i="0" u="none" strike="noStrike" cap="none" normalizeH="0" baseline="0" dirty="0" smtClean="0">
-                <a:ln>
-                  <a:noFill/>
-                </a:ln>
-                <a:solidFill>
-                  <a:srgbClr val="2B91AF"/>
-                </a:solidFill>
-                <a:effectLst/>
-                <a:latin typeface="Courier New" panose="02070309020205020404" pitchFamily="49" charset="0"/>
-                <a:cs typeface="Courier New" panose="02070309020205020404" pitchFamily="49" charset="0"/>
-              </a:rPr>
-              <a:t>Console</a:t>
-            </a:r>
-            <a:r>
-              <a:rPr kumimoji="0" lang="ru-RU" altLang="ru-RU" sz="1200" b="0" i="0" u="none" strike="noStrike" cap="none" normalizeH="0" baseline="0" dirty="0" smtClean="0">
-                <a:ln>
-                  <a:noFill/>
-                </a:ln>
-                <a:solidFill>
-                  <a:srgbClr val="000000"/>
-                </a:solidFill>
-                <a:effectLst/>
-                <a:latin typeface="Courier New" panose="02070309020205020404" pitchFamily="49" charset="0"/>
-                <a:cs typeface="Courier New" panose="02070309020205020404" pitchFamily="49" charset="0"/>
-              </a:rPr>
-              <a:t>.WriteLine(</a:t>
-            </a:r>
-            <a:r>
-              <a:rPr kumimoji="0" lang="ru-RU" altLang="ru-RU" sz="1200" b="0" i="0" u="none" strike="noStrike" cap="none" normalizeH="0" baseline="0" dirty="0" smtClean="0">
-                <a:ln>
-                  <a:noFill/>
-                </a:ln>
-                <a:solidFill>
-                  <a:srgbClr val="A31515"/>
-                </a:solidFill>
-                <a:effectLst/>
-                <a:latin typeface="Courier New" panose="02070309020205020404" pitchFamily="49" charset="0"/>
-                <a:cs typeface="Courier New" panose="02070309020205020404" pitchFamily="49" charset="0"/>
-              </a:rPr>
-              <a:t>"Name      : {0}"</a:t>
-            </a:r>
-            <a:r>
-              <a:rPr kumimoji="0" lang="ru-RU" altLang="ru-RU" sz="1200" b="0" i="0" u="none" strike="noStrike" cap="none" normalizeH="0" baseline="0" dirty="0" smtClean="0">
-                <a:ln>
-                  <a:noFill/>
-                </a:ln>
-                <a:solidFill>
-                  <a:srgbClr val="000000"/>
-                </a:solidFill>
-                <a:effectLst/>
-                <a:latin typeface="Courier New" panose="02070309020205020404" pitchFamily="49" charset="0"/>
-                <a:cs typeface="Courier New" panose="02070309020205020404" pitchFamily="49" charset="0"/>
-              </a:rPr>
-              <a:t>, di.Name);</a:t>
-            </a:r>
-            <a:endParaRPr kumimoji="0" lang="en-US" altLang="ru-RU" sz="1200" b="0" i="0" u="none" strike="noStrike" cap="none" normalizeH="0" baseline="0" dirty="0" smtClean="0">
-              <a:ln>
-                <a:noFill/>
-              </a:ln>
-              <a:solidFill>
-                <a:srgbClr val="000000"/>
-              </a:solidFill>
-              <a:effectLst/>
-              <a:latin typeface="Courier New" panose="02070309020205020404" pitchFamily="49" charset="0"/>
-              <a:cs typeface="Courier New" panose="02070309020205020404" pitchFamily="49" charset="0"/>
-            </a:endParaRPr>
-          </a:p>
-          <a:p>
-            <a:pPr marL="0" marR="0" lvl="0" indent="0" algn="l" defTabSz="914400" rtl="0" eaLnBrk="1" fontAlgn="base" latinLnBrk="0" hangingPunct="1">
-              <a:lnSpc>
-                <a:spcPct val="100000"/>
-              </a:lnSpc>
-              <a:spcBef>
-                <a:spcPct val="0"/>
-              </a:spcBef>
-              <a:spcAft>
-                <a:spcPct val="0"/>
-              </a:spcAft>
-              <a:buClrTx/>
-              <a:buSzTx/>
-              <a:buFontTx/>
-              <a:buNone/>
-              <a:tabLst/>
-            </a:pPr>
-            <a:r>
-              <a:rPr lang="en-US" altLang="ru-RU" sz="1200" dirty="0">
-                <a:solidFill>
-                  <a:srgbClr val="000000"/>
-                </a:solidFill>
-                <a:latin typeface="Courier New" panose="02070309020205020404" pitchFamily="49" charset="0"/>
-                <a:cs typeface="Courier New" panose="02070309020205020404" pitchFamily="49" charset="0"/>
-              </a:rPr>
-              <a:t>	</a:t>
-            </a:r>
-            <a:r>
-              <a:rPr kumimoji="0" lang="ru-RU" altLang="ru-RU" sz="1200" b="0" i="0" u="none" strike="noStrike" cap="none" normalizeH="0" baseline="0" dirty="0" smtClean="0">
-                <a:ln>
-                  <a:noFill/>
-                </a:ln>
-                <a:solidFill>
-                  <a:srgbClr val="0000FF"/>
-                </a:solidFill>
-                <a:effectLst/>
-                <a:latin typeface="Courier New" panose="02070309020205020404" pitchFamily="49" charset="0"/>
-                <a:cs typeface="Courier New" panose="02070309020205020404" pitchFamily="49" charset="0"/>
-              </a:rPr>
-              <a:t>if</a:t>
-            </a:r>
-            <a:r>
-              <a:rPr kumimoji="0" lang="ru-RU" altLang="ru-RU" sz="1200" b="0" i="0" u="none" strike="noStrike" cap="none" normalizeH="0" baseline="0" dirty="0" smtClean="0">
-                <a:ln>
-                  <a:noFill/>
-                </a:ln>
-                <a:solidFill>
-                  <a:srgbClr val="000000"/>
-                </a:solidFill>
-                <a:effectLst/>
-                <a:latin typeface="Courier New" panose="02070309020205020404" pitchFamily="49" charset="0"/>
-                <a:cs typeface="Courier New" panose="02070309020205020404" pitchFamily="49" charset="0"/>
-              </a:rPr>
-              <a:t> (di.IsReady)</a:t>
-            </a:r>
-            <a:endParaRPr kumimoji="0" lang="en-US" altLang="ru-RU" sz="1200" b="0" i="0" u="none" strike="noStrike" cap="none" normalizeH="0" baseline="0" dirty="0" smtClean="0">
-              <a:ln>
-                <a:noFill/>
-              </a:ln>
-              <a:solidFill>
-                <a:srgbClr val="000000"/>
-              </a:solidFill>
-              <a:effectLst/>
-              <a:latin typeface="Courier New" panose="02070309020205020404" pitchFamily="49" charset="0"/>
-              <a:cs typeface="Courier New" panose="02070309020205020404" pitchFamily="49" charset="0"/>
-            </a:endParaRPr>
-          </a:p>
-          <a:p>
-            <a:pPr marL="0" marR="0" lvl="0" indent="0" algn="l" defTabSz="914400" rtl="0" eaLnBrk="1" fontAlgn="base" latinLnBrk="0" hangingPunct="1">
-              <a:lnSpc>
-                <a:spcPct val="100000"/>
-              </a:lnSpc>
-              <a:spcBef>
-                <a:spcPct val="0"/>
-              </a:spcBef>
-              <a:spcAft>
-                <a:spcPct val="0"/>
-              </a:spcAft>
-              <a:buClrTx/>
-              <a:buSzTx/>
-              <a:buFontTx/>
-              <a:buNone/>
-              <a:tabLst/>
-            </a:pPr>
-            <a:r>
-              <a:rPr lang="en-US" altLang="ru-RU" sz="1200" dirty="0">
-                <a:solidFill>
-                  <a:srgbClr val="000000"/>
-                </a:solidFill>
-                <a:latin typeface="Courier New" panose="02070309020205020404" pitchFamily="49" charset="0"/>
-                <a:cs typeface="Courier New" panose="02070309020205020404" pitchFamily="49" charset="0"/>
-              </a:rPr>
-              <a:t>	</a:t>
-            </a:r>
-            <a:r>
-              <a:rPr kumimoji="0" lang="ru-RU" altLang="ru-RU" sz="1200" b="0" i="0" u="none" strike="noStrike" cap="none" normalizeH="0" baseline="0" dirty="0" smtClean="0">
-                <a:ln>
-                  <a:noFill/>
-                </a:ln>
-                <a:solidFill>
-                  <a:srgbClr val="000000"/>
-                </a:solidFill>
-                <a:effectLst/>
-                <a:latin typeface="Courier New" panose="02070309020205020404" pitchFamily="49" charset="0"/>
-                <a:cs typeface="Courier New" panose="02070309020205020404" pitchFamily="49" charset="0"/>
-              </a:rPr>
-              <a:t>{</a:t>
-            </a:r>
-            <a:endParaRPr kumimoji="0" lang="en-US" altLang="ru-RU" sz="1200" b="0" i="0" u="none" strike="noStrike" cap="none" normalizeH="0" baseline="0" dirty="0" smtClean="0">
-              <a:ln>
-                <a:noFill/>
-              </a:ln>
-              <a:solidFill>
-                <a:srgbClr val="000000"/>
-              </a:solidFill>
-              <a:effectLst/>
-              <a:latin typeface="Courier New" panose="02070309020205020404" pitchFamily="49" charset="0"/>
-              <a:cs typeface="Courier New" panose="02070309020205020404" pitchFamily="49" charset="0"/>
-            </a:endParaRPr>
-          </a:p>
-          <a:p>
-            <a:pPr marL="0" marR="0" lvl="0" indent="0" algn="l" defTabSz="914400" rtl="0" eaLnBrk="1" fontAlgn="base" latinLnBrk="0" hangingPunct="1">
-              <a:lnSpc>
-                <a:spcPct val="100000"/>
-              </a:lnSpc>
-              <a:spcBef>
-                <a:spcPct val="0"/>
-              </a:spcBef>
-              <a:spcAft>
-                <a:spcPct val="0"/>
-              </a:spcAft>
-              <a:buClrTx/>
-              <a:buSzTx/>
-              <a:buFontTx/>
-              <a:buNone/>
-              <a:tabLst/>
-            </a:pPr>
-            <a:r>
-              <a:rPr lang="en-US" altLang="ru-RU" sz="1200" dirty="0">
-                <a:solidFill>
-                  <a:srgbClr val="000000"/>
-                </a:solidFill>
-                <a:latin typeface="Courier New" panose="02070309020205020404" pitchFamily="49" charset="0"/>
-                <a:cs typeface="Courier New" panose="02070309020205020404" pitchFamily="49" charset="0"/>
-              </a:rPr>
-              <a:t>	</a:t>
-            </a:r>
-            <a:r>
-              <a:rPr lang="en-US" altLang="ru-RU" sz="1200" dirty="0" smtClean="0">
-                <a:solidFill>
-                  <a:srgbClr val="000000"/>
-                </a:solidFill>
-                <a:latin typeface="Courier New" panose="02070309020205020404" pitchFamily="49" charset="0"/>
-                <a:cs typeface="Courier New" panose="02070309020205020404" pitchFamily="49" charset="0"/>
-              </a:rPr>
-              <a:t>	</a:t>
-            </a:r>
-            <a:r>
-              <a:rPr kumimoji="0" lang="ru-RU" altLang="ru-RU" sz="1200" b="0" i="0" u="none" strike="noStrike" cap="none" normalizeH="0" baseline="0" dirty="0" smtClean="0">
-                <a:ln>
-                  <a:noFill/>
-                </a:ln>
-                <a:solidFill>
-                  <a:srgbClr val="2B91AF"/>
-                </a:solidFill>
-                <a:effectLst/>
-                <a:latin typeface="Courier New" panose="02070309020205020404" pitchFamily="49" charset="0"/>
-                <a:cs typeface="Courier New" panose="02070309020205020404" pitchFamily="49" charset="0"/>
-              </a:rPr>
-              <a:t>Console</a:t>
-            </a:r>
-            <a:r>
-              <a:rPr kumimoji="0" lang="ru-RU" altLang="ru-RU" sz="1200" b="0" i="0" u="none" strike="noStrike" cap="none" normalizeH="0" baseline="0" dirty="0" smtClean="0">
-                <a:ln>
-                  <a:noFill/>
-                </a:ln>
-                <a:solidFill>
-                  <a:srgbClr val="000000"/>
-                </a:solidFill>
-                <a:effectLst/>
-                <a:latin typeface="Courier New" panose="02070309020205020404" pitchFamily="49" charset="0"/>
-                <a:cs typeface="Courier New" panose="02070309020205020404" pitchFamily="49" charset="0"/>
-              </a:rPr>
-              <a:t>.WriteLine(</a:t>
-            </a:r>
-            <a:r>
-              <a:rPr kumimoji="0" lang="ru-RU" altLang="ru-RU" sz="1200" b="0" i="0" u="none" strike="noStrike" cap="none" normalizeH="0" baseline="0" dirty="0" smtClean="0">
-                <a:ln>
-                  <a:noFill/>
-                </a:ln>
-                <a:solidFill>
-                  <a:srgbClr val="A31515"/>
-                </a:solidFill>
-                <a:effectLst/>
-                <a:latin typeface="Courier New" panose="02070309020205020404" pitchFamily="49" charset="0"/>
-                <a:cs typeface="Courier New" panose="02070309020205020404" pitchFamily="49" charset="0"/>
-              </a:rPr>
-              <a:t>"Format    : {0}"</a:t>
-            </a:r>
-            <a:r>
-              <a:rPr kumimoji="0" lang="ru-RU" altLang="ru-RU" sz="1200" b="0" i="0" u="none" strike="noStrike" cap="none" normalizeH="0" baseline="0" dirty="0" smtClean="0">
-                <a:ln>
-                  <a:noFill/>
-                </a:ln>
-                <a:solidFill>
-                  <a:srgbClr val="000000"/>
-                </a:solidFill>
-                <a:effectLst/>
-                <a:latin typeface="Courier New" panose="02070309020205020404" pitchFamily="49" charset="0"/>
-                <a:cs typeface="Courier New" panose="02070309020205020404" pitchFamily="49" charset="0"/>
-              </a:rPr>
-              <a:t>, di.DriveFormat);</a:t>
-            </a:r>
-            <a:endParaRPr kumimoji="0" lang="en-US" altLang="ru-RU" sz="1200" b="0" i="0" u="none" strike="noStrike" cap="none" normalizeH="0" baseline="0" dirty="0" smtClean="0">
-              <a:ln>
-                <a:noFill/>
-              </a:ln>
-              <a:solidFill>
-                <a:srgbClr val="000000"/>
-              </a:solidFill>
-              <a:effectLst/>
-              <a:latin typeface="Courier New" panose="02070309020205020404" pitchFamily="49" charset="0"/>
-              <a:cs typeface="Courier New" panose="02070309020205020404" pitchFamily="49" charset="0"/>
-            </a:endParaRPr>
-          </a:p>
-          <a:p>
-            <a:pPr marL="0" marR="0" lvl="0" indent="0" algn="l" defTabSz="914400" rtl="0" eaLnBrk="1" fontAlgn="base" latinLnBrk="0" hangingPunct="1">
-              <a:lnSpc>
-                <a:spcPct val="100000"/>
-              </a:lnSpc>
-              <a:spcBef>
-                <a:spcPct val="0"/>
-              </a:spcBef>
-              <a:spcAft>
-                <a:spcPct val="0"/>
-              </a:spcAft>
-              <a:buClrTx/>
-              <a:buSzTx/>
-              <a:buFontTx/>
-              <a:buNone/>
-              <a:tabLst/>
-            </a:pPr>
-            <a:r>
-              <a:rPr kumimoji="0" lang="en-US" altLang="ru-RU" sz="1200" b="0" i="0" u="none" strike="noStrike" cap="none" normalizeH="0" baseline="0" dirty="0" smtClean="0">
-                <a:ln>
-                  <a:noFill/>
-                </a:ln>
-                <a:solidFill>
-                  <a:srgbClr val="2B91AF"/>
-                </a:solidFill>
-                <a:effectLst/>
-                <a:latin typeface="Courier New" panose="02070309020205020404" pitchFamily="49" charset="0"/>
-                <a:cs typeface="Courier New" panose="02070309020205020404" pitchFamily="49" charset="0"/>
-              </a:rPr>
-              <a:t>		</a:t>
-            </a:r>
-            <a:r>
-              <a:rPr kumimoji="0" lang="ru-RU" altLang="ru-RU" sz="1200" b="0" i="0" u="none" strike="noStrike" cap="none" normalizeH="0" baseline="0" dirty="0" smtClean="0">
-                <a:ln>
-                  <a:noFill/>
-                </a:ln>
-                <a:solidFill>
-                  <a:srgbClr val="2B91AF"/>
-                </a:solidFill>
-                <a:effectLst/>
-                <a:latin typeface="Courier New" panose="02070309020205020404" pitchFamily="49" charset="0"/>
-                <a:cs typeface="Courier New" panose="02070309020205020404" pitchFamily="49" charset="0"/>
-              </a:rPr>
-              <a:t>Console</a:t>
-            </a:r>
-            <a:r>
-              <a:rPr kumimoji="0" lang="ru-RU" altLang="ru-RU" sz="1200" b="0" i="0" u="none" strike="noStrike" cap="none" normalizeH="0" baseline="0" dirty="0" smtClean="0">
-                <a:ln>
-                  <a:noFill/>
-                </a:ln>
-                <a:solidFill>
-                  <a:srgbClr val="000000"/>
-                </a:solidFill>
-                <a:effectLst/>
-                <a:latin typeface="Courier New" panose="02070309020205020404" pitchFamily="49" charset="0"/>
-                <a:cs typeface="Courier New" panose="02070309020205020404" pitchFamily="49" charset="0"/>
-              </a:rPr>
-              <a:t>.WriteLine(</a:t>
-            </a:r>
-            <a:r>
-              <a:rPr kumimoji="0" lang="ru-RU" altLang="ru-RU" sz="1200" b="0" i="0" u="none" strike="noStrike" cap="none" normalizeH="0" baseline="0" dirty="0" smtClean="0">
-                <a:ln>
-                  <a:noFill/>
-                </a:ln>
-                <a:solidFill>
-                  <a:srgbClr val="A31515"/>
-                </a:solidFill>
-                <a:effectLst/>
-                <a:latin typeface="Courier New" panose="02070309020205020404" pitchFamily="49" charset="0"/>
-                <a:cs typeface="Courier New" panose="02070309020205020404" pitchFamily="49" charset="0"/>
-              </a:rPr>
-              <a:t>"Ready     : {0}"</a:t>
-            </a:r>
-            <a:r>
-              <a:rPr kumimoji="0" lang="ru-RU" altLang="ru-RU" sz="1200" b="0" i="0" u="none" strike="noStrike" cap="none" normalizeH="0" baseline="0" dirty="0" smtClean="0">
-                <a:ln>
-                  <a:noFill/>
-                </a:ln>
-                <a:solidFill>
-                  <a:srgbClr val="000000"/>
-                </a:solidFill>
-                <a:effectLst/>
-                <a:latin typeface="Courier New" panose="02070309020205020404" pitchFamily="49" charset="0"/>
-                <a:cs typeface="Courier New" panose="02070309020205020404" pitchFamily="49" charset="0"/>
-              </a:rPr>
-              <a:t>, di.IsReady);</a:t>
-            </a:r>
-            <a:endParaRPr kumimoji="0" lang="en-US" altLang="ru-RU" sz="1200" b="0" i="0" u="none" strike="noStrike" cap="none" normalizeH="0" baseline="0" dirty="0" smtClean="0">
-              <a:ln>
-                <a:noFill/>
-              </a:ln>
-              <a:solidFill>
-                <a:srgbClr val="000000"/>
-              </a:solidFill>
-              <a:effectLst/>
-              <a:latin typeface="Courier New" panose="02070309020205020404" pitchFamily="49" charset="0"/>
-              <a:cs typeface="Courier New" panose="02070309020205020404" pitchFamily="49" charset="0"/>
-            </a:endParaRPr>
-          </a:p>
-          <a:p>
-            <a:pPr marL="0" marR="0" lvl="0" indent="0" algn="l" defTabSz="914400" rtl="0" eaLnBrk="1" fontAlgn="base" latinLnBrk="0" hangingPunct="1">
-              <a:lnSpc>
-                <a:spcPct val="100000"/>
-              </a:lnSpc>
-              <a:spcBef>
-                <a:spcPct val="0"/>
-              </a:spcBef>
-              <a:spcAft>
-                <a:spcPct val="0"/>
-              </a:spcAft>
-              <a:buClrTx/>
-              <a:buSzTx/>
-              <a:buFontTx/>
-              <a:buNone/>
-              <a:tabLst/>
-            </a:pPr>
-            <a:r>
-              <a:rPr kumimoji="0" lang="en-US" altLang="ru-RU" sz="1200" b="0" i="0" u="none" strike="noStrike" cap="none" normalizeH="0" baseline="0" dirty="0" smtClean="0">
-                <a:ln>
-                  <a:noFill/>
-                </a:ln>
-                <a:solidFill>
-                  <a:srgbClr val="2B91AF"/>
-                </a:solidFill>
-                <a:effectLst/>
-                <a:latin typeface="Courier New" panose="02070309020205020404" pitchFamily="49" charset="0"/>
-                <a:cs typeface="Courier New" panose="02070309020205020404" pitchFamily="49" charset="0"/>
-              </a:rPr>
-              <a:t>		</a:t>
-            </a:r>
-            <a:r>
-              <a:rPr kumimoji="0" lang="ru-RU" altLang="ru-RU" sz="1200" b="0" i="0" u="none" strike="noStrike" cap="none" normalizeH="0" baseline="0" dirty="0" smtClean="0">
-                <a:ln>
-                  <a:noFill/>
-                </a:ln>
-                <a:solidFill>
-                  <a:srgbClr val="2B91AF"/>
-                </a:solidFill>
-                <a:effectLst/>
-                <a:latin typeface="Courier New" panose="02070309020205020404" pitchFamily="49" charset="0"/>
-                <a:cs typeface="Courier New" panose="02070309020205020404" pitchFamily="49" charset="0"/>
-              </a:rPr>
-              <a:t>Console</a:t>
-            </a:r>
-            <a:r>
-              <a:rPr kumimoji="0" lang="ru-RU" altLang="ru-RU" sz="1200" b="0" i="0" u="none" strike="noStrike" cap="none" normalizeH="0" baseline="0" dirty="0" smtClean="0">
-                <a:ln>
-                  <a:noFill/>
-                </a:ln>
-                <a:solidFill>
-                  <a:srgbClr val="000000"/>
-                </a:solidFill>
-                <a:effectLst/>
-                <a:latin typeface="Courier New" panose="02070309020205020404" pitchFamily="49" charset="0"/>
-                <a:cs typeface="Courier New" panose="02070309020205020404" pitchFamily="49" charset="0"/>
-              </a:rPr>
-              <a:t>.WriteLine(</a:t>
-            </a:r>
-            <a:r>
-              <a:rPr kumimoji="0" lang="ru-RU" altLang="ru-RU" sz="1200" b="0" i="0" u="none" strike="noStrike" cap="none" normalizeH="0" baseline="0" dirty="0" smtClean="0">
-                <a:ln>
-                  <a:noFill/>
-                </a:ln>
-                <a:solidFill>
-                  <a:srgbClr val="A31515"/>
-                </a:solidFill>
-                <a:effectLst/>
-                <a:latin typeface="Courier New" panose="02070309020205020404" pitchFamily="49" charset="0"/>
-                <a:cs typeface="Courier New" panose="02070309020205020404" pitchFamily="49" charset="0"/>
-              </a:rPr>
-              <a:t>"Root      : {0}"</a:t>
-            </a:r>
-            <a:r>
-              <a:rPr kumimoji="0" lang="ru-RU" altLang="ru-RU" sz="1200" b="0" i="0" u="none" strike="noStrike" cap="none" normalizeH="0" baseline="0" dirty="0" smtClean="0">
-                <a:ln>
-                  <a:noFill/>
-                </a:ln>
-                <a:solidFill>
-                  <a:srgbClr val="000000"/>
-                </a:solidFill>
-                <a:effectLst/>
-                <a:latin typeface="Courier New" panose="02070309020205020404" pitchFamily="49" charset="0"/>
-                <a:cs typeface="Courier New" panose="02070309020205020404" pitchFamily="49" charset="0"/>
-              </a:rPr>
-              <a:t>, di.RootDirectory);</a:t>
-            </a:r>
-            <a:endParaRPr kumimoji="0" lang="en-US" altLang="ru-RU" sz="1200" b="0" i="0" u="none" strike="noStrike" cap="none" normalizeH="0" baseline="0" dirty="0" smtClean="0">
-              <a:ln>
-                <a:noFill/>
-              </a:ln>
-              <a:solidFill>
-                <a:srgbClr val="000000"/>
-              </a:solidFill>
-              <a:effectLst/>
-              <a:latin typeface="Courier New" panose="02070309020205020404" pitchFamily="49" charset="0"/>
-              <a:cs typeface="Courier New" panose="02070309020205020404" pitchFamily="49" charset="0"/>
-            </a:endParaRPr>
-          </a:p>
-          <a:p>
-            <a:pPr marL="0" marR="0" lvl="0" indent="0" algn="l" defTabSz="914400" rtl="0" eaLnBrk="1" fontAlgn="base" latinLnBrk="0" hangingPunct="1">
-              <a:lnSpc>
-                <a:spcPct val="100000"/>
-              </a:lnSpc>
-              <a:spcBef>
-                <a:spcPct val="0"/>
-              </a:spcBef>
-              <a:spcAft>
-                <a:spcPct val="0"/>
-              </a:spcAft>
-              <a:buClrTx/>
-              <a:buSzTx/>
-              <a:buFontTx/>
-              <a:buNone/>
-              <a:tabLst/>
-            </a:pPr>
-            <a:r>
-              <a:rPr kumimoji="0" lang="en-US" altLang="ru-RU" sz="1200" b="0" i="0" u="none" strike="noStrike" cap="none" normalizeH="0" baseline="0" dirty="0" smtClean="0">
-                <a:ln>
-                  <a:noFill/>
-                </a:ln>
-                <a:solidFill>
-                  <a:srgbClr val="2B91AF"/>
-                </a:solidFill>
-                <a:effectLst/>
-                <a:latin typeface="Courier New" panose="02070309020205020404" pitchFamily="49" charset="0"/>
-                <a:cs typeface="Courier New" panose="02070309020205020404" pitchFamily="49" charset="0"/>
-              </a:rPr>
-              <a:t>		</a:t>
-            </a:r>
-            <a:r>
-              <a:rPr kumimoji="0" lang="ru-RU" altLang="ru-RU" sz="1200" b="0" i="0" u="none" strike="noStrike" cap="none" normalizeH="0" baseline="0" dirty="0" smtClean="0">
-                <a:ln>
-                  <a:noFill/>
-                </a:ln>
-                <a:solidFill>
-                  <a:srgbClr val="2B91AF"/>
-                </a:solidFill>
-                <a:effectLst/>
-                <a:latin typeface="Courier New" panose="02070309020205020404" pitchFamily="49" charset="0"/>
-                <a:cs typeface="Courier New" panose="02070309020205020404" pitchFamily="49" charset="0"/>
-              </a:rPr>
-              <a:t>Console</a:t>
-            </a:r>
-            <a:r>
-              <a:rPr kumimoji="0" lang="ru-RU" altLang="ru-RU" sz="1200" b="0" i="0" u="none" strike="noStrike" cap="none" normalizeH="0" baseline="0" dirty="0" smtClean="0">
-                <a:ln>
-                  <a:noFill/>
-                </a:ln>
-                <a:solidFill>
-                  <a:srgbClr val="000000"/>
-                </a:solidFill>
-                <a:effectLst/>
-                <a:latin typeface="Courier New" panose="02070309020205020404" pitchFamily="49" charset="0"/>
-                <a:cs typeface="Courier New" panose="02070309020205020404" pitchFamily="49" charset="0"/>
-              </a:rPr>
-              <a:t>.WriteLine(</a:t>
-            </a:r>
-            <a:r>
-              <a:rPr kumimoji="0" lang="ru-RU" altLang="ru-RU" sz="1200" b="0" i="0" u="none" strike="noStrike" cap="none" normalizeH="0" baseline="0" dirty="0" smtClean="0">
-                <a:ln>
-                  <a:noFill/>
-                </a:ln>
-                <a:solidFill>
-                  <a:srgbClr val="A31515"/>
-                </a:solidFill>
-                <a:effectLst/>
-                <a:latin typeface="Courier New" panose="02070309020205020404" pitchFamily="49" charset="0"/>
-                <a:cs typeface="Courier New" panose="02070309020205020404" pitchFamily="49" charset="0"/>
-              </a:rPr>
-              <a:t>"Free space: {0:N0} bytes"</a:t>
-            </a:r>
-            <a:r>
-              <a:rPr kumimoji="0" lang="ru-RU" altLang="ru-RU" sz="1200" b="0" i="0" u="none" strike="noStrike" cap="none" normalizeH="0" baseline="0" dirty="0" smtClean="0">
-                <a:ln>
-                  <a:noFill/>
-                </a:ln>
-                <a:solidFill>
-                  <a:srgbClr val="000000"/>
-                </a:solidFill>
-                <a:effectLst/>
-                <a:latin typeface="Courier New" panose="02070309020205020404" pitchFamily="49" charset="0"/>
-                <a:cs typeface="Courier New" panose="02070309020205020404" pitchFamily="49" charset="0"/>
-              </a:rPr>
-              <a:t>, di.TotalFreeSpace);</a:t>
-            </a:r>
-            <a:endParaRPr kumimoji="0" lang="en-US" altLang="ru-RU" sz="1200" b="0" i="0" u="none" strike="noStrike" cap="none" normalizeH="0" baseline="0" dirty="0" smtClean="0">
-              <a:ln>
-                <a:noFill/>
-              </a:ln>
-              <a:solidFill>
-                <a:srgbClr val="000000"/>
-              </a:solidFill>
-              <a:effectLst/>
-              <a:latin typeface="Courier New" panose="02070309020205020404" pitchFamily="49" charset="0"/>
-              <a:cs typeface="Courier New" panose="02070309020205020404" pitchFamily="49" charset="0"/>
-            </a:endParaRPr>
-          </a:p>
-          <a:p>
-            <a:pPr marL="0" marR="0" lvl="0" indent="0" algn="l" defTabSz="914400" rtl="0" eaLnBrk="1" fontAlgn="base" latinLnBrk="0" hangingPunct="1">
-              <a:lnSpc>
-                <a:spcPct val="100000"/>
-              </a:lnSpc>
-              <a:spcBef>
-                <a:spcPct val="0"/>
-              </a:spcBef>
-              <a:spcAft>
-                <a:spcPct val="0"/>
-              </a:spcAft>
-              <a:buClrTx/>
-              <a:buSzTx/>
-              <a:buFontTx/>
-              <a:buNone/>
-              <a:tabLst/>
-            </a:pPr>
-            <a:r>
-              <a:rPr kumimoji="0" lang="en-US" altLang="ru-RU" sz="1200" b="0" i="0" u="none" strike="noStrike" cap="none" normalizeH="0" baseline="0" dirty="0" smtClean="0">
-                <a:ln>
-                  <a:noFill/>
-                </a:ln>
-                <a:solidFill>
-                  <a:srgbClr val="2B91AF"/>
-                </a:solidFill>
-                <a:effectLst/>
-                <a:latin typeface="Courier New" panose="02070309020205020404" pitchFamily="49" charset="0"/>
-                <a:cs typeface="Courier New" panose="02070309020205020404" pitchFamily="49" charset="0"/>
-              </a:rPr>
-              <a:t>		</a:t>
-            </a:r>
-            <a:r>
-              <a:rPr kumimoji="0" lang="ru-RU" altLang="ru-RU" sz="1200" b="0" i="0" u="none" strike="noStrike" cap="none" normalizeH="0" baseline="0" dirty="0" smtClean="0">
-                <a:ln>
-                  <a:noFill/>
-                </a:ln>
-                <a:solidFill>
-                  <a:srgbClr val="2B91AF"/>
-                </a:solidFill>
-                <a:effectLst/>
-                <a:latin typeface="Courier New" panose="02070309020205020404" pitchFamily="49" charset="0"/>
-                <a:cs typeface="Courier New" panose="02070309020205020404" pitchFamily="49" charset="0"/>
-              </a:rPr>
-              <a:t>Console</a:t>
-            </a:r>
-            <a:r>
-              <a:rPr kumimoji="0" lang="ru-RU" altLang="ru-RU" sz="1200" b="0" i="0" u="none" strike="noStrike" cap="none" normalizeH="0" baseline="0" dirty="0" smtClean="0">
-                <a:ln>
-                  <a:noFill/>
-                </a:ln>
-                <a:solidFill>
-                  <a:srgbClr val="000000"/>
-                </a:solidFill>
-                <a:effectLst/>
-                <a:latin typeface="Courier New" panose="02070309020205020404" pitchFamily="49" charset="0"/>
-                <a:cs typeface="Courier New" panose="02070309020205020404" pitchFamily="49" charset="0"/>
-              </a:rPr>
-              <a:t>.WriteLine(</a:t>
-            </a:r>
-            <a:r>
-              <a:rPr kumimoji="0" lang="ru-RU" altLang="ru-RU" sz="1200" b="0" i="0" u="none" strike="noStrike" cap="none" normalizeH="0" baseline="0" dirty="0" smtClean="0">
-                <a:ln>
-                  <a:noFill/>
-                </a:ln>
-                <a:solidFill>
-                  <a:srgbClr val="A31515"/>
-                </a:solidFill>
-                <a:effectLst/>
-                <a:latin typeface="Courier New" panose="02070309020205020404" pitchFamily="49" charset="0"/>
-                <a:cs typeface="Courier New" panose="02070309020205020404" pitchFamily="49" charset="0"/>
-              </a:rPr>
-              <a:t>"Size      : {0:N0} bytes"</a:t>
-            </a:r>
-            <a:r>
-              <a:rPr kumimoji="0" lang="ru-RU" altLang="ru-RU" sz="1200" b="0" i="0" u="none" strike="noStrike" cap="none" normalizeH="0" baseline="0" dirty="0" smtClean="0">
-                <a:ln>
-                  <a:noFill/>
-                </a:ln>
-                <a:solidFill>
-                  <a:srgbClr val="000000"/>
-                </a:solidFill>
-                <a:effectLst/>
-                <a:latin typeface="Courier New" panose="02070309020205020404" pitchFamily="49" charset="0"/>
-                <a:cs typeface="Courier New" panose="02070309020205020404" pitchFamily="49" charset="0"/>
-              </a:rPr>
-              <a:t>, di.TotalSize);</a:t>
-            </a:r>
-            <a:endParaRPr kumimoji="0" lang="en-US" altLang="ru-RU" sz="1200" b="0" i="0" u="none" strike="noStrike" cap="none" normalizeH="0" baseline="0" dirty="0" smtClean="0">
-              <a:ln>
-                <a:noFill/>
-              </a:ln>
-              <a:solidFill>
-                <a:srgbClr val="000000"/>
-              </a:solidFill>
-              <a:effectLst/>
-              <a:latin typeface="Courier New" panose="02070309020205020404" pitchFamily="49" charset="0"/>
-              <a:cs typeface="Courier New" panose="02070309020205020404" pitchFamily="49" charset="0"/>
-            </a:endParaRPr>
-          </a:p>
-          <a:p>
-            <a:pPr marL="0" marR="0" lvl="0" indent="0" algn="l" defTabSz="914400" rtl="0" eaLnBrk="1" fontAlgn="base" latinLnBrk="0" hangingPunct="1">
-              <a:lnSpc>
-                <a:spcPct val="100000"/>
-              </a:lnSpc>
-              <a:spcBef>
-                <a:spcPct val="0"/>
-              </a:spcBef>
-              <a:spcAft>
-                <a:spcPct val="0"/>
-              </a:spcAft>
-              <a:buClrTx/>
-              <a:buSzTx/>
-              <a:buFontTx/>
-              <a:buNone/>
-              <a:tabLst/>
-            </a:pPr>
-            <a:r>
-              <a:rPr kumimoji="0" lang="en-US" altLang="ru-RU" sz="1200" b="0" i="0" u="none" strike="noStrike" cap="none" normalizeH="0" baseline="0" dirty="0" smtClean="0">
-                <a:ln>
-                  <a:noFill/>
-                </a:ln>
-                <a:solidFill>
-                  <a:srgbClr val="2B91AF"/>
-                </a:solidFill>
-                <a:effectLst/>
-                <a:latin typeface="Courier New" panose="02070309020205020404" pitchFamily="49" charset="0"/>
-                <a:cs typeface="Courier New" panose="02070309020205020404" pitchFamily="49" charset="0"/>
-              </a:rPr>
-              <a:t>		</a:t>
-            </a:r>
-            <a:r>
-              <a:rPr kumimoji="0" lang="ru-RU" altLang="ru-RU" sz="1200" b="0" i="0" u="none" strike="noStrike" cap="none" normalizeH="0" baseline="0" dirty="0" smtClean="0">
-                <a:ln>
-                  <a:noFill/>
-                </a:ln>
-                <a:solidFill>
-                  <a:srgbClr val="2B91AF"/>
-                </a:solidFill>
-                <a:effectLst/>
-                <a:latin typeface="Courier New" panose="02070309020205020404" pitchFamily="49" charset="0"/>
-                <a:cs typeface="Courier New" panose="02070309020205020404" pitchFamily="49" charset="0"/>
-              </a:rPr>
-              <a:t>Console</a:t>
-            </a:r>
-            <a:r>
-              <a:rPr kumimoji="0" lang="ru-RU" altLang="ru-RU" sz="1200" b="0" i="0" u="none" strike="noStrike" cap="none" normalizeH="0" baseline="0" dirty="0" smtClean="0">
-                <a:ln>
-                  <a:noFill/>
-                </a:ln>
-                <a:solidFill>
-                  <a:srgbClr val="000000"/>
-                </a:solidFill>
-                <a:effectLst/>
-                <a:latin typeface="Courier New" panose="02070309020205020404" pitchFamily="49" charset="0"/>
-                <a:cs typeface="Courier New" panose="02070309020205020404" pitchFamily="49" charset="0"/>
-              </a:rPr>
-              <a:t>.WriteLine(</a:t>
-            </a:r>
-            <a:r>
-              <a:rPr kumimoji="0" lang="ru-RU" altLang="ru-RU" sz="1200" b="0" i="0" u="none" strike="noStrike" cap="none" normalizeH="0" baseline="0" dirty="0" smtClean="0">
-                <a:ln>
-                  <a:noFill/>
-                </a:ln>
-                <a:solidFill>
-                  <a:srgbClr val="A31515"/>
-                </a:solidFill>
-                <a:effectLst/>
-                <a:latin typeface="Courier New" panose="02070309020205020404" pitchFamily="49" charset="0"/>
-                <a:cs typeface="Courier New" panose="02070309020205020404" pitchFamily="49" charset="0"/>
-              </a:rPr>
-              <a:t>"Label     : {0}"</a:t>
-            </a:r>
-            <a:r>
-              <a:rPr kumimoji="0" lang="ru-RU" altLang="ru-RU" sz="1200" b="0" i="0" u="none" strike="noStrike" cap="none" normalizeH="0" baseline="0" dirty="0" smtClean="0">
-                <a:ln>
-                  <a:noFill/>
-                </a:ln>
-                <a:solidFill>
-                  <a:srgbClr val="000000"/>
-                </a:solidFill>
-                <a:effectLst/>
-                <a:latin typeface="Courier New" panose="02070309020205020404" pitchFamily="49" charset="0"/>
-                <a:cs typeface="Courier New" panose="02070309020205020404" pitchFamily="49" charset="0"/>
-              </a:rPr>
-              <a:t>, di.VolumeLabel);</a:t>
-            </a:r>
-            <a:endParaRPr kumimoji="0" lang="en-US" altLang="ru-RU" sz="1200" b="0" i="0" u="none" strike="noStrike" cap="none" normalizeH="0" baseline="0" dirty="0" smtClean="0">
-              <a:ln>
-                <a:noFill/>
-              </a:ln>
-              <a:solidFill>
-                <a:srgbClr val="000000"/>
-              </a:solidFill>
-              <a:effectLst/>
-              <a:latin typeface="Courier New" panose="02070309020205020404" pitchFamily="49" charset="0"/>
-              <a:cs typeface="Courier New" panose="02070309020205020404" pitchFamily="49" charset="0"/>
-            </a:endParaRPr>
-          </a:p>
-          <a:p>
-            <a:pPr marL="0" marR="0" lvl="0" indent="0" algn="l" defTabSz="914400" rtl="0" eaLnBrk="1" fontAlgn="base" latinLnBrk="0" hangingPunct="1">
-              <a:lnSpc>
-                <a:spcPct val="100000"/>
-              </a:lnSpc>
-              <a:spcBef>
-                <a:spcPct val="0"/>
-              </a:spcBef>
-              <a:spcAft>
-                <a:spcPct val="0"/>
-              </a:spcAft>
-              <a:buClrTx/>
-              <a:buSzTx/>
-              <a:buFontTx/>
-              <a:buNone/>
-              <a:tabLst/>
-            </a:pPr>
-            <a:r>
-              <a:rPr lang="en-US" altLang="ru-RU" sz="1200" dirty="0">
-                <a:solidFill>
-                  <a:srgbClr val="000000"/>
-                </a:solidFill>
-                <a:latin typeface="Courier New" panose="02070309020205020404" pitchFamily="49" charset="0"/>
-                <a:cs typeface="Courier New" panose="02070309020205020404" pitchFamily="49" charset="0"/>
-              </a:rPr>
-              <a:t>	</a:t>
-            </a:r>
-            <a:r>
-              <a:rPr kumimoji="0" lang="ru-RU" altLang="ru-RU" sz="1200" b="0" i="0" u="none" strike="noStrike" cap="none" normalizeH="0" baseline="0" dirty="0" smtClean="0">
-                <a:ln>
-                  <a:noFill/>
-                </a:ln>
-                <a:solidFill>
-                  <a:srgbClr val="000000"/>
-                </a:solidFill>
-                <a:effectLst/>
-                <a:latin typeface="Courier New" panose="02070309020205020404" pitchFamily="49" charset="0"/>
-                <a:cs typeface="Courier New" panose="02070309020205020404" pitchFamily="49" charset="0"/>
-              </a:rPr>
-              <a:t>}</a:t>
-            </a:r>
-            <a:endParaRPr kumimoji="0" lang="en-US" altLang="ru-RU" sz="1200" b="0" i="0" u="none" strike="noStrike" cap="none" normalizeH="0" baseline="0" dirty="0" smtClean="0">
-              <a:ln>
-                <a:noFill/>
-              </a:ln>
-              <a:solidFill>
-                <a:srgbClr val="000000"/>
-              </a:solidFill>
-              <a:effectLst/>
-              <a:latin typeface="Courier New" panose="02070309020205020404" pitchFamily="49" charset="0"/>
-              <a:cs typeface="Courier New" panose="02070309020205020404" pitchFamily="49" charset="0"/>
-            </a:endParaRPr>
-          </a:p>
-          <a:p>
-            <a:pPr marL="0" marR="0" lvl="0" indent="0" algn="l" defTabSz="914400" rtl="0" eaLnBrk="1" fontAlgn="base" latinLnBrk="0" hangingPunct="1">
-              <a:lnSpc>
-                <a:spcPct val="100000"/>
-              </a:lnSpc>
-              <a:spcBef>
-                <a:spcPct val="0"/>
-              </a:spcBef>
-              <a:spcAft>
-                <a:spcPct val="0"/>
-              </a:spcAft>
-              <a:buClrTx/>
-              <a:buSzTx/>
-              <a:buFontTx/>
-              <a:buNone/>
-              <a:tabLst/>
-            </a:pPr>
-            <a:r>
-              <a:rPr kumimoji="0" lang="ru-RU" altLang="ru-RU" sz="1200" b="0" i="0" u="none" strike="noStrike" cap="none" normalizeH="0" baseline="0" dirty="0" smtClean="0">
-                <a:ln>
-                  <a:noFill/>
-                </a:ln>
-                <a:solidFill>
-                  <a:srgbClr val="000000"/>
-                </a:solidFill>
-                <a:effectLst/>
-                <a:latin typeface="Courier New" panose="02070309020205020404" pitchFamily="49" charset="0"/>
-                <a:cs typeface="Courier New" panose="02070309020205020404" pitchFamily="49" charset="0"/>
-              </a:rPr>
-              <a:t>}</a:t>
-            </a:r>
-            <a:endParaRPr kumimoji="0" lang="ru-RU" altLang="ru-RU" sz="1200" b="0" i="0" u="none" strike="noStrike" cap="none" normalizeH="0" baseline="0" dirty="0" smtClean="0">
-              <a:ln>
-                <a:noFill/>
-              </a:ln>
-              <a:solidFill>
-                <a:schemeClr val="tx1"/>
-              </a:solidFill>
-              <a:effectLst/>
               <a:latin typeface="Courier New" panose="02070309020205020404" pitchFamily="49" charset="0"/>
               <a:cs typeface="Courier New" panose="02070309020205020404" pitchFamily="49" charset="0"/>
             </a:endParaRPr>

</xml_diff>

<commit_message>
Updated IO demo and presentation
</commit_message>
<xml_diff>
--- a/Presentation/lesson-04-io.pptx
+++ b/Presentation/lesson-04-io.pptx
@@ -34,15 +34,16 @@
     <p:sldId id="288" r:id="rId28"/>
     <p:sldId id="289" r:id="rId29"/>
     <p:sldId id="265" r:id="rId30"/>
-    <p:sldId id="266" r:id="rId31"/>
-    <p:sldId id="291" r:id="rId32"/>
-    <p:sldId id="267" r:id="rId33"/>
-    <p:sldId id="268" r:id="rId34"/>
-    <p:sldId id="287" r:id="rId35"/>
-    <p:sldId id="278" r:id="rId36"/>
-    <p:sldId id="298" r:id="rId37"/>
-    <p:sldId id="297" r:id="rId38"/>
-    <p:sldId id="271" r:id="rId39"/>
+    <p:sldId id="291" r:id="rId31"/>
+    <p:sldId id="302" r:id="rId32"/>
+    <p:sldId id="266" r:id="rId33"/>
+    <p:sldId id="267" r:id="rId34"/>
+    <p:sldId id="268" r:id="rId35"/>
+    <p:sldId id="287" r:id="rId36"/>
+    <p:sldId id="278" r:id="rId37"/>
+    <p:sldId id="298" r:id="rId38"/>
+    <p:sldId id="297" r:id="rId39"/>
+    <p:sldId id="271" r:id="rId40"/>
   </p:sldIdLst>
   <p:sldSz cx="9144000" cy="6858000" type="screen4x3"/>
   <p:notesSz cx="6858000" cy="9144000"/>
@@ -32820,6 +32821,524 @@
 <file path=ppt/slides/slide29.xml><?xml version="1.0" encoding="utf-8"?>
 <p:sld xmlns:a="http://schemas.openxmlformats.org/drawingml/2006/main" xmlns:r="http://schemas.openxmlformats.org/officeDocument/2006/relationships" xmlns:p="http://schemas.openxmlformats.org/presentationml/2006/main">
   <p:cSld>
+    <p:spTree>
+      <p:nvGrpSpPr>
+        <p:cNvPr id="1" name=""/>
+        <p:cNvGrpSpPr/>
+        <p:nvPr/>
+      </p:nvGrpSpPr>
+      <p:grpSpPr>
+        <a:xfrm>
+          <a:off x="0" y="0"/>
+          <a:ext cx="0" cy="0"/>
+          <a:chOff x="0" y="0"/>
+          <a:chExt cx="0" cy="0"/>
+        </a:xfrm>
+      </p:grpSpPr>
+      <p:sp>
+        <p:nvSpPr>
+          <p:cNvPr id="2" name="Title 1"/>
+          <p:cNvSpPr>
+            <a:spLocks noGrp="1"/>
+          </p:cNvSpPr>
+          <p:nvPr>
+            <p:ph type="title"/>
+          </p:nvPr>
+        </p:nvSpPr>
+        <p:spPr/>
+        <p:txBody>
+          <a:bodyPr/>
+          <a:lstStyle/>
+          <a:p>
+            <a:r>
+              <a:rPr lang="ru-RU" dirty="0" smtClean="0"/>
+              <a:t>Понятие </a:t>
+            </a:r>
+            <a:r>
+              <a:rPr lang="ru-RU" dirty="0" smtClean="0"/>
+              <a:t>потока</a:t>
+            </a:r>
+            <a:r>
+              <a:rPr lang="en-US" dirty="0" smtClean="0"/>
+              <a:t> </a:t>
+            </a:r>
+            <a:r>
+              <a:rPr lang="en-US" dirty="0" smtClean="0"/>
+              <a:t>(Stream)</a:t>
+            </a:r>
+            <a:endParaRPr lang="ru-RU" dirty="0"/>
+          </a:p>
+        </p:txBody>
+      </p:sp>
+      <p:sp>
+        <p:nvSpPr>
+          <p:cNvPr id="3" name="Content Placeholder 2"/>
+          <p:cNvSpPr>
+            <a:spLocks noGrp="1"/>
+          </p:cNvSpPr>
+          <p:nvPr>
+            <p:ph idx="1"/>
+          </p:nvPr>
+        </p:nvSpPr>
+        <p:spPr>
+          <a:solidFill>
+            <a:schemeClr val="bg1"/>
+          </a:solidFill>
+        </p:spPr>
+        <p:txBody>
+          <a:bodyPr/>
+          <a:lstStyle/>
+          <a:p>
+            <a:pPr marL="0" indent="0">
+              <a:buNone/>
+            </a:pPr>
+            <a:endParaRPr lang="ru-RU" dirty="0"/>
+          </a:p>
+        </p:txBody>
+      </p:sp>
+      <p:pic>
+        <p:nvPicPr>
+          <p:cNvPr id="1027" name="Picture 3"/>
+          <p:cNvPicPr>
+            <a:picLocks noChangeAspect="1" noChangeArrowheads="1"/>
+          </p:cNvPicPr>
+          <p:nvPr/>
+        </p:nvPicPr>
+        <p:blipFill>
+          <a:blip r:embed="rId2">
+            <a:extLst>
+              <a:ext uri="{28A0092B-C50C-407E-A947-70E740481C1C}">
+                <a14:useLocalDpi xmlns:a14="http://schemas.microsoft.com/office/drawing/2010/main" val="0"/>
+              </a:ext>
+            </a:extLst>
+          </a:blip>
+          <a:srcRect/>
+          <a:stretch>
+            <a:fillRect/>
+          </a:stretch>
+        </p:blipFill>
+        <p:spPr bwMode="auto">
+          <a:xfrm>
+            <a:off x="1547813" y="1864965"/>
+            <a:ext cx="6048375" cy="3724275"/>
+          </a:xfrm>
+          <a:prstGeom prst="rect">
+            <a:avLst/>
+          </a:prstGeom>
+          <a:noFill/>
+          <a:ln>
+            <a:noFill/>
+          </a:ln>
+          <a:extLst>
+            <a:ext uri="{909E8E84-426E-40DD-AFC4-6F175D3DCCD1}">
+              <a14:hiddenFill xmlns:a14="http://schemas.microsoft.com/office/drawing/2010/main">
+                <a:solidFill>
+                  <a:schemeClr val="accent1"/>
+                </a:solidFill>
+              </a14:hiddenFill>
+            </a:ext>
+            <a:ext uri="{91240B29-F687-4F45-9708-019B960494DF}">
+              <a14:hiddenLine xmlns:a14="http://schemas.microsoft.com/office/drawing/2010/main" w="9525">
+                <a:solidFill>
+                  <a:schemeClr val="tx1"/>
+                </a:solidFill>
+                <a:miter lim="800000"/>
+                <a:headEnd/>
+                <a:tailEnd/>
+              </a14:hiddenLine>
+            </a:ext>
+          </a:extLst>
+        </p:spPr>
+      </p:pic>
+    </p:spTree>
+    <p:extLst>
+      <p:ext uri="{BB962C8B-B14F-4D97-AF65-F5344CB8AC3E}">
+        <p14:creationId xmlns:p14="http://schemas.microsoft.com/office/powerpoint/2010/main" val="1553627584"/>
+      </p:ext>
+    </p:extLst>
+  </p:cSld>
+  <p:clrMapOvr>
+    <a:masterClrMapping/>
+  </p:clrMapOvr>
+  <p:timing>
+    <p:tnLst>
+      <p:par>
+        <p:cTn id="1" dur="indefinite" restart="never" nodeType="tmRoot"/>
+      </p:par>
+    </p:tnLst>
+  </p:timing>
+</p:sld>
+</file>
+
+<file path=ppt/slides/slide3.xml><?xml version="1.0" encoding="utf-8"?>
+<p:sld xmlns:a="http://schemas.openxmlformats.org/drawingml/2006/main" xmlns:r="http://schemas.openxmlformats.org/officeDocument/2006/relationships" xmlns:p="http://schemas.openxmlformats.org/presentationml/2006/main">
+  <p:cSld>
+    <p:bg>
+      <p:bgPr>
+        <a:blipFill dpi="0" rotWithShape="1">
+          <a:blip r:embed="rId2">
+            <a:lum/>
+          </a:blip>
+          <a:srcRect/>
+          <a:stretch>
+            <a:fillRect/>
+          </a:stretch>
+        </a:blipFill>
+        <a:effectLst/>
+      </p:bgPr>
+    </p:bg>
+    <p:spTree>
+      <p:nvGrpSpPr>
+        <p:cNvPr id="1" name=""/>
+        <p:cNvGrpSpPr/>
+        <p:nvPr/>
+      </p:nvGrpSpPr>
+      <p:grpSpPr>
+        <a:xfrm>
+          <a:off x="0" y="0"/>
+          <a:ext cx="0" cy="0"/>
+          <a:chOff x="0" y="0"/>
+          <a:chExt cx="0" cy="0"/>
+        </a:xfrm>
+      </p:grpSpPr>
+      <p:sp>
+        <p:nvSpPr>
+          <p:cNvPr id="3074" name="Прямоугольник 2"/>
+          <p:cNvSpPr>
+            <a:spLocks noChangeArrowheads="1"/>
+          </p:cNvSpPr>
+          <p:nvPr/>
+        </p:nvSpPr>
+        <p:spPr bwMode="auto">
+          <a:xfrm>
+            <a:off x="478347" y="159023"/>
+            <a:ext cx="8187306" cy="646331"/>
+          </a:xfrm>
+          <a:prstGeom prst="rect">
+            <a:avLst/>
+          </a:prstGeom>
+          <a:noFill/>
+          <a:ln>
+            <a:noFill/>
+          </a:ln>
+          <a:extLst>
+            <a:ext uri="{909E8E84-426E-40DD-AFC4-6F175D3DCCD1}">
+              <a14:hiddenFill xmlns:a14="http://schemas.microsoft.com/office/drawing/2010/main">
+                <a:solidFill>
+                  <a:srgbClr val="FFFFFF"/>
+                </a:solidFill>
+              </a14:hiddenFill>
+            </a:ext>
+            <a:ext uri="{91240B29-F687-4F45-9708-019B960494DF}">
+              <a14:hiddenLine xmlns:a14="http://schemas.microsoft.com/office/drawing/2010/main" w="9525">
+                <a:solidFill>
+                  <a:srgbClr val="000000"/>
+                </a:solidFill>
+                <a:miter lim="800000"/>
+                <a:headEnd/>
+                <a:tailEnd/>
+              </a14:hiddenLine>
+            </a:ext>
+          </a:extLst>
+        </p:spPr>
+        <p:txBody>
+          <a:bodyPr wrap="none">
+            <a:spAutoFit/>
+          </a:bodyPr>
+          <a:lstStyle/>
+          <a:p>
+            <a:r>
+              <a:rPr lang="be-BY" sz="3600" b="1" dirty="0"/>
+              <a:t>Исключительные </a:t>
+            </a:r>
+            <a:r>
+              <a:rPr lang="be-BY" sz="3600" b="1" dirty="0" smtClean="0"/>
+              <a:t>ситуации</a:t>
+            </a:r>
+            <a:r>
+              <a:rPr lang="en-US" sz="3600" b="1" dirty="0" smtClean="0"/>
+              <a:t> (exceptions)</a:t>
+            </a:r>
+            <a:r>
+              <a:rPr lang="ru-RU" sz="3600" b="1" dirty="0" smtClean="0"/>
+              <a:t>.</a:t>
+            </a:r>
+            <a:endParaRPr lang="ru-RU" sz="3600" b="1" dirty="0"/>
+          </a:p>
+        </p:txBody>
+      </p:sp>
+      <p:sp>
+        <p:nvSpPr>
+          <p:cNvPr id="2" name="TextBox 1"/>
+          <p:cNvSpPr txBox="1"/>
+          <p:nvPr/>
+        </p:nvSpPr>
+        <p:spPr>
+          <a:xfrm>
+            <a:off x="293233" y="1192543"/>
+            <a:ext cx="8557535" cy="4154984"/>
+          </a:xfrm>
+          <a:prstGeom prst="rect">
+            <a:avLst/>
+          </a:prstGeom>
+          <a:noFill/>
+        </p:spPr>
+        <p:txBody>
+          <a:bodyPr wrap="square" rtlCol="0">
+            <a:spAutoFit/>
+          </a:bodyPr>
+          <a:lstStyle/>
+          <a:p>
+            <a:r>
+              <a:rPr lang="ru-RU" sz="2400" dirty="0" smtClean="0"/>
+              <a:t>Исключительные ситуации это механизм работы с ошибками в среде </a:t>
+            </a:r>
+            <a:r>
+              <a:rPr lang="en-US" sz="2400" dirty="0" smtClean="0"/>
+              <a:t>.NET. </a:t>
+            </a:r>
+            <a:r>
+              <a:rPr lang="ru-RU" sz="2400" dirty="0" smtClean="0"/>
+              <a:t>Под ошибкой понимается отклонение программы от маршрута заложенном в коде. Причиной может быть реальная ошибка</a:t>
+            </a:r>
+            <a:r>
+              <a:rPr lang="en-US" sz="2400" dirty="0" smtClean="0"/>
+              <a:t> </a:t>
+            </a:r>
+            <a:r>
+              <a:rPr lang="ru-RU" sz="2400" dirty="0" smtClean="0"/>
+              <a:t>программиста. </a:t>
+            </a:r>
+            <a:r>
+              <a:rPr lang="ru-RU" sz="2400" dirty="0"/>
+              <a:t>Н</a:t>
+            </a:r>
+            <a:r>
+              <a:rPr lang="ru-RU" sz="2400" dirty="0" smtClean="0"/>
+              <a:t>апример, выход за пределы массива или обращение к неициализированной ссылочной переменной. Другой причиной может стать среда исполнения программы. Например, при попытке записи в файл может выясниться что у пользователя нет на это прав.</a:t>
+            </a:r>
+          </a:p>
+          <a:p>
+            <a:endParaRPr lang="ru-RU" sz="2400" dirty="0"/>
+          </a:p>
+          <a:p>
+            <a:r>
+              <a:rPr lang="ru-RU" sz="2400" dirty="0" smtClean="0"/>
+              <a:t>Необработанные исключения приводят к аварийному завершению программы.</a:t>
+            </a:r>
+            <a:endParaRPr lang="ru-RU" sz="2400" dirty="0"/>
+          </a:p>
+        </p:txBody>
+      </p:sp>
+    </p:spTree>
+    <p:extLst>
+      <p:ext uri="{BB962C8B-B14F-4D97-AF65-F5344CB8AC3E}">
+        <p14:creationId xmlns:p14="http://schemas.microsoft.com/office/powerpoint/2010/main" val="7829428"/>
+      </p:ext>
+    </p:extLst>
+  </p:cSld>
+  <p:clrMapOvr>
+    <a:masterClrMapping/>
+  </p:clrMapOvr>
+  <p:timing>
+    <p:tnLst>
+      <p:par>
+        <p:cTn id="1" dur="indefinite" restart="never" nodeType="tmRoot"/>
+      </p:par>
+    </p:tnLst>
+  </p:timing>
+</p:sld>
+</file>
+
+<file path=ppt/slides/slide30.xml><?xml version="1.0" encoding="utf-8"?>
+<p:sld xmlns:a="http://schemas.openxmlformats.org/drawingml/2006/main" xmlns:r="http://schemas.openxmlformats.org/officeDocument/2006/relationships" xmlns:p="http://schemas.openxmlformats.org/presentationml/2006/main">
+  <p:cSld>
+    <p:bg>
+      <p:bgPr>
+        <a:blipFill dpi="0" rotWithShape="1">
+          <a:blip r:embed="rId2">
+            <a:lum/>
+          </a:blip>
+          <a:srcRect/>
+          <a:stretch>
+            <a:fillRect/>
+          </a:stretch>
+        </a:blipFill>
+        <a:effectLst/>
+      </p:bgPr>
+    </p:bg>
+    <p:spTree>
+      <p:nvGrpSpPr>
+        <p:cNvPr id="1" name=""/>
+        <p:cNvGrpSpPr/>
+        <p:nvPr/>
+      </p:nvGrpSpPr>
+      <p:grpSpPr>
+        <a:xfrm>
+          <a:off x="0" y="0"/>
+          <a:ext cx="0" cy="0"/>
+          <a:chOff x="0" y="0"/>
+          <a:chExt cx="0" cy="0"/>
+        </a:xfrm>
+      </p:grpSpPr>
+      <p:sp>
+        <p:nvSpPr>
+          <p:cNvPr id="9218" name="Прямоугольник 2"/>
+          <p:cNvSpPr>
+            <a:spLocks noChangeArrowheads="1"/>
+          </p:cNvSpPr>
+          <p:nvPr/>
+        </p:nvSpPr>
+        <p:spPr bwMode="auto">
+          <a:xfrm>
+            <a:off x="152400" y="0"/>
+            <a:ext cx="8668072" cy="461665"/>
+          </a:xfrm>
+          <a:prstGeom prst="rect">
+            <a:avLst/>
+          </a:prstGeom>
+          <a:noFill/>
+          <a:ln>
+            <a:noFill/>
+          </a:ln>
+          <a:extLst>
+            <a:ext uri="{909E8E84-426E-40DD-AFC4-6F175D3DCCD1}">
+              <a14:hiddenFill xmlns:a14="http://schemas.microsoft.com/office/drawing/2010/main">
+                <a:solidFill>
+                  <a:srgbClr val="FFFFFF"/>
+                </a:solidFill>
+              </a14:hiddenFill>
+            </a:ext>
+            <a:ext uri="{91240B29-F687-4F45-9708-019B960494DF}">
+              <a14:hiddenLine xmlns:a14="http://schemas.microsoft.com/office/drawing/2010/main" w="9525">
+                <a:solidFill>
+                  <a:srgbClr val="000000"/>
+                </a:solidFill>
+                <a:miter lim="800000"/>
+                <a:headEnd/>
+                <a:tailEnd/>
+              </a14:hiddenLine>
+            </a:ext>
+          </a:extLst>
+        </p:spPr>
+        <p:txBody>
+          <a:bodyPr wrap="square">
+            <a:spAutoFit/>
+          </a:bodyPr>
+          <a:lstStyle/>
+          <a:p>
+            <a:pPr algn="ctr"/>
+            <a:r>
+              <a:rPr lang="ru-RU" sz="2400" b="1" dirty="0" smtClean="0"/>
+              <a:t>Иерархия потоков</a:t>
+            </a:r>
+            <a:endParaRPr lang="ru-RU" sz="2400" b="1" dirty="0"/>
+          </a:p>
+        </p:txBody>
+      </p:sp>
+      <p:pic>
+        <p:nvPicPr>
+          <p:cNvPr id="2" name="Picture 1"/>
+          <p:cNvPicPr>
+            <a:picLocks noChangeAspect="1"/>
+          </p:cNvPicPr>
+          <p:nvPr/>
+        </p:nvPicPr>
+        <p:blipFill>
+          <a:blip r:embed="rId3">
+            <a:extLst>
+              <a:ext uri="{28A0092B-C50C-407E-A947-70E740481C1C}">
+                <a14:useLocalDpi xmlns:a14="http://schemas.microsoft.com/office/drawing/2010/main" val="0"/>
+              </a:ext>
+            </a:extLst>
+          </a:blip>
+          <a:stretch>
+            <a:fillRect/>
+          </a:stretch>
+        </p:blipFill>
+        <p:spPr>
+          <a:xfrm>
+            <a:off x="766231" y="2348046"/>
+            <a:ext cx="7611538" cy="2953162"/>
+          </a:xfrm>
+          <a:prstGeom prst="rect">
+            <a:avLst/>
+          </a:prstGeom>
+        </p:spPr>
+      </p:pic>
+      <p:sp>
+        <p:nvSpPr>
+          <p:cNvPr id="3" name="TextBox 2"/>
+          <p:cNvSpPr txBox="1"/>
+          <p:nvPr/>
+        </p:nvSpPr>
+        <p:spPr>
+          <a:xfrm>
+            <a:off x="400233" y="1038672"/>
+            <a:ext cx="8343535" cy="646331"/>
+          </a:xfrm>
+          <a:prstGeom prst="rect">
+            <a:avLst/>
+          </a:prstGeom>
+          <a:noFill/>
+        </p:spPr>
+        <p:txBody>
+          <a:bodyPr wrap="square" rtlCol="0">
+            <a:spAutoFit/>
+          </a:bodyPr>
+          <a:lstStyle/>
+          <a:p>
+            <a:r>
+              <a:rPr lang="ru-RU" dirty="0" smtClean="0"/>
+              <a:t>Все потоки в </a:t>
+            </a:r>
+            <a:r>
+              <a:rPr lang="en-US" dirty="0" smtClean="0"/>
+              <a:t>.NET </a:t>
+            </a:r>
+            <a:r>
+              <a:rPr lang="ru-RU" dirty="0" smtClean="0"/>
+              <a:t>являются наследниками абстрактного класса </a:t>
+            </a:r>
+            <a:r>
+              <a:rPr lang="en-US" dirty="0" err="1" smtClean="0"/>
+              <a:t>System.IO.Stream</a:t>
+            </a:r>
+            <a:r>
+              <a:rPr lang="en-US" dirty="0" smtClean="0"/>
+              <a:t>. </a:t>
+            </a:r>
+            <a:r>
+              <a:rPr lang="ru-RU" dirty="0" smtClean="0"/>
+              <a:t> Перед вами иерархия некоторых потоков из базовой библиотеки.</a:t>
+            </a:r>
+            <a:endParaRPr lang="ru-RU" dirty="0"/>
+          </a:p>
+        </p:txBody>
+      </p:sp>
+    </p:spTree>
+    <p:extLst>
+      <p:ext uri="{BB962C8B-B14F-4D97-AF65-F5344CB8AC3E}">
+        <p14:creationId xmlns:p14="http://schemas.microsoft.com/office/powerpoint/2010/main" val="3206347925"/>
+      </p:ext>
+    </p:extLst>
+  </p:cSld>
+  <p:clrMapOvr>
+    <a:masterClrMapping/>
+  </p:clrMapOvr>
+  <p:timing>
+    <p:tnLst>
+      <p:par>
+        <p:cTn id="1" dur="indefinite" restart="never" nodeType="tmRoot"/>
+      </p:par>
+    </p:tnLst>
+  </p:timing>
+</p:sld>
+</file>
+
+<file path=ppt/slides/slide31.xml><?xml version="1.0" encoding="utf-8"?>
+<p:sld xmlns:a="http://schemas.openxmlformats.org/drawingml/2006/main" xmlns:r="http://schemas.openxmlformats.org/officeDocument/2006/relationships" xmlns:p="http://schemas.openxmlformats.org/presentationml/2006/main">
+  <p:cSld>
     <p:bg>
       <p:bgPr>
         <a:blipFill dpi="0" rotWithShape="1">
@@ -32858,8 +33377,8 @@
         </p:nvSpPr>
         <p:spPr bwMode="auto">
           <a:xfrm>
-            <a:off x="3048000" y="0"/>
-            <a:ext cx="2741613" cy="461963"/>
+            <a:off x="287524" y="0"/>
+            <a:ext cx="8568952" cy="461665"/>
           </a:xfrm>
           <a:prstGeom prst="rect">
             <a:avLst/>
@@ -32889,19 +33408,21 @@
           </a:extLst>
         </p:spPr>
         <p:txBody>
-          <a:bodyPr wrap="none">
+          <a:bodyPr wrap="square">
             <a:spAutoFit/>
           </a:bodyPr>
           <a:lstStyle/>
           <a:p>
-            <a:r>
-              <a:rPr lang="be-BY" sz="2400" b="1"/>
-              <a:t>Классы потоков</a:t>
-            </a:r>
-            <a:r>
-              <a:rPr lang="ru-RU" sz="2400" b="1"/>
-              <a:t>.</a:t>
-            </a:r>
+            <a:pPr algn="ctr"/>
+            <a:r>
+              <a:rPr lang="ru-RU" sz="2400" b="1" dirty="0" smtClean="0"/>
+              <a:t>Члены класса </a:t>
+            </a:r>
+            <a:r>
+              <a:rPr lang="en-US" sz="2400" b="1" dirty="0" smtClean="0"/>
+              <a:t>Stream</a:t>
+            </a:r>
+            <a:endParaRPr lang="ru-RU" sz="2400" b="1" dirty="0"/>
           </a:p>
         </p:txBody>
       </p:sp>
@@ -32915,8 +33436,8 @@
         </p:nvSpPr>
         <p:spPr bwMode="auto">
           <a:xfrm>
-            <a:off x="76200" y="381000"/>
-            <a:ext cx="8991600" cy="338138"/>
+            <a:off x="76200" y="683985"/>
+            <a:ext cx="8991600" cy="584775"/>
           </a:xfrm>
           <a:prstGeom prst="rect">
             <a:avLst/>
@@ -33048,14 +33569,30 @@
             </a:lvl9pPr>
           </a:lstStyle>
           <a:p>
-            <a:pPr eaLnBrk="1" hangingPunct="1"/>
+            <a:pPr algn="ctr" eaLnBrk="1" hangingPunct="1"/>
             <a:r>
               <a:rPr lang="ru-RU" sz="1600" dirty="0"/>
-              <a:t>	Все классы бинарных потоков унаследованы от абстрактного класса </a:t>
+              <a:t>	Все классы </a:t>
+            </a:r>
+            <a:r>
+              <a:rPr lang="ru-RU" sz="1600" dirty="0" smtClean="0"/>
+              <a:t>потоков </a:t>
+            </a:r>
+            <a:r>
+              <a:rPr lang="ru-RU" sz="1600" dirty="0"/>
+              <a:t>унаследованы от абстрактного класса </a:t>
+            </a:r>
+            <a:r>
+              <a:rPr lang="en-US" sz="1600" dirty="0" smtClean="0"/>
+              <a:t>Stream</a:t>
             </a:r>
             <a:r>
               <a:rPr lang="en-US" sz="1600" dirty="0"/>
-              <a:t>Stream.</a:t>
+              <a:t> </a:t>
+            </a:r>
+            <a:r>
+              <a:rPr lang="ru-RU" sz="1600" dirty="0" smtClean="0"/>
+              <a:t>и поэтому обладают одинаковой функциональностью.</a:t>
             </a:r>
             <a:endParaRPr lang="be-BY" sz="1600" dirty="0">
               <a:solidFill>
@@ -33077,13 +33614,13 @@
           <p:nvPr>
             <p:extLst>
               <p:ext uri="{D42A27DB-BD31-4B8C-83A1-F6EECF244321}">
-                <p14:modId xmlns:p14="http://schemas.microsoft.com/office/powerpoint/2010/main" val="1073971523"/>
+                <p14:modId xmlns:p14="http://schemas.microsoft.com/office/powerpoint/2010/main" val="2928235977"/>
               </p:ext>
             </p:extLst>
           </p:nvPr>
         </p:nvGraphicFramePr>
         <p:xfrm>
-          <a:off x="152400" y="838200"/>
+          <a:off x="152400" y="1412776"/>
           <a:ext cx="8839200" cy="4068908"/>
         </p:xfrm>
         <a:graphic>
@@ -33763,327 +34300,7 @@
 </p:sld>
 </file>
 
-<file path=ppt/slides/slide3.xml><?xml version="1.0" encoding="utf-8"?>
-<p:sld xmlns:a="http://schemas.openxmlformats.org/drawingml/2006/main" xmlns:r="http://schemas.openxmlformats.org/officeDocument/2006/relationships" xmlns:p="http://schemas.openxmlformats.org/presentationml/2006/main">
-  <p:cSld>
-    <p:bg>
-      <p:bgPr>
-        <a:blipFill dpi="0" rotWithShape="1">
-          <a:blip r:embed="rId2">
-            <a:lum/>
-          </a:blip>
-          <a:srcRect/>
-          <a:stretch>
-            <a:fillRect/>
-          </a:stretch>
-        </a:blipFill>
-        <a:effectLst/>
-      </p:bgPr>
-    </p:bg>
-    <p:spTree>
-      <p:nvGrpSpPr>
-        <p:cNvPr id="1" name=""/>
-        <p:cNvGrpSpPr/>
-        <p:nvPr/>
-      </p:nvGrpSpPr>
-      <p:grpSpPr>
-        <a:xfrm>
-          <a:off x="0" y="0"/>
-          <a:ext cx="0" cy="0"/>
-          <a:chOff x="0" y="0"/>
-          <a:chExt cx="0" cy="0"/>
-        </a:xfrm>
-      </p:grpSpPr>
-      <p:sp>
-        <p:nvSpPr>
-          <p:cNvPr id="3074" name="Прямоугольник 2"/>
-          <p:cNvSpPr>
-            <a:spLocks noChangeArrowheads="1"/>
-          </p:cNvSpPr>
-          <p:nvPr/>
-        </p:nvSpPr>
-        <p:spPr bwMode="auto">
-          <a:xfrm>
-            <a:off x="478347" y="159023"/>
-            <a:ext cx="8187306" cy="646331"/>
-          </a:xfrm>
-          <a:prstGeom prst="rect">
-            <a:avLst/>
-          </a:prstGeom>
-          <a:noFill/>
-          <a:ln>
-            <a:noFill/>
-          </a:ln>
-          <a:extLst>
-            <a:ext uri="{909E8E84-426E-40DD-AFC4-6F175D3DCCD1}">
-              <a14:hiddenFill xmlns:a14="http://schemas.microsoft.com/office/drawing/2010/main">
-                <a:solidFill>
-                  <a:srgbClr val="FFFFFF"/>
-                </a:solidFill>
-              </a14:hiddenFill>
-            </a:ext>
-            <a:ext uri="{91240B29-F687-4F45-9708-019B960494DF}">
-              <a14:hiddenLine xmlns:a14="http://schemas.microsoft.com/office/drawing/2010/main" w="9525">
-                <a:solidFill>
-                  <a:srgbClr val="000000"/>
-                </a:solidFill>
-                <a:miter lim="800000"/>
-                <a:headEnd/>
-                <a:tailEnd/>
-              </a14:hiddenLine>
-            </a:ext>
-          </a:extLst>
-        </p:spPr>
-        <p:txBody>
-          <a:bodyPr wrap="none">
-            <a:spAutoFit/>
-          </a:bodyPr>
-          <a:lstStyle/>
-          <a:p>
-            <a:r>
-              <a:rPr lang="be-BY" sz="3600" b="1" dirty="0"/>
-              <a:t>Исключительные </a:t>
-            </a:r>
-            <a:r>
-              <a:rPr lang="be-BY" sz="3600" b="1" dirty="0" smtClean="0"/>
-              <a:t>ситуации</a:t>
-            </a:r>
-            <a:r>
-              <a:rPr lang="en-US" sz="3600" b="1" dirty="0" smtClean="0"/>
-              <a:t> (exceptions)</a:t>
-            </a:r>
-            <a:r>
-              <a:rPr lang="ru-RU" sz="3600" b="1" dirty="0" smtClean="0"/>
-              <a:t>.</a:t>
-            </a:r>
-            <a:endParaRPr lang="ru-RU" sz="3600" b="1" dirty="0"/>
-          </a:p>
-        </p:txBody>
-      </p:sp>
-      <p:sp>
-        <p:nvSpPr>
-          <p:cNvPr id="2" name="TextBox 1"/>
-          <p:cNvSpPr txBox="1"/>
-          <p:nvPr/>
-        </p:nvSpPr>
-        <p:spPr>
-          <a:xfrm>
-            <a:off x="293233" y="1192543"/>
-            <a:ext cx="8557535" cy="4154984"/>
-          </a:xfrm>
-          <a:prstGeom prst="rect">
-            <a:avLst/>
-          </a:prstGeom>
-          <a:noFill/>
-        </p:spPr>
-        <p:txBody>
-          <a:bodyPr wrap="square" rtlCol="0">
-            <a:spAutoFit/>
-          </a:bodyPr>
-          <a:lstStyle/>
-          <a:p>
-            <a:r>
-              <a:rPr lang="ru-RU" sz="2400" dirty="0" smtClean="0"/>
-              <a:t>Исключительные ситуации это механизм работы с ошибками в среде </a:t>
-            </a:r>
-            <a:r>
-              <a:rPr lang="en-US" sz="2400" dirty="0" smtClean="0"/>
-              <a:t>.NET. </a:t>
-            </a:r>
-            <a:r>
-              <a:rPr lang="ru-RU" sz="2400" dirty="0" smtClean="0"/>
-              <a:t>Под ошибкой понимается отклонение программы от маршрута заложенном в коде. Причиной может быть реальная ошибка</a:t>
-            </a:r>
-            <a:r>
-              <a:rPr lang="en-US" sz="2400" dirty="0" smtClean="0"/>
-              <a:t> </a:t>
-            </a:r>
-            <a:r>
-              <a:rPr lang="ru-RU" sz="2400" dirty="0" smtClean="0"/>
-              <a:t>программиста. </a:t>
-            </a:r>
-            <a:r>
-              <a:rPr lang="ru-RU" sz="2400" dirty="0"/>
-              <a:t>Н</a:t>
-            </a:r>
-            <a:r>
-              <a:rPr lang="ru-RU" sz="2400" dirty="0" smtClean="0"/>
-              <a:t>апример, выход за пределы массива или обращение к неициализированной ссылочной переменной. Другой причиной может стать среда исполнения программы. Например, при попытке записи в файл может выясниться что у пользователя нет на это прав.</a:t>
-            </a:r>
-          </a:p>
-          <a:p>
-            <a:endParaRPr lang="ru-RU" sz="2400" dirty="0"/>
-          </a:p>
-          <a:p>
-            <a:r>
-              <a:rPr lang="ru-RU" sz="2400" dirty="0" smtClean="0"/>
-              <a:t>Необработанные исключения приводят к аварийному завершению программы.</a:t>
-            </a:r>
-            <a:endParaRPr lang="ru-RU" sz="2400" dirty="0"/>
-          </a:p>
-        </p:txBody>
-      </p:sp>
-    </p:spTree>
-    <p:extLst>
-      <p:ext uri="{BB962C8B-B14F-4D97-AF65-F5344CB8AC3E}">
-        <p14:creationId xmlns:p14="http://schemas.microsoft.com/office/powerpoint/2010/main" val="7829428"/>
-      </p:ext>
-    </p:extLst>
-  </p:cSld>
-  <p:clrMapOvr>
-    <a:masterClrMapping/>
-  </p:clrMapOvr>
-  <p:timing>
-    <p:tnLst>
-      <p:par>
-        <p:cTn id="1" dur="indefinite" restart="never" nodeType="tmRoot"/>
-      </p:par>
-    </p:tnLst>
-  </p:timing>
-</p:sld>
-</file>
-
-<file path=ppt/slides/slide30.xml><?xml version="1.0" encoding="utf-8"?>
-<p:sld xmlns:a="http://schemas.openxmlformats.org/drawingml/2006/main" xmlns:r="http://schemas.openxmlformats.org/officeDocument/2006/relationships" xmlns:p="http://schemas.openxmlformats.org/presentationml/2006/main">
-  <p:cSld>
-    <p:spTree>
-      <p:nvGrpSpPr>
-        <p:cNvPr id="1" name=""/>
-        <p:cNvGrpSpPr/>
-        <p:nvPr/>
-      </p:nvGrpSpPr>
-      <p:grpSpPr>
-        <a:xfrm>
-          <a:off x="0" y="0"/>
-          <a:ext cx="0" cy="0"/>
-          <a:chOff x="0" y="0"/>
-          <a:chExt cx="0" cy="0"/>
-        </a:xfrm>
-      </p:grpSpPr>
-      <p:sp>
-        <p:nvSpPr>
-          <p:cNvPr id="2" name="Title 1"/>
-          <p:cNvSpPr>
-            <a:spLocks noGrp="1"/>
-          </p:cNvSpPr>
-          <p:nvPr>
-            <p:ph type="title"/>
-          </p:nvPr>
-        </p:nvSpPr>
-        <p:spPr/>
-        <p:txBody>
-          <a:bodyPr/>
-          <a:lstStyle/>
-          <a:p>
-            <a:r>
-              <a:rPr lang="ru-RU" dirty="0" smtClean="0"/>
-              <a:t>Понятие потока</a:t>
-            </a:r>
-            <a:endParaRPr lang="ru-RU" dirty="0"/>
-          </a:p>
-        </p:txBody>
-      </p:sp>
-      <p:sp>
-        <p:nvSpPr>
-          <p:cNvPr id="3" name="Content Placeholder 2"/>
-          <p:cNvSpPr>
-            <a:spLocks noGrp="1"/>
-          </p:cNvSpPr>
-          <p:nvPr>
-            <p:ph idx="1"/>
-          </p:nvPr>
-        </p:nvSpPr>
-        <p:spPr>
-          <a:solidFill>
-            <a:schemeClr val="bg1"/>
-          </a:solidFill>
-        </p:spPr>
-        <p:txBody>
-          <a:bodyPr/>
-          <a:lstStyle/>
-          <a:p>
-            <a:pPr marL="0" indent="0">
-              <a:buNone/>
-            </a:pPr>
-            <a:endParaRPr lang="ru-RU" dirty="0"/>
-          </a:p>
-        </p:txBody>
-      </p:sp>
-      <p:pic>
-        <p:nvPicPr>
-          <p:cNvPr id="1027" name="Picture 3"/>
-          <p:cNvPicPr>
-            <a:picLocks noChangeAspect="1" noChangeArrowheads="1"/>
-          </p:cNvPicPr>
-          <p:nvPr/>
-        </p:nvPicPr>
-        <p:blipFill>
-          <a:blip r:embed="rId2">
-            <a:extLst>
-              <a:ext uri="{28A0092B-C50C-407E-A947-70E740481C1C}">
-                <a14:useLocalDpi xmlns:a14="http://schemas.microsoft.com/office/drawing/2010/main" val="0"/>
-              </a:ext>
-            </a:extLst>
-          </a:blip>
-          <a:srcRect/>
-          <a:stretch>
-            <a:fillRect/>
-          </a:stretch>
-        </p:blipFill>
-        <p:spPr bwMode="auto">
-          <a:xfrm>
-            <a:off x="1547813" y="1864965"/>
-            <a:ext cx="6048375" cy="3724275"/>
-          </a:xfrm>
-          <a:prstGeom prst="rect">
-            <a:avLst/>
-          </a:prstGeom>
-          <a:noFill/>
-          <a:ln>
-            <a:noFill/>
-          </a:ln>
-          <a:extLst>
-            <a:ext uri="{909E8E84-426E-40DD-AFC4-6F175D3DCCD1}">
-              <a14:hiddenFill xmlns:a14="http://schemas.microsoft.com/office/drawing/2010/main">
-                <a:solidFill>
-                  <a:schemeClr val="accent1"/>
-                </a:solidFill>
-              </a14:hiddenFill>
-            </a:ext>
-            <a:ext uri="{91240B29-F687-4F45-9708-019B960494DF}">
-              <a14:hiddenLine xmlns:a14="http://schemas.microsoft.com/office/drawing/2010/main" w="9525">
-                <a:solidFill>
-                  <a:schemeClr val="tx1"/>
-                </a:solidFill>
-                <a:miter lim="800000"/>
-                <a:headEnd/>
-                <a:tailEnd/>
-              </a14:hiddenLine>
-            </a:ext>
-          </a:extLst>
-        </p:spPr>
-      </p:pic>
-    </p:spTree>
-    <p:extLst>
-      <p:ext uri="{BB962C8B-B14F-4D97-AF65-F5344CB8AC3E}">
-        <p14:creationId xmlns:p14="http://schemas.microsoft.com/office/powerpoint/2010/main" val="1553627584"/>
-      </p:ext>
-    </p:extLst>
-  </p:cSld>
-  <p:clrMapOvr>
-    <a:masterClrMapping/>
-  </p:clrMapOvr>
-  <p:timing>
-    <p:tnLst>
-      <p:par>
-        <p:cTn id="1" dur="indefinite" restart="never" nodeType="tmRoot"/>
-      </p:par>
-    </p:tnLst>
-  </p:timing>
-</p:sld>
-</file>
-
-<file path=ppt/slides/slide31.xml><?xml version="1.0" encoding="utf-8"?>
+<file path=ppt/slides/slide32.xml><?xml version="1.0" encoding="utf-8"?>
 <p:sld xmlns:a="http://schemas.openxmlformats.org/drawingml/2006/main" xmlns:r="http://schemas.openxmlformats.org/officeDocument/2006/relationships" xmlns:p="http://schemas.openxmlformats.org/presentationml/2006/main">
   <p:cSld>
     <p:bg>
@@ -35051,7 +35268,7 @@
 </p:sld>
 </file>
 
-<file path=ppt/slides/slide32.xml><?xml version="1.0" encoding="utf-8"?>
+<file path=ppt/slides/slide33.xml><?xml version="1.0" encoding="utf-8"?>
 <p:sld xmlns:a="http://schemas.openxmlformats.org/drawingml/2006/main" xmlns:r="http://schemas.openxmlformats.org/officeDocument/2006/relationships" xmlns:p="http://schemas.openxmlformats.org/presentationml/2006/main">
   <p:cSld>
     <p:bg>
@@ -36228,7 +36445,7 @@
 </p:sld>
 </file>
 
-<file path=ppt/slides/slide33.xml><?xml version="1.0" encoding="utf-8"?>
+<file path=ppt/slides/slide34.xml><?xml version="1.0" encoding="utf-8"?>
 <p:sld xmlns:a="http://schemas.openxmlformats.org/drawingml/2006/main" xmlns:r="http://schemas.openxmlformats.org/officeDocument/2006/relationships" xmlns:p="http://schemas.openxmlformats.org/presentationml/2006/main">
   <p:cSld>
     <p:spTree>
@@ -36459,7 +36676,7 @@
 </p:sld>
 </file>
 
-<file path=ppt/slides/slide34.xml><?xml version="1.0" encoding="utf-8"?>
+<file path=ppt/slides/slide35.xml><?xml version="1.0" encoding="utf-8"?>
 <p:sld xmlns:a="http://schemas.openxmlformats.org/drawingml/2006/main" xmlns:r="http://schemas.openxmlformats.org/officeDocument/2006/relationships" xmlns:p="http://schemas.openxmlformats.org/presentationml/2006/main">
   <p:cSld>
     <p:bg>
@@ -36660,7 +36877,7 @@
 </p:sld>
 </file>
 
-<file path=ppt/slides/slide35.xml><?xml version="1.0" encoding="utf-8"?>
+<file path=ppt/slides/slide36.xml><?xml version="1.0" encoding="utf-8"?>
 <p:sld xmlns:a="http://schemas.openxmlformats.org/drawingml/2006/main" xmlns:r="http://schemas.openxmlformats.org/officeDocument/2006/relationships" xmlns:p="http://schemas.openxmlformats.org/presentationml/2006/main">
   <p:cSld>
     <p:spTree>
@@ -36839,7 +37056,7 @@
 </p:sld>
 </file>
 
-<file path=ppt/slides/slide36.xml><?xml version="1.0" encoding="utf-8"?>
+<file path=ppt/slides/slide37.xml><?xml version="1.0" encoding="utf-8"?>
 <p:sld xmlns:a="http://schemas.openxmlformats.org/drawingml/2006/main" xmlns:r="http://schemas.openxmlformats.org/officeDocument/2006/relationships" xmlns:p="http://schemas.openxmlformats.org/presentationml/2006/main">
   <p:cSld>
     <p:bg>
@@ -37075,7 +37292,7 @@
 </p:sld>
 </file>
 
-<file path=ppt/slides/slide37.xml><?xml version="1.0" encoding="utf-8"?>
+<file path=ppt/slides/slide38.xml><?xml version="1.0" encoding="utf-8"?>
 <p:sld xmlns:a="http://schemas.openxmlformats.org/drawingml/2006/main" xmlns:r="http://schemas.openxmlformats.org/officeDocument/2006/relationships" xmlns:p="http://schemas.openxmlformats.org/presentationml/2006/main">
   <p:cSld>
     <p:bg>

</xml_diff>

<commit_message>
Added several IO terms
</commit_message>
<xml_diff>
--- a/Presentation/lesson-04-io.pptx
+++ b/Presentation/lesson-04-io.pptx
@@ -327,7 +327,7 @@
             <a:fld id="{FAECF776-F836-4CCD-9497-99E5597B8B5D}" type="datetimeFigureOut">
               <a:rPr lang="en-US" smtClean="0"/>
               <a:pPr/>
-              <a:t>8/30/2014</a:t>
+              <a:t>9/3/2014</a:t>
             </a:fld>
             <a:endParaRPr lang="en-US"/>
           </a:p>
@@ -499,7 +499,7 @@
             <a:fld id="{FAECF776-F836-4CCD-9497-99E5597B8B5D}" type="datetimeFigureOut">
               <a:rPr lang="en-US" smtClean="0"/>
               <a:pPr/>
-              <a:t>8/30/2014</a:t>
+              <a:t>9/3/2014</a:t>
             </a:fld>
             <a:endParaRPr lang="en-US"/>
           </a:p>
@@ -681,7 +681,7 @@
             <a:fld id="{FAECF776-F836-4CCD-9497-99E5597B8B5D}" type="datetimeFigureOut">
               <a:rPr lang="en-US" smtClean="0"/>
               <a:pPr/>
-              <a:t>8/30/2014</a:t>
+              <a:t>9/3/2014</a:t>
             </a:fld>
             <a:endParaRPr lang="en-US"/>
           </a:p>
@@ -931,7 +931,7 @@
                 </a:solidFill>
               </a:rPr>
               <a:pPr/>
-              <a:t>8/30/2014</a:t>
+              <a:t>9/3/2014</a:t>
             </a:fld>
             <a:endParaRPr lang="en-US">
               <a:solidFill>
@@ -1133,7 +1133,7 @@
                 </a:solidFill>
               </a:rPr>
               <a:pPr/>
-              <a:t>8/30/2014</a:t>
+              <a:t>9/3/2014</a:t>
             </a:fld>
             <a:endParaRPr lang="en-US">
               <a:solidFill>
@@ -1411,7 +1411,7 @@
                 </a:solidFill>
               </a:rPr>
               <a:pPr/>
-              <a:t>8/30/2014</a:t>
+              <a:t>9/3/2014</a:t>
             </a:fld>
             <a:endParaRPr lang="en-US">
               <a:solidFill>
@@ -1731,7 +1731,7 @@
                 </a:solidFill>
               </a:rPr>
               <a:pPr/>
-              <a:t>8/30/2014</a:t>
+              <a:t>9/3/2014</a:t>
             </a:fld>
             <a:endParaRPr lang="en-US">
               <a:solidFill>
@@ -2185,7 +2185,7 @@
                 </a:solidFill>
               </a:rPr>
               <a:pPr/>
-              <a:t>8/30/2014</a:t>
+              <a:t>9/3/2014</a:t>
             </a:fld>
             <a:endParaRPr lang="en-US">
               <a:solidFill>
@@ -2335,7 +2335,7 @@
                 </a:solidFill>
               </a:rPr>
               <a:pPr/>
-              <a:t>8/30/2014</a:t>
+              <a:t>9/3/2014</a:t>
             </a:fld>
             <a:endParaRPr lang="en-US">
               <a:solidFill>
@@ -2462,7 +2462,7 @@
                 </a:solidFill>
               </a:rPr>
               <a:pPr/>
-              <a:t>8/30/2014</a:t>
+              <a:t>9/3/2014</a:t>
             </a:fld>
             <a:endParaRPr lang="en-US">
               <a:solidFill>
@@ -2771,7 +2771,7 @@
                 </a:solidFill>
               </a:rPr>
               <a:pPr/>
-              <a:t>8/30/2014</a:t>
+              <a:t>9/3/2014</a:t>
             </a:fld>
             <a:endParaRPr lang="en-US">
               <a:solidFill>
@@ -2967,7 +2967,7 @@
             <a:fld id="{FAECF776-F836-4CCD-9497-99E5597B8B5D}" type="datetimeFigureOut">
               <a:rPr lang="en-US" smtClean="0"/>
               <a:pPr/>
-              <a:t>8/30/2014</a:t>
+              <a:t>9/3/2014</a:t>
             </a:fld>
             <a:endParaRPr lang="en-US"/>
           </a:p>
@@ -3228,7 +3228,7 @@
                 </a:solidFill>
               </a:rPr>
               <a:pPr/>
-              <a:t>8/30/2014</a:t>
+              <a:t>9/3/2014</a:t>
             </a:fld>
             <a:endParaRPr lang="en-US">
               <a:solidFill>
@@ -3430,7 +3430,7 @@
                 </a:solidFill>
               </a:rPr>
               <a:pPr/>
-              <a:t>8/30/2014</a:t>
+              <a:t>9/3/2014</a:t>
             </a:fld>
             <a:endParaRPr lang="en-US">
               <a:solidFill>
@@ -3642,7 +3642,7 @@
                 </a:solidFill>
               </a:rPr>
               <a:pPr/>
-              <a:t>8/30/2014</a:t>
+              <a:t>9/3/2014</a:t>
             </a:fld>
             <a:endParaRPr lang="en-US">
               <a:solidFill>
@@ -3914,7 +3914,7 @@
             <a:fld id="{FAECF776-F836-4CCD-9497-99E5597B8B5D}" type="datetimeFigureOut">
               <a:rPr lang="en-US" smtClean="0"/>
               <a:pPr/>
-              <a:t>8/30/2014</a:t>
+              <a:t>9/3/2014</a:t>
             </a:fld>
             <a:endParaRPr lang="en-US"/>
           </a:p>
@@ -4204,7 +4204,7 @@
             <a:fld id="{FAECF776-F836-4CCD-9497-99E5597B8B5D}" type="datetimeFigureOut">
               <a:rPr lang="en-US" smtClean="0"/>
               <a:pPr/>
-              <a:t>8/30/2014</a:t>
+              <a:t>9/3/2014</a:t>
             </a:fld>
             <a:endParaRPr lang="en-US"/>
           </a:p>
@@ -4628,7 +4628,7 @@
             <a:fld id="{FAECF776-F836-4CCD-9497-99E5597B8B5D}" type="datetimeFigureOut">
               <a:rPr lang="en-US" smtClean="0"/>
               <a:pPr/>
-              <a:t>8/30/2014</a:t>
+              <a:t>9/3/2014</a:t>
             </a:fld>
             <a:endParaRPr lang="en-US"/>
           </a:p>
@@ -4748,7 +4748,7 @@
             <a:fld id="{FAECF776-F836-4CCD-9497-99E5597B8B5D}" type="datetimeFigureOut">
               <a:rPr lang="en-US" smtClean="0"/>
               <a:pPr/>
-              <a:t>8/30/2014</a:t>
+              <a:t>9/3/2014</a:t>
             </a:fld>
             <a:endParaRPr lang="en-US"/>
           </a:p>
@@ -4845,7 +4845,7 @@
             <a:fld id="{FAECF776-F836-4CCD-9497-99E5597B8B5D}" type="datetimeFigureOut">
               <a:rPr lang="en-US" smtClean="0"/>
               <a:pPr/>
-              <a:t>8/30/2014</a:t>
+              <a:t>9/3/2014</a:t>
             </a:fld>
             <a:endParaRPr lang="en-US"/>
           </a:p>
@@ -5124,7 +5124,7 @@
             <a:fld id="{FAECF776-F836-4CCD-9497-99E5597B8B5D}" type="datetimeFigureOut">
               <a:rPr lang="en-US" smtClean="0"/>
               <a:pPr/>
-              <a:t>8/30/2014</a:t>
+              <a:t>9/3/2014</a:t>
             </a:fld>
             <a:endParaRPr lang="en-US"/>
           </a:p>
@@ -5379,7 +5379,7 @@
             <a:fld id="{FAECF776-F836-4CCD-9497-99E5597B8B5D}" type="datetimeFigureOut">
               <a:rPr lang="en-US" smtClean="0"/>
               <a:pPr/>
-              <a:t>8/30/2014</a:t>
+              <a:t>9/3/2014</a:t>
             </a:fld>
             <a:endParaRPr lang="en-US"/>
           </a:p>
@@ -5603,7 +5603,7 @@
             <a:fld id="{FAECF776-F836-4CCD-9497-99E5597B8B5D}" type="datetimeFigureOut">
               <a:rPr lang="en-US" smtClean="0"/>
               <a:pPr/>
-              <a:t>8/30/2014</a:t>
+              <a:t>9/3/2014</a:t>
             </a:fld>
             <a:endParaRPr lang="en-US"/>
           </a:p>
@@ -6121,7 +6121,7 @@
                 </a:solidFill>
               </a:rPr>
               <a:pPr/>
-              <a:t>8/30/2014</a:t>
+              <a:t>9/3/2014</a:t>
             </a:fld>
             <a:endParaRPr lang="en-US">
               <a:solidFill>
@@ -8082,7 +8082,9 @@
         </p:nvSpPr>
         <p:spPr/>
         <p:txBody>
-          <a:bodyPr/>
+          <a:bodyPr>
+            <a:normAutofit fontScale="92500" lnSpcReduction="10000"/>
+          </a:bodyPr>
           <a:lstStyle/>
           <a:p>
             <a:r>
@@ -8091,12 +8093,88 @@
             </a:r>
             <a:r>
               <a:rPr lang="en-US" dirty="0" smtClean="0"/>
-              <a:t>: </a:t>
-            </a:r>
-            <a:r>
-              <a:rPr lang="en-US" smtClean="0"/>
-              <a:t>byte[]</a:t>
-            </a:r>
+              <a:t>: byte</a:t>
+            </a:r>
+            <a:r>
+              <a:rPr lang="en-US" dirty="0" smtClean="0"/>
+              <a:t>[]</a:t>
+            </a:r>
+          </a:p>
+          <a:p>
+            <a:r>
+              <a:rPr lang="ru-RU" dirty="0" smtClean="0"/>
+              <a:t>Абсолютный путь – путь начинающийся с корня диска. Например</a:t>
+            </a:r>
+            <a:r>
+              <a:rPr lang="en-US" dirty="0"/>
+              <a:t>, C:\Windows\Microsoft.NET</a:t>
+            </a:r>
+            <a:endParaRPr lang="ru-RU" dirty="0" smtClean="0"/>
+          </a:p>
+          <a:p>
+            <a:r>
+              <a:rPr lang="ru-RU" dirty="0" smtClean="0"/>
+              <a:t>Относительный путь</a:t>
+            </a:r>
+            <a:r>
+              <a:rPr lang="ru-RU" dirty="0"/>
+              <a:t> </a:t>
+            </a:r>
+            <a:r>
+              <a:rPr lang="ru-RU" dirty="0" smtClean="0"/>
+              <a:t>– путь указанный относительно «текущего каталога». Может включать символ</a:t>
+            </a:r>
+            <a:r>
+              <a:rPr lang="ru-RU" dirty="0"/>
+              <a:t>ы</a:t>
+            </a:r>
+            <a:r>
+              <a:rPr lang="ru-RU" dirty="0" smtClean="0"/>
+              <a:t> «</a:t>
+            </a:r>
+            <a:r>
+              <a:rPr lang="en-US" dirty="0" smtClean="0"/>
+              <a:t>..</a:t>
+            </a:r>
+            <a:r>
+              <a:rPr lang="ru-RU" dirty="0" smtClean="0"/>
+              <a:t>» указывающие на родительский каталог.</a:t>
+            </a:r>
+          </a:p>
+          <a:p>
+            <a:r>
+              <a:rPr lang="en-US" dirty="0" smtClean="0"/>
+              <a:t>UNC </a:t>
+            </a:r>
+            <a:r>
+              <a:rPr lang="ru-RU" dirty="0" smtClean="0"/>
+              <a:t>путь – путь к сетевому ресурсу. Имеет вид </a:t>
+            </a:r>
+            <a:r>
+              <a:rPr lang="en-US" dirty="0" smtClean="0"/>
+              <a:t>\\</a:t>
+            </a:r>
+            <a:r>
+              <a:rPr lang="ru-RU" dirty="0" smtClean="0"/>
+              <a:t>И</a:t>
+            </a:r>
+            <a:r>
+              <a:rPr lang="ru-RU" dirty="0" smtClean="0"/>
+              <a:t>мяКомпьютера\</a:t>
+            </a:r>
+            <a:r>
+              <a:rPr lang="ru-RU" dirty="0" smtClean="0"/>
+              <a:t>ИмяОбщейПапки</a:t>
+            </a:r>
+            <a:r>
+              <a:rPr lang="en-US" dirty="0" smtClean="0"/>
+              <a:t>\</a:t>
+            </a:r>
+            <a:r>
+              <a:rPr lang="ru-RU" dirty="0" smtClean="0"/>
+              <a:t>Путь</a:t>
+            </a:r>
+            <a:endParaRPr lang="ru-RU" dirty="0" smtClean="0"/>
           </a:p>
         </p:txBody>
       </p:sp>
@@ -32852,19 +32930,11 @@
           <a:p>
             <a:r>
               <a:rPr lang="ru-RU" dirty="0" smtClean="0"/>
-              <a:t>Понятие </a:t>
-            </a:r>
-            <a:r>
-              <a:rPr lang="ru-RU" dirty="0" smtClean="0"/>
-              <a:t>потока</a:t>
+              <a:t>Понятие потока</a:t>
             </a:r>
             <a:r>
               <a:rPr lang="en-US" dirty="0" smtClean="0"/>
-              <a:t> </a:t>
-            </a:r>
-            <a:r>
-              <a:rPr lang="en-US" dirty="0" smtClean="0"/>
-              <a:t>(Stream)</a:t>
+              <a:t> (Stream)</a:t>
             </a:r>
             <a:endParaRPr lang="ru-RU" dirty="0"/>
           </a:p>

</xml_diff>

<commit_message>
CSV reading via TextFieldParser class
</commit_message>
<xml_diff>
--- a/Presentation/lesson-04-io.pptx
+++ b/Presentation/lesson-04-io.pptx
@@ -42,21 +42,23 @@
     <p:sldId id="315" r:id="rId36"/>
     <p:sldId id="275" r:id="rId37"/>
     <p:sldId id="264" r:id="rId38"/>
-    <p:sldId id="288" r:id="rId39"/>
-    <p:sldId id="289" r:id="rId40"/>
-    <p:sldId id="265" r:id="rId41"/>
-    <p:sldId id="291" r:id="rId42"/>
-    <p:sldId id="302" r:id="rId43"/>
-    <p:sldId id="266" r:id="rId44"/>
-    <p:sldId id="267" r:id="rId45"/>
-    <p:sldId id="268" r:id="rId46"/>
-    <p:sldId id="287" r:id="rId47"/>
-    <p:sldId id="278" r:id="rId48"/>
-    <p:sldId id="298" r:id="rId49"/>
-    <p:sldId id="297" r:id="rId50"/>
-    <p:sldId id="303" r:id="rId51"/>
-    <p:sldId id="271" r:id="rId52"/>
-    <p:sldId id="304" r:id="rId53"/>
+    <p:sldId id="316" r:id="rId39"/>
+    <p:sldId id="288" r:id="rId40"/>
+    <p:sldId id="289" r:id="rId41"/>
+    <p:sldId id="265" r:id="rId42"/>
+    <p:sldId id="291" r:id="rId43"/>
+    <p:sldId id="302" r:id="rId44"/>
+    <p:sldId id="266" r:id="rId45"/>
+    <p:sldId id="267" r:id="rId46"/>
+    <p:sldId id="268" r:id="rId47"/>
+    <p:sldId id="287" r:id="rId48"/>
+    <p:sldId id="317" r:id="rId49"/>
+    <p:sldId id="278" r:id="rId50"/>
+    <p:sldId id="298" r:id="rId51"/>
+    <p:sldId id="297" r:id="rId52"/>
+    <p:sldId id="303" r:id="rId53"/>
+    <p:sldId id="271" r:id="rId54"/>
+    <p:sldId id="304" r:id="rId55"/>
   </p:sldIdLst>
   <p:sldSz cx="9144000" cy="6858000" type="screen4x3"/>
   <p:notesSz cx="6858000" cy="9144000"/>
@@ -340,7 +342,7 @@
             <a:fld id="{FAECF776-F836-4CCD-9497-99E5597B8B5D}" type="datetimeFigureOut">
               <a:rPr lang="en-US" smtClean="0"/>
               <a:pPr/>
-              <a:t>9/18/2014</a:t>
+              <a:t>9/23/2014</a:t>
             </a:fld>
             <a:endParaRPr lang="en-US"/>
           </a:p>
@@ -512,7 +514,7 @@
             <a:fld id="{FAECF776-F836-4CCD-9497-99E5597B8B5D}" type="datetimeFigureOut">
               <a:rPr lang="en-US" smtClean="0"/>
               <a:pPr/>
-              <a:t>9/18/2014</a:t>
+              <a:t>9/23/2014</a:t>
             </a:fld>
             <a:endParaRPr lang="en-US"/>
           </a:p>
@@ -694,7 +696,7 @@
             <a:fld id="{FAECF776-F836-4CCD-9497-99E5597B8B5D}" type="datetimeFigureOut">
               <a:rPr lang="en-US" smtClean="0"/>
               <a:pPr/>
-              <a:t>9/18/2014</a:t>
+              <a:t>9/23/2014</a:t>
             </a:fld>
             <a:endParaRPr lang="en-US"/>
           </a:p>
@@ -944,7 +946,7 @@
                 </a:solidFill>
               </a:rPr>
               <a:pPr/>
-              <a:t>9/18/2014</a:t>
+              <a:t>9/23/2014</a:t>
             </a:fld>
             <a:endParaRPr lang="en-US">
               <a:solidFill>
@@ -1146,7 +1148,7 @@
                 </a:solidFill>
               </a:rPr>
               <a:pPr/>
-              <a:t>9/18/2014</a:t>
+              <a:t>9/23/2014</a:t>
             </a:fld>
             <a:endParaRPr lang="en-US">
               <a:solidFill>
@@ -1424,7 +1426,7 @@
                 </a:solidFill>
               </a:rPr>
               <a:pPr/>
-              <a:t>9/18/2014</a:t>
+              <a:t>9/23/2014</a:t>
             </a:fld>
             <a:endParaRPr lang="en-US">
               <a:solidFill>
@@ -1744,7 +1746,7 @@
                 </a:solidFill>
               </a:rPr>
               <a:pPr/>
-              <a:t>9/18/2014</a:t>
+              <a:t>9/23/2014</a:t>
             </a:fld>
             <a:endParaRPr lang="en-US">
               <a:solidFill>
@@ -2198,7 +2200,7 @@
                 </a:solidFill>
               </a:rPr>
               <a:pPr/>
-              <a:t>9/18/2014</a:t>
+              <a:t>9/23/2014</a:t>
             </a:fld>
             <a:endParaRPr lang="en-US">
               <a:solidFill>
@@ -2348,7 +2350,7 @@
                 </a:solidFill>
               </a:rPr>
               <a:pPr/>
-              <a:t>9/18/2014</a:t>
+              <a:t>9/23/2014</a:t>
             </a:fld>
             <a:endParaRPr lang="en-US">
               <a:solidFill>
@@ -2475,7 +2477,7 @@
                 </a:solidFill>
               </a:rPr>
               <a:pPr/>
-              <a:t>9/18/2014</a:t>
+              <a:t>9/23/2014</a:t>
             </a:fld>
             <a:endParaRPr lang="en-US">
               <a:solidFill>
@@ -2784,7 +2786,7 @@
                 </a:solidFill>
               </a:rPr>
               <a:pPr/>
-              <a:t>9/18/2014</a:t>
+              <a:t>9/23/2014</a:t>
             </a:fld>
             <a:endParaRPr lang="en-US">
               <a:solidFill>
@@ -2980,7 +2982,7 @@
             <a:fld id="{FAECF776-F836-4CCD-9497-99E5597B8B5D}" type="datetimeFigureOut">
               <a:rPr lang="en-US" smtClean="0"/>
               <a:pPr/>
-              <a:t>9/18/2014</a:t>
+              <a:t>9/23/2014</a:t>
             </a:fld>
             <a:endParaRPr lang="en-US"/>
           </a:p>
@@ -3241,7 +3243,7 @@
                 </a:solidFill>
               </a:rPr>
               <a:pPr/>
-              <a:t>9/18/2014</a:t>
+              <a:t>9/23/2014</a:t>
             </a:fld>
             <a:endParaRPr lang="en-US">
               <a:solidFill>
@@ -3443,7 +3445,7 @@
                 </a:solidFill>
               </a:rPr>
               <a:pPr/>
-              <a:t>9/18/2014</a:t>
+              <a:t>9/23/2014</a:t>
             </a:fld>
             <a:endParaRPr lang="en-US">
               <a:solidFill>
@@ -3655,7 +3657,7 @@
                 </a:solidFill>
               </a:rPr>
               <a:pPr/>
-              <a:t>9/18/2014</a:t>
+              <a:t>9/23/2014</a:t>
             </a:fld>
             <a:endParaRPr lang="en-US">
               <a:solidFill>
@@ -3927,7 +3929,7 @@
             <a:fld id="{FAECF776-F836-4CCD-9497-99E5597B8B5D}" type="datetimeFigureOut">
               <a:rPr lang="en-US" smtClean="0"/>
               <a:pPr/>
-              <a:t>9/18/2014</a:t>
+              <a:t>9/23/2014</a:t>
             </a:fld>
             <a:endParaRPr lang="en-US"/>
           </a:p>
@@ -4217,7 +4219,7 @@
             <a:fld id="{FAECF776-F836-4CCD-9497-99E5597B8B5D}" type="datetimeFigureOut">
               <a:rPr lang="en-US" smtClean="0"/>
               <a:pPr/>
-              <a:t>9/18/2014</a:t>
+              <a:t>9/23/2014</a:t>
             </a:fld>
             <a:endParaRPr lang="en-US"/>
           </a:p>
@@ -4641,7 +4643,7 @@
             <a:fld id="{FAECF776-F836-4CCD-9497-99E5597B8B5D}" type="datetimeFigureOut">
               <a:rPr lang="en-US" smtClean="0"/>
               <a:pPr/>
-              <a:t>9/18/2014</a:t>
+              <a:t>9/23/2014</a:t>
             </a:fld>
             <a:endParaRPr lang="en-US"/>
           </a:p>
@@ -4761,7 +4763,7 @@
             <a:fld id="{FAECF776-F836-4CCD-9497-99E5597B8B5D}" type="datetimeFigureOut">
               <a:rPr lang="en-US" smtClean="0"/>
               <a:pPr/>
-              <a:t>9/18/2014</a:t>
+              <a:t>9/23/2014</a:t>
             </a:fld>
             <a:endParaRPr lang="en-US"/>
           </a:p>
@@ -4858,7 +4860,7 @@
             <a:fld id="{FAECF776-F836-4CCD-9497-99E5597B8B5D}" type="datetimeFigureOut">
               <a:rPr lang="en-US" smtClean="0"/>
               <a:pPr/>
-              <a:t>9/18/2014</a:t>
+              <a:t>9/23/2014</a:t>
             </a:fld>
             <a:endParaRPr lang="en-US"/>
           </a:p>
@@ -5137,7 +5139,7 @@
             <a:fld id="{FAECF776-F836-4CCD-9497-99E5597B8B5D}" type="datetimeFigureOut">
               <a:rPr lang="en-US" smtClean="0"/>
               <a:pPr/>
-              <a:t>9/18/2014</a:t>
+              <a:t>9/23/2014</a:t>
             </a:fld>
             <a:endParaRPr lang="en-US"/>
           </a:p>
@@ -5392,7 +5394,7 @@
             <a:fld id="{FAECF776-F836-4CCD-9497-99E5597B8B5D}" type="datetimeFigureOut">
               <a:rPr lang="en-US" smtClean="0"/>
               <a:pPr/>
-              <a:t>9/18/2014</a:t>
+              <a:t>9/23/2014</a:t>
             </a:fld>
             <a:endParaRPr lang="en-US"/>
           </a:p>
@@ -5616,7 +5618,7 @@
             <a:fld id="{FAECF776-F836-4CCD-9497-99E5597B8B5D}" type="datetimeFigureOut">
               <a:rPr lang="en-US" smtClean="0"/>
               <a:pPr/>
-              <a:t>9/18/2014</a:t>
+              <a:t>9/23/2014</a:t>
             </a:fld>
             <a:endParaRPr lang="en-US"/>
           </a:p>
@@ -6134,7 +6136,7 @@
                 </a:solidFill>
               </a:rPr>
               <a:pPr/>
-              <a:t>9/18/2014</a:t>
+              <a:t>9/23/2014</a:t>
             </a:fld>
             <a:endParaRPr lang="en-US">
               <a:solidFill>
@@ -8108,7 +8110,11 @@
               <a:t>Основные классы находятся в пространстве имен </a:t>
             </a:r>
             <a:r>
-              <a:rPr lang="en-US" dirty="0" smtClean="0"/>
+              <a:rPr lang="en-US" dirty="0" smtClean="0">
+                <a:solidFill>
+                  <a:srgbClr val="FFFF00"/>
+                </a:solidFill>
+              </a:rPr>
               <a:t>System.IO</a:t>
             </a:r>
           </a:p>
@@ -8536,11 +8542,7 @@
             <a:pPr lvl="1"/>
             <a:r>
               <a:rPr lang="ru-RU" dirty="0" smtClean="0"/>
-              <a:t>Общеизвестные </a:t>
-            </a:r>
-            <a:r>
-              <a:rPr lang="ru-RU" dirty="0" smtClean="0"/>
-              <a:t>каталоги</a:t>
+              <a:t>Общеизвестные каталоги</a:t>
             </a:r>
             <a:endParaRPr lang="en-US" dirty="0" smtClean="0"/>
           </a:p>
@@ -8550,7 +8552,6 @@
               <a:rPr lang="ru-RU" dirty="0" smtClean="0"/>
               <a:t>Удаление каталогов и файлов</a:t>
             </a:r>
-            <a:endParaRPr lang="ru-RU" dirty="0" smtClean="0"/>
           </a:p>
           <a:p>
             <a:r>
@@ -33504,11 +33505,7 @@
             </a:r>
             <a:r>
               <a:rPr lang="en-US" sz="1800" dirty="0" err="1" smtClean="0"/>
-              <a:t>FileSyste</a:t>
-            </a:r>
-            <a:r>
-              <a:rPr lang="en-US" sz="1800" dirty="0" err="1" smtClean="0"/>
-              <a:t>m</a:t>
+              <a:t>FileSystem</a:t>
             </a:r>
             <a:r>
               <a:rPr lang="en-US" sz="1800" dirty="0" smtClean="0"/>
@@ -33983,25 +33980,7 @@
                           </a:solidFill>
                           <a:latin typeface="Consolas"/>
                         </a:rPr>
-                        <a:t>@"</a:t>
-                      </a:r>
-                      <a:r>
-                        <a:rPr lang="en-US" sz="1400" dirty="0" smtClean="0">
-                          <a:solidFill>
-                            <a:srgbClr val="A31515"/>
-                          </a:solidFill>
-                          <a:latin typeface="Consolas"/>
-                        </a:rPr>
-                        <a:t>c:\someFolder1\someFile.txt</a:t>
-                      </a:r>
-                      <a:r>
-                        <a:rPr lang="en-US" sz="1400" dirty="0" smtClean="0">
-                          <a:solidFill>
-                            <a:srgbClr val="A31515"/>
-                          </a:solidFill>
-                          <a:latin typeface="Consolas"/>
-                        </a:rPr>
-                        <a:t>"</a:t>
+                        <a:t>@"c:\someFolder1\someFile.txt"</a:t>
                       </a:r>
                       <a:r>
                         <a:rPr lang="en-US" sz="1400" dirty="0" smtClean="0">
@@ -36127,6 +36106,120 @@
             <p:ph type="title"/>
           </p:nvPr>
         </p:nvSpPr>
+        <p:spPr/>
+        <p:txBody>
+          <a:bodyPr/>
+          <a:lstStyle/>
+          <a:p>
+            <a:r>
+              <a:rPr lang="ru-RU" dirty="0"/>
+              <a:t>Чтение/запись файлов (потоков)</a:t>
+            </a:r>
+            <a:endParaRPr lang="ru-RU" dirty="0"/>
+          </a:p>
+        </p:txBody>
+      </p:sp>
+      <p:sp>
+        <p:nvSpPr>
+          <p:cNvPr id="3" name="Content Placeholder 2"/>
+          <p:cNvSpPr>
+            <a:spLocks noGrp="1"/>
+          </p:cNvSpPr>
+          <p:nvPr>
+            <p:ph idx="1"/>
+          </p:nvPr>
+        </p:nvSpPr>
+        <p:spPr/>
+        <p:txBody>
+          <a:bodyPr>
+            <a:normAutofit/>
+          </a:bodyPr>
+          <a:lstStyle/>
+          <a:p>
+            <a:r>
+              <a:rPr lang="ru-RU" dirty="0" smtClean="0"/>
+              <a:t>Чтение/запись бинарных данных/файлов</a:t>
+            </a:r>
+          </a:p>
+          <a:p>
+            <a:r>
+              <a:rPr lang="ru-RU" dirty="0" smtClean="0"/>
+              <a:t>Чтение/запись текстовых данных/файлов</a:t>
+            </a:r>
+            <a:endParaRPr lang="ru-RU" dirty="0" smtClean="0"/>
+          </a:p>
+          <a:p>
+            <a:r>
+              <a:rPr lang="ru-RU" dirty="0" smtClean="0"/>
+              <a:t>Чтение </a:t>
+            </a:r>
+            <a:r>
+              <a:rPr lang="en-US" dirty="0" smtClean="0"/>
+              <a:t>CSV </a:t>
+            </a:r>
+            <a:r>
+              <a:rPr lang="ru-RU" dirty="0" smtClean="0"/>
+              <a:t>файлов с помощью класса</a:t>
+            </a:r>
+            <a:r>
+              <a:rPr lang="en-US" dirty="0" smtClean="0"/>
+              <a:t> </a:t>
+            </a:r>
+            <a:r>
+              <a:rPr lang="en-US" dirty="0" err="1" smtClean="0"/>
+              <a:t>TextFieldParser</a:t>
+            </a:r>
+            <a:endParaRPr lang="ru-RU" dirty="0" smtClean="0"/>
+          </a:p>
+        </p:txBody>
+      </p:sp>
+    </p:spTree>
+    <p:extLst>
+      <p:ext uri="{BB962C8B-B14F-4D97-AF65-F5344CB8AC3E}">
+        <p14:creationId xmlns:p14="http://schemas.microsoft.com/office/powerpoint/2010/main" val="3430803750"/>
+      </p:ext>
+    </p:extLst>
+  </p:cSld>
+  <p:clrMapOvr>
+    <a:masterClrMapping/>
+  </p:clrMapOvr>
+  <p:timing>
+    <p:tnLst>
+      <p:par>
+        <p:cTn id="1" dur="indefinite" restart="never" nodeType="tmRoot"/>
+      </p:par>
+    </p:tnLst>
+  </p:timing>
+</p:sld>
+</file>
+
+<file path=ppt/slides/slide38.xml><?xml version="1.0" encoding="utf-8"?>
+<p:sld xmlns:a="http://schemas.openxmlformats.org/drawingml/2006/main" xmlns:r="http://schemas.openxmlformats.org/officeDocument/2006/relationships" xmlns:p="http://schemas.openxmlformats.org/presentationml/2006/main">
+  <p:cSld>
+    <p:spTree>
+      <p:nvGrpSpPr>
+        <p:cNvPr id="1" name=""/>
+        <p:cNvGrpSpPr/>
+        <p:nvPr/>
+      </p:nvGrpSpPr>
+      <p:grpSpPr>
+        <a:xfrm>
+          <a:off x="0" y="0"/>
+          <a:ext cx="0" cy="0"/>
+          <a:chOff x="0" y="0"/>
+          <a:chExt cx="0" cy="0"/>
+        </a:xfrm>
+      </p:grpSpPr>
+      <p:sp>
+        <p:nvSpPr>
+          <p:cNvPr id="2" name="Title 1"/>
+          <p:cNvSpPr>
+            <a:spLocks noGrp="1"/>
+          </p:cNvSpPr>
+          <p:nvPr>
+            <p:ph type="title"/>
+          </p:nvPr>
+        </p:nvSpPr>
         <p:spPr>
           <a:xfrm>
             <a:off x="457200" y="274638"/>
@@ -37690,7 +37783,7 @@
 </p:sld>
 </file>
 
-<file path=ppt/slides/slide38.xml><?xml version="1.0" encoding="utf-8"?>
+<file path=ppt/slides/slide39.xml><?xml version="1.0" encoding="utf-8"?>
 <p:sld xmlns:a="http://schemas.openxmlformats.org/drawingml/2006/main" xmlns:r="http://schemas.openxmlformats.org/officeDocument/2006/relationships" xmlns:p="http://schemas.openxmlformats.org/presentationml/2006/main">
   <p:cSld>
     <p:spTree>
@@ -38741,1446 +38834,6 @@
 </p:sld>
 </file>
 
-<file path=ppt/slides/slide39.xml><?xml version="1.0" encoding="utf-8"?>
-<p:sld xmlns:a="http://schemas.openxmlformats.org/drawingml/2006/main" xmlns:r="http://schemas.openxmlformats.org/officeDocument/2006/relationships" xmlns:p="http://schemas.openxmlformats.org/presentationml/2006/main">
-  <p:cSld>
-    <p:bg>
-      <p:bgPr>
-        <a:blipFill dpi="0" rotWithShape="1">
-          <a:blip r:embed="rId2">
-            <a:lum/>
-          </a:blip>
-          <a:srcRect/>
-          <a:stretch>
-            <a:fillRect/>
-          </a:stretch>
-        </a:blipFill>
-        <a:effectLst/>
-      </p:bgPr>
-    </p:bg>
-    <p:spTree>
-      <p:nvGrpSpPr>
-        <p:cNvPr id="1" name=""/>
-        <p:cNvGrpSpPr/>
-        <p:nvPr/>
-      </p:nvGrpSpPr>
-      <p:grpSpPr>
-        <a:xfrm>
-          <a:off x="0" y="0"/>
-          <a:ext cx="0" cy="0"/>
-          <a:chOff x="0" y="0"/>
-          <a:chExt cx="0" cy="0"/>
-        </a:xfrm>
-      </p:grpSpPr>
-      <p:sp>
-        <p:nvSpPr>
-          <p:cNvPr id="9218" name="Прямоугольник 2"/>
-          <p:cNvSpPr>
-            <a:spLocks noChangeArrowheads="1"/>
-          </p:cNvSpPr>
-          <p:nvPr/>
-        </p:nvSpPr>
-        <p:spPr bwMode="auto">
-          <a:xfrm>
-            <a:off x="3048000" y="0"/>
-            <a:ext cx="3090863" cy="461963"/>
-          </a:xfrm>
-          <a:prstGeom prst="rect">
-            <a:avLst/>
-          </a:prstGeom>
-          <a:noFill/>
-          <a:ln>
-            <a:noFill/>
-          </a:ln>
-          <a:extLst>
-            <a:ext uri="{909E8E84-426E-40DD-AFC4-6F175D3DCCD1}">
-              <a14:hiddenFill xmlns:a14="http://schemas.microsoft.com/office/drawing/2010/main">
-                <a:solidFill>
-                  <a:srgbClr val="FFFFFF"/>
-                </a:solidFill>
-              </a14:hiddenFill>
-            </a:ext>
-            <a:ext uri="{91240B29-F687-4F45-9708-019B960494DF}">
-              <a14:hiddenLine xmlns:a14="http://schemas.microsoft.com/office/drawing/2010/main" w="9525">
-                <a:solidFill>
-                  <a:srgbClr val="000000"/>
-                </a:solidFill>
-                <a:miter lim="800000"/>
-                <a:headEnd/>
-                <a:tailEnd/>
-              </a14:hiddenLine>
-            </a:ext>
-          </a:extLst>
-        </p:spPr>
-        <p:txBody>
-          <a:bodyPr wrap="none">
-            <a:spAutoFit/>
-          </a:bodyPr>
-          <a:lstStyle/>
-          <a:p>
-            <a:r>
-              <a:rPr lang="ru-RU" sz="2400" b="1"/>
-              <a:t>Работа с файлами.</a:t>
-            </a:r>
-          </a:p>
-        </p:txBody>
-      </p:sp>
-      <p:sp>
-        <p:nvSpPr>
-          <p:cNvPr id="9219" name="TextBox 6"/>
-          <p:cNvSpPr txBox="1">
-            <a:spLocks noChangeArrowheads="1"/>
-          </p:cNvSpPr>
-          <p:nvPr/>
-        </p:nvSpPr>
-        <p:spPr bwMode="auto">
-          <a:xfrm>
-            <a:off x="152400" y="457200"/>
-            <a:ext cx="8991600" cy="338138"/>
-          </a:xfrm>
-          <a:prstGeom prst="rect">
-            <a:avLst/>
-          </a:prstGeom>
-          <a:noFill/>
-          <a:ln>
-            <a:noFill/>
-          </a:ln>
-          <a:extLst>
-            <a:ext uri="{909E8E84-426E-40DD-AFC4-6F175D3DCCD1}">
-              <a14:hiddenFill xmlns:a14="http://schemas.microsoft.com/office/drawing/2010/main">
-                <a:solidFill>
-                  <a:srgbClr val="FFFFFF"/>
-                </a:solidFill>
-              </a14:hiddenFill>
-            </a:ext>
-            <a:ext uri="{91240B29-F687-4F45-9708-019B960494DF}">
-              <a14:hiddenLine xmlns:a14="http://schemas.microsoft.com/office/drawing/2010/main" w="9525">
-                <a:solidFill>
-                  <a:srgbClr val="000000"/>
-                </a:solidFill>
-                <a:miter lim="800000"/>
-                <a:headEnd/>
-                <a:tailEnd/>
-              </a14:hiddenLine>
-            </a:ext>
-          </a:extLst>
-        </p:spPr>
-        <p:txBody>
-          <a:bodyPr>
-            <a:spAutoFit/>
-          </a:bodyPr>
-          <a:lstStyle>
-            <a:lvl1pPr defTabSz="358775" eaLnBrk="0" hangingPunct="0">
-              <a:defRPr>
-                <a:solidFill>
-                  <a:schemeClr val="tx1"/>
-                </a:solidFill>
-                <a:latin typeface="Arial" charset="0"/>
-              </a:defRPr>
-            </a:lvl1pPr>
-            <a:lvl2pPr marL="742950" indent="-285750" defTabSz="358775" eaLnBrk="0" hangingPunct="0">
-              <a:defRPr>
-                <a:solidFill>
-                  <a:schemeClr val="tx1"/>
-                </a:solidFill>
-                <a:latin typeface="Arial" charset="0"/>
-              </a:defRPr>
-            </a:lvl2pPr>
-            <a:lvl3pPr marL="1143000" indent="-228600" defTabSz="358775" eaLnBrk="0" hangingPunct="0">
-              <a:defRPr>
-                <a:solidFill>
-                  <a:schemeClr val="tx1"/>
-                </a:solidFill>
-                <a:latin typeface="Arial" charset="0"/>
-              </a:defRPr>
-            </a:lvl3pPr>
-            <a:lvl4pPr marL="1600200" indent="-228600" defTabSz="358775" eaLnBrk="0" hangingPunct="0">
-              <a:defRPr>
-                <a:solidFill>
-                  <a:schemeClr val="tx1"/>
-                </a:solidFill>
-                <a:latin typeface="Arial" charset="0"/>
-              </a:defRPr>
-            </a:lvl4pPr>
-            <a:lvl5pPr marL="2057400" indent="-228600" defTabSz="358775" eaLnBrk="0" hangingPunct="0">
-              <a:defRPr>
-                <a:solidFill>
-                  <a:schemeClr val="tx1"/>
-                </a:solidFill>
-                <a:latin typeface="Arial" charset="0"/>
-              </a:defRPr>
-            </a:lvl5pPr>
-            <a:lvl6pPr marL="2514600" indent="-228600" defTabSz="358775" eaLnBrk="0" fontAlgn="base" hangingPunct="0">
-              <a:spcBef>
-                <a:spcPct val="0"/>
-              </a:spcBef>
-              <a:spcAft>
-                <a:spcPct val="0"/>
-              </a:spcAft>
-              <a:defRPr>
-                <a:solidFill>
-                  <a:schemeClr val="tx1"/>
-                </a:solidFill>
-                <a:latin typeface="Arial" charset="0"/>
-              </a:defRPr>
-            </a:lvl6pPr>
-            <a:lvl7pPr marL="2971800" indent="-228600" defTabSz="358775" eaLnBrk="0" fontAlgn="base" hangingPunct="0">
-              <a:spcBef>
-                <a:spcPct val="0"/>
-              </a:spcBef>
-              <a:spcAft>
-                <a:spcPct val="0"/>
-              </a:spcAft>
-              <a:defRPr>
-                <a:solidFill>
-                  <a:schemeClr val="tx1"/>
-                </a:solidFill>
-                <a:latin typeface="Arial" charset="0"/>
-              </a:defRPr>
-            </a:lvl7pPr>
-            <a:lvl8pPr marL="3429000" indent="-228600" defTabSz="358775" eaLnBrk="0" fontAlgn="base" hangingPunct="0">
-              <a:spcBef>
-                <a:spcPct val="0"/>
-              </a:spcBef>
-              <a:spcAft>
-                <a:spcPct val="0"/>
-              </a:spcAft>
-              <a:defRPr>
-                <a:solidFill>
-                  <a:schemeClr val="tx1"/>
-                </a:solidFill>
-                <a:latin typeface="Arial" charset="0"/>
-              </a:defRPr>
-            </a:lvl8pPr>
-            <a:lvl9pPr marL="3886200" indent="-228600" defTabSz="358775" eaLnBrk="0" fontAlgn="base" hangingPunct="0">
-              <a:spcBef>
-                <a:spcPct val="0"/>
-              </a:spcBef>
-              <a:spcAft>
-                <a:spcPct val="0"/>
-              </a:spcAft>
-              <a:defRPr>
-                <a:solidFill>
-                  <a:schemeClr val="tx1"/>
-                </a:solidFill>
-                <a:latin typeface="Arial" charset="0"/>
-              </a:defRPr>
-            </a:lvl9pPr>
-          </a:lstStyle>
-          <a:p>
-            <a:pPr eaLnBrk="1" hangingPunct="1"/>
-            <a:r>
-              <a:rPr lang="ru-RU" sz="1600"/>
-              <a:t>	Рассмотрим метод</a:t>
-            </a:r>
-            <a:r>
-              <a:rPr lang="en-US" sz="1600"/>
-              <a:t> Open() </a:t>
-            </a:r>
-            <a:r>
-              <a:rPr lang="ru-RU" sz="1600"/>
-              <a:t>класса </a:t>
-            </a:r>
-            <a:r>
-              <a:rPr lang="en-US" sz="1600"/>
-              <a:t>FileInfo.</a:t>
-            </a:r>
-            <a:endParaRPr lang="be-BY" sz="1600">
-              <a:solidFill>
-                <a:srgbClr val="008080"/>
-              </a:solidFill>
-              <a:latin typeface="Courier New" pitchFamily="49" charset="0"/>
-              <a:ea typeface="Calibri" pitchFamily="34" charset="0"/>
-              <a:cs typeface="Courier New" pitchFamily="49" charset="0"/>
-            </a:endParaRPr>
-          </a:p>
-        </p:txBody>
-      </p:sp>
-      <p:sp>
-        <p:nvSpPr>
-          <p:cNvPr id="9220" name="Rectangle 4"/>
-          <p:cNvSpPr>
-            <a:spLocks noChangeArrowheads="1"/>
-          </p:cNvSpPr>
-          <p:nvPr/>
-        </p:nvSpPr>
-        <p:spPr bwMode="auto">
-          <a:xfrm>
-            <a:off x="0" y="838200"/>
-            <a:ext cx="9144000" cy="338138"/>
-          </a:xfrm>
-          <a:prstGeom prst="rect">
-            <a:avLst/>
-          </a:prstGeom>
-          <a:noFill/>
-          <a:ln>
-            <a:noFill/>
-          </a:ln>
-          <a:extLst>
-            <a:ext uri="{909E8E84-426E-40DD-AFC4-6F175D3DCCD1}">
-              <a14:hiddenFill xmlns:a14="http://schemas.microsoft.com/office/drawing/2010/main">
-                <a:solidFill>
-                  <a:srgbClr val="FFFFFF"/>
-                </a:solidFill>
-              </a14:hiddenFill>
-            </a:ext>
-            <a:ext uri="{91240B29-F687-4F45-9708-019B960494DF}">
-              <a14:hiddenLine xmlns:a14="http://schemas.microsoft.com/office/drawing/2010/main" w="9525">
-                <a:solidFill>
-                  <a:srgbClr val="000000"/>
-                </a:solidFill>
-                <a:miter lim="800000"/>
-                <a:headEnd/>
-                <a:tailEnd/>
-              </a14:hiddenLine>
-            </a:ext>
-          </a:extLst>
-        </p:spPr>
-        <p:txBody>
-          <a:bodyPr anchor="ctr">
-            <a:spAutoFit/>
-          </a:bodyPr>
-          <a:lstStyle/>
-          <a:p>
-            <a:pPr algn="ctr" eaLnBrk="0" hangingPunct="0"/>
-            <a:r>
-              <a:rPr lang="be-BY" sz="1600" dirty="0">
-                <a:solidFill>
-                  <a:schemeClr val="bg1"/>
-                </a:solidFill>
-                <a:latin typeface="Segoe UI" pitchFamily="34" charset="0"/>
-                <a:ea typeface="Calibri" pitchFamily="34" charset="0"/>
-                <a:cs typeface="Segoe UI" pitchFamily="34" charset="0"/>
-              </a:rPr>
-              <a:t>public FileStream Open(FileMode </a:t>
-            </a:r>
-            <a:r>
-              <a:rPr lang="be-BY" sz="1600" i="1" dirty="0">
-                <a:solidFill>
-                  <a:schemeClr val="bg1"/>
-                </a:solidFill>
-                <a:latin typeface="Segoe UI" pitchFamily="34" charset="0"/>
-                <a:ea typeface="Calibri" pitchFamily="34" charset="0"/>
-                <a:cs typeface="Segoe UI" pitchFamily="34" charset="0"/>
-              </a:rPr>
-              <a:t>mode</a:t>
-            </a:r>
-            <a:r>
-              <a:rPr lang="be-BY" sz="1600" dirty="0">
-                <a:solidFill>
-                  <a:schemeClr val="bg1"/>
-                </a:solidFill>
-                <a:latin typeface="Segoe UI" pitchFamily="34" charset="0"/>
-                <a:ea typeface="Calibri" pitchFamily="34" charset="0"/>
-                <a:cs typeface="Segoe UI" pitchFamily="34" charset="0"/>
-              </a:rPr>
-              <a:t>, FileAccess </a:t>
-            </a:r>
-            <a:r>
-              <a:rPr lang="be-BY" sz="1600" i="1" dirty="0">
-                <a:solidFill>
-                  <a:schemeClr val="bg1"/>
-                </a:solidFill>
-                <a:latin typeface="Segoe UI" pitchFamily="34" charset="0"/>
-                <a:ea typeface="Calibri" pitchFamily="34" charset="0"/>
-                <a:cs typeface="Segoe UI" pitchFamily="34" charset="0"/>
-              </a:rPr>
-              <a:t>access</a:t>
-            </a:r>
-            <a:r>
-              <a:rPr lang="be-BY" sz="1600" dirty="0">
-                <a:solidFill>
-                  <a:schemeClr val="bg1"/>
-                </a:solidFill>
-                <a:latin typeface="Segoe UI" pitchFamily="34" charset="0"/>
-                <a:ea typeface="Calibri" pitchFamily="34" charset="0"/>
-                <a:cs typeface="Segoe UI" pitchFamily="34" charset="0"/>
-              </a:rPr>
-              <a:t>, FileShare </a:t>
-            </a:r>
-            <a:r>
-              <a:rPr lang="be-BY" sz="1600" i="1" dirty="0">
-                <a:solidFill>
-                  <a:schemeClr val="bg1"/>
-                </a:solidFill>
-                <a:latin typeface="Segoe UI" pitchFamily="34" charset="0"/>
-                <a:ea typeface="Calibri" pitchFamily="34" charset="0"/>
-                <a:cs typeface="Segoe UI" pitchFamily="34" charset="0"/>
-              </a:rPr>
-              <a:t>share</a:t>
-            </a:r>
-            <a:r>
-              <a:rPr lang="be-BY" sz="1600" dirty="0">
-                <a:solidFill>
-                  <a:schemeClr val="bg1"/>
-                </a:solidFill>
-                <a:latin typeface="Segoe UI" pitchFamily="34" charset="0"/>
-                <a:ea typeface="Calibri" pitchFamily="34" charset="0"/>
-                <a:cs typeface="Segoe UI" pitchFamily="34" charset="0"/>
-              </a:rPr>
-              <a:t>)</a:t>
-            </a:r>
-            <a:endParaRPr lang="be-BY" sz="1600" dirty="0">
-              <a:solidFill>
-                <a:schemeClr val="bg1"/>
-              </a:solidFill>
-              <a:ea typeface="Calibri" pitchFamily="34" charset="0"/>
-              <a:cs typeface="Segoe UI" pitchFamily="34" charset="0"/>
-            </a:endParaRPr>
-          </a:p>
-        </p:txBody>
-      </p:sp>
-      <p:sp>
-        <p:nvSpPr>
-          <p:cNvPr id="9221" name="TextBox 6"/>
-          <p:cNvSpPr txBox="1">
-            <a:spLocks noChangeArrowheads="1"/>
-          </p:cNvSpPr>
-          <p:nvPr/>
-        </p:nvSpPr>
-        <p:spPr bwMode="auto">
-          <a:xfrm>
-            <a:off x="0" y="1219200"/>
-            <a:ext cx="9144000" cy="2062163"/>
-          </a:xfrm>
-          <a:prstGeom prst="rect">
-            <a:avLst/>
-          </a:prstGeom>
-          <a:noFill/>
-          <a:ln>
-            <a:noFill/>
-          </a:ln>
-          <a:extLst>
-            <a:ext uri="{909E8E84-426E-40DD-AFC4-6F175D3DCCD1}">
-              <a14:hiddenFill xmlns:a14="http://schemas.microsoft.com/office/drawing/2010/main">
-                <a:solidFill>
-                  <a:srgbClr val="FFFFFF"/>
-                </a:solidFill>
-              </a14:hiddenFill>
-            </a:ext>
-            <a:ext uri="{91240B29-F687-4F45-9708-019B960494DF}">
-              <a14:hiddenLine xmlns:a14="http://schemas.microsoft.com/office/drawing/2010/main" w="9525">
-                <a:solidFill>
-                  <a:srgbClr val="000000"/>
-                </a:solidFill>
-                <a:miter lim="800000"/>
-                <a:headEnd/>
-                <a:tailEnd/>
-              </a14:hiddenLine>
-            </a:ext>
-          </a:extLst>
-        </p:spPr>
-        <p:txBody>
-          <a:bodyPr>
-            <a:spAutoFit/>
-          </a:bodyPr>
-          <a:lstStyle>
-            <a:lvl1pPr defTabSz="358775" eaLnBrk="0" hangingPunct="0">
-              <a:defRPr>
-                <a:solidFill>
-                  <a:schemeClr val="tx1"/>
-                </a:solidFill>
-                <a:latin typeface="Arial" charset="0"/>
-              </a:defRPr>
-            </a:lvl1pPr>
-            <a:lvl2pPr defTabSz="358775" eaLnBrk="0" hangingPunct="0">
-              <a:defRPr>
-                <a:solidFill>
-                  <a:schemeClr val="tx1"/>
-                </a:solidFill>
-                <a:latin typeface="Arial" charset="0"/>
-              </a:defRPr>
-            </a:lvl2pPr>
-            <a:lvl3pPr marL="1143000" indent="-228600" defTabSz="358775" eaLnBrk="0" hangingPunct="0">
-              <a:defRPr>
-                <a:solidFill>
-                  <a:schemeClr val="tx1"/>
-                </a:solidFill>
-                <a:latin typeface="Arial" charset="0"/>
-              </a:defRPr>
-            </a:lvl3pPr>
-            <a:lvl4pPr marL="1600200" indent="-228600" defTabSz="358775" eaLnBrk="0" hangingPunct="0">
-              <a:defRPr>
-                <a:solidFill>
-                  <a:schemeClr val="tx1"/>
-                </a:solidFill>
-                <a:latin typeface="Arial" charset="0"/>
-              </a:defRPr>
-            </a:lvl4pPr>
-            <a:lvl5pPr marL="2057400" indent="-228600" defTabSz="358775" eaLnBrk="0" hangingPunct="0">
-              <a:defRPr>
-                <a:solidFill>
-                  <a:schemeClr val="tx1"/>
-                </a:solidFill>
-                <a:latin typeface="Arial" charset="0"/>
-              </a:defRPr>
-            </a:lvl5pPr>
-            <a:lvl6pPr marL="2514600" indent="-228600" defTabSz="358775" eaLnBrk="0" fontAlgn="base" hangingPunct="0">
-              <a:spcBef>
-                <a:spcPct val="0"/>
-              </a:spcBef>
-              <a:spcAft>
-                <a:spcPct val="0"/>
-              </a:spcAft>
-              <a:defRPr>
-                <a:solidFill>
-                  <a:schemeClr val="tx1"/>
-                </a:solidFill>
-                <a:latin typeface="Arial" charset="0"/>
-              </a:defRPr>
-            </a:lvl6pPr>
-            <a:lvl7pPr marL="2971800" indent="-228600" defTabSz="358775" eaLnBrk="0" fontAlgn="base" hangingPunct="0">
-              <a:spcBef>
-                <a:spcPct val="0"/>
-              </a:spcBef>
-              <a:spcAft>
-                <a:spcPct val="0"/>
-              </a:spcAft>
-              <a:defRPr>
-                <a:solidFill>
-                  <a:schemeClr val="tx1"/>
-                </a:solidFill>
-                <a:latin typeface="Arial" charset="0"/>
-              </a:defRPr>
-            </a:lvl7pPr>
-            <a:lvl8pPr marL="3429000" indent="-228600" defTabSz="358775" eaLnBrk="0" fontAlgn="base" hangingPunct="0">
-              <a:spcBef>
-                <a:spcPct val="0"/>
-              </a:spcBef>
-              <a:spcAft>
-                <a:spcPct val="0"/>
-              </a:spcAft>
-              <a:defRPr>
-                <a:solidFill>
-                  <a:schemeClr val="tx1"/>
-                </a:solidFill>
-                <a:latin typeface="Arial" charset="0"/>
-              </a:defRPr>
-            </a:lvl8pPr>
-            <a:lvl9pPr marL="3886200" indent="-228600" defTabSz="358775" eaLnBrk="0" fontAlgn="base" hangingPunct="0">
-              <a:spcBef>
-                <a:spcPct val="0"/>
-              </a:spcBef>
-              <a:spcAft>
-                <a:spcPct val="0"/>
-              </a:spcAft>
-              <a:defRPr>
-                <a:solidFill>
-                  <a:schemeClr val="tx1"/>
-                </a:solidFill>
-                <a:latin typeface="Arial" charset="0"/>
-              </a:defRPr>
-            </a:lvl9pPr>
-          </a:lstStyle>
-          <a:p>
-            <a:pPr eaLnBrk="1" hangingPunct="1"/>
-            <a:r>
-              <a:rPr lang="ru-RU" sz="1600" dirty="0">
-                <a:solidFill>
-                  <a:schemeClr val="bg1"/>
-                </a:solidFill>
-              </a:rPr>
-              <a:t>	Перечисление </a:t>
-            </a:r>
-            <a:r>
-              <a:rPr lang="be-BY" sz="1600" dirty="0">
-                <a:solidFill>
-                  <a:schemeClr val="bg1"/>
-                </a:solidFill>
-                <a:latin typeface="Segoe UI" pitchFamily="34" charset="0"/>
-                <a:ea typeface="Calibri" pitchFamily="34" charset="0"/>
-                <a:cs typeface="Segoe UI" pitchFamily="34" charset="0"/>
-              </a:rPr>
-              <a:t>FileMode</a:t>
-            </a:r>
-            <a:r>
-              <a:rPr lang="en-US" sz="1600" dirty="0">
-                <a:solidFill>
-                  <a:schemeClr val="bg1"/>
-                </a:solidFill>
-              </a:rPr>
-              <a:t>:</a:t>
-            </a:r>
-          </a:p>
-          <a:p>
-            <a:pPr lvl="1" eaLnBrk="1" hangingPunct="1">
-              <a:buFont typeface="Arial" charset="0"/>
-              <a:buChar char="•"/>
-            </a:pPr>
-            <a:r>
-              <a:rPr lang="en-US" sz="1600" dirty="0">
-                <a:solidFill>
-                  <a:schemeClr val="bg1"/>
-                </a:solidFill>
-              </a:rPr>
-              <a:t>Append	</a:t>
-            </a:r>
-            <a:r>
-              <a:rPr lang="ru-RU" sz="1600" dirty="0">
-                <a:solidFill>
-                  <a:schemeClr val="bg1"/>
-                </a:solidFill>
-              </a:rPr>
-              <a:t>Открывает файл для записи в конец, либо создает новый файл.</a:t>
-            </a:r>
-            <a:endParaRPr lang="en-US" sz="1600" dirty="0">
-              <a:solidFill>
-                <a:schemeClr val="bg1"/>
-              </a:solidFill>
-            </a:endParaRPr>
-          </a:p>
-          <a:p>
-            <a:pPr lvl="1" eaLnBrk="1" hangingPunct="1">
-              <a:buFont typeface="Arial" charset="0"/>
-              <a:buChar char="•"/>
-            </a:pPr>
-            <a:r>
-              <a:rPr lang="en-US" sz="1600" dirty="0">
-                <a:solidFill>
-                  <a:schemeClr val="bg1"/>
-                </a:solidFill>
-              </a:rPr>
-              <a:t>Create</a:t>
-            </a:r>
-            <a:r>
-              <a:rPr lang="ru-RU" sz="1600" dirty="0">
-                <a:solidFill>
-                  <a:schemeClr val="bg1"/>
-                </a:solidFill>
-              </a:rPr>
-              <a:t>	Создает новый файл либо перезаписывает существующий</a:t>
-            </a:r>
-            <a:endParaRPr lang="en-US" sz="1600" dirty="0">
-              <a:solidFill>
-                <a:schemeClr val="bg1"/>
-              </a:solidFill>
-            </a:endParaRPr>
-          </a:p>
-          <a:p>
-            <a:pPr lvl="1" eaLnBrk="1" hangingPunct="1">
-              <a:buFont typeface="Arial" charset="0"/>
-              <a:buChar char="•"/>
-            </a:pPr>
-            <a:r>
-              <a:rPr lang="en-US" sz="1600" dirty="0" err="1">
-                <a:solidFill>
-                  <a:schemeClr val="bg1"/>
-                </a:solidFill>
-              </a:rPr>
-              <a:t>CreateNew</a:t>
-            </a:r>
-            <a:r>
-              <a:rPr lang="ru-RU" sz="1600" dirty="0">
-                <a:solidFill>
-                  <a:schemeClr val="bg1"/>
-                </a:solidFill>
-              </a:rPr>
-              <a:t>	Создает новый файл. Если файл существует, генерируется </a:t>
-            </a:r>
-            <a:r>
-              <a:rPr lang="en-US" sz="1600" dirty="0" err="1">
-                <a:solidFill>
-                  <a:schemeClr val="bg1"/>
-                </a:solidFill>
-              </a:rPr>
-              <a:t>IOException</a:t>
-            </a:r>
-            <a:endParaRPr lang="en-US" sz="1600" dirty="0">
-              <a:solidFill>
-                <a:schemeClr val="bg1"/>
-              </a:solidFill>
-            </a:endParaRPr>
-          </a:p>
-          <a:p>
-            <a:pPr lvl="1" eaLnBrk="1" hangingPunct="1">
-              <a:buFont typeface="Arial" charset="0"/>
-              <a:buChar char="•"/>
-            </a:pPr>
-            <a:r>
-              <a:rPr lang="en-US" sz="1600" dirty="0">
-                <a:solidFill>
-                  <a:schemeClr val="bg1"/>
-                </a:solidFill>
-              </a:rPr>
-              <a:t>Open		</a:t>
-            </a:r>
-            <a:r>
-              <a:rPr lang="ru-RU" sz="1600" dirty="0">
-                <a:solidFill>
-                  <a:schemeClr val="bg1"/>
-                </a:solidFill>
-              </a:rPr>
-              <a:t>Открывает файл для чтения.</a:t>
-            </a:r>
-            <a:endParaRPr lang="en-US" sz="1600" dirty="0">
-              <a:solidFill>
-                <a:schemeClr val="bg1"/>
-              </a:solidFill>
-            </a:endParaRPr>
-          </a:p>
-          <a:p>
-            <a:pPr lvl="1" eaLnBrk="1" hangingPunct="1">
-              <a:buFont typeface="Arial" charset="0"/>
-              <a:buChar char="•"/>
-            </a:pPr>
-            <a:r>
-              <a:rPr lang="en-US" sz="1600" dirty="0" err="1">
-                <a:solidFill>
-                  <a:schemeClr val="bg1"/>
-                </a:solidFill>
-              </a:rPr>
-              <a:t>OpenOrCreate</a:t>
-            </a:r>
-            <a:r>
-              <a:rPr lang="ru-RU" sz="1600" dirty="0">
-                <a:solidFill>
-                  <a:schemeClr val="bg1"/>
-                </a:solidFill>
-              </a:rPr>
-              <a:t>	Открывает файл для чтения или создает новый, если файла не существует.</a:t>
-            </a:r>
-            <a:endParaRPr lang="en-US" sz="1600" dirty="0">
-              <a:solidFill>
-                <a:schemeClr val="bg1"/>
-              </a:solidFill>
-            </a:endParaRPr>
-          </a:p>
-          <a:p>
-            <a:pPr lvl="1" eaLnBrk="1" hangingPunct="1">
-              <a:buFont typeface="Arial" charset="0"/>
-              <a:buChar char="•"/>
-            </a:pPr>
-            <a:r>
-              <a:rPr lang="en-US" sz="1600" dirty="0">
-                <a:solidFill>
-                  <a:schemeClr val="bg1"/>
-                </a:solidFill>
-              </a:rPr>
-              <a:t>Truncate</a:t>
-            </a:r>
-            <a:r>
-              <a:rPr lang="ru-RU" sz="1600" dirty="0">
-                <a:solidFill>
-                  <a:schemeClr val="bg1"/>
-                </a:solidFill>
-              </a:rPr>
-              <a:t>	Открывает существующий файл и очищает его.</a:t>
-            </a:r>
-          </a:p>
-        </p:txBody>
-      </p:sp>
-      <p:sp>
-        <p:nvSpPr>
-          <p:cNvPr id="9222" name="TextBox 6"/>
-          <p:cNvSpPr txBox="1">
-            <a:spLocks noChangeArrowheads="1"/>
-          </p:cNvSpPr>
-          <p:nvPr/>
-        </p:nvSpPr>
-        <p:spPr bwMode="auto">
-          <a:xfrm>
-            <a:off x="0" y="3348038"/>
-            <a:ext cx="9144000" cy="1077912"/>
-          </a:xfrm>
-          <a:prstGeom prst="rect">
-            <a:avLst/>
-          </a:prstGeom>
-          <a:noFill/>
-          <a:ln>
-            <a:noFill/>
-          </a:ln>
-          <a:extLst>
-            <a:ext uri="{909E8E84-426E-40DD-AFC4-6F175D3DCCD1}">
-              <a14:hiddenFill xmlns:a14="http://schemas.microsoft.com/office/drawing/2010/main">
-                <a:solidFill>
-                  <a:srgbClr val="FFFFFF"/>
-                </a:solidFill>
-              </a14:hiddenFill>
-            </a:ext>
-            <a:ext uri="{91240B29-F687-4F45-9708-019B960494DF}">
-              <a14:hiddenLine xmlns:a14="http://schemas.microsoft.com/office/drawing/2010/main" w="9525">
-                <a:solidFill>
-                  <a:srgbClr val="000000"/>
-                </a:solidFill>
-                <a:miter lim="800000"/>
-                <a:headEnd/>
-                <a:tailEnd/>
-              </a14:hiddenLine>
-            </a:ext>
-          </a:extLst>
-        </p:spPr>
-        <p:txBody>
-          <a:bodyPr>
-            <a:spAutoFit/>
-          </a:bodyPr>
-          <a:lstStyle>
-            <a:lvl1pPr defTabSz="358775" eaLnBrk="0" hangingPunct="0">
-              <a:defRPr>
-                <a:solidFill>
-                  <a:schemeClr val="tx1"/>
-                </a:solidFill>
-                <a:latin typeface="Arial" charset="0"/>
-              </a:defRPr>
-            </a:lvl1pPr>
-            <a:lvl2pPr defTabSz="358775" eaLnBrk="0" hangingPunct="0">
-              <a:defRPr>
-                <a:solidFill>
-                  <a:schemeClr val="tx1"/>
-                </a:solidFill>
-                <a:latin typeface="Arial" charset="0"/>
-              </a:defRPr>
-            </a:lvl2pPr>
-            <a:lvl3pPr marL="1143000" indent="-228600" defTabSz="358775" eaLnBrk="0" hangingPunct="0">
-              <a:defRPr>
-                <a:solidFill>
-                  <a:schemeClr val="tx1"/>
-                </a:solidFill>
-                <a:latin typeface="Arial" charset="0"/>
-              </a:defRPr>
-            </a:lvl3pPr>
-            <a:lvl4pPr marL="1600200" indent="-228600" defTabSz="358775" eaLnBrk="0" hangingPunct="0">
-              <a:defRPr>
-                <a:solidFill>
-                  <a:schemeClr val="tx1"/>
-                </a:solidFill>
-                <a:latin typeface="Arial" charset="0"/>
-              </a:defRPr>
-            </a:lvl4pPr>
-            <a:lvl5pPr marL="2057400" indent="-228600" defTabSz="358775" eaLnBrk="0" hangingPunct="0">
-              <a:defRPr>
-                <a:solidFill>
-                  <a:schemeClr val="tx1"/>
-                </a:solidFill>
-                <a:latin typeface="Arial" charset="0"/>
-              </a:defRPr>
-            </a:lvl5pPr>
-            <a:lvl6pPr marL="2514600" indent="-228600" defTabSz="358775" eaLnBrk="0" fontAlgn="base" hangingPunct="0">
-              <a:spcBef>
-                <a:spcPct val="0"/>
-              </a:spcBef>
-              <a:spcAft>
-                <a:spcPct val="0"/>
-              </a:spcAft>
-              <a:defRPr>
-                <a:solidFill>
-                  <a:schemeClr val="tx1"/>
-                </a:solidFill>
-                <a:latin typeface="Arial" charset="0"/>
-              </a:defRPr>
-            </a:lvl6pPr>
-            <a:lvl7pPr marL="2971800" indent="-228600" defTabSz="358775" eaLnBrk="0" fontAlgn="base" hangingPunct="0">
-              <a:spcBef>
-                <a:spcPct val="0"/>
-              </a:spcBef>
-              <a:spcAft>
-                <a:spcPct val="0"/>
-              </a:spcAft>
-              <a:defRPr>
-                <a:solidFill>
-                  <a:schemeClr val="tx1"/>
-                </a:solidFill>
-                <a:latin typeface="Arial" charset="0"/>
-              </a:defRPr>
-            </a:lvl7pPr>
-            <a:lvl8pPr marL="3429000" indent="-228600" defTabSz="358775" eaLnBrk="0" fontAlgn="base" hangingPunct="0">
-              <a:spcBef>
-                <a:spcPct val="0"/>
-              </a:spcBef>
-              <a:spcAft>
-                <a:spcPct val="0"/>
-              </a:spcAft>
-              <a:defRPr>
-                <a:solidFill>
-                  <a:schemeClr val="tx1"/>
-                </a:solidFill>
-                <a:latin typeface="Arial" charset="0"/>
-              </a:defRPr>
-            </a:lvl8pPr>
-            <a:lvl9pPr marL="3886200" indent="-228600" defTabSz="358775" eaLnBrk="0" fontAlgn="base" hangingPunct="0">
-              <a:spcBef>
-                <a:spcPct val="0"/>
-              </a:spcBef>
-              <a:spcAft>
-                <a:spcPct val="0"/>
-              </a:spcAft>
-              <a:defRPr>
-                <a:solidFill>
-                  <a:schemeClr val="tx1"/>
-                </a:solidFill>
-                <a:latin typeface="Arial" charset="0"/>
-              </a:defRPr>
-            </a:lvl9pPr>
-          </a:lstStyle>
-          <a:p>
-            <a:pPr eaLnBrk="1" hangingPunct="1"/>
-            <a:r>
-              <a:rPr lang="ru-RU" sz="1600" dirty="0">
-                <a:solidFill>
-                  <a:schemeClr val="bg1"/>
-                </a:solidFill>
-              </a:rPr>
-              <a:t>	Перечисления </a:t>
-            </a:r>
-            <a:r>
-              <a:rPr lang="be-BY" sz="1600" dirty="0">
-                <a:solidFill>
-                  <a:schemeClr val="bg1"/>
-                </a:solidFill>
-                <a:latin typeface="Segoe UI" pitchFamily="34" charset="0"/>
-                <a:ea typeface="Calibri" pitchFamily="34" charset="0"/>
-                <a:cs typeface="Segoe UI" pitchFamily="34" charset="0"/>
-              </a:rPr>
-              <a:t>FileAccess </a:t>
-            </a:r>
-            <a:r>
-              <a:rPr lang="en-US" sz="1600" dirty="0">
-                <a:solidFill>
-                  <a:schemeClr val="bg1"/>
-                </a:solidFill>
-              </a:rPr>
-              <a:t>:</a:t>
-            </a:r>
-          </a:p>
-          <a:p>
-            <a:pPr lvl="1" eaLnBrk="1" hangingPunct="1">
-              <a:buFont typeface="Arial" charset="0"/>
-              <a:buChar char="•"/>
-            </a:pPr>
-            <a:r>
-              <a:rPr lang="en-US" sz="1600" dirty="0">
-                <a:solidFill>
-                  <a:schemeClr val="bg1"/>
-                </a:solidFill>
-              </a:rPr>
-              <a:t>Read	</a:t>
-            </a:r>
-            <a:r>
-              <a:rPr lang="ru-RU" sz="1600" dirty="0">
-                <a:solidFill>
-                  <a:schemeClr val="bg1"/>
-                </a:solidFill>
-              </a:rPr>
-              <a:t>Файл открыт только для чтения.</a:t>
-            </a:r>
-            <a:endParaRPr lang="en-US" sz="1600" dirty="0">
-              <a:solidFill>
-                <a:schemeClr val="bg1"/>
-              </a:solidFill>
-            </a:endParaRPr>
-          </a:p>
-          <a:p>
-            <a:pPr lvl="1" eaLnBrk="1" hangingPunct="1">
-              <a:buFont typeface="Arial" charset="0"/>
-              <a:buChar char="•"/>
-            </a:pPr>
-            <a:r>
-              <a:rPr lang="en-US" sz="1600" dirty="0" err="1">
-                <a:solidFill>
-                  <a:schemeClr val="bg1"/>
-                </a:solidFill>
-              </a:rPr>
-              <a:t>ReadWrite</a:t>
-            </a:r>
-            <a:r>
-              <a:rPr lang="ru-RU" sz="1600" dirty="0">
-                <a:solidFill>
-                  <a:schemeClr val="bg1"/>
-                </a:solidFill>
-              </a:rPr>
-              <a:t>	Файл открыт как для чтения, так и для записи.</a:t>
-            </a:r>
-            <a:endParaRPr lang="en-US" sz="1600" dirty="0">
-              <a:solidFill>
-                <a:schemeClr val="bg1"/>
-              </a:solidFill>
-            </a:endParaRPr>
-          </a:p>
-          <a:p>
-            <a:pPr lvl="1" eaLnBrk="1" hangingPunct="1">
-              <a:buFont typeface="Arial" charset="0"/>
-              <a:buChar char="•"/>
-            </a:pPr>
-            <a:r>
-              <a:rPr lang="en-US" sz="1600" dirty="0">
-                <a:solidFill>
-                  <a:schemeClr val="bg1"/>
-                </a:solidFill>
-              </a:rPr>
-              <a:t>Write</a:t>
-            </a:r>
-            <a:r>
-              <a:rPr lang="ru-RU" sz="1600" dirty="0">
-                <a:solidFill>
-                  <a:schemeClr val="bg1"/>
-                </a:solidFill>
-              </a:rPr>
-              <a:t>	Файл открыт для записи, т.е. добавления данных.</a:t>
-            </a:r>
-          </a:p>
-        </p:txBody>
-      </p:sp>
-      <p:sp>
-        <p:nvSpPr>
-          <p:cNvPr id="9223" name="TextBox 6"/>
-          <p:cNvSpPr txBox="1">
-            <a:spLocks noChangeArrowheads="1"/>
-          </p:cNvSpPr>
-          <p:nvPr/>
-        </p:nvSpPr>
-        <p:spPr bwMode="auto">
-          <a:xfrm>
-            <a:off x="0" y="4484688"/>
-            <a:ext cx="9144000" cy="1323975"/>
-          </a:xfrm>
-          <a:prstGeom prst="rect">
-            <a:avLst/>
-          </a:prstGeom>
-          <a:noFill/>
-          <a:ln>
-            <a:noFill/>
-          </a:ln>
-          <a:extLst>
-            <a:ext uri="{909E8E84-426E-40DD-AFC4-6F175D3DCCD1}">
-              <a14:hiddenFill xmlns:a14="http://schemas.microsoft.com/office/drawing/2010/main">
-                <a:solidFill>
-                  <a:srgbClr val="FFFFFF"/>
-                </a:solidFill>
-              </a14:hiddenFill>
-            </a:ext>
-            <a:ext uri="{91240B29-F687-4F45-9708-019B960494DF}">
-              <a14:hiddenLine xmlns:a14="http://schemas.microsoft.com/office/drawing/2010/main" w="9525">
-                <a:solidFill>
-                  <a:srgbClr val="000000"/>
-                </a:solidFill>
-                <a:miter lim="800000"/>
-                <a:headEnd/>
-                <a:tailEnd/>
-              </a14:hiddenLine>
-            </a:ext>
-          </a:extLst>
-        </p:spPr>
-        <p:txBody>
-          <a:bodyPr>
-            <a:spAutoFit/>
-          </a:bodyPr>
-          <a:lstStyle>
-            <a:lvl1pPr defTabSz="358775" eaLnBrk="0" hangingPunct="0">
-              <a:defRPr>
-                <a:solidFill>
-                  <a:schemeClr val="tx1"/>
-                </a:solidFill>
-                <a:latin typeface="Arial" charset="0"/>
-              </a:defRPr>
-            </a:lvl1pPr>
-            <a:lvl2pPr defTabSz="358775" eaLnBrk="0" hangingPunct="0">
-              <a:defRPr>
-                <a:solidFill>
-                  <a:schemeClr val="tx1"/>
-                </a:solidFill>
-                <a:latin typeface="Arial" charset="0"/>
-              </a:defRPr>
-            </a:lvl2pPr>
-            <a:lvl3pPr marL="1143000" indent="-228600" defTabSz="358775" eaLnBrk="0" hangingPunct="0">
-              <a:defRPr>
-                <a:solidFill>
-                  <a:schemeClr val="tx1"/>
-                </a:solidFill>
-                <a:latin typeface="Arial" charset="0"/>
-              </a:defRPr>
-            </a:lvl3pPr>
-            <a:lvl4pPr marL="1600200" indent="-228600" defTabSz="358775" eaLnBrk="0" hangingPunct="0">
-              <a:defRPr>
-                <a:solidFill>
-                  <a:schemeClr val="tx1"/>
-                </a:solidFill>
-                <a:latin typeface="Arial" charset="0"/>
-              </a:defRPr>
-            </a:lvl4pPr>
-            <a:lvl5pPr marL="2057400" indent="-228600" defTabSz="358775" eaLnBrk="0" hangingPunct="0">
-              <a:defRPr>
-                <a:solidFill>
-                  <a:schemeClr val="tx1"/>
-                </a:solidFill>
-                <a:latin typeface="Arial" charset="0"/>
-              </a:defRPr>
-            </a:lvl5pPr>
-            <a:lvl6pPr marL="2514600" indent="-228600" defTabSz="358775" eaLnBrk="0" fontAlgn="base" hangingPunct="0">
-              <a:spcBef>
-                <a:spcPct val="0"/>
-              </a:spcBef>
-              <a:spcAft>
-                <a:spcPct val="0"/>
-              </a:spcAft>
-              <a:defRPr>
-                <a:solidFill>
-                  <a:schemeClr val="tx1"/>
-                </a:solidFill>
-                <a:latin typeface="Arial" charset="0"/>
-              </a:defRPr>
-            </a:lvl6pPr>
-            <a:lvl7pPr marL="2971800" indent="-228600" defTabSz="358775" eaLnBrk="0" fontAlgn="base" hangingPunct="0">
-              <a:spcBef>
-                <a:spcPct val="0"/>
-              </a:spcBef>
-              <a:spcAft>
-                <a:spcPct val="0"/>
-              </a:spcAft>
-              <a:defRPr>
-                <a:solidFill>
-                  <a:schemeClr val="tx1"/>
-                </a:solidFill>
-                <a:latin typeface="Arial" charset="0"/>
-              </a:defRPr>
-            </a:lvl7pPr>
-            <a:lvl8pPr marL="3429000" indent="-228600" defTabSz="358775" eaLnBrk="0" fontAlgn="base" hangingPunct="0">
-              <a:spcBef>
-                <a:spcPct val="0"/>
-              </a:spcBef>
-              <a:spcAft>
-                <a:spcPct val="0"/>
-              </a:spcAft>
-              <a:defRPr>
-                <a:solidFill>
-                  <a:schemeClr val="tx1"/>
-                </a:solidFill>
-                <a:latin typeface="Arial" charset="0"/>
-              </a:defRPr>
-            </a:lvl8pPr>
-            <a:lvl9pPr marL="3886200" indent="-228600" defTabSz="358775" eaLnBrk="0" fontAlgn="base" hangingPunct="0">
-              <a:spcBef>
-                <a:spcPct val="0"/>
-              </a:spcBef>
-              <a:spcAft>
-                <a:spcPct val="0"/>
-              </a:spcAft>
-              <a:defRPr>
-                <a:solidFill>
-                  <a:schemeClr val="tx1"/>
-                </a:solidFill>
-                <a:latin typeface="Arial" charset="0"/>
-              </a:defRPr>
-            </a:lvl9pPr>
-          </a:lstStyle>
-          <a:p>
-            <a:pPr eaLnBrk="1" hangingPunct="1"/>
-            <a:r>
-              <a:rPr lang="ru-RU" sz="1600" dirty="0">
-                <a:solidFill>
-                  <a:schemeClr val="bg1"/>
-                </a:solidFill>
-              </a:rPr>
-              <a:t>	Перечисления </a:t>
-            </a:r>
-            <a:r>
-              <a:rPr lang="be-BY" sz="1600" dirty="0">
-                <a:solidFill>
-                  <a:schemeClr val="bg1"/>
-                </a:solidFill>
-                <a:latin typeface="Segoe UI" pitchFamily="34" charset="0"/>
-                <a:ea typeface="Calibri" pitchFamily="34" charset="0"/>
-                <a:cs typeface="Segoe UI" pitchFamily="34" charset="0"/>
-              </a:rPr>
-              <a:t>FileShare </a:t>
-            </a:r>
-            <a:r>
-              <a:rPr lang="en-US" sz="1600" dirty="0">
-                <a:solidFill>
-                  <a:schemeClr val="bg1"/>
-                </a:solidFill>
-              </a:rPr>
-              <a:t>:</a:t>
-            </a:r>
-          </a:p>
-          <a:p>
-            <a:pPr lvl="1" eaLnBrk="1" hangingPunct="1">
-              <a:buFont typeface="Arial" charset="0"/>
-              <a:buChar char="•"/>
-            </a:pPr>
-            <a:r>
-              <a:rPr lang="en-US" sz="1600" dirty="0">
-                <a:solidFill>
-                  <a:schemeClr val="bg1"/>
-                </a:solidFill>
-              </a:rPr>
-              <a:t>None</a:t>
-            </a:r>
-            <a:r>
-              <a:rPr lang="ru-RU" sz="1600" dirty="0">
-                <a:solidFill>
-                  <a:schemeClr val="bg1"/>
-                </a:solidFill>
-              </a:rPr>
-              <a:t> – совместное использование файла запрещено.</a:t>
-            </a:r>
-            <a:endParaRPr lang="be-BY" sz="1600" dirty="0">
-              <a:solidFill>
-                <a:schemeClr val="bg1"/>
-              </a:solidFill>
-            </a:endParaRPr>
-          </a:p>
-          <a:p>
-            <a:pPr lvl="1" eaLnBrk="1" hangingPunct="1">
-              <a:buFont typeface="Arial" charset="0"/>
-              <a:buChar char="•"/>
-            </a:pPr>
-            <a:r>
-              <a:rPr lang="en-US" sz="1600" dirty="0">
-                <a:solidFill>
-                  <a:schemeClr val="bg1"/>
-                </a:solidFill>
-              </a:rPr>
-              <a:t>Read</a:t>
-            </a:r>
-            <a:r>
-              <a:rPr lang="ru-RU" sz="1600" dirty="0">
-                <a:solidFill>
-                  <a:schemeClr val="bg1"/>
-                </a:solidFill>
-              </a:rPr>
-              <a:t> – файл может быть открыт только для чтения другими пользователями.</a:t>
-            </a:r>
-            <a:endParaRPr lang="be-BY" sz="1600" dirty="0">
-              <a:solidFill>
-                <a:schemeClr val="bg1"/>
-              </a:solidFill>
-            </a:endParaRPr>
-          </a:p>
-          <a:p>
-            <a:pPr lvl="1" eaLnBrk="1" hangingPunct="1">
-              <a:buFont typeface="Arial" charset="0"/>
-              <a:buChar char="•"/>
-            </a:pPr>
-            <a:r>
-              <a:rPr lang="en-US" sz="1600" dirty="0" err="1">
-                <a:solidFill>
-                  <a:schemeClr val="bg1"/>
-                </a:solidFill>
-              </a:rPr>
-              <a:t>ReadWrite</a:t>
-            </a:r>
-            <a:r>
-              <a:rPr lang="ru-RU" sz="1600" dirty="0">
-                <a:solidFill>
-                  <a:schemeClr val="bg1"/>
-                </a:solidFill>
-              </a:rPr>
-              <a:t> – Другие пользователи могут открыть файл для чтения и для записи.</a:t>
-            </a:r>
-            <a:endParaRPr lang="be-BY" sz="1600" dirty="0">
-              <a:solidFill>
-                <a:schemeClr val="bg1"/>
-              </a:solidFill>
-            </a:endParaRPr>
-          </a:p>
-          <a:p>
-            <a:pPr lvl="1" eaLnBrk="1" hangingPunct="1">
-              <a:buFont typeface="Arial" charset="0"/>
-              <a:buChar char="•"/>
-            </a:pPr>
-            <a:r>
-              <a:rPr lang="en-US" sz="1600" dirty="0">
-                <a:solidFill>
-                  <a:schemeClr val="bg1"/>
-                </a:solidFill>
-              </a:rPr>
-              <a:t>Write</a:t>
-            </a:r>
-            <a:r>
-              <a:rPr lang="ru-RU" sz="1600" dirty="0">
-                <a:solidFill>
-                  <a:schemeClr val="bg1"/>
-                </a:solidFill>
-              </a:rPr>
-              <a:t> – Файл может быть открыт для записи.</a:t>
-            </a:r>
-            <a:endParaRPr lang="be-BY" sz="1600" dirty="0">
-              <a:solidFill>
-                <a:schemeClr val="bg1"/>
-              </a:solidFill>
-            </a:endParaRPr>
-          </a:p>
-        </p:txBody>
-      </p:sp>
-      <p:sp>
-        <p:nvSpPr>
-          <p:cNvPr id="9224" name="TextBox 6"/>
-          <p:cNvSpPr txBox="1">
-            <a:spLocks noChangeArrowheads="1"/>
-          </p:cNvSpPr>
-          <p:nvPr/>
-        </p:nvSpPr>
-        <p:spPr bwMode="auto">
-          <a:xfrm>
-            <a:off x="152400" y="6062663"/>
-            <a:ext cx="8839200" cy="584200"/>
-          </a:xfrm>
-          <a:prstGeom prst="rect">
-            <a:avLst/>
-          </a:prstGeom>
-          <a:noFill/>
-          <a:ln>
-            <a:noFill/>
-          </a:ln>
-          <a:extLst>
-            <a:ext uri="{909E8E84-426E-40DD-AFC4-6F175D3DCCD1}">
-              <a14:hiddenFill xmlns:a14="http://schemas.microsoft.com/office/drawing/2010/main">
-                <a:solidFill>
-                  <a:srgbClr val="FFFFFF"/>
-                </a:solidFill>
-              </a14:hiddenFill>
-            </a:ext>
-            <a:ext uri="{91240B29-F687-4F45-9708-019B960494DF}">
-              <a14:hiddenLine xmlns:a14="http://schemas.microsoft.com/office/drawing/2010/main" w="9525">
-                <a:solidFill>
-                  <a:srgbClr val="000000"/>
-                </a:solidFill>
-                <a:miter lim="800000"/>
-                <a:headEnd/>
-                <a:tailEnd/>
-              </a14:hiddenLine>
-            </a:ext>
-          </a:extLst>
-        </p:spPr>
-        <p:txBody>
-          <a:bodyPr>
-            <a:spAutoFit/>
-          </a:bodyPr>
-          <a:lstStyle>
-            <a:lvl1pPr defTabSz="358775" eaLnBrk="0" hangingPunct="0">
-              <a:defRPr>
-                <a:solidFill>
-                  <a:schemeClr val="tx1"/>
-                </a:solidFill>
-                <a:latin typeface="Arial" charset="0"/>
-              </a:defRPr>
-            </a:lvl1pPr>
-            <a:lvl2pPr marL="742950" indent="-285750" defTabSz="358775" eaLnBrk="0" hangingPunct="0">
-              <a:defRPr>
-                <a:solidFill>
-                  <a:schemeClr val="tx1"/>
-                </a:solidFill>
-                <a:latin typeface="Arial" charset="0"/>
-              </a:defRPr>
-            </a:lvl2pPr>
-            <a:lvl3pPr marL="1143000" indent="-228600" defTabSz="358775" eaLnBrk="0" hangingPunct="0">
-              <a:defRPr>
-                <a:solidFill>
-                  <a:schemeClr val="tx1"/>
-                </a:solidFill>
-                <a:latin typeface="Arial" charset="0"/>
-              </a:defRPr>
-            </a:lvl3pPr>
-            <a:lvl4pPr marL="1600200" indent="-228600" defTabSz="358775" eaLnBrk="0" hangingPunct="0">
-              <a:defRPr>
-                <a:solidFill>
-                  <a:schemeClr val="tx1"/>
-                </a:solidFill>
-                <a:latin typeface="Arial" charset="0"/>
-              </a:defRPr>
-            </a:lvl4pPr>
-            <a:lvl5pPr marL="2057400" indent="-228600" defTabSz="358775" eaLnBrk="0" hangingPunct="0">
-              <a:defRPr>
-                <a:solidFill>
-                  <a:schemeClr val="tx1"/>
-                </a:solidFill>
-                <a:latin typeface="Arial" charset="0"/>
-              </a:defRPr>
-            </a:lvl5pPr>
-            <a:lvl6pPr marL="2514600" indent="-228600" defTabSz="358775" eaLnBrk="0" fontAlgn="base" hangingPunct="0">
-              <a:spcBef>
-                <a:spcPct val="0"/>
-              </a:spcBef>
-              <a:spcAft>
-                <a:spcPct val="0"/>
-              </a:spcAft>
-              <a:defRPr>
-                <a:solidFill>
-                  <a:schemeClr val="tx1"/>
-                </a:solidFill>
-                <a:latin typeface="Arial" charset="0"/>
-              </a:defRPr>
-            </a:lvl6pPr>
-            <a:lvl7pPr marL="2971800" indent="-228600" defTabSz="358775" eaLnBrk="0" fontAlgn="base" hangingPunct="0">
-              <a:spcBef>
-                <a:spcPct val="0"/>
-              </a:spcBef>
-              <a:spcAft>
-                <a:spcPct val="0"/>
-              </a:spcAft>
-              <a:defRPr>
-                <a:solidFill>
-                  <a:schemeClr val="tx1"/>
-                </a:solidFill>
-                <a:latin typeface="Arial" charset="0"/>
-              </a:defRPr>
-            </a:lvl7pPr>
-            <a:lvl8pPr marL="3429000" indent="-228600" defTabSz="358775" eaLnBrk="0" fontAlgn="base" hangingPunct="0">
-              <a:spcBef>
-                <a:spcPct val="0"/>
-              </a:spcBef>
-              <a:spcAft>
-                <a:spcPct val="0"/>
-              </a:spcAft>
-              <a:defRPr>
-                <a:solidFill>
-                  <a:schemeClr val="tx1"/>
-                </a:solidFill>
-                <a:latin typeface="Arial" charset="0"/>
-              </a:defRPr>
-            </a:lvl8pPr>
-            <a:lvl9pPr marL="3886200" indent="-228600" defTabSz="358775" eaLnBrk="0" fontAlgn="base" hangingPunct="0">
-              <a:spcBef>
-                <a:spcPct val="0"/>
-              </a:spcBef>
-              <a:spcAft>
-                <a:spcPct val="0"/>
-              </a:spcAft>
-              <a:defRPr>
-                <a:solidFill>
-                  <a:schemeClr val="tx1"/>
-                </a:solidFill>
-                <a:latin typeface="Arial" charset="0"/>
-              </a:defRPr>
-            </a:lvl9pPr>
-          </a:lstStyle>
-          <a:p>
-            <a:pPr eaLnBrk="1" hangingPunct="1"/>
-            <a:r>
-              <a:rPr lang="ru-RU" sz="1600"/>
-              <a:t>Данная функция возвращает объект потока </a:t>
-            </a:r>
-            <a:r>
-              <a:rPr lang="en-US" sz="1600"/>
-              <a:t>FileStream, </a:t>
-            </a:r>
-            <a:r>
-              <a:rPr lang="ru-RU" sz="1600"/>
-              <a:t>позволяющая работать с файлом как с потоком данных.</a:t>
-            </a:r>
-            <a:endParaRPr lang="be-BY" sz="1600"/>
-          </a:p>
-        </p:txBody>
-      </p:sp>
-    </p:spTree>
-    <p:extLst>
-      <p:ext uri="{BB962C8B-B14F-4D97-AF65-F5344CB8AC3E}">
-        <p14:creationId xmlns:p14="http://schemas.microsoft.com/office/powerpoint/2010/main" val="3257246211"/>
-      </p:ext>
-    </p:extLst>
-  </p:cSld>
-  <p:clrMapOvr>
-    <a:masterClrMapping/>
-  </p:clrMapOvr>
-  <p:timing>
-    <p:tnLst>
-      <p:par>
-        <p:cTn id="1" dur="indefinite" restart="never" nodeType="tmRoot"/>
-      </p:par>
-    </p:tnLst>
-  </p:timing>
-</p:sld>
-</file>
-
 <file path=ppt/slides/slide4.xml><?xml version="1.0" encoding="utf-8"?>
 <p:sld xmlns:a="http://schemas.openxmlformats.org/drawingml/2006/main" xmlns:r="http://schemas.openxmlformats.org/officeDocument/2006/relationships" xmlns:p="http://schemas.openxmlformats.org/presentationml/2006/main">
   <p:cSld>
@@ -41373,6 +40026,1446 @@
 <file path=ppt/slides/slide40.xml><?xml version="1.0" encoding="utf-8"?>
 <p:sld xmlns:a="http://schemas.openxmlformats.org/drawingml/2006/main" xmlns:r="http://schemas.openxmlformats.org/officeDocument/2006/relationships" xmlns:p="http://schemas.openxmlformats.org/presentationml/2006/main">
   <p:cSld>
+    <p:bg>
+      <p:bgPr>
+        <a:blipFill dpi="0" rotWithShape="1">
+          <a:blip r:embed="rId2">
+            <a:lum/>
+          </a:blip>
+          <a:srcRect/>
+          <a:stretch>
+            <a:fillRect/>
+          </a:stretch>
+        </a:blipFill>
+        <a:effectLst/>
+      </p:bgPr>
+    </p:bg>
+    <p:spTree>
+      <p:nvGrpSpPr>
+        <p:cNvPr id="1" name=""/>
+        <p:cNvGrpSpPr/>
+        <p:nvPr/>
+      </p:nvGrpSpPr>
+      <p:grpSpPr>
+        <a:xfrm>
+          <a:off x="0" y="0"/>
+          <a:ext cx="0" cy="0"/>
+          <a:chOff x="0" y="0"/>
+          <a:chExt cx="0" cy="0"/>
+        </a:xfrm>
+      </p:grpSpPr>
+      <p:sp>
+        <p:nvSpPr>
+          <p:cNvPr id="9218" name="Прямоугольник 2"/>
+          <p:cNvSpPr>
+            <a:spLocks noChangeArrowheads="1"/>
+          </p:cNvSpPr>
+          <p:nvPr/>
+        </p:nvSpPr>
+        <p:spPr bwMode="auto">
+          <a:xfrm>
+            <a:off x="3048000" y="0"/>
+            <a:ext cx="3090863" cy="461963"/>
+          </a:xfrm>
+          <a:prstGeom prst="rect">
+            <a:avLst/>
+          </a:prstGeom>
+          <a:noFill/>
+          <a:ln>
+            <a:noFill/>
+          </a:ln>
+          <a:extLst>
+            <a:ext uri="{909E8E84-426E-40DD-AFC4-6F175D3DCCD1}">
+              <a14:hiddenFill xmlns:a14="http://schemas.microsoft.com/office/drawing/2010/main">
+                <a:solidFill>
+                  <a:srgbClr val="FFFFFF"/>
+                </a:solidFill>
+              </a14:hiddenFill>
+            </a:ext>
+            <a:ext uri="{91240B29-F687-4F45-9708-019B960494DF}">
+              <a14:hiddenLine xmlns:a14="http://schemas.microsoft.com/office/drawing/2010/main" w="9525">
+                <a:solidFill>
+                  <a:srgbClr val="000000"/>
+                </a:solidFill>
+                <a:miter lim="800000"/>
+                <a:headEnd/>
+                <a:tailEnd/>
+              </a14:hiddenLine>
+            </a:ext>
+          </a:extLst>
+        </p:spPr>
+        <p:txBody>
+          <a:bodyPr wrap="none">
+            <a:spAutoFit/>
+          </a:bodyPr>
+          <a:lstStyle/>
+          <a:p>
+            <a:r>
+              <a:rPr lang="ru-RU" sz="2400" b="1"/>
+              <a:t>Работа с файлами.</a:t>
+            </a:r>
+          </a:p>
+        </p:txBody>
+      </p:sp>
+      <p:sp>
+        <p:nvSpPr>
+          <p:cNvPr id="9219" name="TextBox 6"/>
+          <p:cNvSpPr txBox="1">
+            <a:spLocks noChangeArrowheads="1"/>
+          </p:cNvSpPr>
+          <p:nvPr/>
+        </p:nvSpPr>
+        <p:spPr bwMode="auto">
+          <a:xfrm>
+            <a:off x="152400" y="457200"/>
+            <a:ext cx="8991600" cy="338138"/>
+          </a:xfrm>
+          <a:prstGeom prst="rect">
+            <a:avLst/>
+          </a:prstGeom>
+          <a:noFill/>
+          <a:ln>
+            <a:noFill/>
+          </a:ln>
+          <a:extLst>
+            <a:ext uri="{909E8E84-426E-40DD-AFC4-6F175D3DCCD1}">
+              <a14:hiddenFill xmlns:a14="http://schemas.microsoft.com/office/drawing/2010/main">
+                <a:solidFill>
+                  <a:srgbClr val="FFFFFF"/>
+                </a:solidFill>
+              </a14:hiddenFill>
+            </a:ext>
+            <a:ext uri="{91240B29-F687-4F45-9708-019B960494DF}">
+              <a14:hiddenLine xmlns:a14="http://schemas.microsoft.com/office/drawing/2010/main" w="9525">
+                <a:solidFill>
+                  <a:srgbClr val="000000"/>
+                </a:solidFill>
+                <a:miter lim="800000"/>
+                <a:headEnd/>
+                <a:tailEnd/>
+              </a14:hiddenLine>
+            </a:ext>
+          </a:extLst>
+        </p:spPr>
+        <p:txBody>
+          <a:bodyPr>
+            <a:spAutoFit/>
+          </a:bodyPr>
+          <a:lstStyle>
+            <a:lvl1pPr defTabSz="358775" eaLnBrk="0" hangingPunct="0">
+              <a:defRPr>
+                <a:solidFill>
+                  <a:schemeClr val="tx1"/>
+                </a:solidFill>
+                <a:latin typeface="Arial" charset="0"/>
+              </a:defRPr>
+            </a:lvl1pPr>
+            <a:lvl2pPr marL="742950" indent="-285750" defTabSz="358775" eaLnBrk="0" hangingPunct="0">
+              <a:defRPr>
+                <a:solidFill>
+                  <a:schemeClr val="tx1"/>
+                </a:solidFill>
+                <a:latin typeface="Arial" charset="0"/>
+              </a:defRPr>
+            </a:lvl2pPr>
+            <a:lvl3pPr marL="1143000" indent="-228600" defTabSz="358775" eaLnBrk="0" hangingPunct="0">
+              <a:defRPr>
+                <a:solidFill>
+                  <a:schemeClr val="tx1"/>
+                </a:solidFill>
+                <a:latin typeface="Arial" charset="0"/>
+              </a:defRPr>
+            </a:lvl3pPr>
+            <a:lvl4pPr marL="1600200" indent="-228600" defTabSz="358775" eaLnBrk="0" hangingPunct="0">
+              <a:defRPr>
+                <a:solidFill>
+                  <a:schemeClr val="tx1"/>
+                </a:solidFill>
+                <a:latin typeface="Arial" charset="0"/>
+              </a:defRPr>
+            </a:lvl4pPr>
+            <a:lvl5pPr marL="2057400" indent="-228600" defTabSz="358775" eaLnBrk="0" hangingPunct="0">
+              <a:defRPr>
+                <a:solidFill>
+                  <a:schemeClr val="tx1"/>
+                </a:solidFill>
+                <a:latin typeface="Arial" charset="0"/>
+              </a:defRPr>
+            </a:lvl5pPr>
+            <a:lvl6pPr marL="2514600" indent="-228600" defTabSz="358775" eaLnBrk="0" fontAlgn="base" hangingPunct="0">
+              <a:spcBef>
+                <a:spcPct val="0"/>
+              </a:spcBef>
+              <a:spcAft>
+                <a:spcPct val="0"/>
+              </a:spcAft>
+              <a:defRPr>
+                <a:solidFill>
+                  <a:schemeClr val="tx1"/>
+                </a:solidFill>
+                <a:latin typeface="Arial" charset="0"/>
+              </a:defRPr>
+            </a:lvl6pPr>
+            <a:lvl7pPr marL="2971800" indent="-228600" defTabSz="358775" eaLnBrk="0" fontAlgn="base" hangingPunct="0">
+              <a:spcBef>
+                <a:spcPct val="0"/>
+              </a:spcBef>
+              <a:spcAft>
+                <a:spcPct val="0"/>
+              </a:spcAft>
+              <a:defRPr>
+                <a:solidFill>
+                  <a:schemeClr val="tx1"/>
+                </a:solidFill>
+                <a:latin typeface="Arial" charset="0"/>
+              </a:defRPr>
+            </a:lvl7pPr>
+            <a:lvl8pPr marL="3429000" indent="-228600" defTabSz="358775" eaLnBrk="0" fontAlgn="base" hangingPunct="0">
+              <a:spcBef>
+                <a:spcPct val="0"/>
+              </a:spcBef>
+              <a:spcAft>
+                <a:spcPct val="0"/>
+              </a:spcAft>
+              <a:defRPr>
+                <a:solidFill>
+                  <a:schemeClr val="tx1"/>
+                </a:solidFill>
+                <a:latin typeface="Arial" charset="0"/>
+              </a:defRPr>
+            </a:lvl8pPr>
+            <a:lvl9pPr marL="3886200" indent="-228600" defTabSz="358775" eaLnBrk="0" fontAlgn="base" hangingPunct="0">
+              <a:spcBef>
+                <a:spcPct val="0"/>
+              </a:spcBef>
+              <a:spcAft>
+                <a:spcPct val="0"/>
+              </a:spcAft>
+              <a:defRPr>
+                <a:solidFill>
+                  <a:schemeClr val="tx1"/>
+                </a:solidFill>
+                <a:latin typeface="Arial" charset="0"/>
+              </a:defRPr>
+            </a:lvl9pPr>
+          </a:lstStyle>
+          <a:p>
+            <a:pPr eaLnBrk="1" hangingPunct="1"/>
+            <a:r>
+              <a:rPr lang="ru-RU" sz="1600"/>
+              <a:t>	Рассмотрим метод</a:t>
+            </a:r>
+            <a:r>
+              <a:rPr lang="en-US" sz="1600"/>
+              <a:t> Open() </a:t>
+            </a:r>
+            <a:r>
+              <a:rPr lang="ru-RU" sz="1600"/>
+              <a:t>класса </a:t>
+            </a:r>
+            <a:r>
+              <a:rPr lang="en-US" sz="1600"/>
+              <a:t>FileInfo.</a:t>
+            </a:r>
+            <a:endParaRPr lang="be-BY" sz="1600">
+              <a:solidFill>
+                <a:srgbClr val="008080"/>
+              </a:solidFill>
+              <a:latin typeface="Courier New" pitchFamily="49" charset="0"/>
+              <a:ea typeface="Calibri" pitchFamily="34" charset="0"/>
+              <a:cs typeface="Courier New" pitchFamily="49" charset="0"/>
+            </a:endParaRPr>
+          </a:p>
+        </p:txBody>
+      </p:sp>
+      <p:sp>
+        <p:nvSpPr>
+          <p:cNvPr id="9220" name="Rectangle 4"/>
+          <p:cNvSpPr>
+            <a:spLocks noChangeArrowheads="1"/>
+          </p:cNvSpPr>
+          <p:nvPr/>
+        </p:nvSpPr>
+        <p:spPr bwMode="auto">
+          <a:xfrm>
+            <a:off x="0" y="838200"/>
+            <a:ext cx="9144000" cy="338138"/>
+          </a:xfrm>
+          <a:prstGeom prst="rect">
+            <a:avLst/>
+          </a:prstGeom>
+          <a:noFill/>
+          <a:ln>
+            <a:noFill/>
+          </a:ln>
+          <a:extLst>
+            <a:ext uri="{909E8E84-426E-40DD-AFC4-6F175D3DCCD1}">
+              <a14:hiddenFill xmlns:a14="http://schemas.microsoft.com/office/drawing/2010/main">
+                <a:solidFill>
+                  <a:srgbClr val="FFFFFF"/>
+                </a:solidFill>
+              </a14:hiddenFill>
+            </a:ext>
+            <a:ext uri="{91240B29-F687-4F45-9708-019B960494DF}">
+              <a14:hiddenLine xmlns:a14="http://schemas.microsoft.com/office/drawing/2010/main" w="9525">
+                <a:solidFill>
+                  <a:srgbClr val="000000"/>
+                </a:solidFill>
+                <a:miter lim="800000"/>
+                <a:headEnd/>
+                <a:tailEnd/>
+              </a14:hiddenLine>
+            </a:ext>
+          </a:extLst>
+        </p:spPr>
+        <p:txBody>
+          <a:bodyPr anchor="ctr">
+            <a:spAutoFit/>
+          </a:bodyPr>
+          <a:lstStyle/>
+          <a:p>
+            <a:pPr algn="ctr" eaLnBrk="0" hangingPunct="0"/>
+            <a:r>
+              <a:rPr lang="be-BY" sz="1600" dirty="0">
+                <a:solidFill>
+                  <a:schemeClr val="bg1"/>
+                </a:solidFill>
+                <a:latin typeface="Segoe UI" pitchFamily="34" charset="0"/>
+                <a:ea typeface="Calibri" pitchFamily="34" charset="0"/>
+                <a:cs typeface="Segoe UI" pitchFamily="34" charset="0"/>
+              </a:rPr>
+              <a:t>public FileStream Open(FileMode </a:t>
+            </a:r>
+            <a:r>
+              <a:rPr lang="be-BY" sz="1600" i="1" dirty="0">
+                <a:solidFill>
+                  <a:schemeClr val="bg1"/>
+                </a:solidFill>
+                <a:latin typeface="Segoe UI" pitchFamily="34" charset="0"/>
+                <a:ea typeface="Calibri" pitchFamily="34" charset="0"/>
+                <a:cs typeface="Segoe UI" pitchFamily="34" charset="0"/>
+              </a:rPr>
+              <a:t>mode</a:t>
+            </a:r>
+            <a:r>
+              <a:rPr lang="be-BY" sz="1600" dirty="0">
+                <a:solidFill>
+                  <a:schemeClr val="bg1"/>
+                </a:solidFill>
+                <a:latin typeface="Segoe UI" pitchFamily="34" charset="0"/>
+                <a:ea typeface="Calibri" pitchFamily="34" charset="0"/>
+                <a:cs typeface="Segoe UI" pitchFamily="34" charset="0"/>
+              </a:rPr>
+              <a:t>, FileAccess </a:t>
+            </a:r>
+            <a:r>
+              <a:rPr lang="be-BY" sz="1600" i="1" dirty="0">
+                <a:solidFill>
+                  <a:schemeClr val="bg1"/>
+                </a:solidFill>
+                <a:latin typeface="Segoe UI" pitchFamily="34" charset="0"/>
+                <a:ea typeface="Calibri" pitchFamily="34" charset="0"/>
+                <a:cs typeface="Segoe UI" pitchFamily="34" charset="0"/>
+              </a:rPr>
+              <a:t>access</a:t>
+            </a:r>
+            <a:r>
+              <a:rPr lang="be-BY" sz="1600" dirty="0">
+                <a:solidFill>
+                  <a:schemeClr val="bg1"/>
+                </a:solidFill>
+                <a:latin typeface="Segoe UI" pitchFamily="34" charset="0"/>
+                <a:ea typeface="Calibri" pitchFamily="34" charset="0"/>
+                <a:cs typeface="Segoe UI" pitchFamily="34" charset="0"/>
+              </a:rPr>
+              <a:t>, FileShare </a:t>
+            </a:r>
+            <a:r>
+              <a:rPr lang="be-BY" sz="1600" i="1" dirty="0">
+                <a:solidFill>
+                  <a:schemeClr val="bg1"/>
+                </a:solidFill>
+                <a:latin typeface="Segoe UI" pitchFamily="34" charset="0"/>
+                <a:ea typeface="Calibri" pitchFamily="34" charset="0"/>
+                <a:cs typeface="Segoe UI" pitchFamily="34" charset="0"/>
+              </a:rPr>
+              <a:t>share</a:t>
+            </a:r>
+            <a:r>
+              <a:rPr lang="be-BY" sz="1600" dirty="0">
+                <a:solidFill>
+                  <a:schemeClr val="bg1"/>
+                </a:solidFill>
+                <a:latin typeface="Segoe UI" pitchFamily="34" charset="0"/>
+                <a:ea typeface="Calibri" pitchFamily="34" charset="0"/>
+                <a:cs typeface="Segoe UI" pitchFamily="34" charset="0"/>
+              </a:rPr>
+              <a:t>)</a:t>
+            </a:r>
+            <a:endParaRPr lang="be-BY" sz="1600" dirty="0">
+              <a:solidFill>
+                <a:schemeClr val="bg1"/>
+              </a:solidFill>
+              <a:ea typeface="Calibri" pitchFamily="34" charset="0"/>
+              <a:cs typeface="Segoe UI" pitchFamily="34" charset="0"/>
+            </a:endParaRPr>
+          </a:p>
+        </p:txBody>
+      </p:sp>
+      <p:sp>
+        <p:nvSpPr>
+          <p:cNvPr id="9221" name="TextBox 6"/>
+          <p:cNvSpPr txBox="1">
+            <a:spLocks noChangeArrowheads="1"/>
+          </p:cNvSpPr>
+          <p:nvPr/>
+        </p:nvSpPr>
+        <p:spPr bwMode="auto">
+          <a:xfrm>
+            <a:off x="0" y="1219200"/>
+            <a:ext cx="9144000" cy="2062163"/>
+          </a:xfrm>
+          <a:prstGeom prst="rect">
+            <a:avLst/>
+          </a:prstGeom>
+          <a:noFill/>
+          <a:ln>
+            <a:noFill/>
+          </a:ln>
+          <a:extLst>
+            <a:ext uri="{909E8E84-426E-40DD-AFC4-6F175D3DCCD1}">
+              <a14:hiddenFill xmlns:a14="http://schemas.microsoft.com/office/drawing/2010/main">
+                <a:solidFill>
+                  <a:srgbClr val="FFFFFF"/>
+                </a:solidFill>
+              </a14:hiddenFill>
+            </a:ext>
+            <a:ext uri="{91240B29-F687-4F45-9708-019B960494DF}">
+              <a14:hiddenLine xmlns:a14="http://schemas.microsoft.com/office/drawing/2010/main" w="9525">
+                <a:solidFill>
+                  <a:srgbClr val="000000"/>
+                </a:solidFill>
+                <a:miter lim="800000"/>
+                <a:headEnd/>
+                <a:tailEnd/>
+              </a14:hiddenLine>
+            </a:ext>
+          </a:extLst>
+        </p:spPr>
+        <p:txBody>
+          <a:bodyPr>
+            <a:spAutoFit/>
+          </a:bodyPr>
+          <a:lstStyle>
+            <a:lvl1pPr defTabSz="358775" eaLnBrk="0" hangingPunct="0">
+              <a:defRPr>
+                <a:solidFill>
+                  <a:schemeClr val="tx1"/>
+                </a:solidFill>
+                <a:latin typeface="Arial" charset="0"/>
+              </a:defRPr>
+            </a:lvl1pPr>
+            <a:lvl2pPr defTabSz="358775" eaLnBrk="0" hangingPunct="0">
+              <a:defRPr>
+                <a:solidFill>
+                  <a:schemeClr val="tx1"/>
+                </a:solidFill>
+                <a:latin typeface="Arial" charset="0"/>
+              </a:defRPr>
+            </a:lvl2pPr>
+            <a:lvl3pPr marL="1143000" indent="-228600" defTabSz="358775" eaLnBrk="0" hangingPunct="0">
+              <a:defRPr>
+                <a:solidFill>
+                  <a:schemeClr val="tx1"/>
+                </a:solidFill>
+                <a:latin typeface="Arial" charset="0"/>
+              </a:defRPr>
+            </a:lvl3pPr>
+            <a:lvl4pPr marL="1600200" indent="-228600" defTabSz="358775" eaLnBrk="0" hangingPunct="0">
+              <a:defRPr>
+                <a:solidFill>
+                  <a:schemeClr val="tx1"/>
+                </a:solidFill>
+                <a:latin typeface="Arial" charset="0"/>
+              </a:defRPr>
+            </a:lvl4pPr>
+            <a:lvl5pPr marL="2057400" indent="-228600" defTabSz="358775" eaLnBrk="0" hangingPunct="0">
+              <a:defRPr>
+                <a:solidFill>
+                  <a:schemeClr val="tx1"/>
+                </a:solidFill>
+                <a:latin typeface="Arial" charset="0"/>
+              </a:defRPr>
+            </a:lvl5pPr>
+            <a:lvl6pPr marL="2514600" indent="-228600" defTabSz="358775" eaLnBrk="0" fontAlgn="base" hangingPunct="0">
+              <a:spcBef>
+                <a:spcPct val="0"/>
+              </a:spcBef>
+              <a:spcAft>
+                <a:spcPct val="0"/>
+              </a:spcAft>
+              <a:defRPr>
+                <a:solidFill>
+                  <a:schemeClr val="tx1"/>
+                </a:solidFill>
+                <a:latin typeface="Arial" charset="0"/>
+              </a:defRPr>
+            </a:lvl6pPr>
+            <a:lvl7pPr marL="2971800" indent="-228600" defTabSz="358775" eaLnBrk="0" fontAlgn="base" hangingPunct="0">
+              <a:spcBef>
+                <a:spcPct val="0"/>
+              </a:spcBef>
+              <a:spcAft>
+                <a:spcPct val="0"/>
+              </a:spcAft>
+              <a:defRPr>
+                <a:solidFill>
+                  <a:schemeClr val="tx1"/>
+                </a:solidFill>
+                <a:latin typeface="Arial" charset="0"/>
+              </a:defRPr>
+            </a:lvl7pPr>
+            <a:lvl8pPr marL="3429000" indent="-228600" defTabSz="358775" eaLnBrk="0" fontAlgn="base" hangingPunct="0">
+              <a:spcBef>
+                <a:spcPct val="0"/>
+              </a:spcBef>
+              <a:spcAft>
+                <a:spcPct val="0"/>
+              </a:spcAft>
+              <a:defRPr>
+                <a:solidFill>
+                  <a:schemeClr val="tx1"/>
+                </a:solidFill>
+                <a:latin typeface="Arial" charset="0"/>
+              </a:defRPr>
+            </a:lvl8pPr>
+            <a:lvl9pPr marL="3886200" indent="-228600" defTabSz="358775" eaLnBrk="0" fontAlgn="base" hangingPunct="0">
+              <a:spcBef>
+                <a:spcPct val="0"/>
+              </a:spcBef>
+              <a:spcAft>
+                <a:spcPct val="0"/>
+              </a:spcAft>
+              <a:defRPr>
+                <a:solidFill>
+                  <a:schemeClr val="tx1"/>
+                </a:solidFill>
+                <a:latin typeface="Arial" charset="0"/>
+              </a:defRPr>
+            </a:lvl9pPr>
+          </a:lstStyle>
+          <a:p>
+            <a:pPr eaLnBrk="1" hangingPunct="1"/>
+            <a:r>
+              <a:rPr lang="ru-RU" sz="1600" dirty="0">
+                <a:solidFill>
+                  <a:schemeClr val="bg1"/>
+                </a:solidFill>
+              </a:rPr>
+              <a:t>	Перечисление </a:t>
+            </a:r>
+            <a:r>
+              <a:rPr lang="be-BY" sz="1600" dirty="0">
+                <a:solidFill>
+                  <a:schemeClr val="bg1"/>
+                </a:solidFill>
+                <a:latin typeface="Segoe UI" pitchFamily="34" charset="0"/>
+                <a:ea typeface="Calibri" pitchFamily="34" charset="0"/>
+                <a:cs typeface="Segoe UI" pitchFamily="34" charset="0"/>
+              </a:rPr>
+              <a:t>FileMode</a:t>
+            </a:r>
+            <a:r>
+              <a:rPr lang="en-US" sz="1600" dirty="0">
+                <a:solidFill>
+                  <a:schemeClr val="bg1"/>
+                </a:solidFill>
+              </a:rPr>
+              <a:t>:</a:t>
+            </a:r>
+          </a:p>
+          <a:p>
+            <a:pPr lvl="1" eaLnBrk="1" hangingPunct="1">
+              <a:buFont typeface="Arial" charset="0"/>
+              <a:buChar char="•"/>
+            </a:pPr>
+            <a:r>
+              <a:rPr lang="en-US" sz="1600" dirty="0">
+                <a:solidFill>
+                  <a:schemeClr val="bg1"/>
+                </a:solidFill>
+              </a:rPr>
+              <a:t>Append	</a:t>
+            </a:r>
+            <a:r>
+              <a:rPr lang="ru-RU" sz="1600" dirty="0">
+                <a:solidFill>
+                  <a:schemeClr val="bg1"/>
+                </a:solidFill>
+              </a:rPr>
+              <a:t>Открывает файл для записи в конец, либо создает новый файл.</a:t>
+            </a:r>
+            <a:endParaRPr lang="en-US" sz="1600" dirty="0">
+              <a:solidFill>
+                <a:schemeClr val="bg1"/>
+              </a:solidFill>
+            </a:endParaRPr>
+          </a:p>
+          <a:p>
+            <a:pPr lvl="1" eaLnBrk="1" hangingPunct="1">
+              <a:buFont typeface="Arial" charset="0"/>
+              <a:buChar char="•"/>
+            </a:pPr>
+            <a:r>
+              <a:rPr lang="en-US" sz="1600" dirty="0">
+                <a:solidFill>
+                  <a:schemeClr val="bg1"/>
+                </a:solidFill>
+              </a:rPr>
+              <a:t>Create</a:t>
+            </a:r>
+            <a:r>
+              <a:rPr lang="ru-RU" sz="1600" dirty="0">
+                <a:solidFill>
+                  <a:schemeClr val="bg1"/>
+                </a:solidFill>
+              </a:rPr>
+              <a:t>	Создает новый файл либо перезаписывает существующий</a:t>
+            </a:r>
+            <a:endParaRPr lang="en-US" sz="1600" dirty="0">
+              <a:solidFill>
+                <a:schemeClr val="bg1"/>
+              </a:solidFill>
+            </a:endParaRPr>
+          </a:p>
+          <a:p>
+            <a:pPr lvl="1" eaLnBrk="1" hangingPunct="1">
+              <a:buFont typeface="Arial" charset="0"/>
+              <a:buChar char="•"/>
+            </a:pPr>
+            <a:r>
+              <a:rPr lang="en-US" sz="1600" dirty="0" err="1">
+                <a:solidFill>
+                  <a:schemeClr val="bg1"/>
+                </a:solidFill>
+              </a:rPr>
+              <a:t>CreateNew</a:t>
+            </a:r>
+            <a:r>
+              <a:rPr lang="ru-RU" sz="1600" dirty="0">
+                <a:solidFill>
+                  <a:schemeClr val="bg1"/>
+                </a:solidFill>
+              </a:rPr>
+              <a:t>	Создает новый файл. Если файл существует, генерируется </a:t>
+            </a:r>
+            <a:r>
+              <a:rPr lang="en-US" sz="1600" dirty="0" err="1">
+                <a:solidFill>
+                  <a:schemeClr val="bg1"/>
+                </a:solidFill>
+              </a:rPr>
+              <a:t>IOException</a:t>
+            </a:r>
+            <a:endParaRPr lang="en-US" sz="1600" dirty="0">
+              <a:solidFill>
+                <a:schemeClr val="bg1"/>
+              </a:solidFill>
+            </a:endParaRPr>
+          </a:p>
+          <a:p>
+            <a:pPr lvl="1" eaLnBrk="1" hangingPunct="1">
+              <a:buFont typeface="Arial" charset="0"/>
+              <a:buChar char="•"/>
+            </a:pPr>
+            <a:r>
+              <a:rPr lang="en-US" sz="1600" dirty="0">
+                <a:solidFill>
+                  <a:schemeClr val="bg1"/>
+                </a:solidFill>
+              </a:rPr>
+              <a:t>Open		</a:t>
+            </a:r>
+            <a:r>
+              <a:rPr lang="ru-RU" sz="1600" dirty="0">
+                <a:solidFill>
+                  <a:schemeClr val="bg1"/>
+                </a:solidFill>
+              </a:rPr>
+              <a:t>Открывает файл для чтения.</a:t>
+            </a:r>
+            <a:endParaRPr lang="en-US" sz="1600" dirty="0">
+              <a:solidFill>
+                <a:schemeClr val="bg1"/>
+              </a:solidFill>
+            </a:endParaRPr>
+          </a:p>
+          <a:p>
+            <a:pPr lvl="1" eaLnBrk="1" hangingPunct="1">
+              <a:buFont typeface="Arial" charset="0"/>
+              <a:buChar char="•"/>
+            </a:pPr>
+            <a:r>
+              <a:rPr lang="en-US" sz="1600" dirty="0" err="1">
+                <a:solidFill>
+                  <a:schemeClr val="bg1"/>
+                </a:solidFill>
+              </a:rPr>
+              <a:t>OpenOrCreate</a:t>
+            </a:r>
+            <a:r>
+              <a:rPr lang="ru-RU" sz="1600" dirty="0">
+                <a:solidFill>
+                  <a:schemeClr val="bg1"/>
+                </a:solidFill>
+              </a:rPr>
+              <a:t>	Открывает файл для чтения или создает новый, если файла не существует.</a:t>
+            </a:r>
+            <a:endParaRPr lang="en-US" sz="1600" dirty="0">
+              <a:solidFill>
+                <a:schemeClr val="bg1"/>
+              </a:solidFill>
+            </a:endParaRPr>
+          </a:p>
+          <a:p>
+            <a:pPr lvl="1" eaLnBrk="1" hangingPunct="1">
+              <a:buFont typeface="Arial" charset="0"/>
+              <a:buChar char="•"/>
+            </a:pPr>
+            <a:r>
+              <a:rPr lang="en-US" sz="1600" dirty="0">
+                <a:solidFill>
+                  <a:schemeClr val="bg1"/>
+                </a:solidFill>
+              </a:rPr>
+              <a:t>Truncate</a:t>
+            </a:r>
+            <a:r>
+              <a:rPr lang="ru-RU" sz="1600" dirty="0">
+                <a:solidFill>
+                  <a:schemeClr val="bg1"/>
+                </a:solidFill>
+              </a:rPr>
+              <a:t>	Открывает существующий файл и очищает его.</a:t>
+            </a:r>
+          </a:p>
+        </p:txBody>
+      </p:sp>
+      <p:sp>
+        <p:nvSpPr>
+          <p:cNvPr id="9222" name="TextBox 6"/>
+          <p:cNvSpPr txBox="1">
+            <a:spLocks noChangeArrowheads="1"/>
+          </p:cNvSpPr>
+          <p:nvPr/>
+        </p:nvSpPr>
+        <p:spPr bwMode="auto">
+          <a:xfrm>
+            <a:off x="0" y="3348038"/>
+            <a:ext cx="9144000" cy="1077912"/>
+          </a:xfrm>
+          <a:prstGeom prst="rect">
+            <a:avLst/>
+          </a:prstGeom>
+          <a:noFill/>
+          <a:ln>
+            <a:noFill/>
+          </a:ln>
+          <a:extLst>
+            <a:ext uri="{909E8E84-426E-40DD-AFC4-6F175D3DCCD1}">
+              <a14:hiddenFill xmlns:a14="http://schemas.microsoft.com/office/drawing/2010/main">
+                <a:solidFill>
+                  <a:srgbClr val="FFFFFF"/>
+                </a:solidFill>
+              </a14:hiddenFill>
+            </a:ext>
+            <a:ext uri="{91240B29-F687-4F45-9708-019B960494DF}">
+              <a14:hiddenLine xmlns:a14="http://schemas.microsoft.com/office/drawing/2010/main" w="9525">
+                <a:solidFill>
+                  <a:srgbClr val="000000"/>
+                </a:solidFill>
+                <a:miter lim="800000"/>
+                <a:headEnd/>
+                <a:tailEnd/>
+              </a14:hiddenLine>
+            </a:ext>
+          </a:extLst>
+        </p:spPr>
+        <p:txBody>
+          <a:bodyPr>
+            <a:spAutoFit/>
+          </a:bodyPr>
+          <a:lstStyle>
+            <a:lvl1pPr defTabSz="358775" eaLnBrk="0" hangingPunct="0">
+              <a:defRPr>
+                <a:solidFill>
+                  <a:schemeClr val="tx1"/>
+                </a:solidFill>
+                <a:latin typeface="Arial" charset="0"/>
+              </a:defRPr>
+            </a:lvl1pPr>
+            <a:lvl2pPr defTabSz="358775" eaLnBrk="0" hangingPunct="0">
+              <a:defRPr>
+                <a:solidFill>
+                  <a:schemeClr val="tx1"/>
+                </a:solidFill>
+                <a:latin typeface="Arial" charset="0"/>
+              </a:defRPr>
+            </a:lvl2pPr>
+            <a:lvl3pPr marL="1143000" indent="-228600" defTabSz="358775" eaLnBrk="0" hangingPunct="0">
+              <a:defRPr>
+                <a:solidFill>
+                  <a:schemeClr val="tx1"/>
+                </a:solidFill>
+                <a:latin typeface="Arial" charset="0"/>
+              </a:defRPr>
+            </a:lvl3pPr>
+            <a:lvl4pPr marL="1600200" indent="-228600" defTabSz="358775" eaLnBrk="0" hangingPunct="0">
+              <a:defRPr>
+                <a:solidFill>
+                  <a:schemeClr val="tx1"/>
+                </a:solidFill>
+                <a:latin typeface="Arial" charset="0"/>
+              </a:defRPr>
+            </a:lvl4pPr>
+            <a:lvl5pPr marL="2057400" indent="-228600" defTabSz="358775" eaLnBrk="0" hangingPunct="0">
+              <a:defRPr>
+                <a:solidFill>
+                  <a:schemeClr val="tx1"/>
+                </a:solidFill>
+                <a:latin typeface="Arial" charset="0"/>
+              </a:defRPr>
+            </a:lvl5pPr>
+            <a:lvl6pPr marL="2514600" indent="-228600" defTabSz="358775" eaLnBrk="0" fontAlgn="base" hangingPunct="0">
+              <a:spcBef>
+                <a:spcPct val="0"/>
+              </a:spcBef>
+              <a:spcAft>
+                <a:spcPct val="0"/>
+              </a:spcAft>
+              <a:defRPr>
+                <a:solidFill>
+                  <a:schemeClr val="tx1"/>
+                </a:solidFill>
+                <a:latin typeface="Arial" charset="0"/>
+              </a:defRPr>
+            </a:lvl6pPr>
+            <a:lvl7pPr marL="2971800" indent="-228600" defTabSz="358775" eaLnBrk="0" fontAlgn="base" hangingPunct="0">
+              <a:spcBef>
+                <a:spcPct val="0"/>
+              </a:spcBef>
+              <a:spcAft>
+                <a:spcPct val="0"/>
+              </a:spcAft>
+              <a:defRPr>
+                <a:solidFill>
+                  <a:schemeClr val="tx1"/>
+                </a:solidFill>
+                <a:latin typeface="Arial" charset="0"/>
+              </a:defRPr>
+            </a:lvl7pPr>
+            <a:lvl8pPr marL="3429000" indent="-228600" defTabSz="358775" eaLnBrk="0" fontAlgn="base" hangingPunct="0">
+              <a:spcBef>
+                <a:spcPct val="0"/>
+              </a:spcBef>
+              <a:spcAft>
+                <a:spcPct val="0"/>
+              </a:spcAft>
+              <a:defRPr>
+                <a:solidFill>
+                  <a:schemeClr val="tx1"/>
+                </a:solidFill>
+                <a:latin typeface="Arial" charset="0"/>
+              </a:defRPr>
+            </a:lvl8pPr>
+            <a:lvl9pPr marL="3886200" indent="-228600" defTabSz="358775" eaLnBrk="0" fontAlgn="base" hangingPunct="0">
+              <a:spcBef>
+                <a:spcPct val="0"/>
+              </a:spcBef>
+              <a:spcAft>
+                <a:spcPct val="0"/>
+              </a:spcAft>
+              <a:defRPr>
+                <a:solidFill>
+                  <a:schemeClr val="tx1"/>
+                </a:solidFill>
+                <a:latin typeface="Arial" charset="0"/>
+              </a:defRPr>
+            </a:lvl9pPr>
+          </a:lstStyle>
+          <a:p>
+            <a:pPr eaLnBrk="1" hangingPunct="1"/>
+            <a:r>
+              <a:rPr lang="ru-RU" sz="1600" dirty="0">
+                <a:solidFill>
+                  <a:schemeClr val="bg1"/>
+                </a:solidFill>
+              </a:rPr>
+              <a:t>	Перечисления </a:t>
+            </a:r>
+            <a:r>
+              <a:rPr lang="be-BY" sz="1600" dirty="0">
+                <a:solidFill>
+                  <a:schemeClr val="bg1"/>
+                </a:solidFill>
+                <a:latin typeface="Segoe UI" pitchFamily="34" charset="0"/>
+                <a:ea typeface="Calibri" pitchFamily="34" charset="0"/>
+                <a:cs typeface="Segoe UI" pitchFamily="34" charset="0"/>
+              </a:rPr>
+              <a:t>FileAccess </a:t>
+            </a:r>
+            <a:r>
+              <a:rPr lang="en-US" sz="1600" dirty="0">
+                <a:solidFill>
+                  <a:schemeClr val="bg1"/>
+                </a:solidFill>
+              </a:rPr>
+              <a:t>:</a:t>
+            </a:r>
+          </a:p>
+          <a:p>
+            <a:pPr lvl="1" eaLnBrk="1" hangingPunct="1">
+              <a:buFont typeface="Arial" charset="0"/>
+              <a:buChar char="•"/>
+            </a:pPr>
+            <a:r>
+              <a:rPr lang="en-US" sz="1600" dirty="0">
+                <a:solidFill>
+                  <a:schemeClr val="bg1"/>
+                </a:solidFill>
+              </a:rPr>
+              <a:t>Read	</a:t>
+            </a:r>
+            <a:r>
+              <a:rPr lang="ru-RU" sz="1600" dirty="0">
+                <a:solidFill>
+                  <a:schemeClr val="bg1"/>
+                </a:solidFill>
+              </a:rPr>
+              <a:t>Файл открыт только для чтения.</a:t>
+            </a:r>
+            <a:endParaRPr lang="en-US" sz="1600" dirty="0">
+              <a:solidFill>
+                <a:schemeClr val="bg1"/>
+              </a:solidFill>
+            </a:endParaRPr>
+          </a:p>
+          <a:p>
+            <a:pPr lvl="1" eaLnBrk="1" hangingPunct="1">
+              <a:buFont typeface="Arial" charset="0"/>
+              <a:buChar char="•"/>
+            </a:pPr>
+            <a:r>
+              <a:rPr lang="en-US" sz="1600" dirty="0" err="1">
+                <a:solidFill>
+                  <a:schemeClr val="bg1"/>
+                </a:solidFill>
+              </a:rPr>
+              <a:t>ReadWrite</a:t>
+            </a:r>
+            <a:r>
+              <a:rPr lang="ru-RU" sz="1600" dirty="0">
+                <a:solidFill>
+                  <a:schemeClr val="bg1"/>
+                </a:solidFill>
+              </a:rPr>
+              <a:t>	Файл открыт как для чтения, так и для записи.</a:t>
+            </a:r>
+            <a:endParaRPr lang="en-US" sz="1600" dirty="0">
+              <a:solidFill>
+                <a:schemeClr val="bg1"/>
+              </a:solidFill>
+            </a:endParaRPr>
+          </a:p>
+          <a:p>
+            <a:pPr lvl="1" eaLnBrk="1" hangingPunct="1">
+              <a:buFont typeface="Arial" charset="0"/>
+              <a:buChar char="•"/>
+            </a:pPr>
+            <a:r>
+              <a:rPr lang="en-US" sz="1600" dirty="0">
+                <a:solidFill>
+                  <a:schemeClr val="bg1"/>
+                </a:solidFill>
+              </a:rPr>
+              <a:t>Write</a:t>
+            </a:r>
+            <a:r>
+              <a:rPr lang="ru-RU" sz="1600" dirty="0">
+                <a:solidFill>
+                  <a:schemeClr val="bg1"/>
+                </a:solidFill>
+              </a:rPr>
+              <a:t>	Файл открыт для записи, т.е. добавления данных.</a:t>
+            </a:r>
+          </a:p>
+        </p:txBody>
+      </p:sp>
+      <p:sp>
+        <p:nvSpPr>
+          <p:cNvPr id="9223" name="TextBox 6"/>
+          <p:cNvSpPr txBox="1">
+            <a:spLocks noChangeArrowheads="1"/>
+          </p:cNvSpPr>
+          <p:nvPr/>
+        </p:nvSpPr>
+        <p:spPr bwMode="auto">
+          <a:xfrm>
+            <a:off x="0" y="4484688"/>
+            <a:ext cx="9144000" cy="1323975"/>
+          </a:xfrm>
+          <a:prstGeom prst="rect">
+            <a:avLst/>
+          </a:prstGeom>
+          <a:noFill/>
+          <a:ln>
+            <a:noFill/>
+          </a:ln>
+          <a:extLst>
+            <a:ext uri="{909E8E84-426E-40DD-AFC4-6F175D3DCCD1}">
+              <a14:hiddenFill xmlns:a14="http://schemas.microsoft.com/office/drawing/2010/main">
+                <a:solidFill>
+                  <a:srgbClr val="FFFFFF"/>
+                </a:solidFill>
+              </a14:hiddenFill>
+            </a:ext>
+            <a:ext uri="{91240B29-F687-4F45-9708-019B960494DF}">
+              <a14:hiddenLine xmlns:a14="http://schemas.microsoft.com/office/drawing/2010/main" w="9525">
+                <a:solidFill>
+                  <a:srgbClr val="000000"/>
+                </a:solidFill>
+                <a:miter lim="800000"/>
+                <a:headEnd/>
+                <a:tailEnd/>
+              </a14:hiddenLine>
+            </a:ext>
+          </a:extLst>
+        </p:spPr>
+        <p:txBody>
+          <a:bodyPr>
+            <a:spAutoFit/>
+          </a:bodyPr>
+          <a:lstStyle>
+            <a:lvl1pPr defTabSz="358775" eaLnBrk="0" hangingPunct="0">
+              <a:defRPr>
+                <a:solidFill>
+                  <a:schemeClr val="tx1"/>
+                </a:solidFill>
+                <a:latin typeface="Arial" charset="0"/>
+              </a:defRPr>
+            </a:lvl1pPr>
+            <a:lvl2pPr defTabSz="358775" eaLnBrk="0" hangingPunct="0">
+              <a:defRPr>
+                <a:solidFill>
+                  <a:schemeClr val="tx1"/>
+                </a:solidFill>
+                <a:latin typeface="Arial" charset="0"/>
+              </a:defRPr>
+            </a:lvl2pPr>
+            <a:lvl3pPr marL="1143000" indent="-228600" defTabSz="358775" eaLnBrk="0" hangingPunct="0">
+              <a:defRPr>
+                <a:solidFill>
+                  <a:schemeClr val="tx1"/>
+                </a:solidFill>
+                <a:latin typeface="Arial" charset="0"/>
+              </a:defRPr>
+            </a:lvl3pPr>
+            <a:lvl4pPr marL="1600200" indent="-228600" defTabSz="358775" eaLnBrk="0" hangingPunct="0">
+              <a:defRPr>
+                <a:solidFill>
+                  <a:schemeClr val="tx1"/>
+                </a:solidFill>
+                <a:latin typeface="Arial" charset="0"/>
+              </a:defRPr>
+            </a:lvl4pPr>
+            <a:lvl5pPr marL="2057400" indent="-228600" defTabSz="358775" eaLnBrk="0" hangingPunct="0">
+              <a:defRPr>
+                <a:solidFill>
+                  <a:schemeClr val="tx1"/>
+                </a:solidFill>
+                <a:latin typeface="Arial" charset="0"/>
+              </a:defRPr>
+            </a:lvl5pPr>
+            <a:lvl6pPr marL="2514600" indent="-228600" defTabSz="358775" eaLnBrk="0" fontAlgn="base" hangingPunct="0">
+              <a:spcBef>
+                <a:spcPct val="0"/>
+              </a:spcBef>
+              <a:spcAft>
+                <a:spcPct val="0"/>
+              </a:spcAft>
+              <a:defRPr>
+                <a:solidFill>
+                  <a:schemeClr val="tx1"/>
+                </a:solidFill>
+                <a:latin typeface="Arial" charset="0"/>
+              </a:defRPr>
+            </a:lvl6pPr>
+            <a:lvl7pPr marL="2971800" indent="-228600" defTabSz="358775" eaLnBrk="0" fontAlgn="base" hangingPunct="0">
+              <a:spcBef>
+                <a:spcPct val="0"/>
+              </a:spcBef>
+              <a:spcAft>
+                <a:spcPct val="0"/>
+              </a:spcAft>
+              <a:defRPr>
+                <a:solidFill>
+                  <a:schemeClr val="tx1"/>
+                </a:solidFill>
+                <a:latin typeface="Arial" charset="0"/>
+              </a:defRPr>
+            </a:lvl7pPr>
+            <a:lvl8pPr marL="3429000" indent="-228600" defTabSz="358775" eaLnBrk="0" fontAlgn="base" hangingPunct="0">
+              <a:spcBef>
+                <a:spcPct val="0"/>
+              </a:spcBef>
+              <a:spcAft>
+                <a:spcPct val="0"/>
+              </a:spcAft>
+              <a:defRPr>
+                <a:solidFill>
+                  <a:schemeClr val="tx1"/>
+                </a:solidFill>
+                <a:latin typeface="Arial" charset="0"/>
+              </a:defRPr>
+            </a:lvl8pPr>
+            <a:lvl9pPr marL="3886200" indent="-228600" defTabSz="358775" eaLnBrk="0" fontAlgn="base" hangingPunct="0">
+              <a:spcBef>
+                <a:spcPct val="0"/>
+              </a:spcBef>
+              <a:spcAft>
+                <a:spcPct val="0"/>
+              </a:spcAft>
+              <a:defRPr>
+                <a:solidFill>
+                  <a:schemeClr val="tx1"/>
+                </a:solidFill>
+                <a:latin typeface="Arial" charset="0"/>
+              </a:defRPr>
+            </a:lvl9pPr>
+          </a:lstStyle>
+          <a:p>
+            <a:pPr eaLnBrk="1" hangingPunct="1"/>
+            <a:r>
+              <a:rPr lang="ru-RU" sz="1600" dirty="0">
+                <a:solidFill>
+                  <a:schemeClr val="bg1"/>
+                </a:solidFill>
+              </a:rPr>
+              <a:t>	Перечисления </a:t>
+            </a:r>
+            <a:r>
+              <a:rPr lang="be-BY" sz="1600" dirty="0">
+                <a:solidFill>
+                  <a:schemeClr val="bg1"/>
+                </a:solidFill>
+                <a:latin typeface="Segoe UI" pitchFamily="34" charset="0"/>
+                <a:ea typeface="Calibri" pitchFamily="34" charset="0"/>
+                <a:cs typeface="Segoe UI" pitchFamily="34" charset="0"/>
+              </a:rPr>
+              <a:t>FileShare </a:t>
+            </a:r>
+            <a:r>
+              <a:rPr lang="en-US" sz="1600" dirty="0">
+                <a:solidFill>
+                  <a:schemeClr val="bg1"/>
+                </a:solidFill>
+              </a:rPr>
+              <a:t>:</a:t>
+            </a:r>
+          </a:p>
+          <a:p>
+            <a:pPr lvl="1" eaLnBrk="1" hangingPunct="1">
+              <a:buFont typeface="Arial" charset="0"/>
+              <a:buChar char="•"/>
+            </a:pPr>
+            <a:r>
+              <a:rPr lang="en-US" sz="1600" dirty="0">
+                <a:solidFill>
+                  <a:schemeClr val="bg1"/>
+                </a:solidFill>
+              </a:rPr>
+              <a:t>None</a:t>
+            </a:r>
+            <a:r>
+              <a:rPr lang="ru-RU" sz="1600" dirty="0">
+                <a:solidFill>
+                  <a:schemeClr val="bg1"/>
+                </a:solidFill>
+              </a:rPr>
+              <a:t> – совместное использование файла запрещено.</a:t>
+            </a:r>
+            <a:endParaRPr lang="be-BY" sz="1600" dirty="0">
+              <a:solidFill>
+                <a:schemeClr val="bg1"/>
+              </a:solidFill>
+            </a:endParaRPr>
+          </a:p>
+          <a:p>
+            <a:pPr lvl="1" eaLnBrk="1" hangingPunct="1">
+              <a:buFont typeface="Arial" charset="0"/>
+              <a:buChar char="•"/>
+            </a:pPr>
+            <a:r>
+              <a:rPr lang="en-US" sz="1600" dirty="0">
+                <a:solidFill>
+                  <a:schemeClr val="bg1"/>
+                </a:solidFill>
+              </a:rPr>
+              <a:t>Read</a:t>
+            </a:r>
+            <a:r>
+              <a:rPr lang="ru-RU" sz="1600" dirty="0">
+                <a:solidFill>
+                  <a:schemeClr val="bg1"/>
+                </a:solidFill>
+              </a:rPr>
+              <a:t> – файл может быть открыт только для чтения другими пользователями.</a:t>
+            </a:r>
+            <a:endParaRPr lang="be-BY" sz="1600" dirty="0">
+              <a:solidFill>
+                <a:schemeClr val="bg1"/>
+              </a:solidFill>
+            </a:endParaRPr>
+          </a:p>
+          <a:p>
+            <a:pPr lvl="1" eaLnBrk="1" hangingPunct="1">
+              <a:buFont typeface="Arial" charset="0"/>
+              <a:buChar char="•"/>
+            </a:pPr>
+            <a:r>
+              <a:rPr lang="en-US" sz="1600" dirty="0" err="1">
+                <a:solidFill>
+                  <a:schemeClr val="bg1"/>
+                </a:solidFill>
+              </a:rPr>
+              <a:t>ReadWrite</a:t>
+            </a:r>
+            <a:r>
+              <a:rPr lang="ru-RU" sz="1600" dirty="0">
+                <a:solidFill>
+                  <a:schemeClr val="bg1"/>
+                </a:solidFill>
+              </a:rPr>
+              <a:t> – Другие пользователи могут открыть файл для чтения и для записи.</a:t>
+            </a:r>
+            <a:endParaRPr lang="be-BY" sz="1600" dirty="0">
+              <a:solidFill>
+                <a:schemeClr val="bg1"/>
+              </a:solidFill>
+            </a:endParaRPr>
+          </a:p>
+          <a:p>
+            <a:pPr lvl="1" eaLnBrk="1" hangingPunct="1">
+              <a:buFont typeface="Arial" charset="0"/>
+              <a:buChar char="•"/>
+            </a:pPr>
+            <a:r>
+              <a:rPr lang="en-US" sz="1600" dirty="0">
+                <a:solidFill>
+                  <a:schemeClr val="bg1"/>
+                </a:solidFill>
+              </a:rPr>
+              <a:t>Write</a:t>
+            </a:r>
+            <a:r>
+              <a:rPr lang="ru-RU" sz="1600" dirty="0">
+                <a:solidFill>
+                  <a:schemeClr val="bg1"/>
+                </a:solidFill>
+              </a:rPr>
+              <a:t> – Файл может быть открыт для записи.</a:t>
+            </a:r>
+            <a:endParaRPr lang="be-BY" sz="1600" dirty="0">
+              <a:solidFill>
+                <a:schemeClr val="bg1"/>
+              </a:solidFill>
+            </a:endParaRPr>
+          </a:p>
+        </p:txBody>
+      </p:sp>
+      <p:sp>
+        <p:nvSpPr>
+          <p:cNvPr id="9224" name="TextBox 6"/>
+          <p:cNvSpPr txBox="1">
+            <a:spLocks noChangeArrowheads="1"/>
+          </p:cNvSpPr>
+          <p:nvPr/>
+        </p:nvSpPr>
+        <p:spPr bwMode="auto">
+          <a:xfrm>
+            <a:off x="152400" y="6062663"/>
+            <a:ext cx="8839200" cy="584200"/>
+          </a:xfrm>
+          <a:prstGeom prst="rect">
+            <a:avLst/>
+          </a:prstGeom>
+          <a:noFill/>
+          <a:ln>
+            <a:noFill/>
+          </a:ln>
+          <a:extLst>
+            <a:ext uri="{909E8E84-426E-40DD-AFC4-6F175D3DCCD1}">
+              <a14:hiddenFill xmlns:a14="http://schemas.microsoft.com/office/drawing/2010/main">
+                <a:solidFill>
+                  <a:srgbClr val="FFFFFF"/>
+                </a:solidFill>
+              </a14:hiddenFill>
+            </a:ext>
+            <a:ext uri="{91240B29-F687-4F45-9708-019B960494DF}">
+              <a14:hiddenLine xmlns:a14="http://schemas.microsoft.com/office/drawing/2010/main" w="9525">
+                <a:solidFill>
+                  <a:srgbClr val="000000"/>
+                </a:solidFill>
+                <a:miter lim="800000"/>
+                <a:headEnd/>
+                <a:tailEnd/>
+              </a14:hiddenLine>
+            </a:ext>
+          </a:extLst>
+        </p:spPr>
+        <p:txBody>
+          <a:bodyPr>
+            <a:spAutoFit/>
+          </a:bodyPr>
+          <a:lstStyle>
+            <a:lvl1pPr defTabSz="358775" eaLnBrk="0" hangingPunct="0">
+              <a:defRPr>
+                <a:solidFill>
+                  <a:schemeClr val="tx1"/>
+                </a:solidFill>
+                <a:latin typeface="Arial" charset="0"/>
+              </a:defRPr>
+            </a:lvl1pPr>
+            <a:lvl2pPr marL="742950" indent="-285750" defTabSz="358775" eaLnBrk="0" hangingPunct="0">
+              <a:defRPr>
+                <a:solidFill>
+                  <a:schemeClr val="tx1"/>
+                </a:solidFill>
+                <a:latin typeface="Arial" charset="0"/>
+              </a:defRPr>
+            </a:lvl2pPr>
+            <a:lvl3pPr marL="1143000" indent="-228600" defTabSz="358775" eaLnBrk="0" hangingPunct="0">
+              <a:defRPr>
+                <a:solidFill>
+                  <a:schemeClr val="tx1"/>
+                </a:solidFill>
+                <a:latin typeface="Arial" charset="0"/>
+              </a:defRPr>
+            </a:lvl3pPr>
+            <a:lvl4pPr marL="1600200" indent="-228600" defTabSz="358775" eaLnBrk="0" hangingPunct="0">
+              <a:defRPr>
+                <a:solidFill>
+                  <a:schemeClr val="tx1"/>
+                </a:solidFill>
+                <a:latin typeface="Arial" charset="0"/>
+              </a:defRPr>
+            </a:lvl4pPr>
+            <a:lvl5pPr marL="2057400" indent="-228600" defTabSz="358775" eaLnBrk="0" hangingPunct="0">
+              <a:defRPr>
+                <a:solidFill>
+                  <a:schemeClr val="tx1"/>
+                </a:solidFill>
+                <a:latin typeface="Arial" charset="0"/>
+              </a:defRPr>
+            </a:lvl5pPr>
+            <a:lvl6pPr marL="2514600" indent="-228600" defTabSz="358775" eaLnBrk="0" fontAlgn="base" hangingPunct="0">
+              <a:spcBef>
+                <a:spcPct val="0"/>
+              </a:spcBef>
+              <a:spcAft>
+                <a:spcPct val="0"/>
+              </a:spcAft>
+              <a:defRPr>
+                <a:solidFill>
+                  <a:schemeClr val="tx1"/>
+                </a:solidFill>
+                <a:latin typeface="Arial" charset="0"/>
+              </a:defRPr>
+            </a:lvl6pPr>
+            <a:lvl7pPr marL="2971800" indent="-228600" defTabSz="358775" eaLnBrk="0" fontAlgn="base" hangingPunct="0">
+              <a:spcBef>
+                <a:spcPct val="0"/>
+              </a:spcBef>
+              <a:spcAft>
+                <a:spcPct val="0"/>
+              </a:spcAft>
+              <a:defRPr>
+                <a:solidFill>
+                  <a:schemeClr val="tx1"/>
+                </a:solidFill>
+                <a:latin typeface="Arial" charset="0"/>
+              </a:defRPr>
+            </a:lvl7pPr>
+            <a:lvl8pPr marL="3429000" indent="-228600" defTabSz="358775" eaLnBrk="0" fontAlgn="base" hangingPunct="0">
+              <a:spcBef>
+                <a:spcPct val="0"/>
+              </a:spcBef>
+              <a:spcAft>
+                <a:spcPct val="0"/>
+              </a:spcAft>
+              <a:defRPr>
+                <a:solidFill>
+                  <a:schemeClr val="tx1"/>
+                </a:solidFill>
+                <a:latin typeface="Arial" charset="0"/>
+              </a:defRPr>
+            </a:lvl8pPr>
+            <a:lvl9pPr marL="3886200" indent="-228600" defTabSz="358775" eaLnBrk="0" fontAlgn="base" hangingPunct="0">
+              <a:spcBef>
+                <a:spcPct val="0"/>
+              </a:spcBef>
+              <a:spcAft>
+                <a:spcPct val="0"/>
+              </a:spcAft>
+              <a:defRPr>
+                <a:solidFill>
+                  <a:schemeClr val="tx1"/>
+                </a:solidFill>
+                <a:latin typeface="Arial" charset="0"/>
+              </a:defRPr>
+            </a:lvl9pPr>
+          </a:lstStyle>
+          <a:p>
+            <a:pPr eaLnBrk="1" hangingPunct="1"/>
+            <a:r>
+              <a:rPr lang="ru-RU" sz="1600"/>
+              <a:t>Данная функция возвращает объект потока </a:t>
+            </a:r>
+            <a:r>
+              <a:rPr lang="en-US" sz="1600"/>
+              <a:t>FileStream, </a:t>
+            </a:r>
+            <a:r>
+              <a:rPr lang="ru-RU" sz="1600"/>
+              <a:t>позволяющая работать с файлом как с потоком данных.</a:t>
+            </a:r>
+            <a:endParaRPr lang="be-BY" sz="1600"/>
+          </a:p>
+        </p:txBody>
+      </p:sp>
+    </p:spTree>
+    <p:extLst>
+      <p:ext uri="{BB962C8B-B14F-4D97-AF65-F5344CB8AC3E}">
+        <p14:creationId xmlns:p14="http://schemas.microsoft.com/office/powerpoint/2010/main" val="3257246211"/>
+      </p:ext>
+    </p:extLst>
+  </p:cSld>
+  <p:clrMapOvr>
+    <a:masterClrMapping/>
+  </p:clrMapOvr>
+  <p:timing>
+    <p:tnLst>
+      <p:par>
+        <p:cTn id="1" dur="indefinite" restart="never" nodeType="tmRoot"/>
+      </p:par>
+    </p:tnLst>
+  </p:timing>
+</p:sld>
+</file>
+
+<file path=ppt/slides/slide41.xml><?xml version="1.0" encoding="utf-8"?>
+<p:sld xmlns:a="http://schemas.openxmlformats.org/drawingml/2006/main" xmlns:r="http://schemas.openxmlformats.org/officeDocument/2006/relationships" xmlns:p="http://schemas.openxmlformats.org/presentationml/2006/main">
+  <p:cSld>
     <p:spTree>
       <p:nvGrpSpPr>
         <p:cNvPr id="1" name=""/>
@@ -41514,7 +41607,7 @@
 </p:sld>
 </file>
 
-<file path=ppt/slides/slide41.xml><?xml version="1.0" encoding="utf-8"?>
+<file path=ppt/slides/slide42.xml><?xml version="1.0" encoding="utf-8"?>
 <p:sld xmlns:a="http://schemas.openxmlformats.org/drawingml/2006/main" xmlns:r="http://schemas.openxmlformats.org/officeDocument/2006/relationships" xmlns:p="http://schemas.openxmlformats.org/presentationml/2006/main">
   <p:cSld>
     <p:bg>
@@ -41700,7 +41793,7 @@
 </p:sld>
 </file>
 
-<file path=ppt/slides/slide42.xml><?xml version="1.0" encoding="utf-8"?>
+<file path=ppt/slides/slide43.xml><?xml version="1.0" encoding="utf-8"?>
 <p:sld xmlns:a="http://schemas.openxmlformats.org/drawingml/2006/main" xmlns:r="http://schemas.openxmlformats.org/officeDocument/2006/relationships" xmlns:p="http://schemas.openxmlformats.org/presentationml/2006/main">
   <p:cSld>
     <p:bg>
@@ -42664,7 +42757,7 @@
 </p:sld>
 </file>
 
-<file path=ppt/slides/slide43.xml><?xml version="1.0" encoding="utf-8"?>
+<file path=ppt/slides/slide44.xml><?xml version="1.0" encoding="utf-8"?>
 <p:sld xmlns:a="http://schemas.openxmlformats.org/drawingml/2006/main" xmlns:r="http://schemas.openxmlformats.org/officeDocument/2006/relationships" xmlns:p="http://schemas.openxmlformats.org/presentationml/2006/main">
   <p:cSld>
     <p:bg>
@@ -43632,7 +43725,7 @@
 </p:sld>
 </file>
 
-<file path=ppt/slides/slide44.xml><?xml version="1.0" encoding="utf-8"?>
+<file path=ppt/slides/slide45.xml><?xml version="1.0" encoding="utf-8"?>
 <p:sld xmlns:a="http://schemas.openxmlformats.org/drawingml/2006/main" xmlns:r="http://schemas.openxmlformats.org/officeDocument/2006/relationships" xmlns:p="http://schemas.openxmlformats.org/presentationml/2006/main">
   <p:cSld>
     <p:bg>
@@ -44809,7 +44902,7 @@
 </p:sld>
 </file>
 
-<file path=ppt/slides/slide45.xml><?xml version="1.0" encoding="utf-8"?>
+<file path=ppt/slides/slide46.xml><?xml version="1.0" encoding="utf-8"?>
 <p:sld xmlns:a="http://schemas.openxmlformats.org/drawingml/2006/main" xmlns:r="http://schemas.openxmlformats.org/officeDocument/2006/relationships" xmlns:p="http://schemas.openxmlformats.org/presentationml/2006/main">
   <p:cSld>
     <p:spTree>
@@ -44838,12 +44931,30 @@
         </p:nvSpPr>
         <p:spPr/>
         <p:txBody>
-          <a:bodyPr/>
+          <a:bodyPr>
+            <a:normAutofit fontScale="90000"/>
+          </a:bodyPr>
           <a:lstStyle/>
           <a:p>
             <a:r>
-              <a:rPr lang="ru-RU" dirty="0" smtClean="0"/>
-              <a:t>Архивация</a:t>
+              <a:rPr lang="ru-RU" dirty="0"/>
+              <a:t>Чтение </a:t>
+            </a:r>
+            <a:r>
+              <a:rPr lang="en-US" dirty="0"/>
+              <a:t>CSV </a:t>
+            </a:r>
+            <a:r>
+              <a:rPr lang="ru-RU" dirty="0"/>
+              <a:t>файлов с помощью класса</a:t>
+            </a:r>
+            <a:r>
+              <a:rPr lang="en-US" dirty="0"/>
+              <a:t> </a:t>
+            </a:r>
+            <a:r>
+              <a:rPr lang="en-US" dirty="0" err="1"/>
+              <a:t>TextFieldParser</a:t>
             </a:r>
             <a:endParaRPr lang="en-US" dirty="0"/>
           </a:p>
@@ -44862,7 +44973,7 @@
         <p:spPr/>
         <p:txBody>
           <a:bodyPr>
-            <a:normAutofit fontScale="92500" lnSpcReduction="10000"/>
+            <a:normAutofit fontScale="85000" lnSpcReduction="20000"/>
           </a:bodyPr>
           <a:lstStyle/>
           <a:p>
@@ -44870,71 +44981,98 @@
               <a:buNone/>
             </a:pPr>
             <a:r>
+              <a:rPr lang="be-BY" dirty="0" smtClean="0"/>
+              <a:t>К</a:t>
+            </a:r>
+            <a:r>
               <a:rPr lang="ru-RU" dirty="0" smtClean="0"/>
-              <a:t>Пространство имен </a:t>
-            </a:r>
-            <a:r>
-              <a:rPr lang="en-US" dirty="0" err="1" smtClean="0"/>
-              <a:t>System.IO.Compression</a:t>
-            </a:r>
-            <a:endParaRPr lang="ru-RU" dirty="0" smtClean="0"/>
+              <a:t>ласс </a:t>
+            </a:r>
+            <a:r>
+              <a:rPr lang="en-US" dirty="0" err="1"/>
+              <a:t>TextFieldParser</a:t>
+            </a:r>
+            <a:r>
+              <a:rPr lang="en-US" dirty="0"/>
+              <a:t> </a:t>
+            </a:r>
+            <a:r>
+              <a:rPr lang="ru-RU" dirty="0" smtClean="0"/>
+              <a:t>позволяет </a:t>
+            </a:r>
+            <a:r>
+              <a:rPr lang="ru-RU" dirty="0"/>
+              <a:t>обрабатывать текстовые файлы с равномерной </a:t>
+            </a:r>
+            <a:r>
+              <a:rPr lang="ru-RU" dirty="0" smtClean="0"/>
+              <a:t>структурой </a:t>
+            </a:r>
+            <a:r>
+              <a:rPr lang="ru-RU" dirty="0"/>
+              <a:t>где значения отделены разделителями (запятая, </a:t>
+            </a:r>
+            <a:r>
+              <a:rPr lang="ru-RU" dirty="0" smtClean="0"/>
+              <a:t>символ </a:t>
+            </a:r>
+            <a:r>
+              <a:rPr lang="ru-RU" dirty="0"/>
+              <a:t>табуляции и т.п.) или где они выровнены по </a:t>
+            </a:r>
+            <a:r>
+              <a:rPr lang="ru-RU" dirty="0" smtClean="0"/>
+              <a:t>фиксированным позициям.</a:t>
+            </a:r>
           </a:p>
           <a:p>
             <a:pPr marL="0" indent="0">
               <a:buNone/>
             </a:pPr>
-            <a:endParaRPr lang="ru-RU" dirty="0"/>
+            <a:endParaRPr lang="be-BY" dirty="0"/>
           </a:p>
           <a:p>
             <a:pPr marL="0" indent="0">
               <a:buNone/>
             </a:pPr>
             <a:r>
-              <a:rPr lang="ru-RU" dirty="0" smtClean="0"/>
-              <a:t>В </a:t>
-            </a:r>
-            <a:r>
-              <a:rPr lang="en-US" dirty="0" smtClean="0"/>
-              <a:t>.NET 2+ </a:t>
-            </a:r>
-            <a:r>
-              <a:rPr lang="ru-RU" dirty="0" smtClean="0"/>
-              <a:t>есть классы </a:t>
+              <a:rPr lang="be-BY" dirty="0" smtClean="0"/>
+              <a:t>Данный класс объявлен в пространстве имен </a:t>
+            </a:r>
+            <a:r>
+              <a:rPr lang="en-US" dirty="0" err="1" smtClean="0"/>
+              <a:t>Microsoft.VisualBasic.FileIO</a:t>
+            </a:r>
+            <a:r>
+              <a:rPr lang="be-BY" dirty="0" smtClean="0"/>
+              <a:t> из сборки </a:t>
             </a:r>
             <a:r>
               <a:rPr lang="en-US" dirty="0" err="1"/>
-              <a:t>DeflateStream</a:t>
-            </a:r>
-            <a:r>
-              <a:rPr lang="en-US" dirty="0"/>
-              <a:t> </a:t>
-            </a:r>
-            <a:r>
-              <a:rPr lang="ru-RU" dirty="0" smtClean="0"/>
-              <a:t>и </a:t>
-            </a:r>
-            <a:r>
-              <a:rPr lang="en-US" dirty="0" err="1" smtClean="0"/>
-              <a:t>GZipStream</a:t>
-            </a:r>
-            <a:r>
-              <a:rPr lang="ru-RU" dirty="0" smtClean="0"/>
-              <a:t> для сжатия массива байтов.</a:t>
-            </a:r>
-            <a:endParaRPr lang="en-US" dirty="0" smtClean="0"/>
+              <a:t>Microsoft.VisualBasic</a:t>
+            </a:r>
+            <a:r>
+              <a:rPr lang="be-BY" dirty="0" smtClean="0"/>
+              <a:t>.</a:t>
+            </a:r>
           </a:p>
           <a:p>
             <a:pPr marL="0" indent="0">
               <a:buNone/>
             </a:pPr>
-            <a:endParaRPr lang="en-US" dirty="0"/>
+            <a:endParaRPr lang="be-BY" sz="4000" dirty="0">
+              <a:solidFill>
+                <a:srgbClr val="FFC000"/>
+              </a:solidFill>
+              <a:sym typeface="Wingdings"/>
+            </a:endParaRPr>
           </a:p>
           <a:p>
             <a:pPr marL="0" indent="0">
               <a:buNone/>
             </a:pPr>
             <a:r>
-              <a:rPr lang="ru-RU" sz="4000" dirty="0">
+              <a:rPr lang="ru-RU" sz="4000" dirty="0" smtClean="0">
                 <a:solidFill>
                   <a:srgbClr val="FFC000"/>
                 </a:solidFill>
@@ -44943,7 +45081,7 @@
               <a:t></a:t>
             </a:r>
             <a:r>
-              <a:rPr lang="ru-RU" dirty="0">
+              <a:rPr lang="ru-RU" dirty="0" smtClean="0">
                 <a:sym typeface="Wingdings"/>
               </a:rPr>
               <a:t> </a:t>
@@ -44961,60 +45099,8 @@
               <a:t>\</a:t>
             </a:r>
             <a:r>
-              <a:rPr lang="en-US" dirty="0" smtClean="0"/>
-              <a:t>Compression</a:t>
-            </a:r>
-            <a:endParaRPr lang="ru-RU" dirty="0" smtClean="0"/>
-          </a:p>
-          <a:p>
-            <a:pPr marL="0" indent="0">
-              <a:buNone/>
-            </a:pPr>
-            <a:endParaRPr lang="ru-RU" dirty="0"/>
-          </a:p>
-          <a:p>
-            <a:pPr marL="0" indent="0">
-              <a:buNone/>
-            </a:pPr>
-            <a:r>
-              <a:rPr lang="ru-RU" dirty="0" smtClean="0"/>
-              <a:t>В .</a:t>
-            </a:r>
-            <a:r>
-              <a:rPr lang="en-US" dirty="0" smtClean="0"/>
-              <a:t>NET 4.5 </a:t>
-            </a:r>
-            <a:r>
-              <a:rPr lang="ru-RU" dirty="0" smtClean="0"/>
-              <a:t>добавлены классы </a:t>
-            </a:r>
-            <a:r>
-              <a:rPr lang="en-US" dirty="0" err="1"/>
-              <a:t>ZipArchive</a:t>
-            </a:r>
-            <a:r>
-              <a:rPr lang="en-US" dirty="0"/>
-              <a:t> </a:t>
-            </a:r>
-            <a:r>
-              <a:rPr lang="ru-RU" dirty="0" smtClean="0"/>
-              <a:t>и </a:t>
-            </a:r>
-            <a:r>
               <a:rPr lang="en-US" dirty="0" err="1" smtClean="0"/>
-              <a:t>ZipFile</a:t>
-            </a:r>
-            <a:r>
-              <a:rPr lang="en-US" dirty="0" smtClean="0"/>
-              <a:t> </a:t>
-            </a:r>
-            <a:r>
-              <a:rPr lang="ru-RU" dirty="0" smtClean="0"/>
-              <a:t>для работы с архивами в формате </a:t>
-            </a:r>
-            <a:r>
-              <a:rPr lang="en-US" dirty="0" smtClean="0"/>
-              <a:t>zip.</a:t>
+              <a:t>CsvReader</a:t>
             </a:r>
             <a:endParaRPr lang="en-US" dirty="0"/>
           </a:p>
@@ -45024,207 +45110,6 @@
     <p:extLst>
       <p:ext uri="{BB962C8B-B14F-4D97-AF65-F5344CB8AC3E}">
         <p14:creationId xmlns:p14="http://schemas.microsoft.com/office/powerpoint/2010/main" val="1322073642"/>
-      </p:ext>
-    </p:extLst>
-  </p:cSld>
-  <p:clrMapOvr>
-    <a:masterClrMapping/>
-  </p:clrMapOvr>
-  <p:timing>
-    <p:tnLst>
-      <p:par>
-        <p:cTn id="1" dur="indefinite" restart="never" nodeType="tmRoot"/>
-      </p:par>
-    </p:tnLst>
-  </p:timing>
-</p:sld>
-</file>
-
-<file path=ppt/slides/slide46.xml><?xml version="1.0" encoding="utf-8"?>
-<p:sld xmlns:a="http://schemas.openxmlformats.org/drawingml/2006/main" xmlns:r="http://schemas.openxmlformats.org/officeDocument/2006/relationships" xmlns:p="http://schemas.openxmlformats.org/presentationml/2006/main">
-  <p:cSld>
-    <p:bg>
-      <p:bgPr>
-        <a:blipFill dpi="0" rotWithShape="1">
-          <a:blip r:embed="rId2">
-            <a:lum/>
-          </a:blip>
-          <a:srcRect/>
-          <a:stretch>
-            <a:fillRect/>
-          </a:stretch>
-        </a:blipFill>
-        <a:effectLst/>
-      </p:bgPr>
-    </p:bg>
-    <p:spTree>
-      <p:nvGrpSpPr>
-        <p:cNvPr id="1" name=""/>
-        <p:cNvGrpSpPr/>
-        <p:nvPr/>
-      </p:nvGrpSpPr>
-      <p:grpSpPr>
-        <a:xfrm>
-          <a:off x="0" y="0"/>
-          <a:ext cx="0" cy="0"/>
-          <a:chOff x="0" y="0"/>
-          <a:chExt cx="0" cy="0"/>
-        </a:xfrm>
-      </p:grpSpPr>
-      <p:sp>
-        <p:nvSpPr>
-          <p:cNvPr id="2" name="Title 1"/>
-          <p:cNvSpPr>
-            <a:spLocks noGrp="1"/>
-          </p:cNvSpPr>
-          <p:nvPr>
-            <p:ph type="title"/>
-          </p:nvPr>
-        </p:nvSpPr>
-        <p:spPr/>
-        <p:txBody>
-          <a:bodyPr/>
-          <a:lstStyle/>
-          <a:p>
-            <a:r>
-              <a:rPr lang="ru-RU" dirty="0" smtClean="0"/>
-              <a:t>Сериализация (</a:t>
-            </a:r>
-            <a:r>
-              <a:rPr lang="en-US" dirty="0" smtClean="0"/>
-              <a:t>Serialization</a:t>
-            </a:r>
-            <a:r>
-              <a:rPr lang="ru-RU" dirty="0" smtClean="0"/>
-              <a:t>)</a:t>
-            </a:r>
-            <a:endParaRPr lang="en-US" dirty="0"/>
-          </a:p>
-        </p:txBody>
-      </p:sp>
-      <p:sp>
-        <p:nvSpPr>
-          <p:cNvPr id="3" name="Content Placeholder 2"/>
-          <p:cNvSpPr>
-            <a:spLocks noGrp="1"/>
-          </p:cNvSpPr>
-          <p:nvPr>
-            <p:ph idx="1"/>
-          </p:nvPr>
-        </p:nvSpPr>
-        <p:spPr/>
-        <p:txBody>
-          <a:bodyPr>
-            <a:normAutofit fontScale="92500" lnSpcReduction="20000"/>
-          </a:bodyPr>
-          <a:lstStyle/>
-          <a:p>
-            <a:pPr marL="0" indent="0">
-              <a:buNone/>
-            </a:pPr>
-            <a:r>
-              <a:rPr lang="ru-RU" dirty="0" smtClean="0"/>
-              <a:t>Сериализация – механизм сохранения значения переменной типа в поток с возможностью последующего востановления точной копии (десериализация).</a:t>
-            </a:r>
-            <a:endParaRPr lang="en-US" dirty="0" smtClean="0"/>
-          </a:p>
-          <a:p>
-            <a:pPr marL="0" indent="0">
-              <a:buNone/>
-            </a:pPr>
-            <a:endParaRPr lang="en-US" dirty="0"/>
-          </a:p>
-          <a:p>
-            <a:pPr marL="0" indent="0">
-              <a:buNone/>
-            </a:pPr>
-            <a:r>
-              <a:rPr lang="en-US" dirty="0" smtClean="0"/>
-              <a:t>.NET</a:t>
-            </a:r>
-            <a:r>
-              <a:rPr lang="ru-RU" dirty="0" smtClean="0"/>
-              <a:t> поддерживает бинарную и текстовую</a:t>
-            </a:r>
-            <a:r>
-              <a:rPr lang="en-US" dirty="0" smtClean="0"/>
-              <a:t> </a:t>
-            </a:r>
-            <a:r>
-              <a:rPr lang="ru-RU" dirty="0" smtClean="0"/>
-              <a:t>(</a:t>
-            </a:r>
-            <a:r>
-              <a:rPr lang="en-US" dirty="0" smtClean="0"/>
-              <a:t>XML/JSON</a:t>
-            </a:r>
-            <a:r>
-              <a:rPr lang="ru-RU" dirty="0" smtClean="0"/>
-              <a:t>)</a:t>
-            </a:r>
-            <a:r>
-              <a:rPr lang="en-US" dirty="0" smtClean="0"/>
-              <a:t> </a:t>
-            </a:r>
-            <a:r>
-              <a:rPr lang="ru-RU" dirty="0" smtClean="0"/>
-              <a:t>сериализацию. При необходимости можно реализовать собственный механизм.</a:t>
-            </a:r>
-            <a:endParaRPr lang="en-US" dirty="0" smtClean="0"/>
-          </a:p>
-          <a:p>
-            <a:pPr marL="0" indent="0">
-              <a:buNone/>
-            </a:pPr>
-            <a:endParaRPr lang="en-US" dirty="0" smtClean="0"/>
-          </a:p>
-          <a:p>
-            <a:pPr marL="0" indent="0">
-              <a:buNone/>
-            </a:pPr>
-            <a:r>
-              <a:rPr lang="ru-RU" sz="4000" dirty="0">
-                <a:solidFill>
-                  <a:srgbClr val="FFC000"/>
-                </a:solidFill>
-                <a:sym typeface="Wingdings"/>
-              </a:rPr>
-              <a:t></a:t>
-            </a:r>
-            <a:r>
-              <a:rPr lang="ru-RU" dirty="0">
-                <a:sym typeface="Wingdings"/>
-              </a:rPr>
-              <a:t> </a:t>
-            </a:r>
-            <a:r>
-              <a:rPr lang="ru-RU" dirty="0"/>
-              <a:t>См. </a:t>
-            </a:r>
-            <a:r>
-              <a:rPr lang="ru-RU" dirty="0" smtClean="0"/>
-              <a:t>пример </a:t>
-            </a:r>
-            <a:r>
-              <a:rPr lang="en-US" dirty="0"/>
-              <a:t>L04-S03-IO</a:t>
-            </a:r>
-            <a:r>
-              <a:rPr lang="ru-RU" dirty="0" smtClean="0"/>
-              <a:t>\</a:t>
-            </a:r>
-            <a:r>
-              <a:rPr lang="en-US" dirty="0" smtClean="0"/>
-              <a:t>Serialization</a:t>
-            </a:r>
-            <a:endParaRPr lang="en-US" dirty="0"/>
-          </a:p>
-        </p:txBody>
-      </p:sp>
-    </p:spTree>
-    <p:extLst>
-      <p:ext uri="{BB962C8B-B14F-4D97-AF65-F5344CB8AC3E}">
-        <p14:creationId xmlns:p14="http://schemas.microsoft.com/office/powerpoint/2010/main" val="1542700340"/>
       </p:ext>
     </p:extLst>
   </p:cSld>
@@ -45275,9 +45160,9 @@
           <a:p>
             <a:r>
               <a:rPr lang="ru-RU" dirty="0" smtClean="0"/>
-              <a:t>Метаданные файлов</a:t>
-            </a:r>
-            <a:endParaRPr lang="ru-RU" dirty="0"/>
+              <a:t>Архивация</a:t>
+            </a:r>
+            <a:endParaRPr lang="en-US" dirty="0"/>
           </a:p>
         </p:txBody>
       </p:sp>
@@ -45294,7 +45179,7 @@
         <p:spPr/>
         <p:txBody>
           <a:bodyPr>
-            <a:normAutofit lnSpcReduction="10000"/>
+            <a:normAutofit fontScale="92500" lnSpcReduction="10000"/>
           </a:bodyPr>
           <a:lstStyle/>
           <a:p>
@@ -45302,65 +45187,14 @@
               <a:buNone/>
             </a:pPr>
             <a:r>
-              <a:rPr lang="en-US" dirty="0" smtClean="0"/>
-              <a:t>Windows </a:t>
-            </a:r>
-            <a:r>
               <a:rPr lang="ru-RU" dirty="0" smtClean="0"/>
-              <a:t>позволяет читать метаданные из различных файлов. Например</a:t>
-            </a:r>
-            <a:r>
-              <a:rPr lang="en-US" dirty="0" smtClean="0"/>
-              <a:t>, ID </a:t>
-            </a:r>
-            <a:r>
-              <a:rPr lang="ru-RU" dirty="0" smtClean="0"/>
-              <a:t>теги из </a:t>
-            </a:r>
-            <a:r>
-              <a:rPr lang="en-US" dirty="0" smtClean="0"/>
-              <a:t>mp3 </a:t>
-            </a:r>
-            <a:r>
-              <a:rPr lang="ru-RU" dirty="0" smtClean="0"/>
-              <a:t>файлов</a:t>
-            </a:r>
-            <a:r>
-              <a:rPr lang="en-US" dirty="0" smtClean="0"/>
-              <a:t>, EXIF</a:t>
-            </a:r>
-            <a:r>
-              <a:rPr lang="ru-RU" dirty="0"/>
-              <a:t> </a:t>
-            </a:r>
-            <a:r>
-              <a:rPr lang="ru-RU" dirty="0" smtClean="0"/>
-              <a:t>из фотографий и т.д. В самом </a:t>
-            </a:r>
-            <a:r>
-              <a:rPr lang="en-US" dirty="0" smtClean="0"/>
-              <a:t>.NET </a:t>
-            </a:r>
-            <a:r>
-              <a:rPr lang="ru-RU" dirty="0" smtClean="0"/>
-              <a:t>нет встроенных классов для работы с метаданными файлов и понадобится установить </a:t>
-            </a:r>
-            <a:r>
-              <a:rPr lang="en-US" dirty="0" smtClean="0"/>
-              <a:t>NuGet </a:t>
-            </a:r>
-            <a:r>
-              <a:rPr lang="ru-RU" dirty="0" smtClean="0"/>
-              <a:t>пакет </a:t>
+              <a:t>Пространство имен </a:t>
             </a:r>
             <a:r>
               <a:rPr lang="en-US" dirty="0" err="1" smtClean="0"/>
-              <a:t>Microsoft.WindowsAPICodePack.Shell</a:t>
-            </a:r>
-            <a:r>
-              <a:rPr lang="ru-RU" dirty="0" smtClean="0"/>
-              <a:t>.</a:t>
-            </a:r>
+              <a:t>System.IO.Compression</a:t>
+            </a:r>
+            <a:endParaRPr lang="ru-RU" dirty="0" smtClean="0"/>
           </a:p>
           <a:p>
             <a:pPr marL="0" indent="0">
@@ -45373,6 +45207,50 @@
               <a:buNone/>
             </a:pPr>
             <a:r>
+              <a:rPr lang="ru-RU" dirty="0" smtClean="0"/>
+              <a:t>В </a:t>
+            </a:r>
+            <a:r>
+              <a:rPr lang="en-US" dirty="0" smtClean="0"/>
+              <a:t>.NET 2+ </a:t>
+            </a:r>
+            <a:r>
+              <a:rPr lang="ru-RU" dirty="0" smtClean="0"/>
+              <a:t>есть классы </a:t>
+            </a:r>
+            <a:r>
+              <a:rPr lang="en-US" dirty="0" err="1"/>
+              <a:t>DeflateStream</a:t>
+            </a:r>
+            <a:r>
+              <a:rPr lang="en-US" dirty="0"/>
+              <a:t> </a:t>
+            </a:r>
+            <a:r>
+              <a:rPr lang="ru-RU" dirty="0" smtClean="0"/>
+              <a:t>и </a:t>
+            </a:r>
+            <a:r>
+              <a:rPr lang="en-US" dirty="0" err="1" smtClean="0"/>
+              <a:t>GZipStream</a:t>
+            </a:r>
+            <a:r>
+              <a:rPr lang="ru-RU" dirty="0" smtClean="0"/>
+              <a:t> для сжатия массива байтов.</a:t>
+            </a:r>
+            <a:endParaRPr lang="en-US" dirty="0" smtClean="0"/>
+          </a:p>
+          <a:p>
+            <a:pPr marL="0" indent="0">
+              <a:buNone/>
+            </a:pPr>
+            <a:endParaRPr lang="en-US" dirty="0"/>
+          </a:p>
+          <a:p>
+            <a:pPr marL="0" indent="0">
+              <a:buNone/>
+            </a:pPr>
+            <a:r>
               <a:rPr lang="ru-RU" sz="4000" dirty="0">
                 <a:solidFill>
                   <a:srgbClr val="FFC000"/>
@@ -45400,23 +45278,82 @@
               <a:t>\</a:t>
             </a:r>
             <a:r>
+              <a:rPr lang="en-US" dirty="0" smtClean="0"/>
+              <a:t>Compression</a:t>
+            </a:r>
+            <a:endParaRPr lang="ru-RU" dirty="0" smtClean="0"/>
+          </a:p>
+          <a:p>
+            <a:pPr marL="0" indent="0">
+              <a:buNone/>
+            </a:pPr>
+            <a:endParaRPr lang="ru-RU" dirty="0"/>
+          </a:p>
+          <a:p>
+            <a:pPr marL="0" indent="0">
+              <a:buNone/>
+            </a:pPr>
+            <a:r>
+              <a:rPr lang="ru-RU" dirty="0" smtClean="0"/>
+              <a:t>В .</a:t>
+            </a:r>
+            <a:r>
+              <a:rPr lang="en-US" dirty="0" smtClean="0"/>
+              <a:t>NET 4.5 </a:t>
+            </a:r>
+            <a:r>
+              <a:rPr lang="ru-RU" dirty="0" smtClean="0"/>
+              <a:t>добавлены классы </a:t>
+            </a:r>
+            <a:r>
+              <a:rPr lang="en-US" dirty="0" err="1"/>
+              <a:t>ZipArchive</a:t>
+            </a:r>
+            <a:r>
+              <a:rPr lang="en-US" dirty="0"/>
+              <a:t> </a:t>
+            </a:r>
+            <a:r>
+              <a:rPr lang="ru-RU" dirty="0" smtClean="0"/>
+              <a:t>и </a:t>
+            </a:r>
+            <a:r>
               <a:rPr lang="en-US" dirty="0" err="1" smtClean="0"/>
-              <a:t>FileMetadataViewer</a:t>
-            </a:r>
-            <a:endParaRPr lang="ru-RU" dirty="0"/>
+              <a:t>ZipFile</a:t>
+            </a:r>
+            <a:r>
+              <a:rPr lang="en-US" dirty="0" smtClean="0"/>
+              <a:t> </a:t>
+            </a:r>
+            <a:r>
+              <a:rPr lang="ru-RU" dirty="0" smtClean="0"/>
+              <a:t>для работы с архивами в формате </a:t>
+            </a:r>
+            <a:r>
+              <a:rPr lang="en-US" dirty="0" smtClean="0"/>
+              <a:t>zip.</a:t>
+            </a:r>
+            <a:endParaRPr lang="en-US" dirty="0"/>
           </a:p>
         </p:txBody>
       </p:sp>
     </p:spTree>
     <p:extLst>
       <p:ext uri="{BB962C8B-B14F-4D97-AF65-F5344CB8AC3E}">
-        <p14:creationId xmlns:p14="http://schemas.microsoft.com/office/powerpoint/2010/main" val="640264607"/>
+        <p14:creationId xmlns:p14="http://schemas.microsoft.com/office/powerpoint/2010/main" val="1853293638"/>
       </p:ext>
     </p:extLst>
   </p:cSld>
   <p:clrMapOvr>
     <a:masterClrMapping/>
   </p:clrMapOvr>
+  <p:timing>
+    <p:tnLst>
+      <p:par>
+        <p:cTn id="1" dur="indefinite" restart="never" nodeType="tmRoot"/>
+      </p:par>
+    </p:tnLst>
+  </p:timing>
 </p:sld>
 </file>
 
@@ -45468,7 +45405,15 @@
           <a:p>
             <a:r>
               <a:rPr lang="ru-RU" dirty="0" smtClean="0"/>
-              <a:t>Ограничения на длину пути</a:t>
+              <a:t>Сериализация (</a:t>
+            </a:r>
+            <a:r>
+              <a:rPr lang="en-US" dirty="0" smtClean="0"/>
+              <a:t>Serialization</a:t>
+            </a:r>
+            <a:r>
+              <a:rPr lang="ru-RU" dirty="0" smtClean="0"/>
+              <a:t>)</a:t>
             </a:r>
             <a:endParaRPr lang="en-US" dirty="0"/>
           </a:p>
@@ -45487,7 +45432,7 @@
         <p:spPr/>
         <p:txBody>
           <a:bodyPr>
-            <a:normAutofit fontScale="70000" lnSpcReduction="20000"/>
+            <a:normAutofit fontScale="92500" lnSpcReduction="20000"/>
           </a:bodyPr>
           <a:lstStyle/>
           <a:p>
@@ -45496,132 +45441,89 @@
             </a:pPr>
             <a:r>
               <a:rPr lang="ru-RU" dirty="0" smtClean="0"/>
-              <a:t>ОС </a:t>
-            </a:r>
-            <a:r>
-              <a:rPr lang="en-US" dirty="0" smtClean="0"/>
-              <a:t>Windows </a:t>
-            </a:r>
-            <a:r>
-              <a:rPr lang="ru-RU" dirty="0" smtClean="0"/>
-              <a:t>поддерживает пути длиной до 32 Кб, однако в </a:t>
-            </a:r>
-            <a:r>
-              <a:rPr lang="en-US" dirty="0" smtClean="0"/>
-              <a:t>.NET </a:t>
-            </a:r>
-            <a:r>
-              <a:rPr lang="ru-RU" dirty="0" smtClean="0"/>
-              <a:t>мы ограничены следующими значениями:</a:t>
-            </a:r>
+              <a:t>Сериализация – механизм сохранения значения переменной типа в поток с возможностью последующего востановления точной копии (десериализация).</a:t>
+            </a:r>
+            <a:endParaRPr lang="en-US" dirty="0" smtClean="0"/>
           </a:p>
           <a:p>
             <a:pPr marL="0" indent="0">
               <a:buNone/>
             </a:pPr>
-            <a:endParaRPr lang="ru-RU" dirty="0" smtClean="0"/>
-          </a:p>
-          <a:p>
-            <a:r>
-              <a:rPr lang="ru-RU" dirty="0" smtClean="0"/>
-              <a:t>Максимальная длина полного имени каталога</a:t>
-            </a:r>
-            <a:r>
-              <a:rPr lang="en-US" dirty="0"/>
-              <a:t>  </a:t>
-            </a:r>
-            <a:r>
-              <a:rPr lang="ru-RU" dirty="0" smtClean="0"/>
-              <a:t>– 247 символов</a:t>
-            </a:r>
-          </a:p>
-          <a:p>
-            <a:r>
-              <a:rPr lang="ru-RU" dirty="0"/>
-              <a:t>Максимальная длина </a:t>
-            </a:r>
-            <a:r>
-              <a:rPr lang="ru-RU" dirty="0" smtClean="0"/>
-              <a:t>полного имени файла</a:t>
-            </a:r>
-            <a:r>
-              <a:rPr lang="en-US" dirty="0"/>
-              <a:t>  </a:t>
-            </a:r>
-            <a:r>
-              <a:rPr lang="ru-RU" dirty="0" smtClean="0"/>
-              <a:t>– 259 символов.</a:t>
-            </a:r>
+            <a:endParaRPr lang="en-US" dirty="0"/>
           </a:p>
           <a:p>
             <a:pPr marL="0" indent="0">
               <a:buNone/>
             </a:pPr>
-            <a:endParaRPr lang="ru-RU" dirty="0" smtClean="0"/>
+            <a:r>
+              <a:rPr lang="en-US" dirty="0" smtClean="0"/>
+              <a:t>.NET</a:t>
+            </a:r>
+            <a:r>
+              <a:rPr lang="ru-RU" dirty="0" smtClean="0"/>
+              <a:t> поддерживает бинарную и текстовую</a:t>
+            </a:r>
+            <a:r>
+              <a:rPr lang="en-US" dirty="0" smtClean="0"/>
+              <a:t> </a:t>
+            </a:r>
+            <a:r>
+              <a:rPr lang="ru-RU" dirty="0" smtClean="0"/>
+              <a:t>(</a:t>
+            </a:r>
+            <a:r>
+              <a:rPr lang="en-US" dirty="0" smtClean="0"/>
+              <a:t>XML/JSON</a:t>
+            </a:r>
+            <a:r>
+              <a:rPr lang="ru-RU" dirty="0" smtClean="0"/>
+              <a:t>)</a:t>
+            </a:r>
+            <a:r>
+              <a:rPr lang="en-US" dirty="0" smtClean="0"/>
+              <a:t> </a:t>
+            </a:r>
+            <a:r>
+              <a:rPr lang="ru-RU" dirty="0" smtClean="0"/>
+              <a:t>сериализацию. При необходимости можно реализовать собственный механизм.</a:t>
+            </a:r>
+            <a:endParaRPr lang="en-US" dirty="0" smtClean="0"/>
           </a:p>
           <a:p>
             <a:pPr marL="0" indent="0">
               <a:buNone/>
             </a:pPr>
-            <a:r>
-              <a:rPr lang="ru-RU" dirty="0" smtClean="0"/>
-              <a:t>Это не так страшно как может показаться т.к. Проводник </a:t>
-            </a:r>
-            <a:r>
-              <a:rPr lang="en-US" dirty="0" smtClean="0"/>
-              <a:t>Windows </a:t>
-            </a:r>
-            <a:r>
-              <a:rPr lang="ru-RU" dirty="0" smtClean="0"/>
-              <a:t>тоже не умеет работать с длинными путями.</a:t>
-            </a:r>
+            <a:endParaRPr lang="en-US" dirty="0" smtClean="0"/>
           </a:p>
           <a:p>
             <a:pPr marL="0" indent="0">
               <a:buNone/>
             </a:pPr>
-            <a:endParaRPr lang="ru-RU" dirty="0" smtClean="0"/>
-          </a:p>
-          <a:p>
-            <a:pPr marL="0" indent="0">
-              <a:buNone/>
-            </a:pPr>
+            <a:r>
+              <a:rPr lang="ru-RU" sz="4000" dirty="0">
+                <a:solidFill>
+                  <a:srgbClr val="FFC000"/>
+                </a:solidFill>
+                <a:sym typeface="Wingdings"/>
+              </a:rPr>
+              <a:t></a:t>
+            </a:r>
+            <a:r>
+              <a:rPr lang="ru-RU" dirty="0">
+                <a:sym typeface="Wingdings"/>
+              </a:rPr>
+              <a:t> </a:t>
+            </a:r>
+            <a:r>
+              <a:rPr lang="ru-RU" dirty="0"/>
+              <a:t>См. </a:t>
+            </a:r>
             <a:r>
               <a:rPr lang="ru-RU" dirty="0" smtClean="0"/>
-              <a:t>Рекомендую избегать создания слишком длинных путей.</a:t>
-            </a:r>
-          </a:p>
-          <a:p>
-            <a:pPr marL="0" indent="0">
-              <a:buNone/>
-            </a:pPr>
-            <a:endParaRPr lang="ru-RU" dirty="0"/>
-          </a:p>
-          <a:p>
-            <a:pPr marL="0" indent="0">
-              <a:buNone/>
-            </a:pPr>
-            <a:r>
-              <a:rPr lang="ru-RU" sz="4000" dirty="0" smtClean="0">
-                <a:solidFill>
-                  <a:srgbClr val="FFC000"/>
-                </a:solidFill>
-                <a:sym typeface="Wingdings"/>
-              </a:rPr>
-              <a:t></a:t>
-            </a:r>
-            <a:r>
-              <a:rPr lang="ru-RU" dirty="0" smtClean="0">
-                <a:sym typeface="Wingdings"/>
-              </a:rPr>
-              <a:t> </a:t>
-            </a:r>
-            <a:r>
-              <a:rPr lang="ru-RU" dirty="0" smtClean="0"/>
-              <a:t>См. также пример </a:t>
-            </a:r>
-            <a:r>
-              <a:rPr lang="en-US" dirty="0" smtClean="0"/>
+              <a:t>пример </a:t>
+            </a:r>
+            <a:r>
+              <a:rPr lang="en-US" dirty="0"/>
               <a:t>L04-S03-IO</a:t>
             </a:r>
             <a:r>
@@ -45629,8 +45531,8 @@
               <a:t>\</a:t>
             </a:r>
             <a:r>
-              <a:rPr lang="en-US" dirty="0" err="1" smtClean="0"/>
-              <a:t>PathLimits</a:t>
+              <a:rPr lang="en-US" dirty="0" smtClean="0"/>
+              <a:t>Serialization</a:t>
             </a:r>
             <a:endParaRPr lang="en-US" dirty="0"/>
           </a:p>
@@ -45639,7 +45541,7 @@
     </p:spTree>
     <p:extLst>
       <p:ext uri="{BB962C8B-B14F-4D97-AF65-F5344CB8AC3E}">
-        <p14:creationId xmlns:p14="http://schemas.microsoft.com/office/powerpoint/2010/main" val="3295503496"/>
+        <p14:creationId xmlns:p14="http://schemas.microsoft.com/office/powerpoint/2010/main" val="1542700340"/>
       </p:ext>
     </p:extLst>
   </p:cSld>
@@ -45690,7 +45592,7 @@
           <a:p>
             <a:r>
               <a:rPr lang="ru-RU" dirty="0" smtClean="0"/>
-              <a:t>Советы</a:t>
+              <a:t>Метаданные файлов</a:t>
             </a:r>
             <a:endParaRPr lang="ru-RU" dirty="0"/>
           </a:p>
@@ -45713,25 +45615,110 @@
           </a:bodyPr>
           <a:lstStyle/>
           <a:p>
+            <a:pPr marL="0" indent="0">
+              <a:buNone/>
+            </a:pPr>
+            <a:r>
+              <a:rPr lang="en-US" dirty="0" smtClean="0"/>
+              <a:t>Windows </a:t>
+            </a:r>
             <a:r>
               <a:rPr lang="ru-RU" dirty="0" smtClean="0"/>
-              <a:t>При работе с текстовым файлом требуется знать его кодировку. Без этого вы рискуете прочитать мусор. Особенно если читать файл с многобайтовой кодировке как файл в однобайтовой.</a:t>
-            </a:r>
-          </a:p>
-          <a:p>
+              <a:t>позволяет читать метаданные из различных файлов. Например</a:t>
+            </a:r>
+            <a:r>
+              <a:rPr lang="en-US" dirty="0" smtClean="0"/>
+              <a:t>, ID </a:t>
+            </a:r>
             <a:r>
               <a:rPr lang="ru-RU" dirty="0" smtClean="0"/>
-              <a:t>Тестируйте свою программу с пустыми файлами и ОЧЕНЬ большими файлами.</a:t>
-            </a:r>
-          </a:p>
-          <a:p>
+              <a:t>теги из </a:t>
+            </a:r>
+            <a:r>
+              <a:rPr lang="en-US" dirty="0" smtClean="0"/>
+              <a:t>mp3 </a:t>
+            </a:r>
             <a:r>
               <a:rPr lang="ru-RU" dirty="0" smtClean="0"/>
-              <a:t>Для манипуляциями путями используйте методы класса </a:t>
+              <a:t>файлов</a:t>
+            </a:r>
+            <a:r>
+              <a:rPr lang="en-US" dirty="0" smtClean="0"/>
+              <a:t>, EXIF</a:t>
+            </a:r>
+            <a:r>
+              <a:rPr lang="ru-RU" dirty="0"/>
+              <a:t> </a:t>
+            </a:r>
+            <a:r>
+              <a:rPr lang="ru-RU" dirty="0" smtClean="0"/>
+              <a:t>из фотографий и т.д. В самом </a:t>
+            </a:r>
+            <a:r>
+              <a:rPr lang="en-US" dirty="0" smtClean="0"/>
+              <a:t>.NET </a:t>
+            </a:r>
+            <a:r>
+              <a:rPr lang="ru-RU" dirty="0" smtClean="0"/>
+              <a:t>нет встроенных классов для работы с метаданными файлов и понадобится установить </a:t>
+            </a:r>
+            <a:r>
+              <a:rPr lang="en-US" dirty="0" smtClean="0"/>
+              <a:t>NuGet </a:t>
+            </a:r>
+            <a:r>
+              <a:rPr lang="ru-RU" dirty="0" smtClean="0"/>
+              <a:t>пакет </a:t>
             </a:r>
             <a:r>
               <a:rPr lang="en-US" dirty="0" err="1" smtClean="0"/>
-              <a:t>System.IO.Path</a:t>
+              <a:t>Microsoft.WindowsAPICodePack.Shell</a:t>
+            </a:r>
+            <a:r>
+              <a:rPr lang="ru-RU" dirty="0" smtClean="0"/>
+              <a:t>.</a:t>
+            </a:r>
+          </a:p>
+          <a:p>
+            <a:pPr marL="0" indent="0">
+              <a:buNone/>
+            </a:pPr>
+            <a:endParaRPr lang="ru-RU" dirty="0"/>
+          </a:p>
+          <a:p>
+            <a:pPr marL="0" indent="0">
+              <a:buNone/>
+            </a:pPr>
+            <a:r>
+              <a:rPr lang="ru-RU" sz="4000" dirty="0">
+                <a:solidFill>
+                  <a:srgbClr val="FFC000"/>
+                </a:solidFill>
+                <a:sym typeface="Wingdings"/>
+              </a:rPr>
+              <a:t></a:t>
+            </a:r>
+            <a:r>
+              <a:rPr lang="ru-RU" dirty="0">
+                <a:sym typeface="Wingdings"/>
+              </a:rPr>
+              <a:t> </a:t>
+            </a:r>
+            <a:r>
+              <a:rPr lang="ru-RU" dirty="0"/>
+              <a:t>См. пример </a:t>
+            </a:r>
+            <a:r>
+              <a:rPr lang="en-US" dirty="0"/>
+              <a:t>L04-S03-IO</a:t>
+            </a:r>
+            <a:r>
+              <a:rPr lang="ru-RU" dirty="0" smtClean="0"/>
+              <a:t>\</a:t>
+            </a:r>
+            <a:r>
+              <a:rPr lang="en-US" dirty="0" err="1" smtClean="0"/>
+              <a:t>FileMetadataViewer</a:t>
             </a:r>
             <a:endParaRPr lang="ru-RU" dirty="0"/>
           </a:p>
@@ -45740,7 +45727,7 @@
     </p:spTree>
     <p:extLst>
       <p:ext uri="{BB962C8B-B14F-4D97-AF65-F5344CB8AC3E}">
-        <p14:creationId xmlns:p14="http://schemas.microsoft.com/office/powerpoint/2010/main" val="396429370"/>
+        <p14:creationId xmlns:p14="http://schemas.microsoft.com/office/powerpoint/2010/main" val="640264607"/>
       </p:ext>
     </p:extLst>
   </p:cSld>
@@ -46023,6 +46010,336 @@
   <p:cSld>
     <p:bg>
       <p:bgPr>
+        <a:blipFill dpi="0" rotWithShape="1">
+          <a:blip r:embed="rId2">
+            <a:lum/>
+          </a:blip>
+          <a:srcRect/>
+          <a:stretch>
+            <a:fillRect/>
+          </a:stretch>
+        </a:blipFill>
+        <a:effectLst/>
+      </p:bgPr>
+    </p:bg>
+    <p:spTree>
+      <p:nvGrpSpPr>
+        <p:cNvPr id="1" name=""/>
+        <p:cNvGrpSpPr/>
+        <p:nvPr/>
+      </p:nvGrpSpPr>
+      <p:grpSpPr>
+        <a:xfrm>
+          <a:off x="0" y="0"/>
+          <a:ext cx="0" cy="0"/>
+          <a:chOff x="0" y="0"/>
+          <a:chExt cx="0" cy="0"/>
+        </a:xfrm>
+      </p:grpSpPr>
+      <p:sp>
+        <p:nvSpPr>
+          <p:cNvPr id="2" name="Title 1"/>
+          <p:cNvSpPr>
+            <a:spLocks noGrp="1"/>
+          </p:cNvSpPr>
+          <p:nvPr>
+            <p:ph type="title"/>
+          </p:nvPr>
+        </p:nvSpPr>
+        <p:spPr/>
+        <p:txBody>
+          <a:bodyPr/>
+          <a:lstStyle/>
+          <a:p>
+            <a:r>
+              <a:rPr lang="ru-RU" dirty="0" smtClean="0"/>
+              <a:t>Ограничения на длину пути</a:t>
+            </a:r>
+            <a:endParaRPr lang="en-US" dirty="0"/>
+          </a:p>
+        </p:txBody>
+      </p:sp>
+      <p:sp>
+        <p:nvSpPr>
+          <p:cNvPr id="3" name="Content Placeholder 2"/>
+          <p:cNvSpPr>
+            <a:spLocks noGrp="1"/>
+          </p:cNvSpPr>
+          <p:nvPr>
+            <p:ph idx="1"/>
+          </p:nvPr>
+        </p:nvSpPr>
+        <p:spPr/>
+        <p:txBody>
+          <a:bodyPr>
+            <a:normAutofit fontScale="70000" lnSpcReduction="20000"/>
+          </a:bodyPr>
+          <a:lstStyle/>
+          <a:p>
+            <a:pPr marL="0" indent="0">
+              <a:buNone/>
+            </a:pPr>
+            <a:r>
+              <a:rPr lang="ru-RU" dirty="0" smtClean="0"/>
+              <a:t>ОС </a:t>
+            </a:r>
+            <a:r>
+              <a:rPr lang="en-US" dirty="0" smtClean="0"/>
+              <a:t>Windows </a:t>
+            </a:r>
+            <a:r>
+              <a:rPr lang="ru-RU" dirty="0" smtClean="0"/>
+              <a:t>поддерживает пути длиной до 32 Кб, однако в </a:t>
+            </a:r>
+            <a:r>
+              <a:rPr lang="en-US" dirty="0" smtClean="0"/>
+              <a:t>.NET </a:t>
+            </a:r>
+            <a:r>
+              <a:rPr lang="ru-RU" dirty="0" smtClean="0"/>
+              <a:t>мы ограничены следующими значениями:</a:t>
+            </a:r>
+          </a:p>
+          <a:p>
+            <a:pPr marL="0" indent="0">
+              <a:buNone/>
+            </a:pPr>
+            <a:endParaRPr lang="ru-RU" dirty="0" smtClean="0"/>
+          </a:p>
+          <a:p>
+            <a:r>
+              <a:rPr lang="ru-RU" dirty="0" smtClean="0"/>
+              <a:t>Максимальная длина полного имени каталога</a:t>
+            </a:r>
+            <a:r>
+              <a:rPr lang="en-US" dirty="0"/>
+              <a:t>  </a:t>
+            </a:r>
+            <a:r>
+              <a:rPr lang="ru-RU" dirty="0" smtClean="0"/>
+              <a:t>– 247 символов</a:t>
+            </a:r>
+          </a:p>
+          <a:p>
+            <a:r>
+              <a:rPr lang="ru-RU" dirty="0"/>
+              <a:t>Максимальная длина </a:t>
+            </a:r>
+            <a:r>
+              <a:rPr lang="ru-RU" dirty="0" smtClean="0"/>
+              <a:t>полного имени файла</a:t>
+            </a:r>
+            <a:r>
+              <a:rPr lang="en-US" dirty="0"/>
+              <a:t>  </a:t>
+            </a:r>
+            <a:r>
+              <a:rPr lang="ru-RU" dirty="0" smtClean="0"/>
+              <a:t>– 259 символов.</a:t>
+            </a:r>
+          </a:p>
+          <a:p>
+            <a:pPr marL="0" indent="0">
+              <a:buNone/>
+            </a:pPr>
+            <a:endParaRPr lang="ru-RU" dirty="0" smtClean="0"/>
+          </a:p>
+          <a:p>
+            <a:pPr marL="0" indent="0">
+              <a:buNone/>
+            </a:pPr>
+            <a:r>
+              <a:rPr lang="ru-RU" dirty="0" smtClean="0"/>
+              <a:t>Это не так страшно как может показаться т.к. Проводник </a:t>
+            </a:r>
+            <a:r>
+              <a:rPr lang="en-US" dirty="0" smtClean="0"/>
+              <a:t>Windows </a:t>
+            </a:r>
+            <a:r>
+              <a:rPr lang="ru-RU" dirty="0" smtClean="0"/>
+              <a:t>тоже не умеет работать с длинными путями.</a:t>
+            </a:r>
+          </a:p>
+          <a:p>
+            <a:pPr marL="0" indent="0">
+              <a:buNone/>
+            </a:pPr>
+            <a:endParaRPr lang="ru-RU" dirty="0" smtClean="0"/>
+          </a:p>
+          <a:p>
+            <a:pPr marL="0" indent="0">
+              <a:buNone/>
+            </a:pPr>
+            <a:r>
+              <a:rPr lang="ru-RU" dirty="0" smtClean="0"/>
+              <a:t>Рекомендую избегать создания слишком длинных путей.</a:t>
+            </a:r>
+          </a:p>
+          <a:p>
+            <a:pPr marL="0" indent="0">
+              <a:buNone/>
+            </a:pPr>
+            <a:endParaRPr lang="ru-RU" dirty="0"/>
+          </a:p>
+          <a:p>
+            <a:pPr marL="0" indent="0">
+              <a:buNone/>
+            </a:pPr>
+            <a:r>
+              <a:rPr lang="ru-RU" sz="4000" dirty="0" smtClean="0">
+                <a:solidFill>
+                  <a:srgbClr val="FFC000"/>
+                </a:solidFill>
+                <a:sym typeface="Wingdings"/>
+              </a:rPr>
+              <a:t></a:t>
+            </a:r>
+            <a:r>
+              <a:rPr lang="ru-RU" dirty="0" smtClean="0">
+                <a:sym typeface="Wingdings"/>
+              </a:rPr>
+              <a:t> </a:t>
+            </a:r>
+            <a:r>
+              <a:rPr lang="ru-RU" dirty="0" smtClean="0"/>
+              <a:t>См. также пример </a:t>
+            </a:r>
+            <a:r>
+              <a:rPr lang="en-US" dirty="0" smtClean="0"/>
+              <a:t>L04-S03-IO</a:t>
+            </a:r>
+            <a:r>
+              <a:rPr lang="ru-RU" dirty="0" smtClean="0"/>
+              <a:t>\</a:t>
+            </a:r>
+            <a:r>
+              <a:rPr lang="en-US" dirty="0" err="1" smtClean="0"/>
+              <a:t>PathLimits</a:t>
+            </a:r>
+            <a:endParaRPr lang="en-US" dirty="0"/>
+          </a:p>
+        </p:txBody>
+      </p:sp>
+    </p:spTree>
+    <p:extLst>
+      <p:ext uri="{BB962C8B-B14F-4D97-AF65-F5344CB8AC3E}">
+        <p14:creationId xmlns:p14="http://schemas.microsoft.com/office/powerpoint/2010/main" val="3295503496"/>
+      </p:ext>
+    </p:extLst>
+  </p:cSld>
+  <p:clrMapOvr>
+    <a:masterClrMapping/>
+  </p:clrMapOvr>
+  <p:timing>
+    <p:tnLst>
+      <p:par>
+        <p:cTn id="1" dur="indefinite" restart="never" nodeType="tmRoot"/>
+      </p:par>
+    </p:tnLst>
+  </p:timing>
+</p:sld>
+</file>
+
+<file path=ppt/slides/slide51.xml><?xml version="1.0" encoding="utf-8"?>
+<p:sld xmlns:a="http://schemas.openxmlformats.org/drawingml/2006/main" xmlns:r="http://schemas.openxmlformats.org/officeDocument/2006/relationships" xmlns:p="http://schemas.openxmlformats.org/presentationml/2006/main">
+  <p:cSld>
+    <p:spTree>
+      <p:nvGrpSpPr>
+        <p:cNvPr id="1" name=""/>
+        <p:cNvGrpSpPr/>
+        <p:nvPr/>
+      </p:nvGrpSpPr>
+      <p:grpSpPr>
+        <a:xfrm>
+          <a:off x="0" y="0"/>
+          <a:ext cx="0" cy="0"/>
+          <a:chOff x="0" y="0"/>
+          <a:chExt cx="0" cy="0"/>
+        </a:xfrm>
+      </p:grpSpPr>
+      <p:sp>
+        <p:nvSpPr>
+          <p:cNvPr id="2" name="Title 1"/>
+          <p:cNvSpPr>
+            <a:spLocks noGrp="1"/>
+          </p:cNvSpPr>
+          <p:nvPr>
+            <p:ph type="title"/>
+          </p:nvPr>
+        </p:nvSpPr>
+        <p:spPr/>
+        <p:txBody>
+          <a:bodyPr/>
+          <a:lstStyle/>
+          <a:p>
+            <a:r>
+              <a:rPr lang="ru-RU" dirty="0" smtClean="0"/>
+              <a:t>Советы</a:t>
+            </a:r>
+            <a:endParaRPr lang="ru-RU" dirty="0"/>
+          </a:p>
+        </p:txBody>
+      </p:sp>
+      <p:sp>
+        <p:nvSpPr>
+          <p:cNvPr id="3" name="Content Placeholder 2"/>
+          <p:cNvSpPr>
+            <a:spLocks noGrp="1"/>
+          </p:cNvSpPr>
+          <p:nvPr>
+            <p:ph idx="1"/>
+          </p:nvPr>
+        </p:nvSpPr>
+        <p:spPr/>
+        <p:txBody>
+          <a:bodyPr>
+            <a:normAutofit lnSpcReduction="10000"/>
+          </a:bodyPr>
+          <a:lstStyle/>
+          <a:p>
+            <a:r>
+              <a:rPr lang="ru-RU" dirty="0" smtClean="0"/>
+              <a:t>При работе с текстовым файлом требуется знать его кодировку. Без этого вы рискуете прочитать мусор. Особенно если читать файл с многобайтовой кодировке как файл в однобайтовой.</a:t>
+            </a:r>
+          </a:p>
+          <a:p>
+            <a:r>
+              <a:rPr lang="ru-RU" dirty="0" smtClean="0"/>
+              <a:t>Тестируйте свою программу с пустыми файлами и ОЧЕНЬ большими файлами.</a:t>
+            </a:r>
+          </a:p>
+          <a:p>
+            <a:r>
+              <a:rPr lang="ru-RU" dirty="0" smtClean="0"/>
+              <a:t>Для манипуляциями путями используйте методы класса </a:t>
+            </a:r>
+            <a:r>
+              <a:rPr lang="en-US" dirty="0" err="1" smtClean="0"/>
+              <a:t>System.IO.Path</a:t>
+            </a:r>
+            <a:endParaRPr lang="ru-RU" dirty="0"/>
+          </a:p>
+        </p:txBody>
+      </p:sp>
+    </p:spTree>
+    <p:extLst>
+      <p:ext uri="{BB962C8B-B14F-4D97-AF65-F5344CB8AC3E}">
+        <p14:creationId xmlns:p14="http://schemas.microsoft.com/office/powerpoint/2010/main" val="396429370"/>
+      </p:ext>
+    </p:extLst>
+  </p:cSld>
+  <p:clrMapOvr>
+    <a:masterClrMapping/>
+  </p:clrMapOvr>
+</p:sld>
+</file>
+
+<file path=ppt/slides/slide52.xml><?xml version="1.0" encoding="utf-8"?>
+<p:sld xmlns:a="http://schemas.openxmlformats.org/drawingml/2006/main" xmlns:r="http://schemas.openxmlformats.org/officeDocument/2006/relationships" xmlns:p="http://schemas.openxmlformats.org/presentationml/2006/main">
+  <p:cSld>
+    <p:bg>
+      <p:bgPr>
         <a:solidFill>
           <a:srgbClr val="6600CC"/>
         </a:solidFill>
@@ -46311,7 +46628,7 @@
 </p:sld>
 </file>
 
-<file path=ppt/slides/slide51.xml><?xml version="1.0" encoding="utf-8"?>
+<file path=ppt/slides/slide53.xml><?xml version="1.0" encoding="utf-8"?>
 <p:sld xmlns:a="http://schemas.openxmlformats.org/drawingml/2006/main" xmlns:r="http://schemas.openxmlformats.org/officeDocument/2006/relationships" xmlns:p="http://schemas.openxmlformats.org/presentationml/2006/main">
   <p:cSld>
     <p:bg>

</xml_diff>

<commit_message>
Fixed typo in encoding name
</commit_message>
<xml_diff>
--- a/Presentation/lesson-04-io.pptx
+++ b/Presentation/lesson-04-io.pptx
@@ -339,7 +339,7 @@
             <a:fld id="{FAECF776-F836-4CCD-9497-99E5597B8B5D}" type="datetimeFigureOut">
               <a:rPr lang="en-US" smtClean="0"/>
               <a:pPr/>
-              <a:t>11/3/2015</a:t>
+              <a:t>11/20/2015</a:t>
             </a:fld>
             <a:endParaRPr lang="en-US"/>
           </a:p>
@@ -511,7 +511,7 @@
             <a:fld id="{FAECF776-F836-4CCD-9497-99E5597B8B5D}" type="datetimeFigureOut">
               <a:rPr lang="en-US" smtClean="0"/>
               <a:pPr/>
-              <a:t>11/3/2015</a:t>
+              <a:t>11/20/2015</a:t>
             </a:fld>
             <a:endParaRPr lang="en-US"/>
           </a:p>
@@ -693,7 +693,7 @@
             <a:fld id="{FAECF776-F836-4CCD-9497-99E5597B8B5D}" type="datetimeFigureOut">
               <a:rPr lang="en-US" smtClean="0"/>
               <a:pPr/>
-              <a:t>11/3/2015</a:t>
+              <a:t>11/20/2015</a:t>
             </a:fld>
             <a:endParaRPr lang="en-US"/>
           </a:p>
@@ -943,7 +943,7 @@
                 </a:solidFill>
               </a:rPr>
               <a:pPr/>
-              <a:t>11/3/2015</a:t>
+              <a:t>11/20/2015</a:t>
             </a:fld>
             <a:endParaRPr lang="en-US">
               <a:solidFill>
@@ -1145,7 +1145,7 @@
                 </a:solidFill>
               </a:rPr>
               <a:pPr/>
-              <a:t>11/3/2015</a:t>
+              <a:t>11/20/2015</a:t>
             </a:fld>
             <a:endParaRPr lang="en-US">
               <a:solidFill>
@@ -1423,7 +1423,7 @@
                 </a:solidFill>
               </a:rPr>
               <a:pPr/>
-              <a:t>11/3/2015</a:t>
+              <a:t>11/20/2015</a:t>
             </a:fld>
             <a:endParaRPr lang="en-US">
               <a:solidFill>
@@ -1743,7 +1743,7 @@
                 </a:solidFill>
               </a:rPr>
               <a:pPr/>
-              <a:t>11/3/2015</a:t>
+              <a:t>11/20/2015</a:t>
             </a:fld>
             <a:endParaRPr lang="en-US">
               <a:solidFill>
@@ -2197,7 +2197,7 @@
                 </a:solidFill>
               </a:rPr>
               <a:pPr/>
-              <a:t>11/3/2015</a:t>
+              <a:t>11/20/2015</a:t>
             </a:fld>
             <a:endParaRPr lang="en-US">
               <a:solidFill>
@@ -2347,7 +2347,7 @@
                 </a:solidFill>
               </a:rPr>
               <a:pPr/>
-              <a:t>11/3/2015</a:t>
+              <a:t>11/20/2015</a:t>
             </a:fld>
             <a:endParaRPr lang="en-US">
               <a:solidFill>
@@ -2474,7 +2474,7 @@
                 </a:solidFill>
               </a:rPr>
               <a:pPr/>
-              <a:t>11/3/2015</a:t>
+              <a:t>11/20/2015</a:t>
             </a:fld>
             <a:endParaRPr lang="en-US">
               <a:solidFill>
@@ -2783,7 +2783,7 @@
                 </a:solidFill>
               </a:rPr>
               <a:pPr/>
-              <a:t>11/3/2015</a:t>
+              <a:t>11/20/2015</a:t>
             </a:fld>
             <a:endParaRPr lang="en-US">
               <a:solidFill>
@@ -2979,7 +2979,7 @@
             <a:fld id="{FAECF776-F836-4CCD-9497-99E5597B8B5D}" type="datetimeFigureOut">
               <a:rPr lang="en-US" smtClean="0"/>
               <a:pPr/>
-              <a:t>11/3/2015</a:t>
+              <a:t>11/20/2015</a:t>
             </a:fld>
             <a:endParaRPr lang="en-US"/>
           </a:p>
@@ -3240,7 +3240,7 @@
                 </a:solidFill>
               </a:rPr>
               <a:pPr/>
-              <a:t>11/3/2015</a:t>
+              <a:t>11/20/2015</a:t>
             </a:fld>
             <a:endParaRPr lang="en-US">
               <a:solidFill>
@@ -3442,7 +3442,7 @@
                 </a:solidFill>
               </a:rPr>
               <a:pPr/>
-              <a:t>11/3/2015</a:t>
+              <a:t>11/20/2015</a:t>
             </a:fld>
             <a:endParaRPr lang="en-US">
               <a:solidFill>
@@ -3654,7 +3654,7 @@
                 </a:solidFill>
               </a:rPr>
               <a:pPr/>
-              <a:t>11/3/2015</a:t>
+              <a:t>11/20/2015</a:t>
             </a:fld>
             <a:endParaRPr lang="en-US">
               <a:solidFill>
@@ -3926,7 +3926,7 @@
             <a:fld id="{FAECF776-F836-4CCD-9497-99E5597B8B5D}" type="datetimeFigureOut">
               <a:rPr lang="en-US" smtClean="0"/>
               <a:pPr/>
-              <a:t>11/3/2015</a:t>
+              <a:t>11/20/2015</a:t>
             </a:fld>
             <a:endParaRPr lang="en-US"/>
           </a:p>
@@ -4216,7 +4216,7 @@
             <a:fld id="{FAECF776-F836-4CCD-9497-99E5597B8B5D}" type="datetimeFigureOut">
               <a:rPr lang="en-US" smtClean="0"/>
               <a:pPr/>
-              <a:t>11/3/2015</a:t>
+              <a:t>11/20/2015</a:t>
             </a:fld>
             <a:endParaRPr lang="en-US"/>
           </a:p>
@@ -4640,7 +4640,7 @@
             <a:fld id="{FAECF776-F836-4CCD-9497-99E5597B8B5D}" type="datetimeFigureOut">
               <a:rPr lang="en-US" smtClean="0"/>
               <a:pPr/>
-              <a:t>11/3/2015</a:t>
+              <a:t>11/20/2015</a:t>
             </a:fld>
             <a:endParaRPr lang="en-US"/>
           </a:p>
@@ -4760,7 +4760,7 @@
             <a:fld id="{FAECF776-F836-4CCD-9497-99E5597B8B5D}" type="datetimeFigureOut">
               <a:rPr lang="en-US" smtClean="0"/>
               <a:pPr/>
-              <a:t>11/3/2015</a:t>
+              <a:t>11/20/2015</a:t>
             </a:fld>
             <a:endParaRPr lang="en-US"/>
           </a:p>
@@ -4857,7 +4857,7 @@
             <a:fld id="{FAECF776-F836-4CCD-9497-99E5597B8B5D}" type="datetimeFigureOut">
               <a:rPr lang="en-US" smtClean="0"/>
               <a:pPr/>
-              <a:t>11/3/2015</a:t>
+              <a:t>11/20/2015</a:t>
             </a:fld>
             <a:endParaRPr lang="en-US"/>
           </a:p>
@@ -5136,7 +5136,7 @@
             <a:fld id="{FAECF776-F836-4CCD-9497-99E5597B8B5D}" type="datetimeFigureOut">
               <a:rPr lang="en-US" smtClean="0"/>
               <a:pPr/>
-              <a:t>11/3/2015</a:t>
+              <a:t>11/20/2015</a:t>
             </a:fld>
             <a:endParaRPr lang="en-US"/>
           </a:p>
@@ -5391,7 +5391,7 @@
             <a:fld id="{FAECF776-F836-4CCD-9497-99E5597B8B5D}" type="datetimeFigureOut">
               <a:rPr lang="en-US" smtClean="0"/>
               <a:pPr/>
-              <a:t>11/3/2015</a:t>
+              <a:t>11/20/2015</a:t>
             </a:fld>
             <a:endParaRPr lang="en-US"/>
           </a:p>
@@ -5615,7 +5615,7 @@
             <a:fld id="{FAECF776-F836-4CCD-9497-99E5597B8B5D}" type="datetimeFigureOut">
               <a:rPr lang="en-US" smtClean="0"/>
               <a:pPr/>
-              <a:t>11/3/2015</a:t>
+              <a:t>11/20/2015</a:t>
             </a:fld>
             <a:endParaRPr lang="en-US"/>
           </a:p>
@@ -6133,7 +6133,7 @@
                 </a:solidFill>
               </a:rPr>
               <a:pPr/>
-              <a:t>11/3/2015</a:t>
+              <a:t>11/20/2015</a:t>
             </a:fld>
             <a:endParaRPr lang="en-US">
               <a:solidFill>
@@ -23824,7 +23824,7 @@
           <p:nvPr>
             <p:extLst>
               <p:ext uri="{D42A27DB-BD31-4B8C-83A1-F6EECF244321}">
-                <p14:modId xmlns:p14="http://schemas.microsoft.com/office/powerpoint/2010/main" val="1665603976"/>
+                <p14:modId xmlns:p14="http://schemas.microsoft.com/office/powerpoint/2010/main" val="2513128091"/>
               </p:ext>
             </p:extLst>
           </p:nvPr>
@@ -26040,6 +26040,57 @@
           </a:graphicData>
         </a:graphic>
       </p:graphicFrame>
+      <p:sp>
+        <p:nvSpPr>
+          <p:cNvPr id="2" name="TextBox 1"/>
+          <p:cNvSpPr txBox="1"/>
+          <p:nvPr/>
+        </p:nvSpPr>
+        <p:spPr>
+          <a:xfrm>
+            <a:off x="467543" y="4941168"/>
+            <a:ext cx="8280919" cy="400110"/>
+          </a:xfrm>
+          <a:prstGeom prst="rect">
+            <a:avLst/>
+          </a:prstGeom>
+          <a:noFill/>
+        </p:spPr>
+        <p:txBody>
+          <a:bodyPr wrap="square" rtlCol="0">
+            <a:spAutoFit/>
+          </a:bodyPr>
+          <a:lstStyle/>
+          <a:p>
+            <a:r>
+              <a:rPr lang="ru-RU" sz="2000" dirty="0">
+                <a:solidFill>
+                  <a:srgbClr val="FFC000"/>
+                </a:solidFill>
+                <a:sym typeface="Wingdings"/>
+              </a:rPr>
+              <a:t> </a:t>
+            </a:r>
+            <a:r>
+              <a:rPr lang="ru-RU" sz="2000" dirty="0" smtClean="0"/>
+              <a:t>См. также пример </a:t>
+            </a:r>
+            <a:r>
+              <a:rPr lang="en-US" sz="2000" dirty="0" smtClean="0"/>
+              <a:t>L08-S01-Processes</a:t>
+            </a:r>
+            <a:r>
+              <a:rPr lang="ru-RU" sz="2000" dirty="0" smtClean="0"/>
+              <a:t>\</a:t>
+            </a:r>
+            <a:r>
+              <a:rPr lang="en-US" sz="2000" dirty="0" err="1"/>
+              <a:t>EnvironmentInformation</a:t>
+            </a:r>
+            <a:endParaRPr lang="ru-RU" sz="2000" dirty="0"/>
+          </a:p>
+        </p:txBody>
+      </p:sp>
     </p:spTree>
     <p:extLst>
       <p:ext uri="{BB962C8B-B14F-4D97-AF65-F5344CB8AC3E}">

</xml_diff>